<commit_message>
Updated index and ranges !
</commit_message>
<xml_diff>
--- a/CSFeatures/CS80.pptx
+++ b/CSFeatures/CS80.pptx
@@ -2001,10 +2001,9 @@
         <a:p>
           <a:pPr rtl="0"/>
           <a:r>
-            <a:rPr lang="es-ES" dirty="0" smtClean="0"/>
+            <a:rPr lang="es-ES" dirty="0"/>
             <a:t>C# 6.0</a:t>
           </a:r>
-          <a:endParaRPr lang="es-ES" dirty="0"/>
         </a:p>
       </dgm:t>
     </dgm:pt>
@@ -2045,10 +2044,9 @@
         <a:p>
           <a:pPr rtl="0"/>
           <a:r>
-            <a:rPr lang="es-ES" dirty="0" smtClean="0"/>
+            <a:rPr lang="es-ES" dirty="0"/>
             <a:t>C# 7.0</a:t>
           </a:r>
-          <a:endParaRPr lang="es-ES" dirty="0"/>
         </a:p>
       </dgm:t>
     </dgm:pt>
@@ -2089,10 +2087,9 @@
         <a:p>
           <a:pPr rtl="0"/>
           <a:r>
-            <a:rPr lang="es-ES" dirty="0" smtClean="0"/>
+            <a:rPr lang="es-ES" dirty="0"/>
             <a:t>C# 7.1</a:t>
           </a:r>
-          <a:endParaRPr lang="es-ES" dirty="0"/>
         </a:p>
       </dgm:t>
     </dgm:pt>
@@ -2133,10 +2130,9 @@
         <a:p>
           <a:pPr rtl="0"/>
           <a:r>
-            <a:rPr lang="es-ES" dirty="0" smtClean="0"/>
+            <a:rPr lang="es-ES" dirty="0"/>
             <a:t>C# 7.2</a:t>
           </a:r>
-          <a:endParaRPr lang="es-ES" dirty="0"/>
         </a:p>
       </dgm:t>
     </dgm:pt>
@@ -2177,10 +2173,9 @@
         <a:p>
           <a:pPr rtl="0"/>
           <a:r>
-            <a:rPr lang="es-ES" dirty="0" smtClean="0"/>
+            <a:rPr lang="es-ES" dirty="0"/>
             <a:t>C# 7.3</a:t>
           </a:r>
-          <a:endParaRPr lang="es-ES" dirty="0"/>
         </a:p>
       </dgm:t>
     </dgm:pt>
@@ -2215,10 +2210,9 @@
         <a:p>
           <a:pPr rtl="0"/>
           <a:r>
-            <a:rPr lang="es-ES" dirty="0" smtClean="0"/>
+            <a:rPr lang="es-ES" dirty="0"/>
             <a:t>C# 8.0</a:t>
           </a:r>
-          <a:endParaRPr lang="es-ES" dirty="0"/>
         </a:p>
       </dgm:t>
     </dgm:pt>
@@ -2260,10 +2254,9 @@
         <a:p>
           <a:pPr rtl="0"/>
           <a:r>
-            <a:rPr lang="es-ES" dirty="0" smtClean="0"/>
+            <a:rPr lang="es-ES" dirty="0"/>
             <a:t>C# 9.0</a:t>
           </a:r>
-          <a:endParaRPr lang="es-ES" dirty="0"/>
         </a:p>
       </dgm:t>
     </dgm:pt>
@@ -2297,13 +2290,6 @@
         </dgm:presLayoutVars>
       </dgm:prSet>
       <dgm:spPr/>
-      <dgm:t>
-        <a:bodyPr/>
-        <a:lstStyle/>
-        <a:p>
-          <a:endParaRPr lang="es-ES"/>
-        </a:p>
-      </dgm:t>
     </dgm:pt>
     <dgm:pt modelId="{D0807BC8-3214-4EA7-83A1-C064A52D56B2}" type="pres">
       <dgm:prSet presAssocID="{9C88220A-761A-4F7D-AA10-BAC424FB10F0}" presName="node" presStyleLbl="node1" presStyleIdx="0" presStyleCnt="7" custLinFactNeighborY="-1098">
@@ -2312,13 +2298,6 @@
         </dgm:presLayoutVars>
       </dgm:prSet>
       <dgm:spPr/>
-      <dgm:t>
-        <a:bodyPr/>
-        <a:lstStyle/>
-        <a:p>
-          <a:endParaRPr lang="es-ES"/>
-        </a:p>
-      </dgm:t>
     </dgm:pt>
     <dgm:pt modelId="{2219CF2A-1A5B-4B8B-B632-296CCD0741DD}" type="pres">
       <dgm:prSet presAssocID="{A328FF6E-D807-41F5-9B54-86013E55F153}" presName="sibTrans" presStyleCnt="0"/>
@@ -2331,13 +2310,6 @@
         </dgm:presLayoutVars>
       </dgm:prSet>
       <dgm:spPr/>
-      <dgm:t>
-        <a:bodyPr/>
-        <a:lstStyle/>
-        <a:p>
-          <a:endParaRPr lang="es-ES"/>
-        </a:p>
-      </dgm:t>
     </dgm:pt>
     <dgm:pt modelId="{5BCE511F-BEB0-4413-ADCE-261EB016E77E}" type="pres">
       <dgm:prSet presAssocID="{71E237C5-80A3-46DD-952B-12EB23049E8C}" presName="sibTrans" presStyleCnt="0"/>
@@ -2350,13 +2322,6 @@
         </dgm:presLayoutVars>
       </dgm:prSet>
       <dgm:spPr/>
-      <dgm:t>
-        <a:bodyPr/>
-        <a:lstStyle/>
-        <a:p>
-          <a:endParaRPr lang="es-ES"/>
-        </a:p>
-      </dgm:t>
     </dgm:pt>
     <dgm:pt modelId="{3285D919-6CA4-4D89-B256-7813EC3150AF}" type="pres">
       <dgm:prSet presAssocID="{44CCD00D-E2E3-46B7-B5FB-7E6C27B8FAA0}" presName="sibTrans" presStyleCnt="0"/>
@@ -2369,13 +2334,6 @@
         </dgm:presLayoutVars>
       </dgm:prSet>
       <dgm:spPr/>
-      <dgm:t>
-        <a:bodyPr/>
-        <a:lstStyle/>
-        <a:p>
-          <a:endParaRPr lang="es-ES"/>
-        </a:p>
-      </dgm:t>
     </dgm:pt>
     <dgm:pt modelId="{2EE16E4A-D0C3-4FF4-B9DE-6C840371AD01}" type="pres">
       <dgm:prSet presAssocID="{6E5A83F2-D837-4A18-AD76-736D61FB6A7F}" presName="sibTrans" presStyleCnt="0"/>
@@ -2388,13 +2346,6 @@
         </dgm:presLayoutVars>
       </dgm:prSet>
       <dgm:spPr/>
-      <dgm:t>
-        <a:bodyPr/>
-        <a:lstStyle/>
-        <a:p>
-          <a:endParaRPr lang="es-ES"/>
-        </a:p>
-      </dgm:t>
     </dgm:pt>
     <dgm:pt modelId="{A0BF3710-0DE0-414C-A760-3AEB983E01AA}" type="pres">
       <dgm:prSet presAssocID="{7D1EB2F4-56C7-4D78-BE43-3DFC7624124A}" presName="sibTrans" presStyleCnt="0"/>
@@ -2407,13 +2358,6 @@
         </dgm:presLayoutVars>
       </dgm:prSet>
       <dgm:spPr/>
-      <dgm:t>
-        <a:bodyPr/>
-        <a:lstStyle/>
-        <a:p>
-          <a:endParaRPr lang="es-ES"/>
-        </a:p>
-      </dgm:t>
     </dgm:pt>
     <dgm:pt modelId="{70D769A4-DFE6-47E8-A679-F7974F2AB7F7}" type="pres">
       <dgm:prSet presAssocID="{BBF5C8FD-439D-4185-AA77-541675A064F6}" presName="sibTrans" presStyleCnt="0"/>
@@ -2426,31 +2370,24 @@
         </dgm:presLayoutVars>
       </dgm:prSet>
       <dgm:spPr/>
-      <dgm:t>
-        <a:bodyPr/>
-        <a:lstStyle/>
-        <a:p>
-          <a:endParaRPr lang="es-ES"/>
-        </a:p>
-      </dgm:t>
     </dgm:pt>
   </dgm:ptLst>
   <dgm:cxnLst>
+    <dgm:cxn modelId="{2BB81E27-6415-4B0F-89B7-02D92F7D4DE7}" type="presOf" srcId="{7C6AFF78-FB90-44E5-93AD-FDC77BD488E2}" destId="{A0CE45E0-DFDD-4351-A72A-8505030C57C3}" srcOrd="0" destOrd="0" presId="urn:microsoft.com/office/officeart/2005/8/layout/hList6"/>
+    <dgm:cxn modelId="{F816E334-ABD4-4615-BAF3-7CA44469130C}" srcId="{352FE7B3-671C-4073-B16B-7DCE4922259F}" destId="{32F05761-3994-4624-8FA0-C05CFC989FE2}" srcOrd="2" destOrd="0" parTransId="{C2791A8D-C57A-4145-8A42-9AB6AA844879}" sibTransId="{44CCD00D-E2E3-46B7-B5FB-7E6C27B8FAA0}"/>
+    <dgm:cxn modelId="{48919342-748E-43AA-9747-8D68CB42CE08}" type="presOf" srcId="{352FE7B3-671C-4073-B16B-7DCE4922259F}" destId="{B15400B7-7BB5-4F51-BF08-1085B699AEF0}" srcOrd="0" destOrd="0" presId="urn:microsoft.com/office/officeart/2005/8/layout/hList6"/>
+    <dgm:cxn modelId="{983D8F50-C9FB-4111-B016-2406D33D1B09}" type="presOf" srcId="{5E06DF69-6A89-46C1-AEC5-ABF1244C6C74}" destId="{A4A084B5-831E-4886-9159-E3805285A6E3}" srcOrd="0" destOrd="0" presId="urn:microsoft.com/office/officeart/2005/8/layout/hList6"/>
+    <dgm:cxn modelId="{11FD7351-5A76-483B-9272-67F27AA3D517}" srcId="{352FE7B3-671C-4073-B16B-7DCE4922259F}" destId="{33D7CD92-B145-484E-88FF-FF76A848FB2F}" srcOrd="6" destOrd="0" parTransId="{55D8A7BC-BDF6-4A0A-9470-A85E630FFD7F}" sibTransId="{49045E33-0378-49CC-8BEF-3273CFD35D7B}"/>
+    <dgm:cxn modelId="{4B54B365-52BF-49B2-A265-32E9398C77D7}" srcId="{352FE7B3-671C-4073-B16B-7DCE4922259F}" destId="{7C6AFF78-FB90-44E5-93AD-FDC77BD488E2}" srcOrd="5" destOrd="0" parTransId="{0BCF5DD6-BEE9-4DD7-AE86-BF49B485E272}" sibTransId="{BBF5C8FD-439D-4185-AA77-541675A064F6}"/>
     <dgm:cxn modelId="{A8950069-CF71-4B79-9853-5C6157074B69}" type="presOf" srcId="{33D7CD92-B145-484E-88FF-FF76A848FB2F}" destId="{0F7217D2-F4A0-4657-A376-A398E18A6348}" srcOrd="0" destOrd="0" presId="urn:microsoft.com/office/officeart/2005/8/layout/hList6"/>
+    <dgm:cxn modelId="{0CE5437D-F317-4F48-ABBB-036E19710D22}" srcId="{352FE7B3-671C-4073-B16B-7DCE4922259F}" destId="{86892350-85C6-44D5-A4E0-5BDE0D2948DF}" srcOrd="4" destOrd="0" parTransId="{37CF5B84-9F4A-418B-9BC8-D5419FC8E088}" sibTransId="{7D1EB2F4-56C7-4D78-BE43-3DFC7624124A}"/>
+    <dgm:cxn modelId="{7D38B57F-C5FC-4C38-B130-E0DDAB58D6C9}" srcId="{352FE7B3-671C-4073-B16B-7DCE4922259F}" destId="{3BC26A73-6D8D-4E98-BB69-7EC11F8047E2}" srcOrd="3" destOrd="0" parTransId="{BE87D313-09EF-4E29-8F94-B4DCCD68462A}" sibTransId="{6E5A83F2-D837-4A18-AD76-736D61FB6A7F}"/>
+    <dgm:cxn modelId="{25F9789F-2737-43F8-9046-ED0D0B19243B}" type="presOf" srcId="{86892350-85C6-44D5-A4E0-5BDE0D2948DF}" destId="{42B20AE0-90BA-49BD-A2FF-3EE3A010A3EF}" srcOrd="0" destOrd="0" presId="urn:microsoft.com/office/officeart/2005/8/layout/hList6"/>
+    <dgm:cxn modelId="{346FC0A3-EADD-43B7-8808-64BD415355CB}" srcId="{352FE7B3-671C-4073-B16B-7DCE4922259F}" destId="{5E06DF69-6A89-46C1-AEC5-ABF1244C6C74}" srcOrd="1" destOrd="0" parTransId="{092B60E8-D5E7-42BD-B61B-5402E2D9578C}" sibTransId="{71E237C5-80A3-46DD-952B-12EB23049E8C}"/>
     <dgm:cxn modelId="{357BCBDC-D35D-47FB-920E-4EB4EE226CB3}" type="presOf" srcId="{32F05761-3994-4624-8FA0-C05CFC989FE2}" destId="{5C760EA2-0703-43E1-A48C-D563D9B9CF39}" srcOrd="0" destOrd="0" presId="urn:microsoft.com/office/officeart/2005/8/layout/hList6"/>
-    <dgm:cxn modelId="{25F9789F-2737-43F8-9046-ED0D0B19243B}" type="presOf" srcId="{86892350-85C6-44D5-A4E0-5BDE0D2948DF}" destId="{42B20AE0-90BA-49BD-A2FF-3EE3A010A3EF}" srcOrd="0" destOrd="0" presId="urn:microsoft.com/office/officeart/2005/8/layout/hList6"/>
-    <dgm:cxn modelId="{7D38B57F-C5FC-4C38-B130-E0DDAB58D6C9}" srcId="{352FE7B3-671C-4073-B16B-7DCE4922259F}" destId="{3BC26A73-6D8D-4E98-BB69-7EC11F8047E2}" srcOrd="3" destOrd="0" parTransId="{BE87D313-09EF-4E29-8F94-B4DCCD68462A}" sibTransId="{6E5A83F2-D837-4A18-AD76-736D61FB6A7F}"/>
-    <dgm:cxn modelId="{346FC0A3-EADD-43B7-8808-64BD415355CB}" srcId="{352FE7B3-671C-4073-B16B-7DCE4922259F}" destId="{5E06DF69-6A89-46C1-AEC5-ABF1244C6C74}" srcOrd="1" destOrd="0" parTransId="{092B60E8-D5E7-42BD-B61B-5402E2D9578C}" sibTransId="{71E237C5-80A3-46DD-952B-12EB23049E8C}"/>
-    <dgm:cxn modelId="{F816E334-ABD4-4615-BAF3-7CA44469130C}" srcId="{352FE7B3-671C-4073-B16B-7DCE4922259F}" destId="{32F05761-3994-4624-8FA0-C05CFC989FE2}" srcOrd="2" destOrd="0" parTransId="{C2791A8D-C57A-4145-8A42-9AB6AA844879}" sibTransId="{44CCD00D-E2E3-46B7-B5FB-7E6C27B8FAA0}"/>
-    <dgm:cxn modelId="{983D8F50-C9FB-4111-B016-2406D33D1B09}" type="presOf" srcId="{5E06DF69-6A89-46C1-AEC5-ABF1244C6C74}" destId="{A4A084B5-831E-4886-9159-E3805285A6E3}" srcOrd="0" destOrd="0" presId="urn:microsoft.com/office/officeart/2005/8/layout/hList6"/>
-    <dgm:cxn modelId="{2BB81E27-6415-4B0F-89B7-02D92F7D4DE7}" type="presOf" srcId="{7C6AFF78-FB90-44E5-93AD-FDC77BD488E2}" destId="{A0CE45E0-DFDD-4351-A72A-8505030C57C3}" srcOrd="0" destOrd="0" presId="urn:microsoft.com/office/officeart/2005/8/layout/hList6"/>
+    <dgm:cxn modelId="{E57075E5-5D11-4E75-82BB-061E2B8AD75E}" type="presOf" srcId="{9C88220A-761A-4F7D-AA10-BAC424FB10F0}" destId="{D0807BC8-3214-4EA7-83A1-C064A52D56B2}" srcOrd="0" destOrd="0" presId="urn:microsoft.com/office/officeart/2005/8/layout/hList6"/>
     <dgm:cxn modelId="{C289BAF3-EBCB-44F3-A3F2-28DAD7E12704}" type="presOf" srcId="{3BC26A73-6D8D-4E98-BB69-7EC11F8047E2}" destId="{7885D384-7AC2-486A-B21B-402622FF55CE}" srcOrd="0" destOrd="0" presId="urn:microsoft.com/office/officeart/2005/8/layout/hList6"/>
-    <dgm:cxn modelId="{E57075E5-5D11-4E75-82BB-061E2B8AD75E}" type="presOf" srcId="{9C88220A-761A-4F7D-AA10-BAC424FB10F0}" destId="{D0807BC8-3214-4EA7-83A1-C064A52D56B2}" srcOrd="0" destOrd="0" presId="urn:microsoft.com/office/officeart/2005/8/layout/hList6"/>
     <dgm:cxn modelId="{9B1D81FF-828C-42CF-A368-9B3F75316107}" srcId="{352FE7B3-671C-4073-B16B-7DCE4922259F}" destId="{9C88220A-761A-4F7D-AA10-BAC424FB10F0}" srcOrd="0" destOrd="0" parTransId="{2FE5BB0F-B73A-4921-92C0-73E78A0DED05}" sibTransId="{A328FF6E-D807-41F5-9B54-86013E55F153}"/>
-    <dgm:cxn modelId="{48919342-748E-43AA-9747-8D68CB42CE08}" type="presOf" srcId="{352FE7B3-671C-4073-B16B-7DCE4922259F}" destId="{B15400B7-7BB5-4F51-BF08-1085B699AEF0}" srcOrd="0" destOrd="0" presId="urn:microsoft.com/office/officeart/2005/8/layout/hList6"/>
-    <dgm:cxn modelId="{0CE5437D-F317-4F48-ABBB-036E19710D22}" srcId="{352FE7B3-671C-4073-B16B-7DCE4922259F}" destId="{86892350-85C6-44D5-A4E0-5BDE0D2948DF}" srcOrd="4" destOrd="0" parTransId="{37CF5B84-9F4A-418B-9BC8-D5419FC8E088}" sibTransId="{7D1EB2F4-56C7-4D78-BE43-3DFC7624124A}"/>
-    <dgm:cxn modelId="{4B54B365-52BF-49B2-A265-32E9398C77D7}" srcId="{352FE7B3-671C-4073-B16B-7DCE4922259F}" destId="{7C6AFF78-FB90-44E5-93AD-FDC77BD488E2}" srcOrd="5" destOrd="0" parTransId="{0BCF5DD6-BEE9-4DD7-AE86-BF49B485E272}" sibTransId="{BBF5C8FD-439D-4185-AA77-541675A064F6}"/>
-    <dgm:cxn modelId="{11FD7351-5A76-483B-9272-67F27AA3D517}" srcId="{352FE7B3-671C-4073-B16B-7DCE4922259F}" destId="{33D7CD92-B145-484E-88FF-FF76A848FB2F}" srcOrd="6" destOrd="0" parTransId="{55D8A7BC-BDF6-4A0A-9470-A85E630FFD7F}" sibTransId="{49045E33-0378-49CC-8BEF-3273CFD35D7B}"/>
     <dgm:cxn modelId="{3F239EB8-6461-459F-9657-879F9CD02647}" type="presParOf" srcId="{B15400B7-7BB5-4F51-BF08-1085B699AEF0}" destId="{D0807BC8-3214-4EA7-83A1-C064A52D56B2}" srcOrd="0" destOrd="0" presId="urn:microsoft.com/office/officeart/2005/8/layout/hList6"/>
     <dgm:cxn modelId="{C13F314A-C586-4115-ADC1-14A64D2DD3BB}" type="presParOf" srcId="{B15400B7-7BB5-4F51-BF08-1085B699AEF0}" destId="{2219CF2A-1A5B-4B8B-B632-296CCD0741DD}" srcOrd="1" destOrd="0" presId="urn:microsoft.com/office/officeart/2005/8/layout/hList6"/>
     <dgm:cxn modelId="{BA3E7705-DF12-47A9-A157-63611D6D1E49}" type="presParOf" srcId="{B15400B7-7BB5-4F51-BF08-1085B699AEF0}" destId="{A4A084B5-831E-4886-9159-E3805285A6E3}" srcOrd="2" destOrd="0" presId="urn:microsoft.com/office/officeart/2005/8/layout/hList6"/>
@@ -2489,43 +2426,6 @@
         </a:p>
       </dgm:t>
     </dgm:pt>
-    <dgm:pt modelId="{66BD5C80-3BA7-4D13-A4B7-FD6EAD8428AC}">
-      <dgm:prSet/>
-      <dgm:spPr/>
-      <dgm:t>
-        <a:bodyPr/>
-        <a:lstStyle/>
-        <a:p>
-          <a:r>
-            <a:rPr lang="es-ES" dirty="0" err="1" smtClean="0"/>
-            <a:t>IndicesAndRanges</a:t>
-          </a:r>
-          <a:endParaRPr lang="es-ES" dirty="0"/>
-        </a:p>
-      </dgm:t>
-    </dgm:pt>
-    <dgm:pt modelId="{57CA9DC4-B073-4422-9A51-5CF19BA46A47}" type="parTrans" cxnId="{F283E8F1-F632-4603-B8DE-CA5AD5E1976A}">
-      <dgm:prSet/>
-      <dgm:spPr/>
-      <dgm:t>
-        <a:bodyPr/>
-        <a:lstStyle/>
-        <a:p>
-          <a:endParaRPr lang="es-ES"/>
-        </a:p>
-      </dgm:t>
-    </dgm:pt>
-    <dgm:pt modelId="{DEB214F0-B378-40BA-B76F-3E090528DBA9}" type="sibTrans" cxnId="{F283E8F1-F632-4603-B8DE-CA5AD5E1976A}">
-      <dgm:prSet/>
-      <dgm:spPr/>
-      <dgm:t>
-        <a:bodyPr/>
-        <a:lstStyle/>
-        <a:p>
-          <a:endParaRPr lang="es-ES"/>
-        </a:p>
-      </dgm:t>
-    </dgm:pt>
     <dgm:pt modelId="{4D66D171-0D84-4A09-9B39-C4E176455530}">
       <dgm:prSet/>
       <dgm:spPr/>
@@ -2534,7 +2434,7 @@
         <a:lstStyle/>
         <a:p>
           <a:r>
-            <a:rPr lang="es-ES" dirty="0" err="1" smtClean="0"/>
+            <a:rPr lang="es-ES" dirty="0" err="1"/>
             <a:t>Patterns</a:t>
           </a:r>
           <a:endParaRPr lang="es-ES" dirty="0"/>
@@ -2571,7 +2471,7 @@
         <a:lstStyle/>
         <a:p>
           <a:r>
-            <a:rPr lang="es-ES" dirty="0" err="1" smtClean="0"/>
+            <a:rPr lang="es-ES" dirty="0" err="1"/>
             <a:t>NullableReferences</a:t>
           </a:r>
           <a:endParaRPr lang="es-ES" dirty="0"/>
@@ -2608,7 +2508,7 @@
         <a:lstStyle/>
         <a:p>
           <a:r>
-            <a:rPr lang="es-ES" dirty="0" err="1" smtClean="0"/>
+            <a:rPr lang="es-ES" dirty="0" err="1"/>
             <a:t>StaticLocalFunctions</a:t>
           </a:r>
           <a:endParaRPr lang="es-ES" dirty="0"/>
@@ -2645,10 +2545,9 @@
         <a:lstStyle/>
         <a:p>
           <a:r>
-            <a:rPr lang="es-ES" dirty="0" smtClean="0"/>
+            <a:rPr lang="es-ES" dirty="0"/>
             <a:t>Default Interfaces Methods</a:t>
           </a:r>
-          <a:endParaRPr lang="es-ES" dirty="0"/>
         </a:p>
       </dgm:t>
     </dgm:pt>
@@ -2682,7 +2581,7 @@
         <a:lstStyle/>
         <a:p>
           <a:r>
-            <a:rPr lang="es-ES" smtClean="0"/>
+            <a:rPr lang="es-ES" dirty="0" err="1"/>
             <a:t>AsyncStream</a:t>
           </a:r>
           <a:endParaRPr lang="es-ES" dirty="0"/>
@@ -2719,15 +2618,15 @@
         <a:lstStyle/>
         <a:p>
           <a:r>
-            <a:rPr lang="es-ES" dirty="0" err="1" smtClean="0"/>
+            <a:rPr lang="es-ES" dirty="0" err="1"/>
             <a:t>UsingDeclarationRef</a:t>
           </a:r>
           <a:r>
-            <a:rPr lang="es-ES" dirty="0" smtClean="0"/>
+            <a:rPr lang="es-ES" dirty="0"/>
             <a:t> </a:t>
           </a:r>
           <a:r>
-            <a:rPr lang="es-ES" dirty="0" err="1" smtClean="0"/>
+            <a:rPr lang="es-ES" dirty="0" err="1"/>
             <a:t>Struct</a:t>
           </a:r>
           <a:endParaRPr lang="es-ES" dirty="0"/>
@@ -2756,6 +2655,29 @@
         </a:p>
       </dgm:t>
     </dgm:pt>
+    <dgm:pt modelId="{7021FCE1-40F6-9843-8F79-3478FCE84E0A}">
+      <dgm:prSet/>
+      <dgm:spPr/>
+      <dgm:t>
+        <a:bodyPr/>
+        <a:lstStyle/>
+        <a:p>
+          <a:r>
+            <a:rPr lang="es-ES" b="1"/>
+            <a:t>INDICES Y RANGOS</a:t>
+          </a:r>
+          <a:endParaRPr lang="es-ES" dirty="0"/>
+        </a:p>
+      </dgm:t>
+    </dgm:pt>
+    <dgm:pt modelId="{305F700A-2574-064B-B6C7-A122E601B606}" type="parTrans" cxnId="{1DB515F7-3A78-2D49-AAAE-8C561493CCA5}">
+      <dgm:prSet/>
+      <dgm:spPr/>
+    </dgm:pt>
+    <dgm:pt modelId="{149EEF13-B4CD-9C4F-9538-C4C878AD5DCD}" type="sibTrans" cxnId="{1DB515F7-3A78-2D49-AAAE-8C561493CCA5}">
+      <dgm:prSet/>
+      <dgm:spPr/>
+    </dgm:pt>
     <dgm:pt modelId="{E56F1900-67AB-414C-B993-20E46BE57774}" type="pres">
       <dgm:prSet presAssocID="{352FE7B3-671C-4073-B16B-7DCE4922259F}" presName="Name0" presStyleCnt="0">
         <dgm:presLayoutVars>
@@ -2764,13 +2686,6 @@
         </dgm:presLayoutVars>
       </dgm:prSet>
       <dgm:spPr/>
-      <dgm:t>
-        <a:bodyPr/>
-        <a:lstStyle/>
-        <a:p>
-          <a:endParaRPr lang="es-ES"/>
-        </a:p>
-      </dgm:t>
     </dgm:pt>
     <dgm:pt modelId="{47F232E1-6A86-41BC-856C-4A3B3D277B6C}" type="pres">
       <dgm:prSet presAssocID="{4D66D171-0D84-4A09-9B39-C4E176455530}" presName="composite" presStyleCnt="0"/>
@@ -2783,13 +2698,6 @@
         </dgm:presLayoutVars>
       </dgm:prSet>
       <dgm:spPr/>
-      <dgm:t>
-        <a:bodyPr/>
-        <a:lstStyle/>
-        <a:p>
-          <a:endParaRPr lang="es-ES"/>
-        </a:p>
-      </dgm:t>
     </dgm:pt>
     <dgm:pt modelId="{431E5015-2846-4476-8F46-05767805DEDD}" type="pres">
       <dgm:prSet presAssocID="{4D66D171-0D84-4A09-9B39-C4E176455530}" presName="rect2" presStyleLbl="fgImgPlace1" presStyleIdx="0" presStyleCnt="7"/>
@@ -2810,13 +2718,6 @@
         </dgm:presLayoutVars>
       </dgm:prSet>
       <dgm:spPr/>
-      <dgm:t>
-        <a:bodyPr/>
-        <a:lstStyle/>
-        <a:p>
-          <a:endParaRPr lang="es-ES"/>
-        </a:p>
-      </dgm:t>
     </dgm:pt>
     <dgm:pt modelId="{F5CFD782-E0C2-4F2E-A8A5-FB00334E152B}" type="pres">
       <dgm:prSet presAssocID="{43D2D250-CFE0-4406-8984-5C7CA0F26AC1}" presName="rect2" presStyleLbl="fgImgPlace1" presStyleIdx="1" presStyleCnt="7"/>
@@ -2837,13 +2738,6 @@
         </dgm:presLayoutVars>
       </dgm:prSet>
       <dgm:spPr/>
-      <dgm:t>
-        <a:bodyPr/>
-        <a:lstStyle/>
-        <a:p>
-          <a:endParaRPr lang="es-ES"/>
-        </a:p>
-      </dgm:t>
     </dgm:pt>
     <dgm:pt modelId="{3168F93E-0E74-42FB-A69A-C5B8D01D3D1C}" type="pres">
       <dgm:prSet presAssocID="{236BBDC9-7505-4758-AE83-6C0E58BD2E1E}" presName="rect2" presStyleLbl="fgImgPlace1" presStyleIdx="2" presStyleCnt="7"/>
@@ -2864,13 +2758,6 @@
         </dgm:presLayoutVars>
       </dgm:prSet>
       <dgm:spPr/>
-      <dgm:t>
-        <a:bodyPr/>
-        <a:lstStyle/>
-        <a:p>
-          <a:endParaRPr lang="es-ES"/>
-        </a:p>
-      </dgm:t>
     </dgm:pt>
     <dgm:pt modelId="{91983553-861C-41DA-8A3F-D193EC80CF41}" type="pres">
       <dgm:prSet presAssocID="{F5EF1174-5F30-4121-8065-B01A05BEC3B7}" presName="rect2" presStyleLbl="fgImgPlace1" presStyleIdx="3" presStyleCnt="7"/>
@@ -2880,54 +2767,20 @@
       <dgm:prSet presAssocID="{39F77925-D1D1-4CAF-BA88-B80052F3D629}" presName="sibTrans" presStyleCnt="0"/>
       <dgm:spPr/>
     </dgm:pt>
-    <dgm:pt modelId="{9A9E7C37-7607-43BF-924A-4079BF2D3DD3}" type="pres">
-      <dgm:prSet presAssocID="{66BD5C80-3BA7-4D13-A4B7-FD6EAD8428AC}" presName="composite" presStyleCnt="0"/>
+    <dgm:pt modelId="{40A51947-3EDE-4E33-A8C1-BEB9B7163D50}" type="pres">
+      <dgm:prSet presAssocID="{6592B46A-0868-4FA9-86DB-67ED4AEBFB0F}" presName="composite" presStyleCnt="0"/>
       <dgm:spPr/>
     </dgm:pt>
-    <dgm:pt modelId="{BFB4B2EB-C4DA-4B9E-B7DD-D49117F9BD3E}" type="pres">
-      <dgm:prSet presAssocID="{66BD5C80-3BA7-4D13-A4B7-FD6EAD8428AC}" presName="rect1" presStyleLbl="trAlignAcc1" presStyleIdx="4" presStyleCnt="7">
+    <dgm:pt modelId="{B5B370A7-F936-4EE5-B5B8-0C278B755428}" type="pres">
+      <dgm:prSet presAssocID="{6592B46A-0868-4FA9-86DB-67ED4AEBFB0F}" presName="rect1" presStyleLbl="trAlignAcc1" presStyleIdx="4" presStyleCnt="7">
         <dgm:presLayoutVars>
           <dgm:bulletEnabled val="1"/>
         </dgm:presLayoutVars>
       </dgm:prSet>
       <dgm:spPr/>
-      <dgm:t>
-        <a:bodyPr/>
-        <a:lstStyle/>
-        <a:p>
-          <a:endParaRPr lang="es-ES"/>
-        </a:p>
-      </dgm:t>
-    </dgm:pt>
-    <dgm:pt modelId="{D6379DC1-0104-4607-8495-C528849515B3}" type="pres">
-      <dgm:prSet presAssocID="{66BD5C80-3BA7-4D13-A4B7-FD6EAD8428AC}" presName="rect2" presStyleLbl="fgImgPlace1" presStyleIdx="4" presStyleCnt="7"/>
-      <dgm:spPr/>
-    </dgm:pt>
-    <dgm:pt modelId="{75662797-85F8-4B68-8D9B-2D89266D3A6F}" type="pres">
-      <dgm:prSet presAssocID="{DEB214F0-B378-40BA-B76F-3E090528DBA9}" presName="sibTrans" presStyleCnt="0"/>
-      <dgm:spPr/>
-    </dgm:pt>
-    <dgm:pt modelId="{40A51947-3EDE-4E33-A8C1-BEB9B7163D50}" type="pres">
-      <dgm:prSet presAssocID="{6592B46A-0868-4FA9-86DB-67ED4AEBFB0F}" presName="composite" presStyleCnt="0"/>
-      <dgm:spPr/>
-    </dgm:pt>
-    <dgm:pt modelId="{B5B370A7-F936-4EE5-B5B8-0C278B755428}" type="pres">
-      <dgm:prSet presAssocID="{6592B46A-0868-4FA9-86DB-67ED4AEBFB0F}" presName="rect1" presStyleLbl="trAlignAcc1" presStyleIdx="5" presStyleCnt="7">
-        <dgm:presLayoutVars>
-          <dgm:bulletEnabled val="1"/>
-        </dgm:presLayoutVars>
-      </dgm:prSet>
-      <dgm:spPr/>
-      <dgm:t>
-        <a:bodyPr/>
-        <a:lstStyle/>
-        <a:p>
-          <a:endParaRPr lang="es-ES"/>
-        </a:p>
-      </dgm:t>
     </dgm:pt>
     <dgm:pt modelId="{F7DEAB92-DEBF-4CB0-BB67-F6F5A804D1A4}" type="pres">
-      <dgm:prSet presAssocID="{6592B46A-0868-4FA9-86DB-67ED4AEBFB0F}" presName="rect2" presStyleLbl="fgImgPlace1" presStyleIdx="5" presStyleCnt="7"/>
+      <dgm:prSet presAssocID="{6592B46A-0868-4FA9-86DB-67ED4AEBFB0F}" presName="rect2" presStyleLbl="fgImgPlace1" presStyleIdx="4" presStyleCnt="7"/>
       <dgm:spPr/>
     </dgm:pt>
     <dgm:pt modelId="{D778C454-DC8C-4388-9F81-A1EE5166B248}" type="pres">
@@ -2939,41 +2792,54 @@
       <dgm:spPr/>
     </dgm:pt>
     <dgm:pt modelId="{F104F9C3-EA2A-4326-9E78-34028408AB3C}" type="pres">
-      <dgm:prSet presAssocID="{6AAD4584-B062-476E-B86A-31870CB97EDD}" presName="rect1" presStyleLbl="trAlignAcc1" presStyleIdx="6" presStyleCnt="7">
+      <dgm:prSet presAssocID="{6AAD4584-B062-476E-B86A-31870CB97EDD}" presName="rect1" presStyleLbl="trAlignAcc1" presStyleIdx="5" presStyleCnt="7">
         <dgm:presLayoutVars>
           <dgm:bulletEnabled val="1"/>
         </dgm:presLayoutVars>
       </dgm:prSet>
       <dgm:spPr/>
-      <dgm:t>
-        <a:bodyPr/>
-        <a:lstStyle/>
-        <a:p>
-          <a:endParaRPr lang="es-ES"/>
-        </a:p>
-      </dgm:t>
     </dgm:pt>
     <dgm:pt modelId="{45E682B6-A8F2-4968-B3EC-E56725F7806C}" type="pres">
-      <dgm:prSet presAssocID="{6AAD4584-B062-476E-B86A-31870CB97EDD}" presName="rect2" presStyleLbl="fgImgPlace1" presStyleIdx="6" presStyleCnt="7"/>
+      <dgm:prSet presAssocID="{6AAD4584-B062-476E-B86A-31870CB97EDD}" presName="rect2" presStyleLbl="fgImgPlace1" presStyleIdx="5" presStyleCnt="7"/>
+      <dgm:spPr/>
+    </dgm:pt>
+    <dgm:pt modelId="{F50B309C-F4A1-6849-8D7E-D31DCC768DCD}" type="pres">
+      <dgm:prSet presAssocID="{997C1484-42CB-4D7C-B9BA-4433DDAC28A2}" presName="sibTrans" presStyleCnt="0"/>
+      <dgm:spPr/>
+    </dgm:pt>
+    <dgm:pt modelId="{0D7D6FE0-653B-E14D-8C51-C738E5975A75}" type="pres">
+      <dgm:prSet presAssocID="{7021FCE1-40F6-9843-8F79-3478FCE84E0A}" presName="composite" presStyleCnt="0"/>
+      <dgm:spPr/>
+    </dgm:pt>
+    <dgm:pt modelId="{8F971F46-95A4-144A-BF14-6F305FDF0BA9}" type="pres">
+      <dgm:prSet presAssocID="{7021FCE1-40F6-9843-8F79-3478FCE84E0A}" presName="rect1" presStyleLbl="trAlignAcc1" presStyleIdx="6" presStyleCnt="7">
+        <dgm:presLayoutVars>
+          <dgm:bulletEnabled val="1"/>
+        </dgm:presLayoutVars>
+      </dgm:prSet>
+      <dgm:spPr/>
+    </dgm:pt>
+    <dgm:pt modelId="{EFB442C9-CD0C-B84D-AAEA-499D0A478595}" type="pres">
+      <dgm:prSet presAssocID="{7021FCE1-40F6-9843-8F79-3478FCE84E0A}" presName="rect2" presStyleLbl="fgImgPlace1" presStyleIdx="6" presStyleCnt="7"/>
       <dgm:spPr/>
     </dgm:pt>
   </dgm:ptLst>
   <dgm:cxnLst>
+    <dgm:cxn modelId="{35485C15-0F36-4DB5-90DD-89E34D963297}" srcId="{352FE7B3-671C-4073-B16B-7DCE4922259F}" destId="{6AAD4584-B062-476E-B86A-31870CB97EDD}" srcOrd="5" destOrd="0" parTransId="{09E69C58-5DF6-4E23-9AB0-F4BEE1CF2187}" sibTransId="{997C1484-42CB-4D7C-B9BA-4433DDAC28A2}"/>
+    <dgm:cxn modelId="{D28B0916-DBC4-47B6-831C-E2BA3300A36C}" srcId="{352FE7B3-671C-4073-B16B-7DCE4922259F}" destId="{F5EF1174-5F30-4121-8065-B01A05BEC3B7}" srcOrd="3" destOrd="0" parTransId="{5931F3B1-60EE-4A0F-B58F-874347E00F3D}" sibTransId="{39F77925-D1D1-4CAF-BA88-B80052F3D629}"/>
+    <dgm:cxn modelId="{259DFF19-10B4-4EB8-8CB6-2515C67D86D5}" type="presOf" srcId="{6592B46A-0868-4FA9-86DB-67ED4AEBFB0F}" destId="{B5B370A7-F936-4EE5-B5B8-0C278B755428}" srcOrd="0" destOrd="0" presId="urn:microsoft.com/office/officeart/2008/layout/PictureStrips"/>
+    <dgm:cxn modelId="{05F08724-0619-46A5-8A35-272C544381C0}" type="presOf" srcId="{4D66D171-0D84-4A09-9B39-C4E176455530}" destId="{EBD3B18F-B6C7-429A-B6E5-555CCC559BA5}" srcOrd="0" destOrd="0" presId="urn:microsoft.com/office/officeart/2008/layout/PictureStrips"/>
     <dgm:cxn modelId="{3F30D640-53B1-46DE-B064-A74679D994DC}" type="presOf" srcId="{352FE7B3-671C-4073-B16B-7DCE4922259F}" destId="{E56F1900-67AB-414C-B993-20E46BE57774}" srcOrd="0" destOrd="0" presId="urn:microsoft.com/office/officeart/2008/layout/PictureStrips"/>
+    <dgm:cxn modelId="{B2AC3256-21E0-40DF-B717-946B01C2253A}" type="presOf" srcId="{F5EF1174-5F30-4121-8065-B01A05BEC3B7}" destId="{8061BA7F-5477-4CA3-AF12-50DD847B6AC6}" srcOrd="0" destOrd="0" presId="urn:microsoft.com/office/officeart/2008/layout/PictureStrips"/>
     <dgm:cxn modelId="{6B8ECA59-C455-4ED2-A1B1-2A668AE709CD}" srcId="{352FE7B3-671C-4073-B16B-7DCE4922259F}" destId="{4D66D171-0D84-4A09-9B39-C4E176455530}" srcOrd="0" destOrd="0" parTransId="{EEA4DEA2-CA56-4B14-A2FA-ACED9F0BD98D}" sibTransId="{B7329377-EAB2-4C70-9A3D-617F99D41E6D}"/>
+    <dgm:cxn modelId="{24AC899D-6363-4018-A456-B72ED8DFA789}" srcId="{352FE7B3-671C-4073-B16B-7DCE4922259F}" destId="{43D2D250-CFE0-4406-8984-5C7CA0F26AC1}" srcOrd="1" destOrd="0" parTransId="{A591E254-97DC-4972-82D5-2A72E942A01E}" sibTransId="{9E66B2D5-8AD9-4436-8D25-32C7BF343798}"/>
+    <dgm:cxn modelId="{33D3549E-9CCB-714C-8419-C8C35F7A301A}" type="presOf" srcId="{7021FCE1-40F6-9843-8F79-3478FCE84E0A}" destId="{8F971F46-95A4-144A-BF14-6F305FDF0BA9}" srcOrd="0" destOrd="0" presId="urn:microsoft.com/office/officeart/2008/layout/PictureStrips"/>
+    <dgm:cxn modelId="{C0D62DA3-7FC5-4CDE-8EDB-FB5E88EC7EB9}" type="presOf" srcId="{6AAD4584-B062-476E-B86A-31870CB97EDD}" destId="{F104F9C3-EA2A-4326-9E78-34028408AB3C}" srcOrd="0" destOrd="0" presId="urn:microsoft.com/office/officeart/2008/layout/PictureStrips"/>
+    <dgm:cxn modelId="{801B62DD-600F-46B8-B42D-064EEFFEEE95}" srcId="{352FE7B3-671C-4073-B16B-7DCE4922259F}" destId="{236BBDC9-7505-4758-AE83-6C0E58BD2E1E}" srcOrd="2" destOrd="0" parTransId="{BD97F917-BEF5-47A9-961D-B1E33FFECB12}" sibTransId="{F353E6B6-5B95-4373-8AA6-2E7C9918096C}"/>
+    <dgm:cxn modelId="{04DC1DEA-15FB-4740-B334-F6D13A29B34A}" type="presOf" srcId="{43D2D250-CFE0-4406-8984-5C7CA0F26AC1}" destId="{5B745E26-97FD-4B6C-88E9-60FD2133E7A7}" srcOrd="0" destOrd="0" presId="urn:microsoft.com/office/officeart/2008/layout/PictureStrips"/>
+    <dgm:cxn modelId="{C9A0F7F3-4560-447B-AD7A-0F398CB3309F}" srcId="{352FE7B3-671C-4073-B16B-7DCE4922259F}" destId="{6592B46A-0868-4FA9-86DB-67ED4AEBFB0F}" srcOrd="4" destOrd="0" parTransId="{8873079F-1675-438E-B16E-EE7E99CC2696}" sibTransId="{15B8E6C6-0DD2-47BA-B24C-208E70146AC1}"/>
     <dgm:cxn modelId="{D8B720F6-8468-4A5E-A60B-B490E5B28B6E}" type="presOf" srcId="{236BBDC9-7505-4758-AE83-6C0E58BD2E1E}" destId="{073307DB-E4F3-4451-9C39-91941E481A60}" srcOrd="0" destOrd="0" presId="urn:microsoft.com/office/officeart/2008/layout/PictureStrips"/>
-    <dgm:cxn modelId="{F283E8F1-F632-4603-B8DE-CA5AD5E1976A}" srcId="{352FE7B3-671C-4073-B16B-7DCE4922259F}" destId="{66BD5C80-3BA7-4D13-A4B7-FD6EAD8428AC}" srcOrd="4" destOrd="0" parTransId="{57CA9DC4-B073-4422-9A51-5CF19BA46A47}" sibTransId="{DEB214F0-B378-40BA-B76F-3E090528DBA9}"/>
-    <dgm:cxn modelId="{B2AC3256-21E0-40DF-B717-946B01C2253A}" type="presOf" srcId="{F5EF1174-5F30-4121-8065-B01A05BEC3B7}" destId="{8061BA7F-5477-4CA3-AF12-50DD847B6AC6}" srcOrd="0" destOrd="0" presId="urn:microsoft.com/office/officeart/2008/layout/PictureStrips"/>
-    <dgm:cxn modelId="{801B62DD-600F-46B8-B42D-064EEFFEEE95}" srcId="{352FE7B3-671C-4073-B16B-7DCE4922259F}" destId="{236BBDC9-7505-4758-AE83-6C0E58BD2E1E}" srcOrd="2" destOrd="0" parTransId="{BD97F917-BEF5-47A9-961D-B1E33FFECB12}" sibTransId="{F353E6B6-5B95-4373-8AA6-2E7C9918096C}"/>
-    <dgm:cxn modelId="{D28B0916-DBC4-47B6-831C-E2BA3300A36C}" srcId="{352FE7B3-671C-4073-B16B-7DCE4922259F}" destId="{F5EF1174-5F30-4121-8065-B01A05BEC3B7}" srcOrd="3" destOrd="0" parTransId="{5931F3B1-60EE-4A0F-B58F-874347E00F3D}" sibTransId="{39F77925-D1D1-4CAF-BA88-B80052F3D629}"/>
-    <dgm:cxn modelId="{35485C15-0F36-4DB5-90DD-89E34D963297}" srcId="{352FE7B3-671C-4073-B16B-7DCE4922259F}" destId="{6AAD4584-B062-476E-B86A-31870CB97EDD}" srcOrd="6" destOrd="0" parTransId="{09E69C58-5DF6-4E23-9AB0-F4BEE1CF2187}" sibTransId="{997C1484-42CB-4D7C-B9BA-4433DDAC28A2}"/>
-    <dgm:cxn modelId="{04DC1DEA-15FB-4740-B334-F6D13A29B34A}" type="presOf" srcId="{43D2D250-CFE0-4406-8984-5C7CA0F26AC1}" destId="{5B745E26-97FD-4B6C-88E9-60FD2133E7A7}" srcOrd="0" destOrd="0" presId="urn:microsoft.com/office/officeart/2008/layout/PictureStrips"/>
-    <dgm:cxn modelId="{C0D62DA3-7FC5-4CDE-8EDB-FB5E88EC7EB9}" type="presOf" srcId="{6AAD4584-B062-476E-B86A-31870CB97EDD}" destId="{F104F9C3-EA2A-4326-9E78-34028408AB3C}" srcOrd="0" destOrd="0" presId="urn:microsoft.com/office/officeart/2008/layout/PictureStrips"/>
-    <dgm:cxn modelId="{05F08724-0619-46A5-8A35-272C544381C0}" type="presOf" srcId="{4D66D171-0D84-4A09-9B39-C4E176455530}" destId="{EBD3B18F-B6C7-429A-B6E5-555CCC559BA5}" srcOrd="0" destOrd="0" presId="urn:microsoft.com/office/officeart/2008/layout/PictureStrips"/>
-    <dgm:cxn modelId="{259DFF19-10B4-4EB8-8CB6-2515C67D86D5}" type="presOf" srcId="{6592B46A-0868-4FA9-86DB-67ED4AEBFB0F}" destId="{B5B370A7-F936-4EE5-B5B8-0C278B755428}" srcOrd="0" destOrd="0" presId="urn:microsoft.com/office/officeart/2008/layout/PictureStrips"/>
-    <dgm:cxn modelId="{56F7F22A-58EB-4504-BA33-9BDD7E750BBD}" type="presOf" srcId="{66BD5C80-3BA7-4D13-A4B7-FD6EAD8428AC}" destId="{BFB4B2EB-C4DA-4B9E-B7DD-D49117F9BD3E}" srcOrd="0" destOrd="0" presId="urn:microsoft.com/office/officeart/2008/layout/PictureStrips"/>
-    <dgm:cxn modelId="{24AC899D-6363-4018-A456-B72ED8DFA789}" srcId="{352FE7B3-671C-4073-B16B-7DCE4922259F}" destId="{43D2D250-CFE0-4406-8984-5C7CA0F26AC1}" srcOrd="1" destOrd="0" parTransId="{A591E254-97DC-4972-82D5-2A72E942A01E}" sibTransId="{9E66B2D5-8AD9-4436-8D25-32C7BF343798}"/>
-    <dgm:cxn modelId="{C9A0F7F3-4560-447B-AD7A-0F398CB3309F}" srcId="{352FE7B3-671C-4073-B16B-7DCE4922259F}" destId="{6592B46A-0868-4FA9-86DB-67ED4AEBFB0F}" srcOrd="5" destOrd="0" parTransId="{8873079F-1675-438E-B16E-EE7E99CC2696}" sibTransId="{15B8E6C6-0DD2-47BA-B24C-208E70146AC1}"/>
+    <dgm:cxn modelId="{1DB515F7-3A78-2D49-AAAE-8C561493CCA5}" srcId="{352FE7B3-671C-4073-B16B-7DCE4922259F}" destId="{7021FCE1-40F6-9843-8F79-3478FCE84E0A}" srcOrd="6" destOrd="0" parTransId="{305F700A-2574-064B-B6C7-A122E601B606}" sibTransId="{149EEF13-B4CD-9C4F-9538-C4C878AD5DCD}"/>
     <dgm:cxn modelId="{916E8288-9466-4B7C-BB14-E2B1E6CCB4B4}" type="presParOf" srcId="{E56F1900-67AB-414C-B993-20E46BE57774}" destId="{47F232E1-6A86-41BC-856C-4A3B3D277B6C}" srcOrd="0" destOrd="0" presId="urn:microsoft.com/office/officeart/2008/layout/PictureStrips"/>
     <dgm:cxn modelId="{BB04FC41-6621-4E9B-B339-796227F508F0}" type="presParOf" srcId="{47F232E1-6A86-41BC-856C-4A3B3D277B6C}" destId="{EBD3B18F-B6C7-429A-B6E5-555CCC559BA5}" srcOrd="0" destOrd="0" presId="urn:microsoft.com/office/officeart/2008/layout/PictureStrips"/>
     <dgm:cxn modelId="{BB499123-56AC-4E0F-B361-530B080953C6}" type="presParOf" srcId="{47F232E1-6A86-41BC-856C-4A3B3D277B6C}" destId="{431E5015-2846-4476-8F46-05767805DEDD}" srcOrd="1" destOrd="0" presId="urn:microsoft.com/office/officeart/2008/layout/PictureStrips"/>
@@ -2990,17 +2856,17 @@
     <dgm:cxn modelId="{CCFBEF73-3A22-4D42-8D2C-031C7A98A624}" type="presParOf" srcId="{E1BBD7F7-93F4-4DCB-A25B-D447F690CB27}" destId="{8061BA7F-5477-4CA3-AF12-50DD847B6AC6}" srcOrd="0" destOrd="0" presId="urn:microsoft.com/office/officeart/2008/layout/PictureStrips"/>
     <dgm:cxn modelId="{D0FE2058-E692-4F15-A6DB-36ABB7EAC5D7}" type="presParOf" srcId="{E1BBD7F7-93F4-4DCB-A25B-D447F690CB27}" destId="{91983553-861C-41DA-8A3F-D193EC80CF41}" srcOrd="1" destOrd="0" presId="urn:microsoft.com/office/officeart/2008/layout/PictureStrips"/>
     <dgm:cxn modelId="{C5C2A118-7E8D-4128-B829-F74EA4A496FA}" type="presParOf" srcId="{E56F1900-67AB-414C-B993-20E46BE57774}" destId="{D5BA92CC-B601-43B0-A5D2-52A9D271926F}" srcOrd="7" destOrd="0" presId="urn:microsoft.com/office/officeart/2008/layout/PictureStrips"/>
-    <dgm:cxn modelId="{83DDE21C-2425-4588-B117-9F67C0DB85ED}" type="presParOf" srcId="{E56F1900-67AB-414C-B993-20E46BE57774}" destId="{9A9E7C37-7607-43BF-924A-4079BF2D3DD3}" srcOrd="8" destOrd="0" presId="urn:microsoft.com/office/officeart/2008/layout/PictureStrips"/>
-    <dgm:cxn modelId="{98183A77-22E1-4533-960F-F2707D2BD061}" type="presParOf" srcId="{9A9E7C37-7607-43BF-924A-4079BF2D3DD3}" destId="{BFB4B2EB-C4DA-4B9E-B7DD-D49117F9BD3E}" srcOrd="0" destOrd="0" presId="urn:microsoft.com/office/officeart/2008/layout/PictureStrips"/>
-    <dgm:cxn modelId="{5D03EF2C-FD79-4471-A602-9B2317893AB9}" type="presParOf" srcId="{9A9E7C37-7607-43BF-924A-4079BF2D3DD3}" destId="{D6379DC1-0104-4607-8495-C528849515B3}" srcOrd="1" destOrd="0" presId="urn:microsoft.com/office/officeart/2008/layout/PictureStrips"/>
-    <dgm:cxn modelId="{9B85A82D-B6DE-4B93-8C51-E50D0172FAFE}" type="presParOf" srcId="{E56F1900-67AB-414C-B993-20E46BE57774}" destId="{75662797-85F8-4B68-8D9B-2D89266D3A6F}" srcOrd="9" destOrd="0" presId="urn:microsoft.com/office/officeart/2008/layout/PictureStrips"/>
-    <dgm:cxn modelId="{3B682854-A501-4B3D-94BF-E78B2F869880}" type="presParOf" srcId="{E56F1900-67AB-414C-B993-20E46BE57774}" destId="{40A51947-3EDE-4E33-A8C1-BEB9B7163D50}" srcOrd="10" destOrd="0" presId="urn:microsoft.com/office/officeart/2008/layout/PictureStrips"/>
+    <dgm:cxn modelId="{3B682854-A501-4B3D-94BF-E78B2F869880}" type="presParOf" srcId="{E56F1900-67AB-414C-B993-20E46BE57774}" destId="{40A51947-3EDE-4E33-A8C1-BEB9B7163D50}" srcOrd="8" destOrd="0" presId="urn:microsoft.com/office/officeart/2008/layout/PictureStrips"/>
     <dgm:cxn modelId="{C40D7A23-2283-4BF1-993C-AB339ACE8DC2}" type="presParOf" srcId="{40A51947-3EDE-4E33-A8C1-BEB9B7163D50}" destId="{B5B370A7-F936-4EE5-B5B8-0C278B755428}" srcOrd="0" destOrd="0" presId="urn:microsoft.com/office/officeart/2008/layout/PictureStrips"/>
     <dgm:cxn modelId="{03CC4E83-CDD4-4C58-82D9-07152E7745CC}" type="presParOf" srcId="{40A51947-3EDE-4E33-A8C1-BEB9B7163D50}" destId="{F7DEAB92-DEBF-4CB0-BB67-F6F5A804D1A4}" srcOrd="1" destOrd="0" presId="urn:microsoft.com/office/officeart/2008/layout/PictureStrips"/>
-    <dgm:cxn modelId="{2C00DB12-01BF-4E77-9BA7-78B8C7C4979A}" type="presParOf" srcId="{E56F1900-67AB-414C-B993-20E46BE57774}" destId="{D778C454-DC8C-4388-9F81-A1EE5166B248}" srcOrd="11" destOrd="0" presId="urn:microsoft.com/office/officeart/2008/layout/PictureStrips"/>
-    <dgm:cxn modelId="{96E93F70-E878-4CC4-B5D1-3CE47DE589C8}" type="presParOf" srcId="{E56F1900-67AB-414C-B993-20E46BE57774}" destId="{3FA118FA-798C-45D4-BAD7-8C277844FB4E}" srcOrd="12" destOrd="0" presId="urn:microsoft.com/office/officeart/2008/layout/PictureStrips"/>
+    <dgm:cxn modelId="{2C00DB12-01BF-4E77-9BA7-78B8C7C4979A}" type="presParOf" srcId="{E56F1900-67AB-414C-B993-20E46BE57774}" destId="{D778C454-DC8C-4388-9F81-A1EE5166B248}" srcOrd="9" destOrd="0" presId="urn:microsoft.com/office/officeart/2008/layout/PictureStrips"/>
+    <dgm:cxn modelId="{96E93F70-E878-4CC4-B5D1-3CE47DE589C8}" type="presParOf" srcId="{E56F1900-67AB-414C-B993-20E46BE57774}" destId="{3FA118FA-798C-45D4-BAD7-8C277844FB4E}" srcOrd="10" destOrd="0" presId="urn:microsoft.com/office/officeart/2008/layout/PictureStrips"/>
     <dgm:cxn modelId="{BA2F787E-EA36-4A82-B54F-C8C26020615B}" type="presParOf" srcId="{3FA118FA-798C-45D4-BAD7-8C277844FB4E}" destId="{F104F9C3-EA2A-4326-9E78-34028408AB3C}" srcOrd="0" destOrd="0" presId="urn:microsoft.com/office/officeart/2008/layout/PictureStrips"/>
     <dgm:cxn modelId="{176BBC24-FAA0-4406-A002-87DD15571170}" type="presParOf" srcId="{3FA118FA-798C-45D4-BAD7-8C277844FB4E}" destId="{45E682B6-A8F2-4968-B3EC-E56725F7806C}" srcOrd="1" destOrd="0" presId="urn:microsoft.com/office/officeart/2008/layout/PictureStrips"/>
+    <dgm:cxn modelId="{FBCA4042-BE42-B444-9DEE-69C9B7A4D795}" type="presParOf" srcId="{E56F1900-67AB-414C-B993-20E46BE57774}" destId="{F50B309C-F4A1-6849-8D7E-D31DCC768DCD}" srcOrd="11" destOrd="0" presId="urn:microsoft.com/office/officeart/2008/layout/PictureStrips"/>
+    <dgm:cxn modelId="{EAC87724-2661-1545-86B6-88901E8975B2}" type="presParOf" srcId="{E56F1900-67AB-414C-B993-20E46BE57774}" destId="{0D7D6FE0-653B-E14D-8C51-C738E5975A75}" srcOrd="12" destOrd="0" presId="urn:microsoft.com/office/officeart/2008/layout/PictureStrips"/>
+    <dgm:cxn modelId="{02434F06-3D93-8F49-9524-04551B1D62E1}" type="presParOf" srcId="{0D7D6FE0-653B-E14D-8C51-C738E5975A75}" destId="{8F971F46-95A4-144A-BF14-6F305FDF0BA9}" srcOrd="0" destOrd="0" presId="urn:microsoft.com/office/officeart/2008/layout/PictureStrips"/>
+    <dgm:cxn modelId="{1BCAEF66-6FEA-174D-9F49-DB1D65B809B5}" type="presParOf" srcId="{0D7D6FE0-653B-E14D-8C51-C738E5975A75}" destId="{EFB442C9-CD0C-B84D-AAEA-499D0A478595}" srcOrd="1" destOrd="0" presId="urn:microsoft.com/office/officeart/2008/layout/PictureStrips"/>
   </dgm:cxnLst>
   <dgm:bg/>
   <dgm:whole/>
@@ -3071,7 +2937,7 @@
         </a:bodyPr>
         <a:lstStyle/>
         <a:p>
-          <a:pPr lvl="0" algn="ctr" defTabSz="2000250" rtl="0">
+          <a:pPr marL="0" lvl="0" indent="0" algn="ctr" defTabSz="2000250" rtl="0">
             <a:lnSpc>
               <a:spcPct val="90000"/>
             </a:lnSpc>
@@ -3081,12 +2947,12 @@
             <a:spcAft>
               <a:spcPct val="35000"/>
             </a:spcAft>
+            <a:buNone/>
           </a:pPr>
           <a:r>
-            <a:rPr lang="es-ES" sz="4500" kern="1200" dirty="0" smtClean="0"/>
+            <a:rPr lang="es-ES" sz="4500" kern="1200" dirty="0"/>
             <a:t>C# 6.0</a:t>
           </a:r>
-          <a:endParaRPr lang="es-ES" sz="4500" kern="1200" dirty="0"/>
         </a:p>
       </dsp:txBody>
       <dsp:txXfrm rot="5400000">
@@ -3145,7 +3011,7 @@
         </a:bodyPr>
         <a:lstStyle/>
         <a:p>
-          <a:pPr lvl="0" algn="ctr" defTabSz="2000250" rtl="0">
+          <a:pPr marL="0" lvl="0" indent="0" algn="ctr" defTabSz="2000250" rtl="0">
             <a:lnSpc>
               <a:spcPct val="90000"/>
             </a:lnSpc>
@@ -3155,12 +3021,12 @@
             <a:spcAft>
               <a:spcPct val="35000"/>
             </a:spcAft>
+            <a:buNone/>
           </a:pPr>
           <a:r>
-            <a:rPr lang="es-ES" sz="4500" kern="1200" dirty="0" smtClean="0"/>
+            <a:rPr lang="es-ES" sz="4500" kern="1200" dirty="0"/>
             <a:t>C# 7.0</a:t>
           </a:r>
-          <a:endParaRPr lang="es-ES" sz="4500" kern="1200" dirty="0"/>
         </a:p>
       </dsp:txBody>
       <dsp:txXfrm rot="5400000">
@@ -3219,7 +3085,7 @@
         </a:bodyPr>
         <a:lstStyle/>
         <a:p>
-          <a:pPr lvl="0" algn="ctr" defTabSz="2000250" rtl="0">
+          <a:pPr marL="0" lvl="0" indent="0" algn="ctr" defTabSz="2000250" rtl="0">
             <a:lnSpc>
               <a:spcPct val="90000"/>
             </a:lnSpc>
@@ -3229,12 +3095,12 @@
             <a:spcAft>
               <a:spcPct val="35000"/>
             </a:spcAft>
+            <a:buNone/>
           </a:pPr>
           <a:r>
-            <a:rPr lang="es-ES" sz="4500" kern="1200" dirty="0" smtClean="0"/>
+            <a:rPr lang="es-ES" sz="4500" kern="1200" dirty="0"/>
             <a:t>C# 7.1</a:t>
           </a:r>
-          <a:endParaRPr lang="es-ES" sz="4500" kern="1200" dirty="0"/>
         </a:p>
       </dsp:txBody>
       <dsp:txXfrm rot="5400000">
@@ -3293,7 +3159,7 @@
         </a:bodyPr>
         <a:lstStyle/>
         <a:p>
-          <a:pPr lvl="0" algn="ctr" defTabSz="2000250" rtl="0">
+          <a:pPr marL="0" lvl="0" indent="0" algn="ctr" defTabSz="2000250" rtl="0">
             <a:lnSpc>
               <a:spcPct val="90000"/>
             </a:lnSpc>
@@ -3303,12 +3169,12 @@
             <a:spcAft>
               <a:spcPct val="35000"/>
             </a:spcAft>
+            <a:buNone/>
           </a:pPr>
           <a:r>
-            <a:rPr lang="es-ES" sz="4500" kern="1200" dirty="0" smtClean="0"/>
+            <a:rPr lang="es-ES" sz="4500" kern="1200" dirty="0"/>
             <a:t>C# 7.2</a:t>
           </a:r>
-          <a:endParaRPr lang="es-ES" sz="4500" kern="1200" dirty="0"/>
         </a:p>
       </dsp:txBody>
       <dsp:txXfrm rot="5400000">
@@ -3367,7 +3233,7 @@
         </a:bodyPr>
         <a:lstStyle/>
         <a:p>
-          <a:pPr lvl="0" algn="ctr" defTabSz="2000250" rtl="0">
+          <a:pPr marL="0" lvl="0" indent="0" algn="ctr" defTabSz="2000250" rtl="0">
             <a:lnSpc>
               <a:spcPct val="90000"/>
             </a:lnSpc>
@@ -3377,12 +3243,12 @@
             <a:spcAft>
               <a:spcPct val="35000"/>
             </a:spcAft>
+            <a:buNone/>
           </a:pPr>
           <a:r>
-            <a:rPr lang="es-ES" sz="4500" kern="1200" dirty="0" smtClean="0"/>
+            <a:rPr lang="es-ES" sz="4500" kern="1200" dirty="0"/>
             <a:t>C# 7.3</a:t>
           </a:r>
-          <a:endParaRPr lang="es-ES" sz="4500" kern="1200" dirty="0"/>
         </a:p>
       </dsp:txBody>
       <dsp:txXfrm rot="5400000">
@@ -3444,7 +3310,7 @@
         </a:bodyPr>
         <a:lstStyle/>
         <a:p>
-          <a:pPr lvl="0" algn="ctr" defTabSz="2000250" rtl="0">
+          <a:pPr marL="0" lvl="0" indent="0" algn="ctr" defTabSz="2000250" rtl="0">
             <a:lnSpc>
               <a:spcPct val="90000"/>
             </a:lnSpc>
@@ -3454,12 +3320,12 @@
             <a:spcAft>
               <a:spcPct val="35000"/>
             </a:spcAft>
+            <a:buNone/>
           </a:pPr>
           <a:r>
-            <a:rPr lang="es-ES" sz="4500" kern="1200" dirty="0" smtClean="0"/>
+            <a:rPr lang="es-ES" sz="4500" kern="1200" dirty="0"/>
             <a:t>C# 8.0</a:t>
           </a:r>
-          <a:endParaRPr lang="es-ES" sz="4500" kern="1200" dirty="0"/>
         </a:p>
       </dsp:txBody>
       <dsp:txXfrm rot="5400000">
@@ -3519,7 +3385,7 @@
         </a:bodyPr>
         <a:lstStyle/>
         <a:p>
-          <a:pPr lvl="0" algn="ctr" defTabSz="2000250" rtl="0">
+          <a:pPr marL="0" lvl="0" indent="0" algn="ctr" defTabSz="2000250" rtl="0">
             <a:lnSpc>
               <a:spcPct val="90000"/>
             </a:lnSpc>
@@ -3529,12 +3395,12 @@
             <a:spcAft>
               <a:spcPct val="35000"/>
             </a:spcAft>
+            <a:buNone/>
           </a:pPr>
           <a:r>
-            <a:rPr lang="es-ES" sz="4500" kern="1200" dirty="0" smtClean="0"/>
+            <a:rPr lang="es-ES" sz="4500" kern="1200" dirty="0"/>
             <a:t>C# 9.0</a:t>
           </a:r>
-          <a:endParaRPr lang="es-ES" sz="4500" kern="1200" dirty="0"/>
         </a:p>
       </dsp:txBody>
       <dsp:txXfrm rot="5400000">
@@ -3607,7 +3473,7 @@
         </a:bodyPr>
         <a:lstStyle/>
         <a:p>
-          <a:pPr lvl="0" algn="l" defTabSz="977900">
+          <a:pPr marL="0" lvl="0" indent="0" algn="l" defTabSz="977900">
             <a:lnSpc>
               <a:spcPct val="90000"/>
             </a:lnSpc>
@@ -3617,9 +3483,10 @@
             <a:spcAft>
               <a:spcPct val="35000"/>
             </a:spcAft>
+            <a:buNone/>
           </a:pPr>
           <a:r>
-            <a:rPr lang="es-ES" sz="2200" kern="1200" dirty="0" err="1" smtClean="0"/>
+            <a:rPr lang="es-ES" sz="2200" kern="1200" dirty="0" err="1"/>
             <a:t>Patterns</a:t>
           </a:r>
           <a:endParaRPr lang="es-ES" sz="2200" kern="1200" dirty="0"/>
@@ -3731,7 +3598,7 @@
         </a:bodyPr>
         <a:lstStyle/>
         <a:p>
-          <a:pPr lvl="0" algn="l" defTabSz="977900">
+          <a:pPr marL="0" lvl="0" indent="0" algn="l" defTabSz="977900">
             <a:lnSpc>
               <a:spcPct val="90000"/>
             </a:lnSpc>
@@ -3741,9 +3608,10 @@
             <a:spcAft>
               <a:spcPct val="35000"/>
             </a:spcAft>
+            <a:buNone/>
           </a:pPr>
           <a:r>
-            <a:rPr lang="es-ES" sz="2200" kern="1200" dirty="0" err="1" smtClean="0"/>
+            <a:rPr lang="es-ES" sz="2200" kern="1200" dirty="0" err="1"/>
             <a:t>StaticLocalFunctions</a:t>
           </a:r>
           <a:endParaRPr lang="es-ES" sz="2200" kern="1200" dirty="0"/>
@@ -3855,7 +3723,7 @@
         </a:bodyPr>
         <a:lstStyle/>
         <a:p>
-          <a:pPr lvl="0" algn="l" defTabSz="977900">
+          <a:pPr marL="0" lvl="0" indent="0" algn="l" defTabSz="977900">
             <a:lnSpc>
               <a:spcPct val="90000"/>
             </a:lnSpc>
@@ -3865,17 +3733,18 @@
             <a:spcAft>
               <a:spcPct val="35000"/>
             </a:spcAft>
+            <a:buNone/>
           </a:pPr>
           <a:r>
-            <a:rPr lang="es-ES" sz="2200" kern="1200" dirty="0" err="1" smtClean="0"/>
+            <a:rPr lang="es-ES" sz="2200" kern="1200" dirty="0" err="1"/>
             <a:t>UsingDeclarationRef</a:t>
           </a:r>
           <a:r>
-            <a:rPr lang="es-ES" sz="2200" kern="1200" dirty="0" smtClean="0"/>
+            <a:rPr lang="es-ES" sz="2200" kern="1200" dirty="0"/>
             <a:t> </a:t>
           </a:r>
           <a:r>
-            <a:rPr lang="es-ES" sz="2200" kern="1200" dirty="0" err="1" smtClean="0"/>
+            <a:rPr lang="es-ES" sz="2200" kern="1200" dirty="0" err="1"/>
             <a:t>Struct</a:t>
           </a:r>
           <a:endParaRPr lang="es-ES" sz="2200" kern="1200" dirty="0"/>
@@ -3987,7 +3856,7 @@
         </a:bodyPr>
         <a:lstStyle/>
         <a:p>
-          <a:pPr lvl="0" algn="l" defTabSz="977900">
+          <a:pPr marL="0" lvl="0" indent="0" algn="l" defTabSz="977900">
             <a:lnSpc>
               <a:spcPct val="90000"/>
             </a:lnSpc>
@@ -3997,9 +3866,10 @@
             <a:spcAft>
               <a:spcPct val="35000"/>
             </a:spcAft>
+            <a:buNone/>
           </a:pPr>
           <a:r>
-            <a:rPr lang="es-ES" sz="2200" kern="1200" dirty="0" err="1" smtClean="0"/>
+            <a:rPr lang="es-ES" sz="2200" kern="1200" dirty="0" err="1"/>
             <a:t>NullableReferences</a:t>
           </a:r>
           <a:endParaRPr lang="es-ES" sz="2200" kern="1200" dirty="0"/>
@@ -4058,7 +3928,7 @@
         <a:fontRef idx="minor"/>
       </dsp:style>
     </dsp:sp>
-    <dsp:sp modelId="{BFB4B2EB-C4DA-4B9E-B7DD-D49117F9BD3E}">
+    <dsp:sp modelId="{B5B370A7-F936-4EE5-B5B8-0C278B755428}">
       <dsp:nvSpPr>
         <dsp:cNvPr id="0" name=""/>
         <dsp:cNvSpPr/>
@@ -4111,7 +3981,7 @@
         </a:bodyPr>
         <a:lstStyle/>
         <a:p>
-          <a:pPr lvl="0" algn="l" defTabSz="977900">
+          <a:pPr marL="0" lvl="0" indent="0" algn="l" defTabSz="977900">
             <a:lnSpc>
               <a:spcPct val="90000"/>
             </a:lnSpc>
@@ -4121,10 +3991,11 @@
             <a:spcAft>
               <a:spcPct val="35000"/>
             </a:spcAft>
+            <a:buNone/>
           </a:pPr>
           <a:r>
-            <a:rPr lang="es-ES" sz="2200" kern="1200" dirty="0" err="1" smtClean="0"/>
-            <a:t>IndicesAndRanges</a:t>
+            <a:rPr lang="es-ES" sz="2200" kern="1200" dirty="0" err="1"/>
+            <a:t>AsyncStream</a:t>
           </a:r>
           <a:endParaRPr lang="es-ES" sz="2200" kern="1200" dirty="0"/>
         </a:p>
@@ -4134,7 +4005,7 @@
         <a:ext cx="3049266" cy="952895"/>
       </dsp:txXfrm>
     </dsp:sp>
-    <dsp:sp modelId="{D6379DC1-0104-4607-8495-C528849515B3}">
+    <dsp:sp modelId="{F7DEAB92-DEBF-4CB0-BB67-F6F5A804D1A4}">
       <dsp:nvSpPr>
         <dsp:cNvPr id="0" name=""/>
         <dsp:cNvSpPr/>
@@ -4182,7 +4053,7 @@
         <a:fontRef idx="minor"/>
       </dsp:style>
     </dsp:sp>
-    <dsp:sp modelId="{B5B370A7-F936-4EE5-B5B8-0C278B755428}">
+    <dsp:sp modelId="{F104F9C3-EA2A-4326-9E78-34028408AB3C}">
       <dsp:nvSpPr>
         <dsp:cNvPr id="0" name=""/>
         <dsp:cNvSpPr/>
@@ -4235,7 +4106,7 @@
         </a:bodyPr>
         <a:lstStyle/>
         <a:p>
-          <a:pPr lvl="0" algn="l" defTabSz="977900">
+          <a:pPr marL="0" lvl="0" indent="0" algn="l" defTabSz="977900">
             <a:lnSpc>
               <a:spcPct val="90000"/>
             </a:lnSpc>
@@ -4245,12 +4116,12 @@
             <a:spcAft>
               <a:spcPct val="35000"/>
             </a:spcAft>
+            <a:buNone/>
           </a:pPr>
           <a:r>
-            <a:rPr lang="es-ES" sz="2200" kern="1200" smtClean="0"/>
-            <a:t>AsyncStream</a:t>
+            <a:rPr lang="es-ES" sz="2200" kern="1200" dirty="0"/>
+            <a:t>Default Interfaces Methods</a:t>
           </a:r>
-          <a:endParaRPr lang="es-ES" sz="2200" kern="1200" dirty="0"/>
         </a:p>
       </dsp:txBody>
       <dsp:txXfrm>
@@ -4258,7 +4129,7 @@
         <a:ext cx="3049266" cy="952895"/>
       </dsp:txXfrm>
     </dsp:sp>
-    <dsp:sp modelId="{F7DEAB92-DEBF-4CB0-BB67-F6F5A804D1A4}">
+    <dsp:sp modelId="{45E682B6-A8F2-4968-B3EC-E56725F7806C}">
       <dsp:nvSpPr>
         <dsp:cNvPr id="0" name=""/>
         <dsp:cNvSpPr/>
@@ -4306,7 +4177,7 @@
         <a:fontRef idx="minor"/>
       </dsp:style>
     </dsp:sp>
-    <dsp:sp modelId="{F104F9C3-EA2A-4326-9E78-34028408AB3C}">
+    <dsp:sp modelId="{8F971F46-95A4-144A-BF14-6F305FDF0BA9}">
       <dsp:nvSpPr>
         <dsp:cNvPr id="0" name=""/>
         <dsp:cNvSpPr/>
@@ -4359,7 +4230,7 @@
         </a:bodyPr>
         <a:lstStyle/>
         <a:p>
-          <a:pPr lvl="0" algn="l" defTabSz="977900">
+          <a:pPr marL="0" lvl="0" indent="0" algn="l" defTabSz="977900">
             <a:lnSpc>
               <a:spcPct val="90000"/>
             </a:lnSpc>
@@ -4369,10 +4240,11 @@
             <a:spcAft>
               <a:spcPct val="35000"/>
             </a:spcAft>
+            <a:buNone/>
           </a:pPr>
           <a:r>
-            <a:rPr lang="es-ES" sz="2200" kern="1200" dirty="0" smtClean="0"/>
-            <a:t>Default Interfaces Methods</a:t>
+            <a:rPr lang="es-ES" sz="2200" b="1" kern="1200"/>
+            <a:t>INDICES Y RANGOS</a:t>
           </a:r>
           <a:endParaRPr lang="es-ES" sz="2200" kern="1200" dirty="0"/>
         </a:p>
@@ -4382,7 +4254,7 @@
         <a:ext cx="3049266" cy="952895"/>
       </dsp:txXfrm>
     </dsp:sp>
-    <dsp:sp modelId="{45E682B6-A8F2-4968-B3EC-E56725F7806C}">
+    <dsp:sp modelId="{EFB442C9-CD0C-B84D-AAEA-499D0A478595}">
       <dsp:nvSpPr>
         <dsp:cNvPr id="0" name=""/>
         <dsp:cNvSpPr/>
@@ -6951,7 +6823,7 @@
           <a:p>
             <a:fld id="{27B8802E-0937-47D4-BC87-B51C9102E14A}" type="datetimeFigureOut">
               <a:rPr lang="es-ES" smtClean="0"/>
-              <a:t>09/07/2020</a:t>
+              <a:t>12/7/20</a:t>
             </a:fld>
             <a:endParaRPr lang="es-ES"/>
           </a:p>
@@ -7015,35 +6887,35 @@
           <a:p>
             <a:pPr lvl="0"/>
             <a:r>
-              <a:rPr lang="en-US" smtClean="0"/>
+              <a:rPr lang="en-US"/>
               <a:t>Click to edit Master text styles</a:t>
             </a:r>
           </a:p>
           <a:p>
             <a:pPr lvl="1"/>
             <a:r>
-              <a:rPr lang="en-US" smtClean="0"/>
+              <a:rPr lang="en-US"/>
               <a:t>Second level</a:t>
             </a:r>
           </a:p>
           <a:p>
             <a:pPr lvl="2"/>
             <a:r>
-              <a:rPr lang="en-US" smtClean="0"/>
+              <a:rPr lang="en-US"/>
               <a:t>Third level</a:t>
             </a:r>
           </a:p>
           <a:p>
             <a:pPr lvl="3"/>
             <a:r>
-              <a:rPr lang="en-US" smtClean="0"/>
+              <a:rPr lang="en-US"/>
               <a:t>Fourth level</a:t>
             </a:r>
           </a:p>
           <a:p>
             <a:pPr lvl="4"/>
             <a:r>
-              <a:rPr lang="en-US" smtClean="0"/>
+              <a:rPr lang="en-US"/>
               <a:t>Fifth level</a:t>
             </a:r>
             <a:endParaRPr lang="es-ES"/>
@@ -7347,16 +7219,16 @@
           <a:bodyPr/>
           <a:lstStyle/>
           <a:p>
-            <a:endParaRPr lang="en-US" sz="4000" strike="noStrike" baseline="0" dirty="0" smtClean="0"/>
-          </a:p>
-          <a:p>
-            <a:endParaRPr lang="en-US" strike="noStrike" baseline="0" dirty="0" smtClean="0"/>
-          </a:p>
-          <a:p>
-            <a:endParaRPr lang="en-US" strike="noStrike" baseline="0" dirty="0" smtClean="0"/>
-          </a:p>
-          <a:p>
-            <a:endParaRPr lang="en-US" strike="noStrike" baseline="0" dirty="0" smtClean="0"/>
+            <a:endParaRPr lang="en-US" sz="4000" strike="noStrike" baseline="0" dirty="0"/>
+          </a:p>
+          <a:p>
+            <a:endParaRPr lang="en-US" strike="noStrike" baseline="0" dirty="0"/>
+          </a:p>
+          <a:p>
+            <a:endParaRPr lang="en-US" strike="noStrike" baseline="0" dirty="0"/>
+          </a:p>
+          <a:p>
+            <a:endParaRPr lang="en-US" strike="noStrike" baseline="0" dirty="0"/>
           </a:p>
           <a:p>
             <a:endParaRPr lang="en-US" dirty="0"/>
@@ -7396,7 +7268,7 @@
               <a:defRPr/>
             </a:pPr>
             <a:r>
-              <a:rPr kumimoji="0" lang="en-US" sz="1200" b="0" i="0" u="none" strike="noStrike" kern="1200" cap="none" spc="0" normalizeH="0" baseline="0" noProof="0" smtClean="0">
+              <a:rPr kumimoji="0" lang="en-US" sz="1200" b="0" i="0" u="none" strike="noStrike" kern="1200" cap="none" spc="0" normalizeH="0" baseline="0" noProof="0">
                 <a:ln>
                   <a:noFill/>
                 </a:ln>
@@ -7481,7 +7353,7 @@
               <a:defRPr/>
             </a:pPr>
             <a:r>
-              <a:rPr kumimoji="0" lang="en-US" sz="400" b="0" i="0" u="none" strike="noStrike" kern="1200" cap="none" spc="0" normalizeH="0" baseline="0" noProof="0" smtClean="0">
+              <a:rPr kumimoji="0" lang="en-US" sz="400" b="0" i="0" u="none" strike="noStrike" kern="1200" cap="none" spc="0" normalizeH="0" baseline="0" noProof="0">
                 <a:ln>
                   <a:noFill/>
                 </a:ln>
@@ -7505,7 +7377,7 @@
               </a:rPr>
               <a:t>© 2015 Microsoft Corporation. All rights reserved. MICROSOFT MAKES NO WARRANTIES, EXPRESS, IMPLIED OR STATUTORY, AS TO THE INFORMATION IN THIS PRESENTATION.</a:t>
             </a:r>
-            <a:endParaRPr kumimoji="0" lang="en-US" sz="400" b="0" i="0" u="none" strike="noStrike" kern="1200" cap="none" spc="0" normalizeH="0" baseline="0" noProof="0" dirty="0" smtClean="0">
+            <a:endParaRPr kumimoji="0" lang="en-US" sz="400" b="0" i="0" u="none" strike="noStrike" kern="1200" cap="none" spc="0" normalizeH="0" baseline="0" noProof="0" dirty="0">
               <a:ln>
                 <a:noFill/>
               </a:ln>
@@ -7594,7 +7466,7 @@
                 <a:tabLst/>
                 <a:defRPr/>
               </a:pPr>
-              <a:t>7/9/2020 7:31 PM</a:t>
+              <a:t>7/12/20 6:22 PM</a:t>
             </a:fld>
             <a:endParaRPr kumimoji="0" lang="en-US" sz="1200" b="0" i="0" u="none" strike="noStrike" kern="1200" cap="none" spc="0" normalizeH="0" baseline="0" noProof="0" dirty="0">
               <a:ln>
@@ -7754,17 +7626,17 @@
           <a:lstStyle/>
           <a:p>
             <a:r>
-              <a:rPr lang="en-US" sz="4000" b="1" strike="noStrike" baseline="0" dirty="0" smtClean="0"/>
+              <a:rPr lang="en-US" sz="4000" b="1" strike="noStrike" baseline="0" dirty="0"/>
               <a:t>Pattern Matching:</a:t>
             </a:r>
           </a:p>
           <a:p>
             <a:r>
-              <a:rPr lang="en-US" sz="4000" b="0" strike="noStrike" baseline="0" dirty="0" smtClean="0"/>
+              <a:rPr lang="en-US" sz="4000" b="0" strike="noStrike" baseline="0" dirty="0"/>
               <a:t>   Using C# 7.0 </a:t>
             </a:r>
             <a:r>
-              <a:rPr lang="en-US" sz="4000" b="0" strike="noStrike" baseline="0" dirty="0" smtClean="0">
+              <a:rPr lang="en-US" sz="4000" b="0" strike="noStrike" baseline="0" dirty="0">
                 <a:sym typeface="Wingdings" panose="05000000000000000000" pitchFamily="2" charset="2"/>
               </a:rPr>
               <a:t> IS,  switch (object), switch (object) + when,  switch (object) + when using null special case.</a:t>
@@ -7772,7 +7644,7 @@
           </a:p>
           <a:p>
             <a:r>
-              <a:rPr lang="en-US" sz="4000" b="0" strike="noStrike" baseline="0" dirty="0" smtClean="0">
+              <a:rPr lang="en-US" sz="4000" b="0" strike="noStrike" baseline="0" dirty="0">
                 <a:sym typeface="Wingdings" panose="05000000000000000000" pitchFamily="2" charset="2"/>
               </a:rPr>
               <a:t>   In C# 8.0 </a:t>
@@ -7780,25 +7652,25 @@
           </a:p>
           <a:p>
             <a:r>
-              <a:rPr lang="en-US" sz="4000" b="0" strike="noStrike" baseline="0" dirty="0" smtClean="0">
+              <a:rPr lang="en-US" sz="4000" b="0" strike="noStrike" baseline="0" dirty="0">
                 <a:sym typeface="Wingdings" panose="05000000000000000000" pitchFamily="2" charset="2"/>
               </a:rPr>
               <a:t>        public decimal </a:t>
             </a:r>
             <a:r>
-              <a:rPr lang="en-US" sz="4000" b="0" strike="noStrike" baseline="0" dirty="0" err="1" smtClean="0">
+              <a:rPr lang="en-US" sz="4000" b="0" strike="noStrike" baseline="0" dirty="0" err="1">
                 <a:sym typeface="Wingdings" panose="05000000000000000000" pitchFamily="2" charset="2"/>
               </a:rPr>
               <a:t>CalculateToll</a:t>
             </a:r>
             <a:r>
-              <a:rPr lang="en-US" sz="4000" b="0" strike="noStrike" baseline="0" dirty="0" smtClean="0">
+              <a:rPr lang="en-US" sz="4000" b="0" strike="noStrike" baseline="0" dirty="0">
                 <a:sym typeface="Wingdings" panose="05000000000000000000" pitchFamily="2" charset="2"/>
               </a:rPr>
               <a:t>(object vehicle) </a:t>
             </a:r>
             <a:r>
-              <a:rPr lang="en-US" sz="4000" b="1" strike="noStrike" baseline="0" dirty="0" smtClean="0">
+              <a:rPr lang="en-US" sz="4000" b="1" strike="noStrike" baseline="0" dirty="0">
                 <a:sym typeface="Wingdings" panose="05000000000000000000" pitchFamily="2" charset="2"/>
               </a:rPr>
               <a:t>=&gt; vehicle switch</a:t>
@@ -7806,7 +7678,7 @@
           </a:p>
           <a:p>
             <a:r>
-              <a:rPr lang="en-US" sz="4000" b="0" strike="noStrike" baseline="0" dirty="0" smtClean="0">
+              <a:rPr lang="en-US" sz="4000" b="0" strike="noStrike" baseline="0" dirty="0">
                 <a:sym typeface="Wingdings" panose="05000000000000000000" pitchFamily="2" charset="2"/>
               </a:rPr>
               <a:t>            {</a:t>
@@ -7814,7 +7686,7 @@
           </a:p>
           <a:p>
             <a:r>
-              <a:rPr lang="en-US" sz="4000" b="0" strike="noStrike" baseline="0" dirty="0" smtClean="0">
+              <a:rPr lang="en-US" sz="4000" b="0" strike="noStrike" baseline="0" dirty="0">
                 <a:sym typeface="Wingdings" panose="05000000000000000000" pitchFamily="2" charset="2"/>
               </a:rPr>
               <a:t>                Car c =&gt; 2.00m,</a:t>
@@ -7822,7 +7694,7 @@
           </a:p>
           <a:p>
             <a:r>
-              <a:rPr lang="en-US" sz="4000" b="0" strike="noStrike" baseline="0" dirty="0" smtClean="0">
+              <a:rPr lang="en-US" sz="4000" b="0" strike="noStrike" baseline="0" dirty="0">
                 <a:sym typeface="Wingdings" panose="05000000000000000000" pitchFamily="2" charset="2"/>
               </a:rPr>
               <a:t>                Taxi t =&gt; 3.50m,</a:t>
@@ -7830,7 +7702,7 @@
           </a:p>
           <a:p>
             <a:r>
-              <a:rPr lang="en-US" sz="4000" b="0" strike="noStrike" baseline="0" dirty="0" smtClean="0">
+              <a:rPr lang="en-US" sz="4000" b="0" strike="noStrike" baseline="0" dirty="0">
                 <a:sym typeface="Wingdings" panose="05000000000000000000" pitchFamily="2" charset="2"/>
               </a:rPr>
               <a:t>                Bus b =&gt; 5.00m,</a:t>
@@ -7838,19 +7710,19 @@
           </a:p>
           <a:p>
             <a:r>
-              <a:rPr lang="en-US" sz="4000" b="0" strike="noStrike" baseline="0" dirty="0" smtClean="0">
+              <a:rPr lang="en-US" sz="4000" b="0" strike="noStrike" baseline="0" dirty="0">
                 <a:sym typeface="Wingdings" panose="05000000000000000000" pitchFamily="2" charset="2"/>
               </a:rPr>
               <a:t>                </a:t>
             </a:r>
             <a:r>
-              <a:rPr lang="en-US" sz="4000" b="0" strike="noStrike" baseline="0" dirty="0" err="1" smtClean="0">
+              <a:rPr lang="en-US" sz="4000" b="0" strike="noStrike" baseline="0" dirty="0" err="1">
                 <a:sym typeface="Wingdings" panose="05000000000000000000" pitchFamily="2" charset="2"/>
               </a:rPr>
               <a:t>DeliveryTruck</a:t>
             </a:r>
             <a:r>
-              <a:rPr lang="en-US" sz="4000" b="0" strike="noStrike" baseline="0" dirty="0" smtClean="0">
+              <a:rPr lang="en-US" sz="4000" b="0" strike="noStrike" baseline="0" dirty="0">
                 <a:sym typeface="Wingdings" panose="05000000000000000000" pitchFamily="2" charset="2"/>
               </a:rPr>
               <a:t> t =&gt; 10.00m,</a:t>
@@ -7858,55 +7730,55 @@
           </a:p>
           <a:p>
             <a:r>
-              <a:rPr lang="en-US" sz="4000" b="0" strike="noStrike" baseline="0" dirty="0" smtClean="0">
+              <a:rPr lang="en-US" sz="4000" b="0" strike="noStrike" baseline="0" dirty="0">
                 <a:sym typeface="Wingdings" panose="05000000000000000000" pitchFamily="2" charset="2"/>
               </a:rPr>
               <a:t>                </a:t>
             </a:r>
             <a:r>
-              <a:rPr lang="en-US" sz="4000" b="1" strike="noStrike" baseline="0" dirty="0" smtClean="0">
+              <a:rPr lang="en-US" sz="4000" b="1" strike="noStrike" baseline="0" dirty="0">
                 <a:sym typeface="Wingdings" panose="05000000000000000000" pitchFamily="2" charset="2"/>
               </a:rPr>
               <a:t>{}</a:t>
             </a:r>
             <a:r>
-              <a:rPr lang="en-US" sz="4000" b="0" strike="noStrike" baseline="0" dirty="0" smtClean="0">
+              <a:rPr lang="en-US" sz="4000" b="0" strike="noStrike" baseline="0" dirty="0">
                 <a:sym typeface="Wingdings" panose="05000000000000000000" pitchFamily="2" charset="2"/>
               </a:rPr>
               <a:t> =&gt; throw new </a:t>
             </a:r>
             <a:r>
-              <a:rPr lang="en-US" sz="4000" b="0" strike="noStrike" baseline="0" dirty="0" err="1" smtClean="0">
+              <a:rPr lang="en-US" sz="4000" b="0" strike="noStrike" baseline="0" dirty="0" err="1">
                 <a:sym typeface="Wingdings" panose="05000000000000000000" pitchFamily="2" charset="2"/>
               </a:rPr>
               <a:t>ArgumentException</a:t>
             </a:r>
             <a:r>
-              <a:rPr lang="en-US" sz="4000" b="0" strike="noStrike" baseline="0" dirty="0" smtClean="0">
+              <a:rPr lang="en-US" sz="4000" b="0" strike="noStrike" baseline="0" dirty="0">
                 <a:sym typeface="Wingdings" panose="05000000000000000000" pitchFamily="2" charset="2"/>
               </a:rPr>
               <a:t>(message: "Not a known vehicle type", </a:t>
             </a:r>
             <a:r>
-              <a:rPr lang="en-US" sz="4000" b="0" strike="noStrike" baseline="0" dirty="0" err="1" smtClean="0">
+              <a:rPr lang="en-US" sz="4000" b="0" strike="noStrike" baseline="0" dirty="0" err="1">
                 <a:sym typeface="Wingdings" panose="05000000000000000000" pitchFamily="2" charset="2"/>
               </a:rPr>
               <a:t>paramName</a:t>
             </a:r>
             <a:r>
-              <a:rPr lang="en-US" sz="4000" b="0" strike="noStrike" baseline="0" dirty="0" smtClean="0">
+              <a:rPr lang="en-US" sz="4000" b="0" strike="noStrike" baseline="0" dirty="0">
                 <a:sym typeface="Wingdings" panose="05000000000000000000" pitchFamily="2" charset="2"/>
               </a:rPr>
               <a:t>: </a:t>
             </a:r>
             <a:r>
-              <a:rPr lang="en-US" sz="4000" b="0" strike="noStrike" baseline="0" dirty="0" err="1" smtClean="0">
+              <a:rPr lang="en-US" sz="4000" b="0" strike="noStrike" baseline="0" dirty="0" err="1">
                 <a:sym typeface="Wingdings" panose="05000000000000000000" pitchFamily="2" charset="2"/>
               </a:rPr>
               <a:t>nameof</a:t>
             </a:r>
             <a:r>
-              <a:rPr lang="en-US" sz="4000" b="0" strike="noStrike" baseline="0" dirty="0" smtClean="0">
+              <a:rPr lang="en-US" sz="4000" b="0" strike="noStrike" baseline="0" dirty="0">
                 <a:sym typeface="Wingdings" panose="05000000000000000000" pitchFamily="2" charset="2"/>
               </a:rPr>
               <a:t>(vehicle)),</a:t>
@@ -7914,43 +7786,43 @@
           </a:p>
           <a:p>
             <a:r>
-              <a:rPr lang="en-US" sz="4000" b="0" strike="noStrike" baseline="0" dirty="0" smtClean="0">
+              <a:rPr lang="en-US" sz="4000" b="0" strike="noStrike" baseline="0" dirty="0">
                 <a:sym typeface="Wingdings" panose="05000000000000000000" pitchFamily="2" charset="2"/>
               </a:rPr>
               <a:t>                </a:t>
             </a:r>
             <a:r>
-              <a:rPr lang="en-US" sz="4000" b="1" strike="noStrike" baseline="0" dirty="0" smtClean="0">
+              <a:rPr lang="en-US" sz="4000" b="1" strike="noStrike" baseline="0" dirty="0">
                 <a:sym typeface="Wingdings" panose="05000000000000000000" pitchFamily="2" charset="2"/>
               </a:rPr>
               <a:t>null</a:t>
             </a:r>
             <a:r>
-              <a:rPr lang="en-US" sz="4000" b="0" strike="noStrike" baseline="0" dirty="0" smtClean="0">
+              <a:rPr lang="en-US" sz="4000" b="0" strike="noStrike" baseline="0" dirty="0">
                 <a:sym typeface="Wingdings" panose="05000000000000000000" pitchFamily="2" charset="2"/>
               </a:rPr>
               <a:t> =&gt; throw new </a:t>
             </a:r>
             <a:r>
-              <a:rPr lang="en-US" sz="4000" b="0" strike="noStrike" baseline="0" dirty="0" err="1" smtClean="0">
+              <a:rPr lang="en-US" sz="4000" b="0" strike="noStrike" baseline="0" dirty="0" err="1">
                 <a:sym typeface="Wingdings" panose="05000000000000000000" pitchFamily="2" charset="2"/>
               </a:rPr>
               <a:t>ArgumentNullException</a:t>
             </a:r>
             <a:r>
-              <a:rPr lang="en-US" sz="4000" b="0" strike="noStrike" baseline="0" dirty="0" smtClean="0">
+              <a:rPr lang="en-US" sz="4000" b="0" strike="noStrike" baseline="0" dirty="0">
                 <a:sym typeface="Wingdings" panose="05000000000000000000" pitchFamily="2" charset="2"/>
               </a:rPr>
               <a:t>(</a:t>
             </a:r>
             <a:r>
-              <a:rPr lang="en-US" sz="4000" b="0" strike="noStrike" baseline="0" dirty="0" err="1" smtClean="0">
+              <a:rPr lang="en-US" sz="4000" b="0" strike="noStrike" baseline="0" dirty="0" err="1">
                 <a:sym typeface="Wingdings" panose="05000000000000000000" pitchFamily="2" charset="2"/>
               </a:rPr>
               <a:t>nameof</a:t>
             </a:r>
             <a:r>
-              <a:rPr lang="en-US" sz="4000" b="0" strike="noStrike" baseline="0" dirty="0" smtClean="0">
+              <a:rPr lang="en-US" sz="4000" b="0" strike="noStrike" baseline="0" dirty="0">
                 <a:sym typeface="Wingdings" panose="05000000000000000000" pitchFamily="2" charset="2"/>
               </a:rPr>
               <a:t>(vehicle))</a:t>
@@ -7958,24 +7830,112 @@
           </a:p>
           <a:p>
             <a:r>
-              <a:rPr lang="en-US" sz="4000" b="0" strike="noStrike" baseline="0" dirty="0" smtClean="0">
+              <a:rPr lang="en-US" sz="4000" b="0" strike="noStrike" baseline="0" dirty="0">
                 <a:sym typeface="Wingdings" panose="05000000000000000000" pitchFamily="2" charset="2"/>
               </a:rPr>
               <a:t>            };</a:t>
             </a:r>
-            <a:endParaRPr lang="en-US" sz="4000" b="0" strike="noStrike" baseline="0" dirty="0" smtClean="0"/>
-          </a:p>
-          <a:p>
-            <a:endParaRPr lang="en-US" sz="4000" b="1" strike="noStrike" baseline="0" dirty="0" smtClean="0"/>
-          </a:p>
-          <a:p>
-            <a:r>
-              <a:rPr lang="en-US" sz="4000" b="1" strike="noStrike" baseline="0" dirty="0" err="1" smtClean="0"/>
-              <a:t>Async</a:t>
-            </a:r>
-            <a:r>
-              <a:rPr lang="en-US" sz="4000" b="1" strike="noStrike" baseline="0" dirty="0" smtClean="0"/>
-              <a:t> Steam:</a:t>
+            <a:endParaRPr lang="en-US" sz="4000" b="0" strike="noStrike" baseline="0" dirty="0"/>
+          </a:p>
+          <a:p>
+            <a:endParaRPr lang="en-US" strike="noStrike" baseline="0" dirty="0"/>
+          </a:p>
+          <a:p>
+            <a:r>
+              <a:rPr lang="en-US" strike="noStrike" baseline="0" dirty="0"/>
+              <a:t>Static Local Function.</a:t>
+            </a:r>
+          </a:p>
+          <a:p>
+            <a:pPr marL="171450" indent="-171450">
+              <a:buFontTx/>
+              <a:buChar char="-"/>
+            </a:pPr>
+            <a:r>
+              <a:rPr lang="en-US" strike="noStrike" baseline="0" dirty="0"/>
+              <a:t>C# 7.0 -&gt; local functions.</a:t>
+            </a:r>
+          </a:p>
+          <a:p>
+            <a:pPr marL="171450" indent="-171450">
+              <a:buFontTx/>
+              <a:buChar char="-"/>
+            </a:pPr>
+            <a:r>
+              <a:rPr lang="en-US" strike="noStrike" baseline="0" dirty="0"/>
+              <a:t>C# 8.0</a:t>
+            </a:r>
+          </a:p>
+          <a:p>
+            <a:endParaRPr lang="en-US" strike="noStrike" baseline="0" dirty="0"/>
+          </a:p>
+          <a:p>
+            <a:pPr lvl="0"/>
+            <a:r>
+              <a:rPr lang="es-ES" b="1" dirty="0"/>
+              <a:t>Default Interfaces Methods</a:t>
+            </a:r>
+          </a:p>
+          <a:p>
+            <a:pPr lvl="0"/>
+            <a:r>
+              <a:rPr lang="es-ES" b="1" strike="noStrike" baseline="0" dirty="0"/>
+              <a:t>   </a:t>
+            </a:r>
+            <a:r>
+              <a:rPr lang="en-US" b="0" strike="noStrike" baseline="0" dirty="0"/>
+              <a:t>What about Abstract Class ???????</a:t>
+            </a:r>
+            <a:endParaRPr lang="en-US" b="1" strike="noStrike" baseline="0" dirty="0"/>
+          </a:p>
+          <a:p>
+            <a:endParaRPr lang="en-US" b="1" strike="noStrike" baseline="0" dirty="0"/>
+          </a:p>
+          <a:p>
+            <a:r>
+              <a:rPr lang="en-US" b="1" strike="noStrike" baseline="0" dirty="0" err="1"/>
+              <a:t>Nullable</a:t>
+            </a:r>
+            <a:r>
+              <a:rPr lang="en-US" b="1" strike="noStrike" baseline="0" dirty="0"/>
+              <a:t> References:</a:t>
+            </a:r>
+          </a:p>
+          <a:p>
+            <a:r>
+              <a:rPr lang="en-US" b="0" strike="noStrike" baseline="0" dirty="0"/>
+              <a:t>- #</a:t>
+            </a:r>
+            <a:r>
+              <a:rPr lang="en-US" b="0" strike="noStrike" baseline="0" dirty="0" err="1"/>
+              <a:t>nullable</a:t>
+            </a:r>
+            <a:r>
+              <a:rPr lang="en-US" b="0" strike="noStrike" baseline="0" dirty="0"/>
+              <a:t> enable / #</a:t>
+            </a:r>
+            <a:r>
+              <a:rPr lang="en-US" b="0" strike="noStrike" baseline="0" dirty="0" err="1"/>
+              <a:t>nullable</a:t>
+            </a:r>
+            <a:r>
+              <a:rPr lang="en-US" b="0" strike="noStrike" baseline="0" dirty="0"/>
+              <a:t> restore</a:t>
+            </a:r>
+          </a:p>
+          <a:p>
+            <a:r>
+              <a:rPr lang="en-US" b="0" strike="noStrike" baseline="0" dirty="0"/>
+              <a:t>- forgiveness operator, !</a:t>
+            </a:r>
+          </a:p>
+          <a:p>
+            <a:endParaRPr lang="en-US" strike="noStrike" baseline="0" dirty="0"/>
+          </a:p>
+          <a:p>
+            <a:r>
+              <a:rPr lang="en-US" sz="4000" b="1" strike="noStrike" baseline="0" dirty="0"/>
+              <a:t>Async Steam:</a:t>
             </a:r>
           </a:p>
           <a:p>
@@ -7984,22 +7944,14 @@
               <a:buNone/>
             </a:pPr>
             <a:r>
-              <a:rPr lang="en-US" sz="4000" strike="noStrike" baseline="0" dirty="0" smtClean="0"/>
-              <a:t>   Declare </a:t>
-            </a:r>
-            <a:r>
-              <a:rPr lang="en-US" sz="4000" strike="noStrike" baseline="0" dirty="0" err="1" smtClean="0"/>
-              <a:t>async</a:t>
-            </a:r>
-            <a:r>
-              <a:rPr lang="en-US" sz="4000" strike="noStrike" baseline="0" dirty="0" smtClean="0"/>
-              <a:t> </a:t>
-            </a:r>
-            <a:r>
-              <a:rPr lang="en-US" sz="4000" strike="noStrike" baseline="0" dirty="0" err="1" smtClean="0"/>
+              <a:rPr lang="en-US" sz="4000" strike="noStrike" baseline="0" dirty="0"/>
+              <a:t>   Declare async </a:t>
+            </a:r>
+            <a:r>
+              <a:rPr lang="en-US" sz="4000" strike="noStrike" baseline="0" dirty="0" err="1"/>
               <a:t>moficier</a:t>
             </a:r>
-            <a:endParaRPr lang="en-US" sz="4000" strike="noStrike" baseline="0" dirty="0" smtClean="0"/>
+            <a:endParaRPr lang="en-US" sz="4000" strike="noStrike" baseline="0" dirty="0"/>
           </a:p>
           <a:p>
             <a:pPr marL="0" indent="0">
@@ -8007,11 +7959,11 @@
               <a:buNone/>
             </a:pPr>
             <a:r>
-              <a:rPr lang="en-US" sz="4000" strike="noStrike" baseline="0" dirty="0" smtClean="0"/>
+              <a:rPr lang="en-US" sz="4000" strike="noStrike" baseline="0" dirty="0"/>
               <a:t>   Return </a:t>
             </a:r>
             <a:r>
-              <a:rPr lang="es-ES" sz="1200" b="0" i="0" kern="1200" dirty="0" err="1" smtClean="0">
+              <a:rPr lang="es-ES" sz="1200" b="0" i="0" kern="1200" dirty="0" err="1">
                 <a:solidFill>
                   <a:schemeClr val="tx1"/>
                 </a:solidFill>
@@ -8023,7 +7975,7 @@
               <a:t>System.Collections.Generic.IAsyncEnumerable</a:t>
             </a:r>
             <a:r>
-              <a:rPr lang="es-ES" sz="1200" b="0" i="0" kern="1200" dirty="0" smtClean="0">
+              <a:rPr lang="es-ES" sz="1200" b="0" i="0" kern="1200" dirty="0">
                 <a:solidFill>
                   <a:schemeClr val="tx1"/>
                 </a:solidFill>
@@ -8041,7 +7993,7 @@
               <a:buNone/>
             </a:pPr>
             <a:r>
-              <a:rPr lang="es-ES" sz="1200" b="0" i="0" strike="noStrike" kern="1200" baseline="0" dirty="0" smtClean="0">
+              <a:rPr lang="es-ES" sz="1200" b="0" i="0" strike="noStrike" kern="1200" baseline="0" dirty="0">
                 <a:solidFill>
                   <a:schemeClr val="tx1"/>
                 </a:solidFill>
@@ -8053,7 +8005,7 @@
               <a:t>   </a:t>
             </a:r>
             <a:r>
-              <a:rPr lang="es-ES" sz="1200" b="0" i="0" strike="noStrike" kern="1200" baseline="0" dirty="0" err="1" smtClean="0">
+              <a:rPr lang="es-ES" sz="1200" b="0" i="0" strike="noStrike" kern="1200" baseline="0" dirty="0" err="1">
                 <a:solidFill>
                   <a:schemeClr val="tx1"/>
                 </a:solidFill>
@@ -8065,7 +8017,7 @@
               <a:t>Yield</a:t>
             </a:r>
             <a:r>
-              <a:rPr lang="es-ES" sz="1200" b="0" i="0" strike="noStrike" kern="1200" baseline="0" dirty="0" smtClean="0">
+              <a:rPr lang="es-ES" sz="1200" b="0" i="0" strike="noStrike" kern="1200" baseline="0" dirty="0">
                 <a:solidFill>
                   <a:schemeClr val="tx1"/>
                 </a:solidFill>
@@ -8077,7 +8029,7 @@
               <a:t> </a:t>
             </a:r>
             <a:r>
-              <a:rPr lang="es-ES" sz="1200" b="0" i="0" strike="noStrike" kern="1200" baseline="0" dirty="0" err="1" smtClean="0">
+              <a:rPr lang="es-ES" sz="1200" b="0" i="0" strike="noStrike" kern="1200" baseline="0" dirty="0" err="1">
                 <a:solidFill>
                   <a:schemeClr val="tx1"/>
                 </a:solidFill>
@@ -8088,7 +8040,7 @@
               </a:rPr>
               <a:t>return</a:t>
             </a:r>
-            <a:endParaRPr lang="es-ES" sz="1200" b="0" i="0" strike="noStrike" kern="1200" baseline="0" dirty="0" smtClean="0">
+            <a:endParaRPr lang="es-ES" sz="1200" b="0" i="0" strike="noStrike" kern="1200" baseline="0" dirty="0">
               <a:solidFill>
                 <a:schemeClr val="tx1"/>
               </a:solidFill>
@@ -8104,7 +8056,7 @@
               <a:buNone/>
             </a:pPr>
             <a:r>
-              <a:rPr lang="es-ES" sz="1200" b="0" i="0" strike="noStrike" kern="1200" baseline="0" dirty="0" smtClean="0">
+              <a:rPr lang="es-ES" sz="1200" b="0" i="0" strike="noStrike" kern="1200" baseline="0" dirty="0">
                 <a:solidFill>
                   <a:schemeClr val="tx1"/>
                 </a:solidFill>
@@ -8116,7 +8068,7 @@
               <a:t> </a:t>
             </a:r>
             <a:r>
-              <a:rPr lang="es-ES" sz="1200" b="0" i="0" strike="noStrike" kern="1200" baseline="0" dirty="0" err="1" smtClean="0">
+              <a:rPr lang="es-ES" sz="1200" b="0" i="0" strike="noStrike" kern="1200" baseline="0" dirty="0" err="1">
                 <a:solidFill>
                   <a:schemeClr val="tx1"/>
                 </a:solidFill>
@@ -8128,7 +8080,7 @@
               <a:t>Consuming</a:t>
             </a:r>
             <a:r>
-              <a:rPr lang="es-ES" sz="1200" b="0" i="0" strike="noStrike" kern="1200" baseline="0" dirty="0" smtClean="0">
+              <a:rPr lang="es-ES" sz="1200" b="0" i="0" strike="noStrike" kern="1200" baseline="0" dirty="0">
                 <a:solidFill>
                   <a:schemeClr val="tx1"/>
                 </a:solidFill>
@@ -8146,7 +8098,7 @@
               <a:buNone/>
             </a:pPr>
             <a:r>
-              <a:rPr lang="es-ES" sz="1200" b="0" i="0" strike="noStrike" kern="1200" baseline="0" dirty="0" smtClean="0">
+              <a:rPr lang="es-ES" sz="1200" b="0" i="0" strike="noStrike" kern="1200" baseline="0" dirty="0">
                 <a:solidFill>
                   <a:schemeClr val="tx1"/>
                 </a:solidFill>
@@ -8158,7 +8110,7 @@
               <a:t>   </a:t>
             </a:r>
             <a:r>
-              <a:rPr lang="es-ES" sz="1200" b="0" i="0" strike="noStrike" kern="1200" baseline="0" dirty="0" err="1" smtClean="0">
+              <a:rPr lang="es-ES" sz="1200" b="0" i="0" strike="noStrike" kern="1200" baseline="0" dirty="0" err="1">
                 <a:solidFill>
                   <a:schemeClr val="tx1"/>
                 </a:solidFill>
@@ -8170,7 +8122,7 @@
               <a:t>await</a:t>
             </a:r>
             <a:r>
-              <a:rPr lang="es-ES" sz="1200" b="0" i="0" strike="noStrike" kern="1200" baseline="0" dirty="0" smtClean="0">
+              <a:rPr lang="es-ES" sz="1200" b="0" i="0" strike="noStrike" kern="1200" baseline="0" dirty="0">
                 <a:solidFill>
                   <a:schemeClr val="tx1"/>
                 </a:solidFill>
@@ -8182,7 +8134,7 @@
               <a:t> </a:t>
             </a:r>
             <a:r>
-              <a:rPr lang="es-ES" sz="1200" b="0" i="0" strike="noStrike" kern="1200" baseline="0" dirty="0" err="1" smtClean="0">
+              <a:rPr lang="es-ES" sz="1200" b="0" i="0" strike="noStrike" kern="1200" baseline="0" dirty="0" err="1">
                 <a:solidFill>
                   <a:schemeClr val="tx1"/>
                 </a:solidFill>
@@ -8194,7 +8146,7 @@
               <a:t>foreach</a:t>
             </a:r>
             <a:r>
-              <a:rPr lang="es-ES" sz="1200" b="0" i="0" strike="noStrike" kern="1200" baseline="0" dirty="0" smtClean="0">
+              <a:rPr lang="es-ES" sz="1200" b="0" i="0" strike="noStrike" kern="1200" baseline="0" dirty="0">
                 <a:solidFill>
                   <a:schemeClr val="tx1"/>
                 </a:solidFill>
@@ -8206,7 +8158,7 @@
               <a:t> (</a:t>
             </a:r>
             <a:r>
-              <a:rPr lang="es-ES" sz="1200" b="0" i="0" strike="noStrike" kern="1200" baseline="0" dirty="0" err="1" smtClean="0">
+              <a:rPr lang="es-ES" sz="1200" b="0" i="0" strike="noStrike" kern="1200" baseline="0" dirty="0" err="1">
                 <a:solidFill>
                   <a:schemeClr val="tx1"/>
                 </a:solidFill>
@@ -8218,7 +8170,7 @@
               <a:t>var</a:t>
             </a:r>
             <a:r>
-              <a:rPr lang="es-ES" sz="1200" b="0" i="0" strike="noStrike" kern="1200" baseline="0" dirty="0" smtClean="0">
+              <a:rPr lang="es-ES" sz="1200" b="0" i="0" strike="noStrike" kern="1200" baseline="0" dirty="0">
                 <a:solidFill>
                   <a:schemeClr val="tx1"/>
                 </a:solidFill>
@@ -8230,7 +8182,7 @@
               <a:t> x in </a:t>
             </a:r>
             <a:r>
-              <a:rPr lang="es-ES" sz="1200" b="0" i="0" strike="noStrike" kern="1200" baseline="0" dirty="0" err="1" smtClean="0">
+              <a:rPr lang="es-ES" sz="1200" b="0" i="0" strike="noStrike" kern="1200" baseline="0" dirty="0" err="1">
                 <a:solidFill>
                   <a:schemeClr val="tx1"/>
                 </a:solidFill>
@@ -8242,7 +8194,7 @@
               <a:t>list</a:t>
             </a:r>
             <a:r>
-              <a:rPr lang="es-ES" sz="1200" b="0" i="0" strike="noStrike" kern="1200" baseline="0" dirty="0" smtClean="0">
+              <a:rPr lang="es-ES" sz="1200" b="0" i="0" strike="noStrike" kern="1200" baseline="0" dirty="0">
                 <a:solidFill>
                   <a:schemeClr val="tx1"/>
                 </a:solidFill>
@@ -8253,15 +8205,15 @@
               </a:rPr>
               <a:t>) {}</a:t>
             </a:r>
-            <a:endParaRPr lang="en-US" sz="4000" strike="noStrike" baseline="0" dirty="0" smtClean="0"/>
-          </a:p>
-          <a:p>
-            <a:endParaRPr lang="en-US" strike="noStrike" baseline="0" dirty="0" smtClean="0"/>
-          </a:p>
-          <a:p>
-            <a:r>
-              <a:rPr lang="en-US" strike="noStrike" baseline="0" dirty="0" smtClean="0"/>
-              <a:t>Static Local Function.</a:t>
+            <a:endParaRPr lang="en-US" sz="4000" strike="noStrike" baseline="0" dirty="0"/>
+          </a:p>
+          <a:p>
+            <a:endParaRPr lang="en-US" strike="noStrike" baseline="0" dirty="0"/>
+          </a:p>
+          <a:p>
+            <a:r>
+              <a:rPr lang="en-US" strike="noStrike" baseline="0" dirty="0"/>
+              <a:t>Indices and ranges:</a:t>
             </a:r>
           </a:p>
           <a:p>
@@ -8270,8 +8222,8 @@
               <a:buChar char="-"/>
             </a:pPr>
             <a:r>
-              <a:rPr lang="en-US" strike="noStrike" baseline="0" dirty="0" smtClean="0"/>
-              <a:t>C# 7.0 -&gt; local functions.</a:t>
+              <a:rPr lang="en-US" strike="noStrike" baseline="0" dirty="0"/>
+              <a:t>Index -&gt; from 0 to n-1</a:t>
             </a:r>
           </a:p>
           <a:p>
@@ -8280,82 +8232,9 @@
               <a:buChar char="-"/>
             </a:pPr>
             <a:r>
-              <a:rPr lang="en-US" strike="noStrike" baseline="0" dirty="0" smtClean="0"/>
-              <a:t>C# 8.0</a:t>
-            </a:r>
-          </a:p>
-          <a:p>
-            <a:endParaRPr lang="en-US" strike="noStrike" baseline="0" dirty="0" smtClean="0"/>
-          </a:p>
-          <a:p>
-            <a:pPr lvl="0"/>
-            <a:r>
-              <a:rPr lang="es-ES" b="1" dirty="0" smtClean="0"/>
-              <a:t>Default Interfaces Methods</a:t>
-            </a:r>
-          </a:p>
-          <a:p>
-            <a:pPr lvl="0"/>
-            <a:r>
-              <a:rPr lang="es-ES" b="1" strike="noStrike" baseline="0" dirty="0" smtClean="0"/>
-              <a:t>   </a:t>
-            </a:r>
-            <a:r>
-              <a:rPr lang="en-US" b="0" strike="noStrike" baseline="0" dirty="0" smtClean="0"/>
-              <a:t>What about Abstract Class ???????</a:t>
-            </a:r>
-            <a:endParaRPr lang="en-US" b="1" strike="noStrike" baseline="0" dirty="0" smtClean="0"/>
-          </a:p>
-          <a:p>
-            <a:endParaRPr lang="en-US" b="1" strike="noStrike" baseline="0" dirty="0" smtClean="0"/>
-          </a:p>
-          <a:p>
-            <a:endParaRPr lang="en-US" b="1" strike="noStrike" baseline="0" dirty="0" smtClean="0"/>
-          </a:p>
-          <a:p>
-            <a:r>
-              <a:rPr lang="en-US" b="1" strike="noStrike" baseline="0" dirty="0" err="1" smtClean="0"/>
-              <a:t>Nullable</a:t>
-            </a:r>
-            <a:r>
-              <a:rPr lang="en-US" b="1" strike="noStrike" baseline="0" dirty="0" smtClean="0"/>
-              <a:t> References:</a:t>
-            </a:r>
-          </a:p>
-          <a:p>
-            <a:r>
-              <a:rPr lang="en-US" b="0" strike="noStrike" baseline="0" dirty="0" smtClean="0"/>
-              <a:t>- #</a:t>
-            </a:r>
-            <a:r>
-              <a:rPr lang="en-US" b="0" strike="noStrike" baseline="0" dirty="0" err="1" smtClean="0"/>
-              <a:t>nullable</a:t>
-            </a:r>
-            <a:r>
-              <a:rPr lang="en-US" b="0" strike="noStrike" baseline="0" dirty="0" smtClean="0"/>
-              <a:t> enable / #</a:t>
-            </a:r>
-            <a:r>
-              <a:rPr lang="en-US" b="0" strike="noStrike" baseline="0" dirty="0" err="1" smtClean="0"/>
-              <a:t>nullable</a:t>
-            </a:r>
-            <a:r>
-              <a:rPr lang="en-US" b="0" strike="noStrike" baseline="0" dirty="0" smtClean="0"/>
-              <a:t> restore</a:t>
-            </a:r>
-          </a:p>
-          <a:p>
-            <a:r>
-              <a:rPr lang="en-US" b="0" strike="noStrike" baseline="0" dirty="0" smtClean="0"/>
-              <a:t>- forgiveness operator, !</a:t>
-            </a:r>
-            <a:endParaRPr lang="en-US" b="0" strike="noStrike" baseline="0" dirty="0" smtClean="0"/>
-          </a:p>
-          <a:p>
-            <a:endParaRPr lang="en-US" strike="noStrike" baseline="0" dirty="0" smtClean="0"/>
-          </a:p>
-          <a:p>
-            <a:endParaRPr lang="en-US" strike="noStrike" baseline="0" dirty="0" smtClean="0"/>
+              <a:rPr lang="en-US" strike="noStrike" baseline="0" dirty="0"/>
+              <a:t>Ranges -&gt; from 1 t N</a:t>
+            </a:r>
           </a:p>
         </p:txBody>
       </p:sp>
@@ -8392,7 +8271,7 @@
               <a:defRPr/>
             </a:pPr>
             <a:r>
-              <a:rPr kumimoji="0" lang="en-US" sz="1200" b="0" i="0" u="none" strike="noStrike" kern="1200" cap="none" spc="0" normalizeH="0" baseline="0" noProof="0" smtClean="0">
+              <a:rPr kumimoji="0" lang="en-US" sz="1200" b="0" i="0" u="none" strike="noStrike" kern="1200" cap="none" spc="0" normalizeH="0" baseline="0" noProof="0">
                 <a:ln>
                   <a:noFill/>
                 </a:ln>
@@ -8477,7 +8356,7 @@
               <a:defRPr/>
             </a:pPr>
             <a:r>
-              <a:rPr kumimoji="0" lang="en-US" sz="400" b="0" i="0" u="none" strike="noStrike" kern="1200" cap="none" spc="0" normalizeH="0" baseline="0" noProof="0" smtClean="0">
+              <a:rPr kumimoji="0" lang="en-US" sz="400" b="0" i="0" u="none" strike="noStrike" kern="1200" cap="none" spc="0" normalizeH="0" baseline="0" noProof="0">
                 <a:ln>
                   <a:noFill/>
                 </a:ln>
@@ -8501,7 +8380,7 @@
               </a:rPr>
               <a:t>© 2015 Microsoft Corporation. All rights reserved. MICROSOFT MAKES NO WARRANTIES, EXPRESS, IMPLIED OR STATUTORY, AS TO THE INFORMATION IN THIS PRESENTATION.</a:t>
             </a:r>
-            <a:endParaRPr kumimoji="0" lang="en-US" sz="400" b="0" i="0" u="none" strike="noStrike" kern="1200" cap="none" spc="0" normalizeH="0" baseline="0" noProof="0" dirty="0" smtClean="0">
+            <a:endParaRPr kumimoji="0" lang="en-US" sz="400" b="0" i="0" u="none" strike="noStrike" kern="1200" cap="none" spc="0" normalizeH="0" baseline="0" noProof="0" dirty="0">
               <a:ln>
                 <a:noFill/>
               </a:ln>
@@ -8590,7 +8469,7 @@
                 <a:tabLst/>
                 <a:defRPr/>
               </a:pPr>
-              <a:t>7/9/2020 10:26 PM</a:t>
+              <a:t>7/12/20 6:32 PM</a:t>
             </a:fld>
             <a:endParaRPr kumimoji="0" lang="en-US" sz="1200" b="0" i="0" u="none" strike="noStrike" kern="1200" cap="none" spc="0" normalizeH="0" baseline="0" noProof="0" dirty="0">
               <a:ln>
@@ -8749,7 +8628,7 @@
           <a:bodyPr/>
           <a:lstStyle/>
           <a:p>
-            <a:endParaRPr lang="es-ES" sz="1200" kern="1200" dirty="0" smtClean="0">
+            <a:endParaRPr lang="es-ES" sz="1200" kern="1200" dirty="0">
               <a:solidFill>
                 <a:schemeClr val="tx1"/>
               </a:solidFill>
@@ -8794,7 +8673,7 @@
               <a:defRPr/>
             </a:pPr>
             <a:r>
-              <a:rPr kumimoji="0" lang="en-US" sz="1200" b="0" i="0" u="none" strike="noStrike" kern="1200" cap="none" spc="0" normalizeH="0" baseline="0" noProof="0" smtClean="0">
+              <a:rPr kumimoji="0" lang="en-US" sz="1200" b="0" i="0" u="none" strike="noStrike" kern="1200" cap="none" spc="0" normalizeH="0" baseline="0" noProof="0">
                 <a:ln>
                   <a:noFill/>
                 </a:ln>
@@ -8879,7 +8758,7 @@
               <a:defRPr/>
             </a:pPr>
             <a:r>
-              <a:rPr kumimoji="0" lang="en-US" sz="400" b="0" i="0" u="none" strike="noStrike" kern="1200" cap="none" spc="0" normalizeH="0" baseline="0" noProof="0" smtClean="0">
+              <a:rPr kumimoji="0" lang="en-US" sz="400" b="0" i="0" u="none" strike="noStrike" kern="1200" cap="none" spc="0" normalizeH="0" baseline="0" noProof="0">
                 <a:ln>
                   <a:noFill/>
                 </a:ln>
@@ -8903,7 +8782,7 @@
               </a:rPr>
               <a:t>© 2015 Microsoft Corporation. All rights reserved. MICROSOFT MAKES NO WARRANTIES, EXPRESS, IMPLIED OR STATUTORY, AS TO THE INFORMATION IN THIS PRESENTATION.</a:t>
             </a:r>
-            <a:endParaRPr kumimoji="0" lang="en-US" sz="400" b="0" i="0" u="none" strike="noStrike" kern="1200" cap="none" spc="0" normalizeH="0" baseline="0" noProof="0" dirty="0" smtClean="0">
+            <a:endParaRPr kumimoji="0" lang="en-US" sz="400" b="0" i="0" u="none" strike="noStrike" kern="1200" cap="none" spc="0" normalizeH="0" baseline="0" noProof="0" dirty="0">
               <a:ln>
                 <a:noFill/>
               </a:ln>
@@ -8992,7 +8871,7 @@
                 <a:tabLst/>
                 <a:defRPr/>
               </a:pPr>
-              <a:t>7/9/2020 7:31 PM</a:t>
+              <a:t>7/12/20 6:22 PM</a:t>
             </a:fld>
             <a:endParaRPr kumimoji="0" lang="en-US" sz="1200" b="0" i="0" u="none" strike="noStrike" kern="1200" cap="none" spc="0" normalizeH="0" baseline="0" noProof="0" dirty="0">
               <a:ln>
@@ -9151,7 +9030,7 @@
           <a:bodyPr/>
           <a:lstStyle/>
           <a:p>
-            <a:endParaRPr lang="es-ES" sz="1200" kern="1200" dirty="0" smtClean="0">
+            <a:endParaRPr lang="es-ES" sz="1200" kern="1200" dirty="0">
               <a:solidFill>
                 <a:schemeClr val="tx1"/>
               </a:solidFill>
@@ -9196,7 +9075,7 @@
               <a:defRPr/>
             </a:pPr>
             <a:r>
-              <a:rPr kumimoji="0" lang="en-US" sz="1200" b="0" i="0" u="none" strike="noStrike" kern="1200" cap="none" spc="0" normalizeH="0" baseline="0" noProof="0" smtClean="0">
+              <a:rPr kumimoji="0" lang="en-US" sz="1200" b="0" i="0" u="none" strike="noStrike" kern="1200" cap="none" spc="0" normalizeH="0" baseline="0" noProof="0">
                 <a:ln>
                   <a:noFill/>
                 </a:ln>
@@ -9281,7 +9160,7 @@
               <a:defRPr/>
             </a:pPr>
             <a:r>
-              <a:rPr kumimoji="0" lang="en-US" sz="400" b="0" i="0" u="none" strike="noStrike" kern="1200" cap="none" spc="0" normalizeH="0" baseline="0" noProof="0" smtClean="0">
+              <a:rPr kumimoji="0" lang="en-US" sz="400" b="0" i="0" u="none" strike="noStrike" kern="1200" cap="none" spc="0" normalizeH="0" baseline="0" noProof="0">
                 <a:ln>
                   <a:noFill/>
                 </a:ln>
@@ -9305,7 +9184,7 @@
               </a:rPr>
               <a:t>© 2015 Microsoft Corporation. All rights reserved. MICROSOFT MAKES NO WARRANTIES, EXPRESS, IMPLIED OR STATUTORY, AS TO THE INFORMATION IN THIS PRESENTATION.</a:t>
             </a:r>
-            <a:endParaRPr kumimoji="0" lang="en-US" sz="400" b="0" i="0" u="none" strike="noStrike" kern="1200" cap="none" spc="0" normalizeH="0" baseline="0" noProof="0" dirty="0" smtClean="0">
+            <a:endParaRPr kumimoji="0" lang="en-US" sz="400" b="0" i="0" u="none" strike="noStrike" kern="1200" cap="none" spc="0" normalizeH="0" baseline="0" noProof="0" dirty="0">
               <a:ln>
                 <a:noFill/>
               </a:ln>
@@ -9394,7 +9273,7 @@
                 <a:tabLst/>
                 <a:defRPr/>
               </a:pPr>
-              <a:t>7/9/2020 7:31 PM</a:t>
+              <a:t>7/12/20 6:22 PM</a:t>
             </a:fld>
             <a:endParaRPr kumimoji="0" lang="en-US" sz="1200" b="0" i="0" u="none" strike="noStrike" kern="1200" cap="none" spc="0" normalizeH="0" baseline="0" noProof="0" dirty="0">
               <a:ln>
@@ -9554,7 +9433,7 @@
           <a:lstStyle/>
           <a:p>
             <a:r>
-              <a:rPr lang="en-US" sz="1200" b="0" i="0" u="none" strike="noStrike" kern="1200" dirty="0" smtClean="0">
+              <a:rPr lang="en-US" sz="1200" b="0" i="0" u="none" strike="noStrike" kern="1200" dirty="0">
                 <a:solidFill>
                   <a:schemeClr val="tx1"/>
                 </a:solidFill>
@@ -9566,7 +9445,7 @@
               <a:t>C# 6.0 </a:t>
             </a:r>
             <a:r>
-              <a:rPr lang="en-US" sz="1200" b="0" i="0" u="none" strike="noStrike" kern="1200" dirty="0" err="1" smtClean="0">
+              <a:rPr lang="en-US" sz="1200" b="0" i="0" u="none" strike="noStrike" kern="1200" dirty="0" err="1">
                 <a:solidFill>
                   <a:schemeClr val="tx1"/>
                 </a:solidFill>
@@ -9578,7 +9457,7 @@
               <a:t>es</a:t>
             </a:r>
             <a:r>
-              <a:rPr lang="en-US" sz="1200" b="0" i="0" u="none" strike="noStrike" kern="1200" dirty="0" smtClean="0">
+              <a:rPr lang="en-US" sz="1200" b="0" i="0" u="none" strike="noStrike" kern="1200" dirty="0">
                 <a:solidFill>
                   <a:schemeClr val="tx1"/>
                 </a:solidFill>
@@ -9590,7 +9469,7 @@
               <a:t> compatible</a:t>
             </a:r>
             <a:r>
-              <a:rPr lang="en-US" sz="1200" b="0" i="0" u="none" strike="noStrike" kern="1200" baseline="0" dirty="0" smtClean="0">
+              <a:rPr lang="en-US" sz="1200" b="0" i="0" u="none" strike="noStrike" kern="1200" baseline="0" dirty="0">
                 <a:solidFill>
                   <a:schemeClr val="tx1"/>
                 </a:solidFill>
@@ -9602,7 +9481,7 @@
               <a:t> con </a:t>
             </a:r>
             <a:r>
-              <a:rPr lang="en-US" sz="1200" b="0" i="0" u="none" strike="noStrike" kern="1200" baseline="0" dirty="0" err="1" smtClean="0">
+              <a:rPr lang="en-US" sz="1200" b="0" i="0" u="none" strike="noStrike" kern="1200" baseline="0" dirty="0" err="1">
                 <a:solidFill>
                   <a:schemeClr val="tx1"/>
                 </a:solidFill>
@@ -9614,7 +9493,7 @@
               <a:t>.N</a:t>
             </a:r>
             <a:r>
-              <a:rPr lang="en-US" sz="1200" b="0" i="0" u="none" strike="noStrike" kern="1200" dirty="0" err="1" smtClean="0">
+              <a:rPr lang="en-US" sz="1200" b="0" i="0" u="none" strike="noStrike" kern="1200" dirty="0" err="1">
                 <a:solidFill>
                   <a:schemeClr val="tx1"/>
                 </a:solidFill>
@@ -9626,7 +9505,7 @@
               <a:t>et</a:t>
             </a:r>
             <a:r>
-              <a:rPr lang="en-US" sz="1200" b="0" i="0" u="none" strike="noStrike" kern="1200" dirty="0" smtClean="0">
+              <a:rPr lang="en-US" sz="1200" b="0" i="0" u="none" strike="noStrike" kern="1200" dirty="0">
                 <a:solidFill>
                   <a:schemeClr val="tx1"/>
                 </a:solidFill>
@@ -9638,7 +9517,7 @@
               <a:t> framework </a:t>
             </a:r>
             <a:r>
-              <a:rPr lang="en-US" sz="1200" b="0" i="0" u="none" strike="noStrike" kern="1200" dirty="0" err="1" smtClean="0">
+              <a:rPr lang="en-US" sz="1200" b="0" i="0" u="none" strike="noStrike" kern="1200" dirty="0" err="1">
                 <a:solidFill>
                   <a:schemeClr val="tx1"/>
                 </a:solidFill>
@@ -9650,7 +9529,7 @@
               <a:t>desde</a:t>
             </a:r>
             <a:r>
-              <a:rPr lang="en-US" sz="1200" b="0" i="0" u="none" strike="noStrike" kern="1200" dirty="0" smtClean="0">
+              <a:rPr lang="en-US" sz="1200" b="0" i="0" u="none" strike="noStrike" kern="1200" dirty="0">
                 <a:solidFill>
                   <a:schemeClr val="tx1"/>
                 </a:solidFill>
@@ -9662,7 +9541,7 @@
               <a:t> la v2.0 hasta</a:t>
             </a:r>
             <a:r>
-              <a:rPr lang="en-US" sz="1200" b="0" i="0" u="none" strike="noStrike" kern="1200" baseline="0" dirty="0" smtClean="0">
+              <a:rPr lang="en-US" sz="1200" b="0" i="0" u="none" strike="noStrike" kern="1200" baseline="0" dirty="0">
                 <a:solidFill>
                   <a:schemeClr val="tx1"/>
                 </a:solidFill>
@@ -9674,7 +9553,7 @@
               <a:t> </a:t>
             </a:r>
             <a:r>
-              <a:rPr lang="en-US" sz="1200" b="0" i="0" u="none" strike="noStrike" kern="1200" dirty="0" smtClean="0">
+              <a:rPr lang="en-US" sz="1200" b="0" i="0" u="none" strike="noStrike" kern="1200" dirty="0">
                 <a:solidFill>
                   <a:schemeClr val="tx1"/>
                 </a:solidFill>
@@ -9686,7 +9565,7 @@
               <a:t> la 4.6. No require de </a:t>
             </a:r>
             <a:r>
-              <a:rPr lang="en-US" sz="1200" b="0" i="0" u="none" strike="noStrike" kern="1200" dirty="0" err="1" smtClean="0">
+              <a:rPr lang="en-US" sz="1200" b="0" i="0" u="none" strike="noStrike" kern="1200" dirty="0" err="1">
                 <a:solidFill>
                   <a:schemeClr val="tx1"/>
                 </a:solidFill>
@@ -9698,7 +9577,7 @@
               <a:t>ninguna</a:t>
             </a:r>
             <a:r>
-              <a:rPr lang="en-US" sz="1200" b="0" i="0" u="none" strike="noStrike" kern="1200" dirty="0" smtClean="0">
+              <a:rPr lang="en-US" sz="1200" b="0" i="0" u="none" strike="noStrike" kern="1200" dirty="0">
                 <a:solidFill>
                   <a:schemeClr val="tx1"/>
                 </a:solidFill>
@@ -9710,7 +9589,7 @@
               <a:t> version mayor</a:t>
             </a:r>
             <a:r>
-              <a:rPr lang="en-US" sz="1200" b="0" i="0" u="none" strike="noStrike" kern="1200" baseline="0" dirty="0" smtClean="0">
+              <a:rPr lang="en-US" sz="1200" b="0" i="0" u="none" strike="noStrike" kern="1200" baseline="0" dirty="0">
                 <a:solidFill>
                   <a:schemeClr val="tx1"/>
                 </a:solidFill>
@@ -9722,7 +9601,7 @@
               <a:t> de </a:t>
             </a:r>
             <a:r>
-              <a:rPr lang="en-US" sz="1200" b="0" i="0" u="none" strike="noStrike" kern="1200" dirty="0" err="1" smtClean="0">
+              <a:rPr lang="en-US" sz="1200" b="0" i="0" u="none" strike="noStrike" kern="1200" dirty="0" err="1">
                 <a:solidFill>
                   <a:schemeClr val="tx1"/>
                 </a:solidFill>
@@ -9734,7 +9613,7 @@
               <a:t>.net</a:t>
             </a:r>
             <a:r>
-              <a:rPr lang="en-US" sz="1200" b="0" i="0" u="none" strike="noStrike" kern="1200" dirty="0" smtClean="0">
+              <a:rPr lang="en-US" sz="1200" b="0" i="0" u="none" strike="noStrike" kern="1200" dirty="0">
                 <a:solidFill>
                   <a:schemeClr val="tx1"/>
                 </a:solidFill>
@@ -9746,7 +9625,7 @@
               <a:t> framework </a:t>
             </a:r>
             <a:r>
-              <a:rPr lang="en-US" sz="1200" b="0" i="0" u="none" strike="noStrike" kern="1200" dirty="0" err="1" smtClean="0">
+              <a:rPr lang="en-US" sz="1200" b="0" i="0" u="none" strike="noStrike" kern="1200" dirty="0" err="1">
                 <a:solidFill>
                   <a:schemeClr val="tx1"/>
                 </a:solidFill>
@@ -9758,7 +9637,7 @@
               <a:t>pero</a:t>
             </a:r>
             <a:r>
-              <a:rPr lang="en-US" sz="1200" b="0" i="0" u="none" strike="noStrike" kern="1200" dirty="0" smtClean="0">
+              <a:rPr lang="en-US" sz="1200" b="0" i="0" u="none" strike="noStrike" kern="1200" dirty="0">
                 <a:solidFill>
                   <a:schemeClr val="tx1"/>
                 </a:solidFill>
@@ -9770,7 +9649,7 @@
               <a:t> </a:t>
             </a:r>
             <a:r>
-              <a:rPr lang="en-US" sz="1200" b="0" i="0" u="none" strike="noStrike" kern="1200" dirty="0" err="1" smtClean="0">
+              <a:rPr lang="en-US" sz="1200" b="0" i="0" u="none" strike="noStrike" kern="1200" dirty="0" err="1">
                 <a:solidFill>
                   <a:schemeClr val="tx1"/>
                 </a:solidFill>
@@ -9782,7 +9661,7 @@
               <a:t>necesita</a:t>
             </a:r>
             <a:r>
-              <a:rPr lang="en-US" sz="1200" b="0" i="0" u="none" strike="noStrike" kern="1200" dirty="0" smtClean="0">
+              <a:rPr lang="en-US" sz="1200" b="0" i="0" u="none" strike="noStrike" kern="1200" dirty="0">
                 <a:solidFill>
                   <a:schemeClr val="tx1"/>
                 </a:solidFill>
@@ -9794,7 +9673,7 @@
               <a:t> </a:t>
             </a:r>
             <a:r>
-              <a:rPr lang="en-US" sz="1200" b="0" i="0" u="none" strike="noStrike" kern="1200" dirty="0" err="1" smtClean="0">
+              <a:rPr lang="en-US" sz="1200" b="0" i="0" u="none" strike="noStrike" kern="1200" dirty="0" err="1">
                 <a:solidFill>
                   <a:schemeClr val="tx1"/>
                 </a:solidFill>
@@ -9806,7 +9685,7 @@
               <a:t>una</a:t>
             </a:r>
             <a:r>
-              <a:rPr lang="en-US" sz="1200" b="0" i="0" u="none" strike="noStrike" kern="1200" dirty="0" smtClean="0">
+              <a:rPr lang="en-US" sz="1200" b="0" i="0" u="none" strike="noStrike" kern="1200" dirty="0">
                 <a:solidFill>
                   <a:schemeClr val="tx1"/>
                 </a:solidFill>
@@ -9818,7 +9697,7 @@
               <a:t> version superior de Visual Studio:</a:t>
             </a:r>
             <a:r>
-              <a:rPr lang="en-US" sz="1200" b="0" i="0" u="none" strike="noStrike" kern="1200" baseline="0" dirty="0" smtClean="0">
+              <a:rPr lang="en-US" sz="1200" b="0" i="0" u="none" strike="noStrike" kern="1200" baseline="0" dirty="0">
                 <a:solidFill>
                   <a:schemeClr val="tx1"/>
                 </a:solidFill>
@@ -9832,7 +9711,7 @@
           </a:p>
           <a:p>
             <a:r>
-              <a:rPr lang="en-US" sz="1200" b="0" i="0" u="none" strike="noStrike" kern="1200" baseline="0" dirty="0" err="1" smtClean="0">
+              <a:rPr lang="en-US" sz="1200" b="0" i="0" u="none" strike="noStrike" kern="1200" baseline="0" dirty="0" err="1">
                 <a:solidFill>
                   <a:schemeClr val="tx1"/>
                 </a:solidFill>
@@ -9844,7 +9723,7 @@
               <a:t>Existen</a:t>
             </a:r>
             <a:r>
-              <a:rPr lang="en-US" sz="1200" b="0" i="0" u="none" strike="noStrike" kern="1200" baseline="0" dirty="0" smtClean="0">
+              <a:rPr lang="en-US" sz="1200" b="0" i="0" u="none" strike="noStrike" kern="1200" baseline="0" dirty="0">
                 <a:solidFill>
                   <a:schemeClr val="tx1"/>
                 </a:solidFill>
@@ -9856,7 +9735,7 @@
               <a:t> </a:t>
             </a:r>
             <a:r>
-              <a:rPr lang="en-US" sz="1200" b="0" i="0" u="none" strike="noStrike" kern="1200" baseline="0" dirty="0" err="1" smtClean="0">
+              <a:rPr lang="en-US" sz="1200" b="0" i="0" u="none" strike="noStrike" kern="1200" baseline="0" dirty="0" err="1">
                 <a:solidFill>
                   <a:schemeClr val="tx1"/>
                 </a:solidFill>
@@ -9868,7 +9747,7 @@
               <a:t>alguna</a:t>
             </a:r>
             <a:r>
-              <a:rPr lang="en-US" sz="1200" b="0" i="0" u="none" strike="noStrike" kern="1200" baseline="0" dirty="0" smtClean="0">
+              <a:rPr lang="en-US" sz="1200" b="0" i="0" u="none" strike="noStrike" kern="1200" baseline="0" dirty="0">
                 <a:solidFill>
                   <a:schemeClr val="tx1"/>
                 </a:solidFill>
@@ -9880,7 +9759,7 @@
               <a:t> </a:t>
             </a:r>
             <a:r>
-              <a:rPr lang="en-US" sz="1200" b="0" i="0" u="none" strike="noStrike" kern="1200" baseline="0" dirty="0" err="1" smtClean="0">
+              <a:rPr lang="en-US" sz="1200" b="0" i="0" u="none" strike="noStrike" kern="1200" baseline="0" dirty="0" err="1">
                 <a:solidFill>
                   <a:schemeClr val="tx1"/>
                 </a:solidFill>
@@ -9892,7 +9771,7 @@
               <a:t>excepciones</a:t>
             </a:r>
             <a:r>
-              <a:rPr lang="en-US" sz="1200" b="0" i="0" u="none" strike="noStrike" kern="1200" baseline="0" dirty="0" smtClean="0">
+              <a:rPr lang="en-US" sz="1200" b="0" i="0" u="none" strike="noStrike" kern="1200" baseline="0" dirty="0">
                 <a:solidFill>
                   <a:schemeClr val="tx1"/>
                 </a:solidFill>
@@ -9904,7 +9783,7 @@
               <a:t>: </a:t>
             </a:r>
             <a:r>
-              <a:rPr lang="en-US" sz="1200" b="0" i="0" u="none" strike="noStrike" kern="1200" baseline="0" dirty="0" err="1" smtClean="0">
+              <a:rPr lang="en-US" sz="1200" b="0" i="0" u="none" strike="noStrike" kern="1200" baseline="0" dirty="0" err="1">
                 <a:solidFill>
                   <a:schemeClr val="tx1"/>
                 </a:solidFill>
@@ -9916,7 +9795,7 @@
               <a:t>Ej</a:t>
             </a:r>
             <a:r>
-              <a:rPr lang="en-US" sz="1200" b="0" i="0" u="none" strike="noStrike" kern="1200" baseline="0" dirty="0" smtClean="0">
+              <a:rPr lang="en-US" sz="1200" b="0" i="0" u="none" strike="noStrike" kern="1200" baseline="0" dirty="0">
                 <a:solidFill>
                   <a:schemeClr val="tx1"/>
                 </a:solidFill>
@@ -9928,7 +9807,7 @@
               <a:t>: La </a:t>
             </a:r>
             <a:r>
-              <a:rPr lang="en-US" sz="1200" b="0" i="0" u="none" strike="noStrike" kern="1200" baseline="0" dirty="0" err="1" smtClean="0">
+              <a:rPr lang="en-US" sz="1200" b="0" i="0" u="none" strike="noStrike" kern="1200" baseline="0" dirty="0" err="1">
                 <a:solidFill>
                   <a:schemeClr val="tx1"/>
                 </a:solidFill>
@@ -9940,7 +9819,7 @@
               <a:t>interpolación</a:t>
             </a:r>
             <a:r>
-              <a:rPr lang="en-US" sz="1200" b="0" i="0" u="none" strike="noStrike" kern="1200" baseline="0" dirty="0" smtClean="0">
+              <a:rPr lang="en-US" sz="1200" b="0" i="0" u="none" strike="noStrike" kern="1200" baseline="0" dirty="0">
                 <a:solidFill>
                   <a:schemeClr val="tx1"/>
                 </a:solidFill>
@@ -9952,7 +9831,7 @@
               <a:t> de </a:t>
             </a:r>
             <a:r>
-              <a:rPr lang="en-US" sz="1200" b="0" i="0" u="none" strike="noStrike" kern="1200" baseline="0" dirty="0" err="1" smtClean="0">
+              <a:rPr lang="en-US" sz="1200" b="0" i="0" u="none" strike="noStrike" kern="1200" baseline="0" dirty="0" err="1">
                 <a:solidFill>
                   <a:schemeClr val="tx1"/>
                 </a:solidFill>
@@ -9964,7 +9843,7 @@
               <a:t>cadenas</a:t>
             </a:r>
             <a:r>
-              <a:rPr lang="en-US" sz="1200" b="0" i="0" u="none" strike="noStrike" kern="1200" baseline="0" dirty="0" smtClean="0">
+              <a:rPr lang="en-US" sz="1200" b="0" i="0" u="none" strike="noStrike" kern="1200" baseline="0" dirty="0">
                 <a:solidFill>
                   <a:schemeClr val="tx1"/>
                 </a:solidFill>
@@ -9976,7 +9855,7 @@
               <a:t> la </a:t>
             </a:r>
             <a:r>
-              <a:rPr lang="en-US" sz="1200" b="0" i="0" u="none" strike="noStrike" kern="1200" baseline="0" dirty="0" err="1" smtClean="0">
+              <a:rPr lang="en-US" sz="1200" b="0" i="0" u="none" strike="noStrike" kern="1200" baseline="0" dirty="0" err="1">
                 <a:solidFill>
                   <a:schemeClr val="tx1"/>
                 </a:solidFill>
@@ -9988,7 +9867,7 @@
               <a:t>soporta</a:t>
             </a:r>
             <a:r>
-              <a:rPr lang="en-US" sz="1200" b="0" i="0" u="none" strike="noStrike" kern="1200" baseline="0" dirty="0" smtClean="0">
+              <a:rPr lang="en-US" sz="1200" b="0" i="0" u="none" strike="noStrike" kern="1200" baseline="0" dirty="0">
                 <a:solidFill>
                   <a:schemeClr val="tx1"/>
                 </a:solidFill>
@@ -10000,7 +9879,7 @@
               <a:t>, </a:t>
             </a:r>
             <a:r>
-              <a:rPr lang="en-US" sz="1200" b="0" i="0" u="none" strike="noStrike" kern="1200" baseline="0" dirty="0" err="1" smtClean="0">
+              <a:rPr lang="en-US" sz="1200" b="0" i="0" u="none" strike="noStrike" kern="1200" baseline="0" dirty="0" err="1">
                 <a:solidFill>
                   <a:schemeClr val="tx1"/>
                 </a:solidFill>
@@ -10012,7 +9891,7 @@
               <a:t>si</a:t>
             </a:r>
             <a:r>
-              <a:rPr lang="en-US" sz="1200" b="0" i="0" u="none" strike="noStrike" kern="1200" baseline="0" dirty="0" smtClean="0">
+              <a:rPr lang="en-US" sz="1200" b="0" i="0" u="none" strike="noStrike" kern="1200" baseline="0" dirty="0">
                 <a:solidFill>
                   <a:schemeClr val="tx1"/>
                 </a:solidFill>
@@ -10024,7 +9903,7 @@
               <a:t> </a:t>
             </a:r>
             <a:r>
-              <a:rPr lang="en-US" sz="1200" b="0" i="0" u="none" strike="noStrike" kern="1200" baseline="0" dirty="0" err="1" smtClean="0">
+              <a:rPr lang="en-US" sz="1200" b="0" i="0" u="none" strike="noStrike" kern="1200" baseline="0" dirty="0" err="1">
                 <a:solidFill>
                   <a:schemeClr val="tx1"/>
                 </a:solidFill>
@@ -10036,7 +9915,7 @@
               <a:t>bien</a:t>
             </a:r>
             <a:r>
-              <a:rPr lang="en-US" sz="1200" b="0" i="0" u="none" strike="noStrike" kern="1200" baseline="0" dirty="0" smtClean="0">
+              <a:rPr lang="en-US" sz="1200" b="0" i="0" u="none" strike="noStrike" kern="1200" baseline="0" dirty="0">
                 <a:solidFill>
                   <a:schemeClr val="tx1"/>
                 </a:solidFill>
@@ -10048,7 +9927,7 @@
               <a:t>, </a:t>
             </a:r>
             <a:r>
-              <a:rPr lang="en-US" sz="1200" b="0" i="0" u="none" strike="noStrike" kern="1200" baseline="0" dirty="0" err="1" smtClean="0">
+              <a:rPr lang="en-US" sz="1200" b="0" i="0" u="none" strike="noStrike" kern="1200" baseline="0" dirty="0" err="1">
                 <a:solidFill>
                   <a:schemeClr val="tx1"/>
                 </a:solidFill>
@@ -10060,7 +9939,7 @@
               <a:t>IFormatable</a:t>
             </a:r>
             <a:r>
-              <a:rPr lang="en-US" sz="1200" b="0" i="0" u="none" strike="noStrike" kern="1200" baseline="0" dirty="0" smtClean="0">
+              <a:rPr lang="en-US" sz="1200" b="0" i="0" u="none" strike="noStrike" kern="1200" baseline="0" dirty="0">
                 <a:solidFill>
                   <a:schemeClr val="tx1"/>
                 </a:solidFill>
@@ -10074,7 +9953,7 @@
           </a:p>
           <a:p>
             <a:r>
-              <a:rPr lang="en-US" sz="1200" b="0" i="0" u="none" strike="noStrike" kern="1200" baseline="0" dirty="0" err="1" smtClean="0">
+              <a:rPr lang="en-US" sz="1200" b="0" i="0" u="none" strike="noStrike" kern="1200" baseline="0" dirty="0" err="1">
                 <a:solidFill>
                   <a:schemeClr val="tx1"/>
                 </a:solidFill>
@@ -10086,7 +9965,7 @@
               <a:t>Basicamente</a:t>
             </a:r>
             <a:r>
-              <a:rPr lang="en-US" sz="1200" b="0" i="0" u="none" strike="noStrike" kern="1200" baseline="0" dirty="0" smtClean="0">
+              <a:rPr lang="en-US" sz="1200" b="0" i="0" u="none" strike="noStrike" kern="1200" baseline="0" dirty="0">
                 <a:solidFill>
                   <a:schemeClr val="tx1"/>
                 </a:solidFill>
@@ -10098,7 +9977,7 @@
               <a:t> se </a:t>
             </a:r>
             <a:r>
-              <a:rPr lang="en-US" sz="1200" b="0" i="0" u="none" strike="noStrike" kern="1200" baseline="0" dirty="0" err="1" smtClean="0">
+              <a:rPr lang="en-US" sz="1200" b="0" i="0" u="none" strike="noStrike" kern="1200" baseline="0" dirty="0" err="1">
                 <a:solidFill>
                   <a:schemeClr val="tx1"/>
                 </a:solidFill>
@@ -10110,7 +9989,7 @@
               <a:t>trata</a:t>
             </a:r>
             <a:r>
-              <a:rPr lang="en-US" sz="1200" b="0" i="0" u="none" strike="noStrike" kern="1200" baseline="0" dirty="0" smtClean="0">
+              <a:rPr lang="en-US" sz="1200" b="0" i="0" u="none" strike="noStrike" kern="1200" baseline="0" dirty="0">
                 <a:solidFill>
                   <a:schemeClr val="tx1"/>
                 </a:solidFill>
@@ -10122,7 +10001,7 @@
               <a:t> del </a:t>
             </a:r>
             <a:r>
-              <a:rPr lang="en-US" sz="1200" b="0" i="0" u="none" strike="noStrike" kern="1200" baseline="0" dirty="0" err="1" smtClean="0">
+              <a:rPr lang="en-US" sz="1200" b="0" i="0" u="none" strike="noStrike" kern="1200" baseline="0" dirty="0" err="1">
                 <a:solidFill>
                   <a:schemeClr val="tx1"/>
                 </a:solidFill>
@@ -10134,7 +10013,7 @@
               <a:t>mismo</a:t>
             </a:r>
             <a:r>
-              <a:rPr lang="en-US" sz="1200" b="0" i="0" u="none" strike="noStrike" kern="1200" baseline="0" dirty="0" smtClean="0">
+              <a:rPr lang="en-US" sz="1200" b="0" i="0" u="none" strike="noStrike" kern="1200" baseline="0" dirty="0">
                 <a:solidFill>
                   <a:schemeClr val="tx1"/>
                 </a:solidFill>
@@ -10146,7 +10025,7 @@
               <a:t> CLR (</a:t>
             </a:r>
             <a:r>
-              <a:rPr lang="en-US" sz="1200" b="0" i="0" u="none" strike="noStrike" kern="1200" baseline="0" dirty="0" err="1" smtClean="0">
+              <a:rPr lang="en-US" sz="1200" b="0" i="0" u="none" strike="noStrike" kern="1200" baseline="0" dirty="0" err="1">
                 <a:solidFill>
                   <a:schemeClr val="tx1"/>
                 </a:solidFill>
@@ -10158,7 +10037,7 @@
               <a:t>Versión</a:t>
             </a:r>
             <a:r>
-              <a:rPr lang="en-US" sz="1200" b="0" i="0" u="none" strike="noStrike" kern="1200" baseline="0" dirty="0" smtClean="0">
+              <a:rPr lang="en-US" sz="1200" b="0" i="0" u="none" strike="noStrike" kern="1200" baseline="0" dirty="0">
                 <a:solidFill>
                   <a:schemeClr val="tx1"/>
                 </a:solidFill>
@@ -10172,7 +10051,7 @@
           </a:p>
           <a:p>
             <a:r>
-              <a:rPr lang="en-US" sz="1200" b="0" i="0" u="none" strike="noStrike" kern="1200" baseline="0" dirty="0" err="1" smtClean="0">
+              <a:rPr lang="en-US" sz="1200" b="0" i="0" u="none" strike="noStrike" kern="1200" baseline="0" dirty="0" err="1">
                 <a:solidFill>
                   <a:schemeClr val="tx1"/>
                 </a:solidFill>
@@ -10184,7 +10063,7 @@
               <a:t>También</a:t>
             </a:r>
             <a:r>
-              <a:rPr lang="en-US" sz="1200" b="0" i="0" u="none" strike="noStrike" kern="1200" baseline="0" dirty="0" smtClean="0">
+              <a:rPr lang="en-US" sz="1200" b="0" i="0" u="none" strike="noStrike" kern="1200" baseline="0" dirty="0">
                 <a:solidFill>
                   <a:schemeClr val="tx1"/>
                 </a:solidFill>
@@ -10196,7 +10075,7 @@
               <a:t>, </a:t>
             </a:r>
             <a:r>
-              <a:rPr lang="en-US" sz="1200" b="0" i="0" u="none" strike="noStrike" kern="1200" baseline="0" dirty="0" err="1" smtClean="0">
+              <a:rPr lang="en-US" sz="1200" b="0" i="0" u="none" strike="noStrike" kern="1200" baseline="0" dirty="0" err="1">
                 <a:solidFill>
                   <a:schemeClr val="tx1"/>
                 </a:solidFill>
@@ -10208,7 +10087,7 @@
               <a:t>podríamos</a:t>
             </a:r>
             <a:r>
-              <a:rPr lang="en-US" sz="1200" b="0" i="0" u="none" strike="noStrike" kern="1200" baseline="0" dirty="0" smtClean="0">
+              <a:rPr lang="en-US" sz="1200" b="0" i="0" u="none" strike="noStrike" kern="1200" baseline="0" dirty="0">
                 <a:solidFill>
                   <a:schemeClr val="tx1"/>
                 </a:solidFill>
@@ -10220,7 +10099,7 @@
               <a:t> </a:t>
             </a:r>
             <a:r>
-              <a:rPr lang="en-US" sz="1200" b="0" i="0" u="none" strike="noStrike" kern="1200" baseline="0" dirty="0" err="1" smtClean="0">
+              <a:rPr lang="en-US" sz="1200" b="0" i="0" u="none" strike="noStrike" kern="1200" baseline="0" dirty="0" err="1">
                 <a:solidFill>
                   <a:schemeClr val="tx1"/>
                 </a:solidFill>
@@ -10232,7 +10111,7 @@
               <a:t>tener</a:t>
             </a:r>
             <a:r>
-              <a:rPr lang="en-US" sz="1200" b="0" i="0" u="none" strike="noStrike" kern="1200" baseline="0" dirty="0" smtClean="0">
+              <a:rPr lang="en-US" sz="1200" b="0" i="0" u="none" strike="noStrike" kern="1200" baseline="0" dirty="0">
                 <a:solidFill>
                   <a:schemeClr val="tx1"/>
                 </a:solidFill>
@@ -10244,7 +10123,7 @@
               <a:t> Visual Studio 2013 + el </a:t>
             </a:r>
             <a:r>
-              <a:rPr lang="en-US" sz="1200" b="0" i="0" u="none" strike="noStrike" kern="1200" baseline="0" dirty="0" err="1" smtClean="0">
+              <a:rPr lang="en-US" sz="1200" b="0" i="0" u="none" strike="noStrike" kern="1200" baseline="0" dirty="0" err="1">
                 <a:solidFill>
                   <a:schemeClr val="tx1"/>
                 </a:solidFill>
@@ -10256,7 +10135,7 @@
               <a:t>Compilador</a:t>
             </a:r>
             <a:r>
-              <a:rPr lang="en-US" sz="1200" b="0" i="0" u="none" strike="noStrike" kern="1200" baseline="0" dirty="0" smtClean="0">
+              <a:rPr lang="en-US" sz="1200" b="0" i="0" u="none" strike="noStrike" kern="1200" baseline="0" dirty="0">
                 <a:solidFill>
                   <a:schemeClr val="tx1"/>
                 </a:solidFill>
@@ -10269,7 +10148,7 @@
             </a:r>
           </a:p>
           <a:p>
-            <a:endParaRPr lang="es-ES" sz="1200" kern="1200" dirty="0" smtClean="0">
+            <a:endParaRPr lang="es-ES" sz="1200" kern="1200" dirty="0">
               <a:solidFill>
                 <a:schemeClr val="tx1"/>
               </a:solidFill>
@@ -10314,7 +10193,7 @@
               <a:defRPr/>
             </a:pPr>
             <a:r>
-              <a:rPr kumimoji="0" lang="en-US" sz="1200" b="0" i="0" u="none" strike="noStrike" kern="1200" cap="none" spc="0" normalizeH="0" baseline="0" noProof="0" smtClean="0">
+              <a:rPr kumimoji="0" lang="en-US" sz="1200" b="0" i="0" u="none" strike="noStrike" kern="1200" cap="none" spc="0" normalizeH="0" baseline="0" noProof="0">
                 <a:ln>
                   <a:noFill/>
                 </a:ln>
@@ -10399,7 +10278,7 @@
               <a:defRPr/>
             </a:pPr>
             <a:r>
-              <a:rPr kumimoji="0" lang="en-US" sz="400" b="0" i="0" u="none" strike="noStrike" kern="1200" cap="none" spc="0" normalizeH="0" baseline="0" noProof="0" smtClean="0">
+              <a:rPr kumimoji="0" lang="en-US" sz="400" b="0" i="0" u="none" strike="noStrike" kern="1200" cap="none" spc="0" normalizeH="0" baseline="0" noProof="0">
                 <a:ln>
                   <a:noFill/>
                 </a:ln>
@@ -10423,7 +10302,7 @@
               </a:rPr>
               <a:t>© 2015 Microsoft Corporation. All rights reserved. MICROSOFT MAKES NO WARRANTIES, EXPRESS, IMPLIED OR STATUTORY, AS TO THE INFORMATION IN THIS PRESENTATION.</a:t>
             </a:r>
-            <a:endParaRPr kumimoji="0" lang="en-US" sz="400" b="0" i="0" u="none" strike="noStrike" kern="1200" cap="none" spc="0" normalizeH="0" baseline="0" noProof="0" dirty="0" smtClean="0">
+            <a:endParaRPr kumimoji="0" lang="en-US" sz="400" b="0" i="0" u="none" strike="noStrike" kern="1200" cap="none" spc="0" normalizeH="0" baseline="0" noProof="0" dirty="0">
               <a:ln>
                 <a:noFill/>
               </a:ln>
@@ -10512,7 +10391,7 @@
                 <a:tabLst/>
                 <a:defRPr/>
               </a:pPr>
-              <a:t>7/9/2020 7:31 PM</a:t>
+              <a:t>7/12/20 6:22 PM</a:t>
             </a:fld>
             <a:endParaRPr kumimoji="0" lang="en-US" sz="1200" b="0" i="0" u="none" strike="noStrike" kern="1200" cap="none" spc="0" normalizeH="0" baseline="0" noProof="0" dirty="0">
               <a:ln>
@@ -10671,7 +10550,7 @@
           <a:bodyPr/>
           <a:lstStyle/>
           <a:p>
-            <a:endParaRPr lang="es-ES" sz="1200" kern="1200" dirty="0" smtClean="0">
+            <a:endParaRPr lang="es-ES" sz="1200" kern="1200" dirty="0">
               <a:solidFill>
                 <a:schemeClr val="tx1"/>
               </a:solidFill>
@@ -10716,7 +10595,7 @@
               <a:defRPr/>
             </a:pPr>
             <a:r>
-              <a:rPr kumimoji="0" lang="en-US" sz="1200" b="0" i="0" u="none" strike="noStrike" kern="1200" cap="none" spc="0" normalizeH="0" baseline="0" noProof="0" smtClean="0">
+              <a:rPr kumimoji="0" lang="en-US" sz="1200" b="0" i="0" u="none" strike="noStrike" kern="1200" cap="none" spc="0" normalizeH="0" baseline="0" noProof="0">
                 <a:ln>
                   <a:noFill/>
                 </a:ln>
@@ -10801,7 +10680,7 @@
               <a:defRPr/>
             </a:pPr>
             <a:r>
-              <a:rPr kumimoji="0" lang="en-US" sz="400" b="0" i="0" u="none" strike="noStrike" kern="1200" cap="none" spc="0" normalizeH="0" baseline="0" noProof="0" smtClean="0">
+              <a:rPr kumimoji="0" lang="en-US" sz="400" b="0" i="0" u="none" strike="noStrike" kern="1200" cap="none" spc="0" normalizeH="0" baseline="0" noProof="0">
                 <a:ln>
                   <a:noFill/>
                 </a:ln>
@@ -10825,7 +10704,7 @@
               </a:rPr>
               <a:t>© 2015 Microsoft Corporation. All rights reserved. MICROSOFT MAKES NO WARRANTIES, EXPRESS, IMPLIED OR STATUTORY, AS TO THE INFORMATION IN THIS PRESENTATION.</a:t>
             </a:r>
-            <a:endParaRPr kumimoji="0" lang="en-US" sz="400" b="0" i="0" u="none" strike="noStrike" kern="1200" cap="none" spc="0" normalizeH="0" baseline="0" noProof="0" dirty="0" smtClean="0">
+            <a:endParaRPr kumimoji="0" lang="en-US" sz="400" b="0" i="0" u="none" strike="noStrike" kern="1200" cap="none" spc="0" normalizeH="0" baseline="0" noProof="0" dirty="0">
               <a:ln>
                 <a:noFill/>
               </a:ln>
@@ -10914,7 +10793,7 @@
                 <a:tabLst/>
                 <a:defRPr/>
               </a:pPr>
-              <a:t>7/9/2020 7:31 PM</a:t>
+              <a:t>7/12/20 6:22 PM</a:t>
             </a:fld>
             <a:endParaRPr kumimoji="0" lang="en-US" sz="1200" b="0" i="0" u="none" strike="noStrike" kern="1200" cap="none" spc="0" normalizeH="0" baseline="0" noProof="0" dirty="0">
               <a:ln>
@@ -11079,7 +10958,7 @@
           <a:lstStyle/>
           <a:p>
             <a:pPr eaLnBrk="1" hangingPunct="1"/>
-            <a:endParaRPr lang="es-ES" dirty="0" smtClean="0"/>
+            <a:endParaRPr lang="es-ES" dirty="0"/>
           </a:p>
         </p:txBody>
       </p:sp>
@@ -11105,7 +10984,7 @@
               <a:pPr/>
               <a:t>9</a:t>
             </a:fld>
-            <a:endParaRPr lang="es-ES" smtClean="0"/>
+            <a:endParaRPr lang="es-ES"/>
           </a:p>
         </p:txBody>
       </p:sp>
@@ -11160,7 +11039,7 @@
           <a:lstStyle/>
           <a:p>
             <a:r>
-              <a:rPr lang="en-US" smtClean="0"/>
+              <a:rPr lang="en-US"/>
               <a:t>Click to edit Master title style</a:t>
             </a:r>
             <a:endParaRPr lang="es-ES"/>
@@ -11279,7 +11158,7 @@
           </a:lstStyle>
           <a:p>
             <a:r>
-              <a:rPr lang="en-US" smtClean="0"/>
+              <a:rPr lang="en-US"/>
               <a:t>Click to edit Master subtitle style</a:t>
             </a:r>
             <a:endParaRPr lang="es-ES"/>
@@ -11303,7 +11182,7 @@
           <a:p>
             <a:fld id="{19846C5A-1DDF-42C4-9FB4-FFCE11C434AC}" type="datetimeFigureOut">
               <a:rPr lang="es-ES" smtClean="0"/>
-              <a:t>09/07/2020</a:t>
+              <a:t>12/7/20</a:t>
             </a:fld>
             <a:endParaRPr lang="es-ES"/>
           </a:p>
@@ -11397,7 +11276,7 @@
           <a:lstStyle/>
           <a:p>
             <a:r>
-              <a:rPr lang="en-US" smtClean="0"/>
+              <a:rPr lang="en-US"/>
               <a:t>Click to edit Master title style</a:t>
             </a:r>
             <a:endParaRPr lang="es-ES"/>
@@ -11421,35 +11300,35 @@
           <a:p>
             <a:pPr lvl="0"/>
             <a:r>
-              <a:rPr lang="en-US" smtClean="0"/>
+              <a:rPr lang="en-US"/>
               <a:t>Click to edit Master text styles</a:t>
             </a:r>
           </a:p>
           <a:p>
             <a:pPr lvl="1"/>
             <a:r>
-              <a:rPr lang="en-US" smtClean="0"/>
+              <a:rPr lang="en-US"/>
               <a:t>Second level</a:t>
             </a:r>
           </a:p>
           <a:p>
             <a:pPr lvl="2"/>
             <a:r>
-              <a:rPr lang="en-US" smtClean="0"/>
+              <a:rPr lang="en-US"/>
               <a:t>Third level</a:t>
             </a:r>
           </a:p>
           <a:p>
             <a:pPr lvl="3"/>
             <a:r>
-              <a:rPr lang="en-US" smtClean="0"/>
+              <a:rPr lang="en-US"/>
               <a:t>Fourth level</a:t>
             </a:r>
           </a:p>
           <a:p>
             <a:pPr lvl="4"/>
             <a:r>
-              <a:rPr lang="en-US" smtClean="0"/>
+              <a:rPr lang="en-US"/>
               <a:t>Fifth level</a:t>
             </a:r>
             <a:endParaRPr lang="es-ES"/>
@@ -11473,7 +11352,7 @@
           <a:p>
             <a:fld id="{19846C5A-1DDF-42C4-9FB4-FFCE11C434AC}" type="datetimeFigureOut">
               <a:rPr lang="es-ES" smtClean="0"/>
-              <a:t>09/07/2020</a:t>
+              <a:t>12/7/20</a:t>
             </a:fld>
             <a:endParaRPr lang="es-ES"/>
           </a:p>
@@ -11572,7 +11451,7 @@
           <a:lstStyle/>
           <a:p>
             <a:r>
-              <a:rPr lang="en-US" smtClean="0"/>
+              <a:rPr lang="en-US"/>
               <a:t>Click to edit Master title style</a:t>
             </a:r>
             <a:endParaRPr lang="es-ES"/>
@@ -11601,35 +11480,35 @@
           <a:p>
             <a:pPr lvl="0"/>
             <a:r>
-              <a:rPr lang="en-US" smtClean="0"/>
+              <a:rPr lang="en-US"/>
               <a:t>Click to edit Master text styles</a:t>
             </a:r>
           </a:p>
           <a:p>
             <a:pPr lvl="1"/>
             <a:r>
-              <a:rPr lang="en-US" smtClean="0"/>
+              <a:rPr lang="en-US"/>
               <a:t>Second level</a:t>
             </a:r>
           </a:p>
           <a:p>
             <a:pPr lvl="2"/>
             <a:r>
-              <a:rPr lang="en-US" smtClean="0"/>
+              <a:rPr lang="en-US"/>
               <a:t>Third level</a:t>
             </a:r>
           </a:p>
           <a:p>
             <a:pPr lvl="3"/>
             <a:r>
-              <a:rPr lang="en-US" smtClean="0"/>
+              <a:rPr lang="en-US"/>
               <a:t>Fourth level</a:t>
             </a:r>
           </a:p>
           <a:p>
             <a:pPr lvl="4"/>
             <a:r>
-              <a:rPr lang="en-US" smtClean="0"/>
+              <a:rPr lang="en-US"/>
               <a:t>Fifth level</a:t>
             </a:r>
             <a:endParaRPr lang="es-ES"/>
@@ -11653,7 +11532,7 @@
           <a:p>
             <a:fld id="{19846C5A-1DDF-42C4-9FB4-FFCE11C434AC}" type="datetimeFigureOut">
               <a:rPr lang="es-ES" smtClean="0"/>
-              <a:t>09/07/2020</a:t>
+              <a:t>12/7/20</a:t>
             </a:fld>
             <a:endParaRPr lang="es-ES"/>
           </a:p>
@@ -11749,13 +11628,6 @@
   <p:transition>
     <p:fade/>
   </p:transition>
-  <p:timing>
-    <p:tnLst>
-      <p:par>
-        <p:cTn id="1" dur="indefinite" restart="never" nodeType="tmRoot"/>
-      </p:par>
-    </p:tnLst>
-  </p:timing>
 </p:sldLayout>
 </file>
 
@@ -11798,38 +11670,37 @@
           <a:p>
             <a:pPr lvl="0"/>
             <a:r>
-              <a:rPr lang="es-ES" smtClean="0"/>
+              <a:rPr lang="es-ES"/>
               <a:t>Haga clic para modificar el estilo de texto del patrón</a:t>
             </a:r>
           </a:p>
           <a:p>
             <a:pPr lvl="1"/>
             <a:r>
-              <a:rPr lang="es-ES" smtClean="0"/>
+              <a:rPr lang="es-ES"/>
               <a:t>Segundo nivel</a:t>
             </a:r>
           </a:p>
           <a:p>
             <a:pPr lvl="2"/>
             <a:r>
-              <a:rPr lang="es-ES" smtClean="0"/>
+              <a:rPr lang="es-ES"/>
               <a:t>Tercer nivel</a:t>
             </a:r>
           </a:p>
           <a:p>
             <a:pPr lvl="3"/>
             <a:r>
-              <a:rPr lang="es-ES" smtClean="0"/>
+              <a:rPr lang="es-ES"/>
               <a:t>Cuarto nivel</a:t>
             </a:r>
           </a:p>
           <a:p>
             <a:pPr lvl="4"/>
             <a:r>
-              <a:rPr lang="es-ES" smtClean="0"/>
+              <a:rPr lang="es-ES"/>
               <a:t>Quinto nivel</a:t>
             </a:r>
-            <a:endParaRPr lang="es-ES"/>
           </a:p>
         </p:txBody>
       </p:sp>
@@ -11882,7 +11753,7 @@
           <a:lstStyle/>
           <a:p>
             <a:r>
-              <a:rPr lang="en-US" smtClean="0"/>
+              <a:rPr lang="en-US"/>
               <a:t>Click to edit Master title style</a:t>
             </a:r>
             <a:endParaRPr lang="es-ES"/>
@@ -11906,35 +11777,35 @@
           <a:p>
             <a:pPr lvl="0"/>
             <a:r>
-              <a:rPr lang="en-US" smtClean="0"/>
+              <a:rPr lang="en-US"/>
               <a:t>Click to edit Master text styles</a:t>
             </a:r>
           </a:p>
           <a:p>
             <a:pPr lvl="1"/>
             <a:r>
-              <a:rPr lang="en-US" smtClean="0"/>
+              <a:rPr lang="en-US"/>
               <a:t>Second level</a:t>
             </a:r>
           </a:p>
           <a:p>
             <a:pPr lvl="2"/>
             <a:r>
-              <a:rPr lang="en-US" smtClean="0"/>
+              <a:rPr lang="en-US"/>
               <a:t>Third level</a:t>
             </a:r>
           </a:p>
           <a:p>
             <a:pPr lvl="3"/>
             <a:r>
-              <a:rPr lang="en-US" smtClean="0"/>
+              <a:rPr lang="en-US"/>
               <a:t>Fourth level</a:t>
             </a:r>
           </a:p>
           <a:p>
             <a:pPr lvl="4"/>
             <a:r>
-              <a:rPr lang="en-US" smtClean="0"/>
+              <a:rPr lang="en-US"/>
               <a:t>Fifth level</a:t>
             </a:r>
             <a:endParaRPr lang="es-ES"/>
@@ -11958,7 +11829,7 @@
           <a:p>
             <a:fld id="{19846C5A-1DDF-42C4-9FB4-FFCE11C434AC}" type="datetimeFigureOut">
               <a:rPr lang="es-ES" smtClean="0"/>
-              <a:t>09/07/2020</a:t>
+              <a:t>12/7/20</a:t>
             </a:fld>
             <a:endParaRPr lang="es-ES"/>
           </a:p>
@@ -12061,7 +11932,7 @@
           </a:lstStyle>
           <a:p>
             <a:r>
-              <a:rPr lang="en-US" smtClean="0"/>
+              <a:rPr lang="en-US"/>
               <a:t>Click to edit Master title style</a:t>
             </a:r>
             <a:endParaRPr lang="es-ES"/>
@@ -12181,7 +12052,7 @@
           <a:p>
             <a:pPr lvl="0"/>
             <a:r>
-              <a:rPr lang="en-US" smtClean="0"/>
+              <a:rPr lang="en-US"/>
               <a:t>Click to edit Master text styles</a:t>
             </a:r>
           </a:p>
@@ -12204,7 +12075,7 @@
           <a:p>
             <a:fld id="{19846C5A-1DDF-42C4-9FB4-FFCE11C434AC}" type="datetimeFigureOut">
               <a:rPr lang="es-ES" smtClean="0"/>
-              <a:t>09/07/2020</a:t>
+              <a:t>12/7/20</a:t>
             </a:fld>
             <a:endParaRPr lang="es-ES"/>
           </a:p>
@@ -12298,7 +12169,7 @@
           <a:lstStyle/>
           <a:p>
             <a:r>
-              <a:rPr lang="en-US" smtClean="0"/>
+              <a:rPr lang="en-US"/>
               <a:t>Click to edit Master title style</a:t>
             </a:r>
             <a:endParaRPr lang="es-ES"/>
@@ -12355,35 +12226,35 @@
           <a:p>
             <a:pPr lvl="0"/>
             <a:r>
-              <a:rPr lang="en-US" smtClean="0"/>
+              <a:rPr lang="en-US"/>
               <a:t>Click to edit Master text styles</a:t>
             </a:r>
           </a:p>
           <a:p>
             <a:pPr lvl="1"/>
             <a:r>
-              <a:rPr lang="en-US" smtClean="0"/>
+              <a:rPr lang="en-US"/>
               <a:t>Second level</a:t>
             </a:r>
           </a:p>
           <a:p>
             <a:pPr lvl="2"/>
             <a:r>
-              <a:rPr lang="en-US" smtClean="0"/>
+              <a:rPr lang="en-US"/>
               <a:t>Third level</a:t>
             </a:r>
           </a:p>
           <a:p>
             <a:pPr lvl="3"/>
             <a:r>
-              <a:rPr lang="en-US" smtClean="0"/>
+              <a:rPr lang="en-US"/>
               <a:t>Fourth level</a:t>
             </a:r>
           </a:p>
           <a:p>
             <a:pPr lvl="4"/>
             <a:r>
-              <a:rPr lang="en-US" smtClean="0"/>
+              <a:rPr lang="en-US"/>
               <a:t>Fifth level</a:t>
             </a:r>
             <a:endParaRPr lang="es-ES"/>
@@ -12440,35 +12311,35 @@
           <a:p>
             <a:pPr lvl="0"/>
             <a:r>
-              <a:rPr lang="en-US" smtClean="0"/>
+              <a:rPr lang="en-US"/>
               <a:t>Click to edit Master text styles</a:t>
             </a:r>
           </a:p>
           <a:p>
             <a:pPr lvl="1"/>
             <a:r>
-              <a:rPr lang="en-US" smtClean="0"/>
+              <a:rPr lang="en-US"/>
               <a:t>Second level</a:t>
             </a:r>
           </a:p>
           <a:p>
             <a:pPr lvl="2"/>
             <a:r>
-              <a:rPr lang="en-US" smtClean="0"/>
+              <a:rPr lang="en-US"/>
               <a:t>Third level</a:t>
             </a:r>
           </a:p>
           <a:p>
             <a:pPr lvl="3"/>
             <a:r>
-              <a:rPr lang="en-US" smtClean="0"/>
+              <a:rPr lang="en-US"/>
               <a:t>Fourth level</a:t>
             </a:r>
           </a:p>
           <a:p>
             <a:pPr lvl="4"/>
             <a:r>
-              <a:rPr lang="en-US" smtClean="0"/>
+              <a:rPr lang="en-US"/>
               <a:t>Fifth level</a:t>
             </a:r>
             <a:endParaRPr lang="es-ES"/>
@@ -12492,7 +12363,7 @@
           <a:p>
             <a:fld id="{19846C5A-1DDF-42C4-9FB4-FFCE11C434AC}" type="datetimeFigureOut">
               <a:rPr lang="es-ES" smtClean="0"/>
-              <a:t>09/07/2020</a:t>
+              <a:t>12/7/20</a:t>
             </a:fld>
             <a:endParaRPr lang="es-ES"/>
           </a:p>
@@ -12590,7 +12461,7 @@
           </a:lstStyle>
           <a:p>
             <a:r>
-              <a:rPr lang="en-US" smtClean="0"/>
+              <a:rPr lang="en-US"/>
               <a:t>Click to edit Master title style</a:t>
             </a:r>
             <a:endParaRPr lang="es-ES"/>
@@ -12656,7 +12527,7 @@
           <a:p>
             <a:pPr lvl="0"/>
             <a:r>
-              <a:rPr lang="en-US" smtClean="0"/>
+              <a:rPr lang="en-US"/>
               <a:t>Click to edit Master text styles</a:t>
             </a:r>
           </a:p>
@@ -12712,35 +12583,35 @@
           <a:p>
             <a:pPr lvl="0"/>
             <a:r>
-              <a:rPr lang="en-US" smtClean="0"/>
+              <a:rPr lang="en-US"/>
               <a:t>Click to edit Master text styles</a:t>
             </a:r>
           </a:p>
           <a:p>
             <a:pPr lvl="1"/>
             <a:r>
-              <a:rPr lang="en-US" smtClean="0"/>
+              <a:rPr lang="en-US"/>
               <a:t>Second level</a:t>
             </a:r>
           </a:p>
           <a:p>
             <a:pPr lvl="2"/>
             <a:r>
-              <a:rPr lang="en-US" smtClean="0"/>
+              <a:rPr lang="en-US"/>
               <a:t>Third level</a:t>
             </a:r>
           </a:p>
           <a:p>
             <a:pPr lvl="3"/>
             <a:r>
-              <a:rPr lang="en-US" smtClean="0"/>
+              <a:rPr lang="en-US"/>
               <a:t>Fourth level</a:t>
             </a:r>
           </a:p>
           <a:p>
             <a:pPr lvl="4"/>
             <a:r>
-              <a:rPr lang="en-US" smtClean="0"/>
+              <a:rPr lang="en-US"/>
               <a:t>Fifth level</a:t>
             </a:r>
             <a:endParaRPr lang="es-ES"/>
@@ -12806,7 +12677,7 @@
           <a:p>
             <a:pPr lvl="0"/>
             <a:r>
-              <a:rPr lang="en-US" smtClean="0"/>
+              <a:rPr lang="en-US"/>
               <a:t>Click to edit Master text styles</a:t>
             </a:r>
           </a:p>
@@ -12862,35 +12733,35 @@
           <a:p>
             <a:pPr lvl="0"/>
             <a:r>
-              <a:rPr lang="en-US" smtClean="0"/>
+              <a:rPr lang="en-US"/>
               <a:t>Click to edit Master text styles</a:t>
             </a:r>
           </a:p>
           <a:p>
             <a:pPr lvl="1"/>
             <a:r>
-              <a:rPr lang="en-US" smtClean="0"/>
+              <a:rPr lang="en-US"/>
               <a:t>Second level</a:t>
             </a:r>
           </a:p>
           <a:p>
             <a:pPr lvl="2"/>
             <a:r>
-              <a:rPr lang="en-US" smtClean="0"/>
+              <a:rPr lang="en-US"/>
               <a:t>Third level</a:t>
             </a:r>
           </a:p>
           <a:p>
             <a:pPr lvl="3"/>
             <a:r>
-              <a:rPr lang="en-US" smtClean="0"/>
+              <a:rPr lang="en-US"/>
               <a:t>Fourth level</a:t>
             </a:r>
           </a:p>
           <a:p>
             <a:pPr lvl="4"/>
             <a:r>
-              <a:rPr lang="en-US" smtClean="0"/>
+              <a:rPr lang="en-US"/>
               <a:t>Fifth level</a:t>
             </a:r>
             <a:endParaRPr lang="es-ES"/>
@@ -12914,7 +12785,7 @@
           <a:p>
             <a:fld id="{19846C5A-1DDF-42C4-9FB4-FFCE11C434AC}" type="datetimeFigureOut">
               <a:rPr lang="es-ES" smtClean="0"/>
-              <a:t>09/07/2020</a:t>
+              <a:t>12/7/20</a:t>
             </a:fld>
             <a:endParaRPr lang="es-ES"/>
           </a:p>
@@ -13008,7 +12879,7 @@
           <a:lstStyle/>
           <a:p>
             <a:r>
-              <a:rPr lang="en-US" smtClean="0"/>
+              <a:rPr lang="en-US"/>
               <a:t>Click to edit Master title style</a:t>
             </a:r>
             <a:endParaRPr lang="es-ES"/>
@@ -13032,7 +12903,7 @@
           <a:p>
             <a:fld id="{19846C5A-1DDF-42C4-9FB4-FFCE11C434AC}" type="datetimeFigureOut">
               <a:rPr lang="es-ES" smtClean="0"/>
-              <a:t>09/07/2020</a:t>
+              <a:t>12/7/20</a:t>
             </a:fld>
             <a:endParaRPr lang="es-ES"/>
           </a:p>
@@ -13127,7 +12998,7 @@
           <a:p>
             <a:fld id="{19846C5A-1DDF-42C4-9FB4-FFCE11C434AC}" type="datetimeFigureOut">
               <a:rPr lang="es-ES" smtClean="0"/>
-              <a:t>09/07/2020</a:t>
+              <a:t>12/7/20</a:t>
             </a:fld>
             <a:endParaRPr lang="es-ES"/>
           </a:p>
@@ -13230,7 +13101,7 @@
           </a:lstStyle>
           <a:p>
             <a:r>
-              <a:rPr lang="en-US" smtClean="0"/>
+              <a:rPr lang="en-US"/>
               <a:t>Click to edit Master title style</a:t>
             </a:r>
             <a:endParaRPr lang="es-ES"/>
@@ -13287,35 +13158,35 @@
           <a:p>
             <a:pPr lvl="0"/>
             <a:r>
-              <a:rPr lang="en-US" smtClean="0"/>
+              <a:rPr lang="en-US"/>
               <a:t>Click to edit Master text styles</a:t>
             </a:r>
           </a:p>
           <a:p>
             <a:pPr lvl="1"/>
             <a:r>
-              <a:rPr lang="en-US" smtClean="0"/>
+              <a:rPr lang="en-US"/>
               <a:t>Second level</a:t>
             </a:r>
           </a:p>
           <a:p>
             <a:pPr lvl="2"/>
             <a:r>
-              <a:rPr lang="en-US" smtClean="0"/>
+              <a:rPr lang="en-US"/>
               <a:t>Third level</a:t>
             </a:r>
           </a:p>
           <a:p>
             <a:pPr lvl="3"/>
             <a:r>
-              <a:rPr lang="en-US" smtClean="0"/>
+              <a:rPr lang="en-US"/>
               <a:t>Fourth level</a:t>
             </a:r>
           </a:p>
           <a:p>
             <a:pPr lvl="4"/>
             <a:r>
-              <a:rPr lang="en-US" smtClean="0"/>
+              <a:rPr lang="en-US"/>
               <a:t>Fifth level</a:t>
             </a:r>
             <a:endParaRPr lang="es-ES"/>
@@ -13381,7 +13252,7 @@
           <a:p>
             <a:pPr lvl="0"/>
             <a:r>
-              <a:rPr lang="en-US" smtClean="0"/>
+              <a:rPr lang="en-US"/>
               <a:t>Click to edit Master text styles</a:t>
             </a:r>
           </a:p>
@@ -13404,7 +13275,7 @@
           <a:p>
             <a:fld id="{19846C5A-1DDF-42C4-9FB4-FFCE11C434AC}" type="datetimeFigureOut">
               <a:rPr lang="es-ES" smtClean="0"/>
-              <a:t>09/07/2020</a:t>
+              <a:t>12/7/20</a:t>
             </a:fld>
             <a:endParaRPr lang="es-ES"/>
           </a:p>
@@ -13507,7 +13378,7 @@
           </a:lstStyle>
           <a:p>
             <a:r>
-              <a:rPr lang="en-US" smtClean="0"/>
+              <a:rPr lang="en-US"/>
               <a:t>Click to edit Master title style</a:t>
             </a:r>
             <a:endParaRPr lang="es-ES"/>
@@ -13634,7 +13505,7 @@
           <a:p>
             <a:pPr lvl="0"/>
             <a:r>
-              <a:rPr lang="en-US" smtClean="0"/>
+              <a:rPr lang="en-US"/>
               <a:t>Click to edit Master text styles</a:t>
             </a:r>
           </a:p>
@@ -13657,7 +13528,7 @@
           <a:p>
             <a:fld id="{19846C5A-1DDF-42C4-9FB4-FFCE11C434AC}" type="datetimeFigureOut">
               <a:rPr lang="es-ES" smtClean="0"/>
-              <a:t>09/07/2020</a:t>
+              <a:t>12/7/20</a:t>
             </a:fld>
             <a:endParaRPr lang="es-ES"/>
           </a:p>
@@ -13766,7 +13637,7 @@
           <a:lstStyle/>
           <a:p>
             <a:r>
-              <a:rPr lang="en-US" smtClean="0"/>
+              <a:rPr lang="en-US"/>
               <a:t>Click to edit Master title style</a:t>
             </a:r>
             <a:endParaRPr lang="es-ES"/>
@@ -13800,35 +13671,35 @@
           <a:p>
             <a:pPr lvl="0"/>
             <a:r>
-              <a:rPr lang="en-US" smtClean="0"/>
+              <a:rPr lang="en-US"/>
               <a:t>Click to edit Master text styles</a:t>
             </a:r>
           </a:p>
           <a:p>
             <a:pPr lvl="1"/>
             <a:r>
-              <a:rPr lang="en-US" smtClean="0"/>
+              <a:rPr lang="en-US"/>
               <a:t>Second level</a:t>
             </a:r>
           </a:p>
           <a:p>
             <a:pPr lvl="2"/>
             <a:r>
-              <a:rPr lang="en-US" smtClean="0"/>
+              <a:rPr lang="en-US"/>
               <a:t>Third level</a:t>
             </a:r>
           </a:p>
           <a:p>
             <a:pPr lvl="3"/>
             <a:r>
-              <a:rPr lang="en-US" smtClean="0"/>
+              <a:rPr lang="en-US"/>
               <a:t>Fourth level</a:t>
             </a:r>
           </a:p>
           <a:p>
             <a:pPr lvl="4"/>
             <a:r>
-              <a:rPr lang="en-US" smtClean="0"/>
+              <a:rPr lang="en-US"/>
               <a:t>Fifth level</a:t>
             </a:r>
             <a:endParaRPr lang="es-ES"/>
@@ -13870,7 +13741,7 @@
           <a:p>
             <a:fld id="{19846C5A-1DDF-42C4-9FB4-FFCE11C434AC}" type="datetimeFigureOut">
               <a:rPr lang="es-ES" smtClean="0"/>
-              <a:t>09/07/2020</a:t>
+              <a:t>12/7/20</a:t>
             </a:fld>
             <a:endParaRPr lang="es-ES"/>
           </a:p>
@@ -14406,7 +14277,7 @@
           </a:lstStyle>
           <a:p>
             <a:r>
-              <a:rPr lang="es-ES" sz="2400" dirty="0" smtClean="0">
+              <a:rPr lang="es-ES" sz="2400" dirty="0">
                 <a:latin typeface="Segoe UI Light" panose="020B0502040204020203" pitchFamily="34" charset="0"/>
                 <a:cs typeface="Segoe UI Light" panose="020B0502040204020203" pitchFamily="34" charset="0"/>
                 <a:hlinkClick r:id="rId4"/>
@@ -14414,20 +14285,16 @@
               <a:t>jlguerrero@gmail.com</a:t>
             </a:r>
             <a:r>
-              <a:rPr lang="es-ES" sz="2400" dirty="0" smtClean="0">
+              <a:rPr lang="es-ES" sz="2400" dirty="0">
                 <a:latin typeface="Segoe UI Light" panose="020B0502040204020203" pitchFamily="34" charset="0"/>
                 <a:cs typeface="Segoe UI Light" panose="020B0502040204020203" pitchFamily="34" charset="0"/>
               </a:rPr>
               <a:t> </a:t>
             </a:r>
-            <a:endParaRPr lang="es-ES" sz="2400" dirty="0">
-              <a:latin typeface="Segoe UI Light" panose="020B0502040204020203" pitchFamily="34" charset="0"/>
-              <a:cs typeface="Segoe UI Light" panose="020B0502040204020203" pitchFamily="34" charset="0"/>
-            </a:endParaRPr>
-          </a:p>
-          <a:p>
-            <a:r>
-              <a:rPr lang="es-ES" sz="2400" dirty="0" smtClean="0">
+          </a:p>
+          <a:p>
+            <a:r>
+              <a:rPr lang="es-ES" sz="2400" dirty="0">
                 <a:solidFill>
                   <a:schemeClr val="tx1"/>
                 </a:solidFill>
@@ -14436,13 +14303,6 @@
               </a:rPr>
               <a:t>@juanluelguerre</a:t>
             </a:r>
-            <a:endParaRPr lang="es-ES" sz="2400" dirty="0">
-              <a:solidFill>
-                <a:schemeClr val="tx1"/>
-              </a:solidFill>
-              <a:latin typeface="Segoe UI Light" panose="020B0502040204020203" pitchFamily="34" charset="0"/>
-              <a:cs typeface="Segoe UI Light" panose="020B0502040204020203" pitchFamily="34" charset="0"/>
-            </a:endParaRPr>
           </a:p>
         </p:txBody>
       </p:sp>
@@ -14528,7 +14388,7 @@
           <a:p>
             <a:pPr algn="r"/>
             <a:r>
-              <a:rPr lang="es-ES" sz="5400" b="1" dirty="0" smtClean="0">
+              <a:rPr lang="es-ES" sz="5400" b="1" dirty="0">
                 <a:solidFill>
                   <a:srgbClr val="92D050"/>
                 </a:solidFill>
@@ -14572,16 +14432,12 @@
           <a:lstStyle/>
           <a:p>
             <a:r>
-              <a:rPr lang="es-ES" sz="6600" dirty="0" smtClean="0">
+              <a:rPr lang="es-ES" sz="6600" dirty="0">
                 <a:latin typeface="Segoe UI" panose="020B0502040204020203" pitchFamily="34" charset="0"/>
                 <a:cs typeface="Segoe UI" panose="020B0502040204020203" pitchFamily="34" charset="0"/>
               </a:rPr>
               <a:t>NEW FEATURES C#</a:t>
             </a:r>
-            <a:endParaRPr lang="es-ES" sz="6600" dirty="0">
-              <a:latin typeface="Segoe UI" panose="020B0502040204020203" pitchFamily="34" charset="0"/>
-              <a:cs typeface="Segoe UI" panose="020B0502040204020203" pitchFamily="34" charset="0"/>
-            </a:endParaRPr>
           </a:p>
         </p:txBody>
       </p:sp>
@@ -14598,13 +14454,6 @@
   <p:transition spd="slow">
     <p:push/>
   </p:transition>
-  <p:timing>
-    <p:tnLst>
-      <p:par>
-        <p:cTn id="1" dur="indefinite" restart="never" nodeType="tmRoot"/>
-      </p:par>
-    </p:tnLst>
-  </p:timing>
 </p:sld>
 </file>
 
@@ -14876,7 +14725,7 @@
           <a:p>
             <a:pPr algn="l"/>
             <a:r>
-              <a:rPr lang="es-ES" dirty="0" err="1" smtClean="0">
+              <a:rPr lang="es-ES" dirty="0" err="1">
                 <a:solidFill>
                   <a:schemeClr val="bg1"/>
                 </a:solidFill>
@@ -15008,14 +14857,14 @@
           <a:lstStyle/>
           <a:p>
             <a:r>
-              <a:rPr lang="es-ES" sz="1200" dirty="0" smtClean="0">
+              <a:rPr lang="es-ES" sz="1200" dirty="0">
                 <a:latin typeface="Segoe UI Light" panose="020B0502040204020203" pitchFamily="34" charset="0"/>
                 <a:cs typeface="Segoe UI Light" panose="020B0502040204020203" pitchFamily="34" charset="0"/>
               </a:rPr>
               <a:t>@</a:t>
             </a:r>
             <a:r>
-              <a:rPr lang="es-ES" sz="1200" dirty="0" err="1" smtClean="0">
+              <a:rPr lang="es-ES" sz="1200" dirty="0" err="1">
                 <a:latin typeface="Segoe UI Light" panose="020B0502040204020203" pitchFamily="34" charset="0"/>
                 <a:cs typeface="Segoe UI Light" panose="020B0502040204020203" pitchFamily="34" charset="0"/>
               </a:rPr>
@@ -15041,13 +14890,6 @@
   <p:transition spd="slow">
     <p:push/>
   </p:transition>
-  <p:timing>
-    <p:tnLst>
-      <p:par>
-        <p:cTn id="1" dur="indefinite" restart="never" nodeType="tmRoot"/>
-      </p:par>
-    </p:tnLst>
-  </p:timing>
 </p:sld>
 </file>
 
@@ -15327,10 +15169,9 @@
           <a:p>
             <a:pPr algn="l"/>
             <a:r>
-              <a:rPr lang="es-ES" dirty="0" smtClean="0"/>
+              <a:rPr lang="es-ES" dirty="0"/>
               <a:t>C# 8.0</a:t>
             </a:r>
-            <a:endParaRPr lang="es-ES" dirty="0"/>
           </a:p>
         </p:txBody>
       </p:sp>
@@ -15413,7 +15254,7 @@
           <p:nvPr>
             <p:extLst>
               <p:ext uri="{D42A27DB-BD31-4B8C-83A1-F6EECF244321}">
-                <p14:modId xmlns:p14="http://schemas.microsoft.com/office/powerpoint/2010/main" val="2682825982"/>
+                <p14:modId xmlns:p14="http://schemas.microsoft.com/office/powerpoint/2010/main" val="1852532351"/>
               </p:ext>
             </p:extLst>
           </p:nvPr>
@@ -15451,7 +15292,7 @@
           <a:lstStyle/>
           <a:p>
             <a:r>
-              <a:rPr lang="es-ES" sz="1200" dirty="0" smtClean="0">
+              <a:rPr lang="es-ES" sz="1200" dirty="0">
                 <a:solidFill>
                   <a:schemeClr val="bg1"/>
                 </a:solidFill>
@@ -15461,7 +15302,7 @@
               <a:t>@</a:t>
             </a:r>
             <a:r>
-              <a:rPr lang="es-ES" sz="1200" dirty="0" err="1" smtClean="0">
+              <a:rPr lang="es-ES" sz="1200" dirty="0" err="1">
                 <a:solidFill>
                   <a:schemeClr val="bg1"/>
                 </a:solidFill>
@@ -15504,7 +15345,7 @@
           <a:p>
             <a:pPr algn="r"/>
             <a:r>
-              <a:rPr lang="es-ES" sz="4000" b="1" dirty="0" smtClean="0">
+              <a:rPr lang="es-ES" sz="4000" b="1" dirty="0">
                 <a:solidFill>
                   <a:schemeClr val="bg2"/>
                 </a:solidFill>
@@ -15521,7 +15362,7 @@
               <a:t>New </a:t>
             </a:r>
             <a:r>
-              <a:rPr lang="es-ES" sz="4000" b="1" dirty="0" err="1" smtClean="0">
+              <a:rPr lang="es-ES" sz="4000" b="1" dirty="0" err="1">
                 <a:solidFill>
                   <a:schemeClr val="bg2"/>
                 </a:solidFill>
@@ -15538,7 +15379,7 @@
               <a:t>Features</a:t>
             </a:r>
             <a:r>
-              <a:rPr lang="es-ES" sz="4000" b="1" dirty="0" smtClean="0">
+              <a:rPr lang="es-ES" sz="4000" b="1" dirty="0">
                 <a:solidFill>
                   <a:schemeClr val="bg2"/>
                 </a:solidFill>
@@ -15554,20 +15395,6 @@
               </a:rPr>
               <a:t> </a:t>
             </a:r>
-            <a:endParaRPr lang="es-ES" sz="4000" b="1" dirty="0">
-              <a:solidFill>
-                <a:schemeClr val="bg2"/>
-              </a:solidFill>
-              <a:effectLst>
-                <a:outerShdw blurRad="38100" dist="38100" dir="2700000" algn="tl">
-                  <a:srgbClr val="000000">
-                    <a:alpha val="43137"/>
-                  </a:srgbClr>
-                </a:outerShdw>
-              </a:effectLst>
-              <a:latin typeface="Segoe UI" panose="020B0502040204020203" pitchFamily="34" charset="0"/>
-              <a:cs typeface="Segoe UI" panose="020B0502040204020203" pitchFamily="34" charset="0"/>
-            </a:endParaRPr>
           </a:p>
         </p:txBody>
       </p:sp>
@@ -15627,13 +15454,6 @@
   <p:transition spd="slow">
     <p:push/>
   </p:transition>
-  <p:timing>
-    <p:tnLst>
-      <p:par>
-        <p:cTn id="1" dur="indefinite" restart="never" nodeType="tmRoot"/>
-      </p:par>
-    </p:tnLst>
-  </p:timing>
 </p:sld>
 </file>
 
@@ -16261,7 +16081,7 @@
           <a:p>
             <a:pPr algn="r"/>
             <a:r>
-              <a:rPr lang="es-ES" sz="4000" b="1" dirty="0" smtClean="0">
+              <a:rPr lang="es-ES" sz="4000" b="1" dirty="0">
                 <a:solidFill>
                   <a:schemeClr val="tx2"/>
                 </a:solidFill>
@@ -16277,20 +16097,6 @@
               </a:rPr>
               <a:t>Recordemos …</a:t>
             </a:r>
-            <a:endParaRPr lang="es-ES" sz="4000" b="1" dirty="0">
-              <a:solidFill>
-                <a:schemeClr val="tx2"/>
-              </a:solidFill>
-              <a:effectLst>
-                <a:outerShdw blurRad="38100" dist="38100" dir="2700000" algn="tl">
-                  <a:srgbClr val="000000">
-                    <a:alpha val="43137"/>
-                  </a:srgbClr>
-                </a:outerShdw>
-              </a:effectLst>
-              <a:latin typeface="Segoe UI" panose="020B0502040204020203" pitchFamily="34" charset="0"/>
-              <a:cs typeface="Segoe UI" panose="020B0502040204020203" pitchFamily="34" charset="0"/>
-            </a:endParaRPr>
           </a:p>
         </p:txBody>
       </p:sp>
@@ -16317,7 +16123,7 @@
           <a:lstStyle/>
           <a:p>
             <a:r>
-              <a:rPr lang="es-ES" sz="3200" dirty="0" smtClean="0">
+              <a:rPr lang="es-ES" sz="3200" dirty="0">
                 <a:solidFill>
                   <a:schemeClr val="bg1">
                     <a:lumMod val="50000"/>
@@ -16328,15 +16134,6 @@
               </a:rPr>
               <a:t>¿Qué versión?</a:t>
             </a:r>
-            <a:endParaRPr lang="es-ES" sz="3200" dirty="0">
-              <a:solidFill>
-                <a:schemeClr val="bg1">
-                  <a:lumMod val="50000"/>
-                </a:schemeClr>
-              </a:solidFill>
-              <a:latin typeface="Segoe UI" panose="020B0502040204020203" pitchFamily="34" charset="0"/>
-              <a:cs typeface="Segoe UI" panose="020B0502040204020203" pitchFamily="34" charset="0"/>
-            </a:endParaRPr>
           </a:p>
         </p:txBody>
       </p:sp>
@@ -16432,13 +16229,6 @@
   <p:transition spd="slow">
     <p:push/>
   </p:transition>
-  <p:timing>
-    <p:tnLst>
-      <p:par>
-        <p:cTn id="1" dur="indefinite" restart="never" nodeType="tmRoot"/>
-      </p:par>
-    </p:tnLst>
-  </p:timing>
 </p:sld>
 </file>
 
@@ -16511,13 +16301,6 @@
   <p:transition spd="slow">
     <p:push/>
   </p:transition>
-  <p:timing>
-    <p:tnLst>
-      <p:par>
-        <p:cTn id="1" dur="indefinite" restart="never" nodeType="tmRoot"/>
-      </p:par>
-    </p:tnLst>
-  </p:timing>
 </p:sld>
 </file>
 
@@ -17145,7 +16928,7 @@
           <a:p>
             <a:pPr algn="r"/>
             <a:r>
-              <a:rPr lang="es-ES" sz="4000" b="1" dirty="0" err="1" smtClean="0">
+              <a:rPr lang="es-ES" sz="4000" b="1" dirty="0" err="1">
                 <a:solidFill>
                   <a:schemeClr val="tx2"/>
                 </a:solidFill>
@@ -17204,19 +16987,12 @@
               <a:rPr lang="es-ES" dirty="0">
                 <a:hlinkClick r:id="rId5"/>
               </a:rPr>
-              <a:t>https://</a:t>
-            </a:r>
-            <a:r>
-              <a:rPr lang="es-ES" dirty="0" smtClean="0">
-                <a:hlinkClick r:id="rId5"/>
-              </a:rPr>
-              <a:t>github.com/dotnet/roslyn</a:t>
-            </a:r>
-            <a:r>
-              <a:rPr lang="es-ES" dirty="0" smtClean="0"/>
+              <a:t>https://github.com/dotnet/roslyn</a:t>
+            </a:r>
+            <a:r>
+              <a:rPr lang="es-ES" dirty="0"/>
               <a:t> </a:t>
             </a:r>
-            <a:endParaRPr lang="es-ES" dirty="0"/>
           </a:p>
         </p:txBody>
       </p:sp>
@@ -17243,12 +17019,8 @@
           <a:lstStyle/>
           <a:p>
             <a:r>
-              <a:rPr lang="es-ES" dirty="0" smtClean="0"/>
-              <a:t>Es el resultado de reescribir </a:t>
-            </a:r>
-            <a:r>
               <a:rPr lang="es-ES" dirty="0"/>
-              <a:t>los compiladores de C# y VB en código manejado</a:t>
+              <a:t>Es el resultado de reescribir los compiladores de C# y VB en código manejado</a:t>
             </a:r>
           </a:p>
         </p:txBody>
@@ -17359,13 +17131,6 @@
   <p:transition spd="slow">
     <p:push/>
   </p:transition>
-  <p:timing>
-    <p:tnLst>
-      <p:par>
-        <p:cTn id="1" dur="indefinite" restart="never" nodeType="tmRoot"/>
-      </p:par>
-    </p:tnLst>
-  </p:timing>
 </p:sld>
 </file>
 
@@ -18017,23 +17782,6 @@
           <a:p>
             <a:pPr algn="r"/>
             <a:r>
-              <a:rPr lang="es-ES" sz="4000" b="1" dirty="0" smtClean="0">
-                <a:solidFill>
-                  <a:schemeClr val="tx2"/>
-                </a:solidFill>
-                <a:effectLst>
-                  <a:outerShdw blurRad="38100" dist="38100" dir="2700000" algn="tl">
-                    <a:srgbClr val="000000">
-                      <a:alpha val="43137"/>
-                    </a:srgbClr>
-                  </a:outerShdw>
-                </a:effectLst>
-                <a:latin typeface="Segoe UI" panose="020B0502040204020203" pitchFamily="34" charset="0"/>
-                <a:cs typeface="Segoe UI" panose="020B0502040204020203" pitchFamily="34" charset="0"/>
-              </a:rPr>
-              <a:t>Versión, Framework y Visual </a:t>
-            </a:r>
-            <a:r>
               <a:rPr lang="es-ES" sz="4000" b="1" dirty="0">
                 <a:solidFill>
                   <a:schemeClr val="tx2"/>
@@ -18048,7 +17796,7 @@
                 <a:latin typeface="Segoe UI" panose="020B0502040204020203" pitchFamily="34" charset="0"/>
                 <a:cs typeface="Segoe UI" panose="020B0502040204020203" pitchFamily="34" charset="0"/>
               </a:rPr>
-              <a:t>Studio</a:t>
+              <a:t>Versión, Framework y Visual Studio</a:t>
             </a:r>
           </a:p>
         </p:txBody>
@@ -18078,7 +17826,7 @@
           <a:lstStyle/>
           <a:p>
             <a:r>
-              <a:rPr lang="es-ES" dirty="0" smtClean="0">
+              <a:rPr lang="es-ES" dirty="0">
                 <a:hlinkClick r:id="rId6"/>
               </a:rPr>
               <a:t>Wikipedia</a:t>
@@ -18202,18 +17950,13 @@
           <a:lstStyle/>
           <a:p>
             <a:r>
-              <a:rPr lang="es-ES" dirty="0" smtClean="0">
+              <a:rPr lang="es-ES" dirty="0">
                 <a:solidFill>
                   <a:srgbClr val="FFC000"/>
                 </a:solidFill>
               </a:rPr>
               <a:t>***</a:t>
             </a:r>
-            <a:endParaRPr lang="es-ES" dirty="0">
-              <a:solidFill>
-                <a:srgbClr val="FFC000"/>
-              </a:solidFill>
-            </a:endParaRPr>
           </a:p>
         </p:txBody>
       </p:sp>
@@ -18250,18 +17993,13 @@
           <a:lstStyle/>
           <a:p>
             <a:r>
-              <a:rPr lang="es-ES" sz="2800" b="1" dirty="0" smtClean="0">
+              <a:rPr lang="es-ES" sz="2800" b="1" dirty="0">
                 <a:solidFill>
                   <a:schemeClr val="accent3"/>
                 </a:solidFill>
               </a:rPr>
               <a:t>CLR Versión 4</a:t>
             </a:r>
-            <a:endParaRPr lang="es-ES" sz="2800" b="1" dirty="0">
-              <a:solidFill>
-                <a:schemeClr val="accent3"/>
-              </a:solidFill>
-            </a:endParaRPr>
           </a:p>
         </p:txBody>
       </p:sp>
@@ -18298,7 +18036,7 @@
           <a:lstStyle/>
           <a:p>
             <a:r>
-              <a:rPr lang="es-ES" sz="2800" b="1" dirty="0" smtClean="0">
+              <a:rPr lang="es-ES" sz="2800" b="1" dirty="0">
                 <a:solidFill>
                   <a:schemeClr val="accent3"/>
                 </a:solidFill>
@@ -18306,7 +18044,7 @@
               <a:t>Algunas excepciones, ej.: </a:t>
             </a:r>
             <a:r>
-              <a:rPr lang="es-ES" sz="2800" b="1" dirty="0" err="1" smtClean="0">
+              <a:rPr lang="es-ES" sz="2800" b="1" dirty="0" err="1">
                 <a:solidFill>
                   <a:schemeClr val="accent3"/>
                 </a:solidFill>
@@ -19416,7 +19154,7 @@
           <a:lstStyle/>
           <a:p>
             <a:r>
-              <a:rPr lang="es-ES" sz="4400" dirty="0" smtClean="0">
+              <a:rPr lang="es-ES" sz="4400" dirty="0">
                 <a:solidFill>
                   <a:schemeClr val="bg1">
                     <a:lumMod val="50000"/>
@@ -19427,15 +19165,6 @@
               </a:rPr>
               <a:t>C# 9.0…</a:t>
             </a:r>
-            <a:endParaRPr lang="es-ES" sz="4400" dirty="0">
-              <a:solidFill>
-                <a:schemeClr val="bg1">
-                  <a:lumMod val="50000"/>
-                </a:schemeClr>
-              </a:solidFill>
-              <a:latin typeface="Segoe UI" panose="020B0502040204020203" pitchFamily="34" charset="0"/>
-              <a:cs typeface="Segoe UI" panose="020B0502040204020203" pitchFamily="34" charset="0"/>
-            </a:endParaRPr>
           </a:p>
         </p:txBody>
       </p:sp>
@@ -19462,7 +19191,7 @@
           <a:lstStyle/>
           <a:p>
             <a:r>
-              <a:rPr lang="es-ES" sz="3600" dirty="0" smtClean="0">
+              <a:rPr lang="es-ES" sz="3600" dirty="0">
                 <a:solidFill>
                   <a:schemeClr val="tx2"/>
                 </a:solidFill>
@@ -19471,13 +19200,6 @@
               </a:rPr>
               <a:t>Continuará… </a:t>
             </a:r>
-            <a:endParaRPr lang="es-ES" sz="3600" dirty="0">
-              <a:solidFill>
-                <a:schemeClr val="tx2"/>
-              </a:solidFill>
-              <a:latin typeface="Segoe UI" panose="020B0502040204020203" pitchFamily="34" charset="0"/>
-              <a:cs typeface="Segoe UI" panose="020B0502040204020203" pitchFamily="34" charset="0"/>
-            </a:endParaRPr>
           </a:p>
         </p:txBody>
       </p:sp>
@@ -19494,13 +19216,6 @@
   <p:transition spd="slow">
     <p:push/>
   </p:transition>
-  <p:timing>
-    <p:tnLst>
-      <p:par>
-        <p:cTn id="1" dur="indefinite" restart="never" nodeType="tmRoot"/>
-      </p:par>
-    </p:tnLst>
-  </p:timing>
 </p:sld>
 </file>
 
@@ -19709,7 +19424,7 @@
               <a:buNone/>
             </a:pPr>
             <a:r>
-              <a:rPr lang="es-ES" sz="2000" dirty="0" smtClean="0">
+              <a:rPr lang="es-ES" sz="2000" dirty="0">
                 <a:latin typeface="Segoe UI Light" panose="020B0502040204020203" pitchFamily="34" charset="0"/>
                 <a:cs typeface="Segoe UI Light" panose="020B0502040204020203" pitchFamily="34" charset="0"/>
                 <a:hlinkClick r:id="rId3"/>
@@ -19717,7 +19432,7 @@
               <a:t>jlguerrero@gmail.com</a:t>
             </a:r>
             <a:r>
-              <a:rPr lang="es-ES" sz="2000" dirty="0" smtClean="0">
+              <a:rPr lang="es-ES" sz="2000" dirty="0">
                 <a:latin typeface="Segoe UI Light" panose="020B0502040204020203" pitchFamily="34" charset="0"/>
                 <a:cs typeface="Segoe UI Light" panose="020B0502040204020203" pitchFamily="34" charset="0"/>
               </a:rPr>
@@ -19729,7 +19444,7 @@
               <a:buNone/>
             </a:pPr>
             <a:r>
-              <a:rPr lang="es-ES" sz="2000" dirty="0" smtClean="0">
+              <a:rPr lang="es-ES" sz="2000" dirty="0">
                 <a:latin typeface="Segoe UI Light" panose="020B0502040204020203" pitchFamily="34" charset="0"/>
                 <a:cs typeface="Segoe UI Light" panose="020B0502040204020203" pitchFamily="34" charset="0"/>
               </a:rPr>
@@ -19763,19 +19478,12 @@
               <a:rPr lang="es-ES" dirty="0">
                 <a:hlinkClick r:id="rId4"/>
               </a:rPr>
-              <a:t>https://github.com/juanluelguerre/Training/tree/master/CSFeatures</a:t>
-            </a:r>
-            <a:r>
-              <a:rPr lang="es-ES" dirty="0" smtClean="0">
-                <a:hlinkClick r:id="rId4"/>
-              </a:rPr>
-              <a:t>/</a:t>
-            </a:r>
-            <a:r>
-              <a:rPr lang="es-ES" dirty="0" smtClean="0"/>
+              <a:t>https://github.com/juanluelguerre/Training/tree/master/CSFeatures/</a:t>
+            </a:r>
+            <a:r>
+              <a:rPr lang="es-ES" dirty="0"/>
               <a:t> </a:t>
             </a:r>
-            <a:endParaRPr lang="es-ES" dirty="0"/>
           </a:p>
         </p:txBody>
       </p:sp>
@@ -19835,13 +19543,6 @@
   <p:transition spd="slow">
     <p:push/>
   </p:transition>
-  <p:timing>
-    <p:tnLst>
-      <p:par>
-        <p:cTn id="1" dur="indefinite" restart="never" nodeType="tmRoot"/>
-      </p:par>
-    </p:tnLst>
-  </p:timing>
 </p:sld>
 </file>
 

</xml_diff>

<commit_message>
* update some comments and 1 slide added
</commit_message>
<xml_diff>
--- a/CSFeatures/CS80.pptx
+++ b/CSFeatures/CS80.pptx
@@ -5,18 +5,19 @@
     <p:sldMasterId id="2147483648" r:id="rId1"/>
   </p:sldMasterIdLst>
   <p:notesMasterIdLst>
-    <p:notesMasterId r:id="rId11"/>
+    <p:notesMasterId r:id="rId12"/>
   </p:notesMasterIdLst>
   <p:sldIdLst>
     <p:sldId id="285" r:id="rId2"/>
     <p:sldId id="290" r:id="rId3"/>
     <p:sldId id="300" r:id="rId4"/>
-    <p:sldId id="297" r:id="rId5"/>
-    <p:sldId id="299" r:id="rId6"/>
-    <p:sldId id="295" r:id="rId7"/>
-    <p:sldId id="293" r:id="rId8"/>
-    <p:sldId id="284" r:id="rId9"/>
-    <p:sldId id="287" r:id="rId10"/>
+    <p:sldId id="301" r:id="rId5"/>
+    <p:sldId id="297" r:id="rId6"/>
+    <p:sldId id="299" r:id="rId7"/>
+    <p:sldId id="295" r:id="rId8"/>
+    <p:sldId id="293" r:id="rId9"/>
+    <p:sldId id="284" r:id="rId10"/>
+    <p:sldId id="287" r:id="rId11"/>
   </p:sldIdLst>
   <p:sldSz cx="12192000" cy="6858000"/>
   <p:notesSz cx="6858000" cy="9144000"/>
@@ -2663,7 +2664,7 @@
         <a:lstStyle/>
         <a:p>
           <a:r>
-            <a:rPr lang="es-ES" b="1"/>
+            <a:rPr lang="es-ES" b="1" dirty="0"/>
             <a:t>INDICES Y RANGOS</a:t>
           </a:r>
           <a:endParaRPr lang="es-ES" dirty="0"/>
@@ -2673,8 +2674,166 @@
     <dgm:pt modelId="{305F700A-2574-064B-B6C7-A122E601B606}" type="parTrans" cxnId="{1DB515F7-3A78-2D49-AAAE-8C561493CCA5}">
       <dgm:prSet/>
       <dgm:spPr/>
+      <dgm:t>
+        <a:bodyPr/>
+        <a:lstStyle/>
+        <a:p>
+          <a:endParaRPr lang="en-GB"/>
+        </a:p>
+      </dgm:t>
     </dgm:pt>
     <dgm:pt modelId="{149EEF13-B4CD-9C4F-9538-C4C878AD5DCD}" type="sibTrans" cxnId="{1DB515F7-3A78-2D49-AAAE-8C561493CCA5}">
+      <dgm:prSet/>
+      <dgm:spPr/>
+      <dgm:t>
+        <a:bodyPr/>
+        <a:lstStyle/>
+        <a:p>
+          <a:endParaRPr lang="en-GB"/>
+        </a:p>
+      </dgm:t>
+    </dgm:pt>
+    <dgm:pt modelId="{78926158-ED38-954D-99D7-F5108FF28C71}">
+      <dgm:prSet/>
+      <dgm:spPr/>
+      <dgm:t>
+        <a:bodyPr/>
+        <a:lstStyle/>
+        <a:p>
+          <a:r>
+            <a:rPr lang="es-ES" b="1" dirty="0" err="1"/>
+            <a:t>System.Index</a:t>
+          </a:r>
+          <a:endParaRPr lang="es-ES" dirty="0"/>
+        </a:p>
+      </dgm:t>
+    </dgm:pt>
+    <dgm:pt modelId="{4F4AC0CE-9141-9144-B2F7-87E6561082C7}" type="parTrans" cxnId="{22CA0605-09E4-5D4F-81CF-3C0185CF9981}">
+      <dgm:prSet/>
+      <dgm:spPr/>
+      <dgm:t>
+        <a:bodyPr/>
+        <a:lstStyle/>
+        <a:p>
+          <a:endParaRPr lang="en-GB"/>
+        </a:p>
+      </dgm:t>
+    </dgm:pt>
+    <dgm:pt modelId="{B01C24E8-0875-384C-AE90-30CB2FFEB472}" type="sibTrans" cxnId="{22CA0605-09E4-5D4F-81CF-3C0185CF9981}">
+      <dgm:prSet/>
+      <dgm:spPr/>
+      <dgm:t>
+        <a:bodyPr/>
+        <a:lstStyle/>
+        <a:p>
+          <a:endParaRPr lang="en-GB"/>
+        </a:p>
+      </dgm:t>
+    </dgm:pt>
+    <dgm:pt modelId="{1307C38B-8261-8F4D-946C-DE8376D3CA81}">
+      <dgm:prSet/>
+      <dgm:spPr/>
+      <dgm:t>
+        <a:bodyPr/>
+        <a:lstStyle/>
+        <a:p>
+          <a:r>
+            <a:rPr lang="es-ES" b="1" dirty="0" err="1"/>
+            <a:t>System.Range</a:t>
+          </a:r>
+          <a:endParaRPr lang="es-ES" dirty="0"/>
+        </a:p>
+      </dgm:t>
+    </dgm:pt>
+    <dgm:pt modelId="{15556E51-18FE-9248-9F16-BA53F848AF5E}" type="parTrans" cxnId="{FCCC5DFC-BC58-0C43-B94F-28077F7C56C5}">
+      <dgm:prSet/>
+      <dgm:spPr/>
+      <dgm:t>
+        <a:bodyPr/>
+        <a:lstStyle/>
+        <a:p>
+          <a:endParaRPr lang="en-GB"/>
+        </a:p>
+      </dgm:t>
+    </dgm:pt>
+    <dgm:pt modelId="{97242540-2F57-3F44-8409-1EE6C0C05541}" type="sibTrans" cxnId="{FCCC5DFC-BC58-0C43-B94F-28077F7C56C5}">
+      <dgm:prSet/>
+      <dgm:spPr/>
+      <dgm:t>
+        <a:bodyPr/>
+        <a:lstStyle/>
+        <a:p>
+          <a:endParaRPr lang="en-GB"/>
+        </a:p>
+      </dgm:t>
+    </dgm:pt>
+    <dgm:pt modelId="{83C4BC54-3A91-0E46-9D8B-D8347AE5E718}">
+      <dgm:prSet/>
+      <dgm:spPr/>
+      <dgm:t>
+        <a:bodyPr/>
+        <a:lstStyle/>
+        <a:p>
+          <a:r>
+            <a:rPr lang="es-ES" b="1" dirty="0"/>
+            <a:t>Operador </a:t>
+          </a:r>
+          <a:r>
+            <a:rPr lang="es-ES" b="1" dirty="0" err="1"/>
+            <a:t>Hat</a:t>
+          </a:r>
+          <a:r>
+            <a:rPr lang="es-ES" b="1" dirty="0"/>
+            <a:t> (sombrero) “^”</a:t>
+          </a:r>
+          <a:endParaRPr lang="es-ES" dirty="0"/>
+        </a:p>
+      </dgm:t>
+    </dgm:pt>
+    <dgm:pt modelId="{8B642ADC-3B41-564A-A92B-43D64E55EFBD}" type="parTrans" cxnId="{96D9371E-710F-8B49-BA73-627D183DFA4F}">
+      <dgm:prSet/>
+      <dgm:spPr/>
+      <dgm:t>
+        <a:bodyPr/>
+        <a:lstStyle/>
+        <a:p>
+          <a:endParaRPr lang="en-GB"/>
+        </a:p>
+      </dgm:t>
+    </dgm:pt>
+    <dgm:pt modelId="{159471C9-0B9D-C449-9430-B503344E4F21}" type="sibTrans" cxnId="{96D9371E-710F-8B49-BA73-627D183DFA4F}">
+      <dgm:prSet/>
+      <dgm:spPr/>
+      <dgm:t>
+        <a:bodyPr/>
+        <a:lstStyle/>
+        <a:p>
+          <a:endParaRPr lang="en-GB"/>
+        </a:p>
+      </dgm:t>
+    </dgm:pt>
+    <dgm:pt modelId="{021B7A51-8576-8040-994A-2B488DABCC86}">
+      <dgm:prSet/>
+      <dgm:spPr/>
+      <dgm:t>
+        <a:bodyPr/>
+        <a:lstStyle/>
+        <a:p>
+          <a:r>
+            <a:rPr lang="es-ES" b="1" dirty="0"/>
+            <a:t>Operador rango “..”</a:t>
+          </a:r>
+        </a:p>
+        <a:p>
+          <a:endParaRPr lang="es-ES" dirty="0"/>
+        </a:p>
+      </dgm:t>
+    </dgm:pt>
+    <dgm:pt modelId="{4DE0BEA4-10FB-6241-8C0C-D9BD713FF5A4}" type="parTrans" cxnId="{B6F2EB39-D878-3E4E-A80C-BBE0427A825B}">
+      <dgm:prSet/>
+      <dgm:spPr/>
+    </dgm:pt>
+    <dgm:pt modelId="{0F029D95-61F1-3B44-AF22-7E7DFF49512F}" type="sibTrans" cxnId="{B6F2EB39-D878-3E4E-A80C-BBE0427A825B}">
       <dgm:prSet/>
       <dgm:spPr/>
     </dgm:pt>
@@ -2825,48 +2984,56 @@
     </dgm:pt>
   </dgm:ptLst>
   <dgm:cxnLst>
+    <dgm:cxn modelId="{DB04FF03-C36A-A34B-B665-4DF63CA7E943}" type="presOf" srcId="{78926158-ED38-954D-99D7-F5108FF28C71}" destId="{8F971F46-95A4-144A-BF14-6F305FDF0BA9}" srcOrd="0" destOrd="1" presId="urn:microsoft.com/office/officeart/2008/layout/PictureStrips"/>
+    <dgm:cxn modelId="{22CA0605-09E4-5D4F-81CF-3C0185CF9981}" srcId="{7021FCE1-40F6-9843-8F79-3478FCE84E0A}" destId="{78926158-ED38-954D-99D7-F5108FF28C71}" srcOrd="0" destOrd="0" parTransId="{4F4AC0CE-9141-9144-B2F7-87E6561082C7}" sibTransId="{B01C24E8-0875-384C-AE90-30CB2FFEB472}"/>
     <dgm:cxn modelId="{35485C15-0F36-4DB5-90DD-89E34D963297}" srcId="{352FE7B3-671C-4073-B16B-7DCE4922259F}" destId="{6AAD4584-B062-476E-B86A-31870CB97EDD}" srcOrd="5" destOrd="0" parTransId="{09E69C58-5DF6-4E23-9AB0-F4BEE1CF2187}" sibTransId="{997C1484-42CB-4D7C-B9BA-4433DDAC28A2}"/>
     <dgm:cxn modelId="{D28B0916-DBC4-47B6-831C-E2BA3300A36C}" srcId="{352FE7B3-671C-4073-B16B-7DCE4922259F}" destId="{F5EF1174-5F30-4121-8065-B01A05BEC3B7}" srcOrd="3" destOrd="0" parTransId="{5931F3B1-60EE-4A0F-B58F-874347E00F3D}" sibTransId="{39F77925-D1D1-4CAF-BA88-B80052F3D629}"/>
-    <dgm:cxn modelId="{259DFF19-10B4-4EB8-8CB6-2515C67D86D5}" type="presOf" srcId="{6592B46A-0868-4FA9-86DB-67ED4AEBFB0F}" destId="{B5B370A7-F936-4EE5-B5B8-0C278B755428}" srcOrd="0" destOrd="0" presId="urn:microsoft.com/office/officeart/2008/layout/PictureStrips"/>
-    <dgm:cxn modelId="{05F08724-0619-46A5-8A35-272C544381C0}" type="presOf" srcId="{4D66D171-0D84-4A09-9B39-C4E176455530}" destId="{EBD3B18F-B6C7-429A-B6E5-555CCC559BA5}" srcOrd="0" destOrd="0" presId="urn:microsoft.com/office/officeart/2008/layout/PictureStrips"/>
+    <dgm:cxn modelId="{EA6C0D1E-3A55-5B42-87A2-6FDFEB6483CF}" type="presOf" srcId="{6AAD4584-B062-476E-B86A-31870CB97EDD}" destId="{F104F9C3-EA2A-4326-9E78-34028408AB3C}" srcOrd="0" destOrd="0" presId="urn:microsoft.com/office/officeart/2008/layout/PictureStrips"/>
+    <dgm:cxn modelId="{96D9371E-710F-8B49-BA73-627D183DFA4F}" srcId="{7021FCE1-40F6-9843-8F79-3478FCE84E0A}" destId="{83C4BC54-3A91-0E46-9D8B-D8347AE5E718}" srcOrd="2" destOrd="0" parTransId="{8B642ADC-3B41-564A-A92B-43D64E55EFBD}" sibTransId="{159471C9-0B9D-C449-9430-B503344E4F21}"/>
+    <dgm:cxn modelId="{A11CC324-FB1B-524D-ABB3-A00C04F10431}" type="presOf" srcId="{7021FCE1-40F6-9843-8F79-3478FCE84E0A}" destId="{8F971F46-95A4-144A-BF14-6F305FDF0BA9}" srcOrd="0" destOrd="0" presId="urn:microsoft.com/office/officeart/2008/layout/PictureStrips"/>
+    <dgm:cxn modelId="{BB401A35-69F9-2F43-8894-730869D2BB3E}" type="presOf" srcId="{1307C38B-8261-8F4D-946C-DE8376D3CA81}" destId="{8F971F46-95A4-144A-BF14-6F305FDF0BA9}" srcOrd="0" destOrd="2" presId="urn:microsoft.com/office/officeart/2008/layout/PictureStrips"/>
+    <dgm:cxn modelId="{F7340B39-2C92-7A46-B644-0A8550114FD8}" type="presOf" srcId="{83C4BC54-3A91-0E46-9D8B-D8347AE5E718}" destId="{8F971F46-95A4-144A-BF14-6F305FDF0BA9}" srcOrd="0" destOrd="3" presId="urn:microsoft.com/office/officeart/2008/layout/PictureStrips"/>
+    <dgm:cxn modelId="{B6F2EB39-D878-3E4E-A80C-BBE0427A825B}" srcId="{7021FCE1-40F6-9843-8F79-3478FCE84E0A}" destId="{021B7A51-8576-8040-994A-2B488DABCC86}" srcOrd="3" destOrd="0" parTransId="{4DE0BEA4-10FB-6241-8C0C-D9BD713FF5A4}" sibTransId="{0F029D95-61F1-3B44-AF22-7E7DFF49512F}"/>
     <dgm:cxn modelId="{3F30D640-53B1-46DE-B064-A74679D994DC}" type="presOf" srcId="{352FE7B3-671C-4073-B16B-7DCE4922259F}" destId="{E56F1900-67AB-414C-B993-20E46BE57774}" srcOrd="0" destOrd="0" presId="urn:microsoft.com/office/officeart/2008/layout/PictureStrips"/>
-    <dgm:cxn modelId="{B2AC3256-21E0-40DF-B717-946B01C2253A}" type="presOf" srcId="{F5EF1174-5F30-4121-8065-B01A05BEC3B7}" destId="{8061BA7F-5477-4CA3-AF12-50DD847B6AC6}" srcOrd="0" destOrd="0" presId="urn:microsoft.com/office/officeart/2008/layout/PictureStrips"/>
+    <dgm:cxn modelId="{F6148641-5D36-DA4E-9256-3252A8FF6BF9}" type="presOf" srcId="{F5EF1174-5F30-4121-8065-B01A05BEC3B7}" destId="{8061BA7F-5477-4CA3-AF12-50DD847B6AC6}" srcOrd="0" destOrd="0" presId="urn:microsoft.com/office/officeart/2008/layout/PictureStrips"/>
+    <dgm:cxn modelId="{D59DBB43-2E13-4E4F-90AD-86EAF80D7FA3}" type="presOf" srcId="{021B7A51-8576-8040-994A-2B488DABCC86}" destId="{8F971F46-95A4-144A-BF14-6F305FDF0BA9}" srcOrd="0" destOrd="4" presId="urn:microsoft.com/office/officeart/2008/layout/PictureStrips"/>
     <dgm:cxn modelId="{6B8ECA59-C455-4ED2-A1B1-2A668AE709CD}" srcId="{352FE7B3-671C-4073-B16B-7DCE4922259F}" destId="{4D66D171-0D84-4A09-9B39-C4E176455530}" srcOrd="0" destOrd="0" parTransId="{EEA4DEA2-CA56-4B14-A2FA-ACED9F0BD98D}" sibTransId="{B7329377-EAB2-4C70-9A3D-617F99D41E6D}"/>
     <dgm:cxn modelId="{24AC899D-6363-4018-A456-B72ED8DFA789}" srcId="{352FE7B3-671C-4073-B16B-7DCE4922259F}" destId="{43D2D250-CFE0-4406-8984-5C7CA0F26AC1}" srcOrd="1" destOrd="0" parTransId="{A591E254-97DC-4972-82D5-2A72E942A01E}" sibTransId="{9E66B2D5-8AD9-4436-8D25-32C7BF343798}"/>
-    <dgm:cxn modelId="{33D3549E-9CCB-714C-8419-C8C35F7A301A}" type="presOf" srcId="{7021FCE1-40F6-9843-8F79-3478FCE84E0A}" destId="{8F971F46-95A4-144A-BF14-6F305FDF0BA9}" srcOrd="0" destOrd="0" presId="urn:microsoft.com/office/officeart/2008/layout/PictureStrips"/>
-    <dgm:cxn modelId="{C0D62DA3-7FC5-4CDE-8EDB-FB5E88EC7EB9}" type="presOf" srcId="{6AAD4584-B062-476E-B86A-31870CB97EDD}" destId="{F104F9C3-EA2A-4326-9E78-34028408AB3C}" srcOrd="0" destOrd="0" presId="urn:microsoft.com/office/officeart/2008/layout/PictureStrips"/>
+    <dgm:cxn modelId="{F628B1BA-41A7-B144-8392-B0BB8443BD78}" type="presOf" srcId="{236BBDC9-7505-4758-AE83-6C0E58BD2E1E}" destId="{073307DB-E4F3-4451-9C39-91941E481A60}" srcOrd="0" destOrd="0" presId="urn:microsoft.com/office/officeart/2008/layout/PictureStrips"/>
+    <dgm:cxn modelId="{F5AF46C9-9289-B442-825D-4FE3E0538DE2}" type="presOf" srcId="{4D66D171-0D84-4A09-9B39-C4E176455530}" destId="{EBD3B18F-B6C7-429A-B6E5-555CCC559BA5}" srcOrd="0" destOrd="0" presId="urn:microsoft.com/office/officeart/2008/layout/PictureStrips"/>
     <dgm:cxn modelId="{801B62DD-600F-46B8-B42D-064EEFFEEE95}" srcId="{352FE7B3-671C-4073-B16B-7DCE4922259F}" destId="{236BBDC9-7505-4758-AE83-6C0E58BD2E1E}" srcOrd="2" destOrd="0" parTransId="{BD97F917-BEF5-47A9-961D-B1E33FFECB12}" sibTransId="{F353E6B6-5B95-4373-8AA6-2E7C9918096C}"/>
-    <dgm:cxn modelId="{04DC1DEA-15FB-4740-B334-F6D13A29B34A}" type="presOf" srcId="{43D2D250-CFE0-4406-8984-5C7CA0F26AC1}" destId="{5B745E26-97FD-4B6C-88E9-60FD2133E7A7}" srcOrd="0" destOrd="0" presId="urn:microsoft.com/office/officeart/2008/layout/PictureStrips"/>
+    <dgm:cxn modelId="{DFF940F1-4E17-3E4E-9B7D-A5FBF7659A10}" type="presOf" srcId="{43D2D250-CFE0-4406-8984-5C7CA0F26AC1}" destId="{5B745E26-97FD-4B6C-88E9-60FD2133E7A7}" srcOrd="0" destOrd="0" presId="urn:microsoft.com/office/officeart/2008/layout/PictureStrips"/>
     <dgm:cxn modelId="{C9A0F7F3-4560-447B-AD7A-0F398CB3309F}" srcId="{352FE7B3-671C-4073-B16B-7DCE4922259F}" destId="{6592B46A-0868-4FA9-86DB-67ED4AEBFB0F}" srcOrd="4" destOrd="0" parTransId="{8873079F-1675-438E-B16E-EE7E99CC2696}" sibTransId="{15B8E6C6-0DD2-47BA-B24C-208E70146AC1}"/>
-    <dgm:cxn modelId="{D8B720F6-8468-4A5E-A60B-B490E5B28B6E}" type="presOf" srcId="{236BBDC9-7505-4758-AE83-6C0E58BD2E1E}" destId="{073307DB-E4F3-4451-9C39-91941E481A60}" srcOrd="0" destOrd="0" presId="urn:microsoft.com/office/officeart/2008/layout/PictureStrips"/>
     <dgm:cxn modelId="{1DB515F7-3A78-2D49-AAAE-8C561493CCA5}" srcId="{352FE7B3-671C-4073-B16B-7DCE4922259F}" destId="{7021FCE1-40F6-9843-8F79-3478FCE84E0A}" srcOrd="6" destOrd="0" parTransId="{305F700A-2574-064B-B6C7-A122E601B606}" sibTransId="{149EEF13-B4CD-9C4F-9538-C4C878AD5DCD}"/>
-    <dgm:cxn modelId="{916E8288-9466-4B7C-BB14-E2B1E6CCB4B4}" type="presParOf" srcId="{E56F1900-67AB-414C-B993-20E46BE57774}" destId="{47F232E1-6A86-41BC-856C-4A3B3D277B6C}" srcOrd="0" destOrd="0" presId="urn:microsoft.com/office/officeart/2008/layout/PictureStrips"/>
-    <dgm:cxn modelId="{BB04FC41-6621-4E9B-B339-796227F508F0}" type="presParOf" srcId="{47F232E1-6A86-41BC-856C-4A3B3D277B6C}" destId="{EBD3B18F-B6C7-429A-B6E5-555CCC559BA5}" srcOrd="0" destOrd="0" presId="urn:microsoft.com/office/officeart/2008/layout/PictureStrips"/>
-    <dgm:cxn modelId="{BB499123-56AC-4E0F-B361-530B080953C6}" type="presParOf" srcId="{47F232E1-6A86-41BC-856C-4A3B3D277B6C}" destId="{431E5015-2846-4476-8F46-05767805DEDD}" srcOrd="1" destOrd="0" presId="urn:microsoft.com/office/officeart/2008/layout/PictureStrips"/>
-    <dgm:cxn modelId="{296AA086-F2A3-4CD8-BECF-6BC3B474A804}" type="presParOf" srcId="{E56F1900-67AB-414C-B993-20E46BE57774}" destId="{59677606-E192-45CE-97D1-806E901AA39C}" srcOrd="1" destOrd="0" presId="urn:microsoft.com/office/officeart/2008/layout/PictureStrips"/>
-    <dgm:cxn modelId="{6C550DA0-1ABB-4FF5-8917-B611679D408A}" type="presParOf" srcId="{E56F1900-67AB-414C-B993-20E46BE57774}" destId="{CE7D0E4E-BC08-4408-BEEB-EDBB39796651}" srcOrd="2" destOrd="0" presId="urn:microsoft.com/office/officeart/2008/layout/PictureStrips"/>
-    <dgm:cxn modelId="{44FD7946-E206-4E12-BE02-B6CA15C51B19}" type="presParOf" srcId="{CE7D0E4E-BC08-4408-BEEB-EDBB39796651}" destId="{5B745E26-97FD-4B6C-88E9-60FD2133E7A7}" srcOrd="0" destOrd="0" presId="urn:microsoft.com/office/officeart/2008/layout/PictureStrips"/>
-    <dgm:cxn modelId="{F982CF7F-8ACC-4B4F-9D12-332C7852C078}" type="presParOf" srcId="{CE7D0E4E-BC08-4408-BEEB-EDBB39796651}" destId="{F5CFD782-E0C2-4F2E-A8A5-FB00334E152B}" srcOrd="1" destOrd="0" presId="urn:microsoft.com/office/officeart/2008/layout/PictureStrips"/>
-    <dgm:cxn modelId="{2F954CDA-22BF-4E39-A3A6-724C7F675D04}" type="presParOf" srcId="{E56F1900-67AB-414C-B993-20E46BE57774}" destId="{F70C7F7E-6D25-4A7B-BD88-F69AC0AD513E}" srcOrd="3" destOrd="0" presId="urn:microsoft.com/office/officeart/2008/layout/PictureStrips"/>
-    <dgm:cxn modelId="{DDA69501-7CAF-41F8-AE5B-AC5508ACA98A}" type="presParOf" srcId="{E56F1900-67AB-414C-B993-20E46BE57774}" destId="{708987AF-ADB2-470E-B8B2-AA3C0F3C646D}" srcOrd="4" destOrd="0" presId="urn:microsoft.com/office/officeart/2008/layout/PictureStrips"/>
-    <dgm:cxn modelId="{9558ECB9-F5D6-45ED-A761-886176F1734F}" type="presParOf" srcId="{708987AF-ADB2-470E-B8B2-AA3C0F3C646D}" destId="{073307DB-E4F3-4451-9C39-91941E481A60}" srcOrd="0" destOrd="0" presId="urn:microsoft.com/office/officeart/2008/layout/PictureStrips"/>
-    <dgm:cxn modelId="{829422DC-6DA5-4B2F-9697-4F299385D8C6}" type="presParOf" srcId="{708987AF-ADB2-470E-B8B2-AA3C0F3C646D}" destId="{3168F93E-0E74-42FB-A69A-C5B8D01D3D1C}" srcOrd="1" destOrd="0" presId="urn:microsoft.com/office/officeart/2008/layout/PictureStrips"/>
-    <dgm:cxn modelId="{7095C9C7-EFFA-48D1-B17B-BC86A13EC6DB}" type="presParOf" srcId="{E56F1900-67AB-414C-B993-20E46BE57774}" destId="{471CDEA2-6B57-4AB0-BD29-FDB093C7C94F}" srcOrd="5" destOrd="0" presId="urn:microsoft.com/office/officeart/2008/layout/PictureStrips"/>
-    <dgm:cxn modelId="{D224C2A4-DE5B-4723-85E2-E9B1F8BE884C}" type="presParOf" srcId="{E56F1900-67AB-414C-B993-20E46BE57774}" destId="{E1BBD7F7-93F4-4DCB-A25B-D447F690CB27}" srcOrd="6" destOrd="0" presId="urn:microsoft.com/office/officeart/2008/layout/PictureStrips"/>
-    <dgm:cxn modelId="{CCFBEF73-3A22-4D42-8D2C-031C7A98A624}" type="presParOf" srcId="{E1BBD7F7-93F4-4DCB-A25B-D447F690CB27}" destId="{8061BA7F-5477-4CA3-AF12-50DD847B6AC6}" srcOrd="0" destOrd="0" presId="urn:microsoft.com/office/officeart/2008/layout/PictureStrips"/>
-    <dgm:cxn modelId="{D0FE2058-E692-4F15-A6DB-36ABB7EAC5D7}" type="presParOf" srcId="{E1BBD7F7-93F4-4DCB-A25B-D447F690CB27}" destId="{91983553-861C-41DA-8A3F-D193EC80CF41}" srcOrd="1" destOrd="0" presId="urn:microsoft.com/office/officeart/2008/layout/PictureStrips"/>
-    <dgm:cxn modelId="{C5C2A118-7E8D-4128-B829-F74EA4A496FA}" type="presParOf" srcId="{E56F1900-67AB-414C-B993-20E46BE57774}" destId="{D5BA92CC-B601-43B0-A5D2-52A9D271926F}" srcOrd="7" destOrd="0" presId="urn:microsoft.com/office/officeart/2008/layout/PictureStrips"/>
-    <dgm:cxn modelId="{3B682854-A501-4B3D-94BF-E78B2F869880}" type="presParOf" srcId="{E56F1900-67AB-414C-B993-20E46BE57774}" destId="{40A51947-3EDE-4E33-A8C1-BEB9B7163D50}" srcOrd="8" destOrd="0" presId="urn:microsoft.com/office/officeart/2008/layout/PictureStrips"/>
-    <dgm:cxn modelId="{C40D7A23-2283-4BF1-993C-AB339ACE8DC2}" type="presParOf" srcId="{40A51947-3EDE-4E33-A8C1-BEB9B7163D50}" destId="{B5B370A7-F936-4EE5-B5B8-0C278B755428}" srcOrd="0" destOrd="0" presId="urn:microsoft.com/office/officeart/2008/layout/PictureStrips"/>
-    <dgm:cxn modelId="{03CC4E83-CDD4-4C58-82D9-07152E7745CC}" type="presParOf" srcId="{40A51947-3EDE-4E33-A8C1-BEB9B7163D50}" destId="{F7DEAB92-DEBF-4CB0-BB67-F6F5A804D1A4}" srcOrd="1" destOrd="0" presId="urn:microsoft.com/office/officeart/2008/layout/PictureStrips"/>
-    <dgm:cxn modelId="{2C00DB12-01BF-4E77-9BA7-78B8C7C4979A}" type="presParOf" srcId="{E56F1900-67AB-414C-B993-20E46BE57774}" destId="{D778C454-DC8C-4388-9F81-A1EE5166B248}" srcOrd="9" destOrd="0" presId="urn:microsoft.com/office/officeart/2008/layout/PictureStrips"/>
-    <dgm:cxn modelId="{96E93F70-E878-4CC4-B5D1-3CE47DE589C8}" type="presParOf" srcId="{E56F1900-67AB-414C-B993-20E46BE57774}" destId="{3FA118FA-798C-45D4-BAD7-8C277844FB4E}" srcOrd="10" destOrd="0" presId="urn:microsoft.com/office/officeart/2008/layout/PictureStrips"/>
-    <dgm:cxn modelId="{BA2F787E-EA36-4A82-B54F-C8C26020615B}" type="presParOf" srcId="{3FA118FA-798C-45D4-BAD7-8C277844FB4E}" destId="{F104F9C3-EA2A-4326-9E78-34028408AB3C}" srcOrd="0" destOrd="0" presId="urn:microsoft.com/office/officeart/2008/layout/PictureStrips"/>
-    <dgm:cxn modelId="{176BBC24-FAA0-4406-A002-87DD15571170}" type="presParOf" srcId="{3FA118FA-798C-45D4-BAD7-8C277844FB4E}" destId="{45E682B6-A8F2-4968-B3EC-E56725F7806C}" srcOrd="1" destOrd="0" presId="urn:microsoft.com/office/officeart/2008/layout/PictureStrips"/>
-    <dgm:cxn modelId="{FBCA4042-BE42-B444-9DEE-69C9B7A4D795}" type="presParOf" srcId="{E56F1900-67AB-414C-B993-20E46BE57774}" destId="{F50B309C-F4A1-6849-8D7E-D31DCC768DCD}" srcOrd="11" destOrd="0" presId="urn:microsoft.com/office/officeart/2008/layout/PictureStrips"/>
-    <dgm:cxn modelId="{EAC87724-2661-1545-86B6-88901E8975B2}" type="presParOf" srcId="{E56F1900-67AB-414C-B993-20E46BE57774}" destId="{0D7D6FE0-653B-E14D-8C51-C738E5975A75}" srcOrd="12" destOrd="0" presId="urn:microsoft.com/office/officeart/2008/layout/PictureStrips"/>
-    <dgm:cxn modelId="{02434F06-3D93-8F49-9524-04551B1D62E1}" type="presParOf" srcId="{0D7D6FE0-653B-E14D-8C51-C738E5975A75}" destId="{8F971F46-95A4-144A-BF14-6F305FDF0BA9}" srcOrd="0" destOrd="0" presId="urn:microsoft.com/office/officeart/2008/layout/PictureStrips"/>
-    <dgm:cxn modelId="{1BCAEF66-6FEA-174D-9F49-DB1D65B809B5}" type="presParOf" srcId="{0D7D6FE0-653B-E14D-8C51-C738E5975A75}" destId="{EFB442C9-CD0C-B84D-AAEA-499D0A478595}" srcOrd="1" destOrd="0" presId="urn:microsoft.com/office/officeart/2008/layout/PictureStrips"/>
+    <dgm:cxn modelId="{80338EF7-38DB-574A-9010-B877A1AF2E5B}" type="presOf" srcId="{6592B46A-0868-4FA9-86DB-67ED4AEBFB0F}" destId="{B5B370A7-F936-4EE5-B5B8-0C278B755428}" srcOrd="0" destOrd="0" presId="urn:microsoft.com/office/officeart/2008/layout/PictureStrips"/>
+    <dgm:cxn modelId="{FCCC5DFC-BC58-0C43-B94F-28077F7C56C5}" srcId="{7021FCE1-40F6-9843-8F79-3478FCE84E0A}" destId="{1307C38B-8261-8F4D-946C-DE8376D3CA81}" srcOrd="1" destOrd="0" parTransId="{15556E51-18FE-9248-9F16-BA53F848AF5E}" sibTransId="{97242540-2F57-3F44-8409-1EE6C0C05541}"/>
+    <dgm:cxn modelId="{2692B066-C2E7-E149-8B54-D033302CB9DE}" type="presParOf" srcId="{E56F1900-67AB-414C-B993-20E46BE57774}" destId="{47F232E1-6A86-41BC-856C-4A3B3D277B6C}" srcOrd="0" destOrd="0" presId="urn:microsoft.com/office/officeart/2008/layout/PictureStrips"/>
+    <dgm:cxn modelId="{500C5237-B5BB-1E4E-9D7C-88A873AE0752}" type="presParOf" srcId="{47F232E1-6A86-41BC-856C-4A3B3D277B6C}" destId="{EBD3B18F-B6C7-429A-B6E5-555CCC559BA5}" srcOrd="0" destOrd="0" presId="urn:microsoft.com/office/officeart/2008/layout/PictureStrips"/>
+    <dgm:cxn modelId="{71DC18C2-DA48-0D4D-82CC-3C1C776FE393}" type="presParOf" srcId="{47F232E1-6A86-41BC-856C-4A3B3D277B6C}" destId="{431E5015-2846-4476-8F46-05767805DEDD}" srcOrd="1" destOrd="0" presId="urn:microsoft.com/office/officeart/2008/layout/PictureStrips"/>
+    <dgm:cxn modelId="{A5D1D4C0-ED9D-A948-97D7-AED856670BAC}" type="presParOf" srcId="{E56F1900-67AB-414C-B993-20E46BE57774}" destId="{59677606-E192-45CE-97D1-806E901AA39C}" srcOrd="1" destOrd="0" presId="urn:microsoft.com/office/officeart/2008/layout/PictureStrips"/>
+    <dgm:cxn modelId="{D712F8D0-611C-4047-8E45-3FFEF6E1D865}" type="presParOf" srcId="{E56F1900-67AB-414C-B993-20E46BE57774}" destId="{CE7D0E4E-BC08-4408-BEEB-EDBB39796651}" srcOrd="2" destOrd="0" presId="urn:microsoft.com/office/officeart/2008/layout/PictureStrips"/>
+    <dgm:cxn modelId="{89EA0840-1A91-9C43-BD29-E05BBA0F46A8}" type="presParOf" srcId="{CE7D0E4E-BC08-4408-BEEB-EDBB39796651}" destId="{5B745E26-97FD-4B6C-88E9-60FD2133E7A7}" srcOrd="0" destOrd="0" presId="urn:microsoft.com/office/officeart/2008/layout/PictureStrips"/>
+    <dgm:cxn modelId="{6F8D38E7-CE35-3749-B1D3-AF6F533ECE3C}" type="presParOf" srcId="{CE7D0E4E-BC08-4408-BEEB-EDBB39796651}" destId="{F5CFD782-E0C2-4F2E-A8A5-FB00334E152B}" srcOrd="1" destOrd="0" presId="urn:microsoft.com/office/officeart/2008/layout/PictureStrips"/>
+    <dgm:cxn modelId="{E611B1C7-880B-5447-8554-97DFC6B4EBAF}" type="presParOf" srcId="{E56F1900-67AB-414C-B993-20E46BE57774}" destId="{F70C7F7E-6D25-4A7B-BD88-F69AC0AD513E}" srcOrd="3" destOrd="0" presId="urn:microsoft.com/office/officeart/2008/layout/PictureStrips"/>
+    <dgm:cxn modelId="{4B36B244-5AF6-2D44-9749-7E146515CD3B}" type="presParOf" srcId="{E56F1900-67AB-414C-B993-20E46BE57774}" destId="{708987AF-ADB2-470E-B8B2-AA3C0F3C646D}" srcOrd="4" destOrd="0" presId="urn:microsoft.com/office/officeart/2008/layout/PictureStrips"/>
+    <dgm:cxn modelId="{D86D896F-A184-D345-B361-AC7536FB66A7}" type="presParOf" srcId="{708987AF-ADB2-470E-B8B2-AA3C0F3C646D}" destId="{073307DB-E4F3-4451-9C39-91941E481A60}" srcOrd="0" destOrd="0" presId="urn:microsoft.com/office/officeart/2008/layout/PictureStrips"/>
+    <dgm:cxn modelId="{22935C88-4DB4-0746-90CC-EE4D1C6133FD}" type="presParOf" srcId="{708987AF-ADB2-470E-B8B2-AA3C0F3C646D}" destId="{3168F93E-0E74-42FB-A69A-C5B8D01D3D1C}" srcOrd="1" destOrd="0" presId="urn:microsoft.com/office/officeart/2008/layout/PictureStrips"/>
+    <dgm:cxn modelId="{CBF083F2-D989-3147-9E2D-1137430DDA35}" type="presParOf" srcId="{E56F1900-67AB-414C-B993-20E46BE57774}" destId="{471CDEA2-6B57-4AB0-BD29-FDB093C7C94F}" srcOrd="5" destOrd="0" presId="urn:microsoft.com/office/officeart/2008/layout/PictureStrips"/>
+    <dgm:cxn modelId="{D54D5955-E613-834E-9C9B-6EF4D953CFF2}" type="presParOf" srcId="{E56F1900-67AB-414C-B993-20E46BE57774}" destId="{E1BBD7F7-93F4-4DCB-A25B-D447F690CB27}" srcOrd="6" destOrd="0" presId="urn:microsoft.com/office/officeart/2008/layout/PictureStrips"/>
+    <dgm:cxn modelId="{F0EEBA3D-0AB4-134D-918F-FAB104761A90}" type="presParOf" srcId="{E1BBD7F7-93F4-4DCB-A25B-D447F690CB27}" destId="{8061BA7F-5477-4CA3-AF12-50DD847B6AC6}" srcOrd="0" destOrd="0" presId="urn:microsoft.com/office/officeart/2008/layout/PictureStrips"/>
+    <dgm:cxn modelId="{BDF88EDA-013D-5D48-86C3-BD50E704B796}" type="presParOf" srcId="{E1BBD7F7-93F4-4DCB-A25B-D447F690CB27}" destId="{91983553-861C-41DA-8A3F-D193EC80CF41}" srcOrd="1" destOrd="0" presId="urn:microsoft.com/office/officeart/2008/layout/PictureStrips"/>
+    <dgm:cxn modelId="{F794F2E3-6005-E54E-B9B7-F28E2FAFB0F6}" type="presParOf" srcId="{E56F1900-67AB-414C-B993-20E46BE57774}" destId="{D5BA92CC-B601-43B0-A5D2-52A9D271926F}" srcOrd="7" destOrd="0" presId="urn:microsoft.com/office/officeart/2008/layout/PictureStrips"/>
+    <dgm:cxn modelId="{10BF9FE3-06C6-9E44-8EC2-5972B61E0201}" type="presParOf" srcId="{E56F1900-67AB-414C-B993-20E46BE57774}" destId="{40A51947-3EDE-4E33-A8C1-BEB9B7163D50}" srcOrd="8" destOrd="0" presId="urn:microsoft.com/office/officeart/2008/layout/PictureStrips"/>
+    <dgm:cxn modelId="{62FCB09F-CFAD-EB4F-AC2B-4F484AD715B5}" type="presParOf" srcId="{40A51947-3EDE-4E33-A8C1-BEB9B7163D50}" destId="{B5B370A7-F936-4EE5-B5B8-0C278B755428}" srcOrd="0" destOrd="0" presId="urn:microsoft.com/office/officeart/2008/layout/PictureStrips"/>
+    <dgm:cxn modelId="{B6AD02A4-9F5A-BA4F-AF7F-DB489605BC88}" type="presParOf" srcId="{40A51947-3EDE-4E33-A8C1-BEB9B7163D50}" destId="{F7DEAB92-DEBF-4CB0-BB67-F6F5A804D1A4}" srcOrd="1" destOrd="0" presId="urn:microsoft.com/office/officeart/2008/layout/PictureStrips"/>
+    <dgm:cxn modelId="{BE420153-1CCB-0848-9A31-A3291C87D8A9}" type="presParOf" srcId="{E56F1900-67AB-414C-B993-20E46BE57774}" destId="{D778C454-DC8C-4388-9F81-A1EE5166B248}" srcOrd="9" destOrd="0" presId="urn:microsoft.com/office/officeart/2008/layout/PictureStrips"/>
+    <dgm:cxn modelId="{7E2C32D7-4B17-5845-9D50-04A273118F46}" type="presParOf" srcId="{E56F1900-67AB-414C-B993-20E46BE57774}" destId="{3FA118FA-798C-45D4-BAD7-8C277844FB4E}" srcOrd="10" destOrd="0" presId="urn:microsoft.com/office/officeart/2008/layout/PictureStrips"/>
+    <dgm:cxn modelId="{25EDA5FE-1254-8E47-A798-582B1A995A64}" type="presParOf" srcId="{3FA118FA-798C-45D4-BAD7-8C277844FB4E}" destId="{F104F9C3-EA2A-4326-9E78-34028408AB3C}" srcOrd="0" destOrd="0" presId="urn:microsoft.com/office/officeart/2008/layout/PictureStrips"/>
+    <dgm:cxn modelId="{5569C0B6-7F54-2E4D-A1DB-126CFEE2CD99}" type="presParOf" srcId="{3FA118FA-798C-45D4-BAD7-8C277844FB4E}" destId="{45E682B6-A8F2-4968-B3EC-E56725F7806C}" srcOrd="1" destOrd="0" presId="urn:microsoft.com/office/officeart/2008/layout/PictureStrips"/>
+    <dgm:cxn modelId="{42CF544E-C39C-9E45-B400-AA83D42482E7}" type="presParOf" srcId="{E56F1900-67AB-414C-B993-20E46BE57774}" destId="{F50B309C-F4A1-6849-8D7E-D31DCC768DCD}" srcOrd="11" destOrd="0" presId="urn:microsoft.com/office/officeart/2008/layout/PictureStrips"/>
+    <dgm:cxn modelId="{4F6B289B-83EA-4941-94E9-19955DDF2A5A}" type="presParOf" srcId="{E56F1900-67AB-414C-B993-20E46BE57774}" destId="{0D7D6FE0-653B-E14D-8C51-C738E5975A75}" srcOrd="12" destOrd="0" presId="urn:microsoft.com/office/officeart/2008/layout/PictureStrips"/>
+    <dgm:cxn modelId="{2EBAA414-F682-AA41-9965-B146302B8476}" type="presParOf" srcId="{0D7D6FE0-653B-E14D-8C51-C738E5975A75}" destId="{8F971F46-95A4-144A-BF14-6F305FDF0BA9}" srcOrd="0" destOrd="0" presId="urn:microsoft.com/office/officeart/2008/layout/PictureStrips"/>
+    <dgm:cxn modelId="{BB0525C7-DE2C-AD41-8644-C01E2F6AC5D7}" type="presParOf" srcId="{0D7D6FE0-653B-E14D-8C51-C738E5975A75}" destId="{EFB442C9-CD0C-B84D-AAEA-499D0A478595}" srcOrd="1" destOrd="0" presId="urn:microsoft.com/office/officeart/2008/layout/PictureStrips"/>
   </dgm:cxnLst>
   <dgm:bg/>
   <dgm:whole/>
@@ -3468,12 +3635,12 @@
         <a:fontRef idx="minor"/>
       </dsp:style>
       <dsp:txBody>
-        <a:bodyPr spcFirstLastPara="0" vert="horz" wrap="square" lIns="645428" tIns="83820" rIns="83820" bIns="83820" numCol="1" spcCol="1270" anchor="ctr" anchorCtr="0">
+        <a:bodyPr spcFirstLastPara="0" vert="horz" wrap="square" lIns="645428" tIns="38100" rIns="38100" bIns="38100" numCol="1" spcCol="1270" anchor="ctr" anchorCtr="0">
           <a:noAutofit/>
         </a:bodyPr>
         <a:lstStyle/>
         <a:p>
-          <a:pPr marL="0" lvl="0" indent="0" algn="l" defTabSz="977900">
+          <a:pPr marL="0" lvl="0" indent="0" algn="l" defTabSz="444500">
             <a:lnSpc>
               <a:spcPct val="90000"/>
             </a:lnSpc>
@@ -3486,10 +3653,10 @@
             <a:buNone/>
           </a:pPr>
           <a:r>
-            <a:rPr lang="es-ES" sz="2200" kern="1200" dirty="0" err="1"/>
+            <a:rPr lang="es-ES" sz="1000" kern="1200" dirty="0" err="1"/>
             <a:t>Patterns</a:t>
           </a:r>
-          <a:endParaRPr lang="es-ES" sz="2200" kern="1200" dirty="0"/>
+          <a:endParaRPr lang="es-ES" sz="1000" kern="1200" dirty="0"/>
         </a:p>
       </dsp:txBody>
       <dsp:txXfrm>
@@ -3593,12 +3760,12 @@
         <a:fontRef idx="minor"/>
       </dsp:style>
       <dsp:txBody>
-        <a:bodyPr spcFirstLastPara="0" vert="horz" wrap="square" lIns="645428" tIns="83820" rIns="83820" bIns="83820" numCol="1" spcCol="1270" anchor="ctr" anchorCtr="0">
+        <a:bodyPr spcFirstLastPara="0" vert="horz" wrap="square" lIns="645428" tIns="38100" rIns="38100" bIns="38100" numCol="1" spcCol="1270" anchor="ctr" anchorCtr="0">
           <a:noAutofit/>
         </a:bodyPr>
         <a:lstStyle/>
         <a:p>
-          <a:pPr marL="0" lvl="0" indent="0" algn="l" defTabSz="977900">
+          <a:pPr marL="0" lvl="0" indent="0" algn="l" defTabSz="444500">
             <a:lnSpc>
               <a:spcPct val="90000"/>
             </a:lnSpc>
@@ -3611,10 +3778,10 @@
             <a:buNone/>
           </a:pPr>
           <a:r>
-            <a:rPr lang="es-ES" sz="2200" kern="1200" dirty="0" err="1"/>
+            <a:rPr lang="es-ES" sz="1000" kern="1200" dirty="0" err="1"/>
             <a:t>StaticLocalFunctions</a:t>
           </a:r>
-          <a:endParaRPr lang="es-ES" sz="2200" kern="1200" dirty="0"/>
+          <a:endParaRPr lang="es-ES" sz="1000" kern="1200" dirty="0"/>
         </a:p>
       </dsp:txBody>
       <dsp:txXfrm>
@@ -3718,12 +3885,12 @@
         <a:fontRef idx="minor"/>
       </dsp:style>
       <dsp:txBody>
-        <a:bodyPr spcFirstLastPara="0" vert="horz" wrap="square" lIns="645428" tIns="83820" rIns="83820" bIns="83820" numCol="1" spcCol="1270" anchor="ctr" anchorCtr="0">
+        <a:bodyPr spcFirstLastPara="0" vert="horz" wrap="square" lIns="645428" tIns="38100" rIns="38100" bIns="38100" numCol="1" spcCol="1270" anchor="ctr" anchorCtr="0">
           <a:noAutofit/>
         </a:bodyPr>
         <a:lstStyle/>
         <a:p>
-          <a:pPr marL="0" lvl="0" indent="0" algn="l" defTabSz="977900">
+          <a:pPr marL="0" lvl="0" indent="0" algn="l" defTabSz="444500">
             <a:lnSpc>
               <a:spcPct val="90000"/>
             </a:lnSpc>
@@ -3736,18 +3903,18 @@
             <a:buNone/>
           </a:pPr>
           <a:r>
-            <a:rPr lang="es-ES" sz="2200" kern="1200" dirty="0" err="1"/>
+            <a:rPr lang="es-ES" sz="1000" kern="1200" dirty="0" err="1"/>
             <a:t>UsingDeclarationRef</a:t>
           </a:r>
           <a:r>
-            <a:rPr lang="es-ES" sz="2200" kern="1200" dirty="0"/>
+            <a:rPr lang="es-ES" sz="1000" kern="1200" dirty="0"/>
             <a:t> </a:t>
           </a:r>
           <a:r>
-            <a:rPr lang="es-ES" sz="2200" kern="1200" dirty="0" err="1"/>
+            <a:rPr lang="es-ES" sz="1000" kern="1200" dirty="0" err="1"/>
             <a:t>Struct</a:t>
           </a:r>
-          <a:endParaRPr lang="es-ES" sz="2200" kern="1200" dirty="0"/>
+          <a:endParaRPr lang="es-ES" sz="1000" kern="1200" dirty="0"/>
         </a:p>
       </dsp:txBody>
       <dsp:txXfrm>
@@ -3851,12 +4018,12 @@
         <a:fontRef idx="minor"/>
       </dsp:style>
       <dsp:txBody>
-        <a:bodyPr spcFirstLastPara="0" vert="horz" wrap="square" lIns="645428" tIns="83820" rIns="83820" bIns="83820" numCol="1" spcCol="1270" anchor="ctr" anchorCtr="0">
+        <a:bodyPr spcFirstLastPara="0" vert="horz" wrap="square" lIns="645428" tIns="38100" rIns="38100" bIns="38100" numCol="1" spcCol="1270" anchor="ctr" anchorCtr="0">
           <a:noAutofit/>
         </a:bodyPr>
         <a:lstStyle/>
         <a:p>
-          <a:pPr marL="0" lvl="0" indent="0" algn="l" defTabSz="977900">
+          <a:pPr marL="0" lvl="0" indent="0" algn="l" defTabSz="444500">
             <a:lnSpc>
               <a:spcPct val="90000"/>
             </a:lnSpc>
@@ -3869,10 +4036,10 @@
             <a:buNone/>
           </a:pPr>
           <a:r>
-            <a:rPr lang="es-ES" sz="2200" kern="1200" dirty="0" err="1"/>
+            <a:rPr lang="es-ES" sz="1000" kern="1200" dirty="0" err="1"/>
             <a:t>NullableReferences</a:t>
           </a:r>
-          <a:endParaRPr lang="es-ES" sz="2200" kern="1200" dirty="0"/>
+          <a:endParaRPr lang="es-ES" sz="1000" kern="1200" dirty="0"/>
         </a:p>
       </dsp:txBody>
       <dsp:txXfrm>
@@ -3976,12 +4143,12 @@
         <a:fontRef idx="minor"/>
       </dsp:style>
       <dsp:txBody>
-        <a:bodyPr spcFirstLastPara="0" vert="horz" wrap="square" lIns="645428" tIns="83820" rIns="83820" bIns="83820" numCol="1" spcCol="1270" anchor="ctr" anchorCtr="0">
+        <a:bodyPr spcFirstLastPara="0" vert="horz" wrap="square" lIns="645428" tIns="38100" rIns="38100" bIns="38100" numCol="1" spcCol="1270" anchor="ctr" anchorCtr="0">
           <a:noAutofit/>
         </a:bodyPr>
         <a:lstStyle/>
         <a:p>
-          <a:pPr marL="0" lvl="0" indent="0" algn="l" defTabSz="977900">
+          <a:pPr marL="0" lvl="0" indent="0" algn="l" defTabSz="444500">
             <a:lnSpc>
               <a:spcPct val="90000"/>
             </a:lnSpc>
@@ -3994,10 +4161,10 @@
             <a:buNone/>
           </a:pPr>
           <a:r>
-            <a:rPr lang="es-ES" sz="2200" kern="1200" dirty="0" err="1"/>
+            <a:rPr lang="es-ES" sz="1000" kern="1200" dirty="0" err="1"/>
             <a:t>AsyncStream</a:t>
           </a:r>
-          <a:endParaRPr lang="es-ES" sz="2200" kern="1200" dirty="0"/>
+          <a:endParaRPr lang="es-ES" sz="1000" kern="1200" dirty="0"/>
         </a:p>
       </dsp:txBody>
       <dsp:txXfrm>
@@ -4101,12 +4268,12 @@
         <a:fontRef idx="minor"/>
       </dsp:style>
       <dsp:txBody>
-        <a:bodyPr spcFirstLastPara="0" vert="horz" wrap="square" lIns="645428" tIns="83820" rIns="83820" bIns="83820" numCol="1" spcCol="1270" anchor="ctr" anchorCtr="0">
+        <a:bodyPr spcFirstLastPara="0" vert="horz" wrap="square" lIns="645428" tIns="38100" rIns="38100" bIns="38100" numCol="1" spcCol="1270" anchor="ctr" anchorCtr="0">
           <a:noAutofit/>
         </a:bodyPr>
         <a:lstStyle/>
         <a:p>
-          <a:pPr marL="0" lvl="0" indent="0" algn="l" defTabSz="977900">
+          <a:pPr marL="0" lvl="0" indent="0" algn="l" defTabSz="444500">
             <a:lnSpc>
               <a:spcPct val="90000"/>
             </a:lnSpc>
@@ -4119,7 +4286,7 @@
             <a:buNone/>
           </a:pPr>
           <a:r>
-            <a:rPr lang="es-ES" sz="2200" kern="1200" dirty="0"/>
+            <a:rPr lang="es-ES" sz="1000" kern="1200" dirty="0"/>
             <a:t>Default Interfaces Methods</a:t>
           </a:r>
         </a:p>
@@ -4225,12 +4392,12 @@
         <a:fontRef idx="minor"/>
       </dsp:style>
       <dsp:txBody>
-        <a:bodyPr spcFirstLastPara="0" vert="horz" wrap="square" lIns="645428" tIns="83820" rIns="83820" bIns="83820" numCol="1" spcCol="1270" anchor="ctr" anchorCtr="0">
+        <a:bodyPr spcFirstLastPara="0" vert="horz" wrap="square" lIns="645428" tIns="38100" rIns="38100" bIns="38100" numCol="1" spcCol="1270" anchor="t" anchorCtr="0">
           <a:noAutofit/>
         </a:bodyPr>
         <a:lstStyle/>
         <a:p>
-          <a:pPr marL="0" lvl="0" indent="0" algn="l" defTabSz="977900">
+          <a:pPr marL="0" lvl="0" indent="0" algn="l" defTabSz="444500">
             <a:lnSpc>
               <a:spcPct val="90000"/>
             </a:lnSpc>
@@ -4243,10 +4410,108 @@
             <a:buNone/>
           </a:pPr>
           <a:r>
-            <a:rPr lang="es-ES" sz="2200" b="1" kern="1200"/>
+            <a:rPr lang="es-ES" sz="1000" b="1" kern="1200" dirty="0"/>
             <a:t>INDICES Y RANGOS</a:t>
           </a:r>
-          <a:endParaRPr lang="es-ES" sz="2200" kern="1200" dirty="0"/>
+          <a:endParaRPr lang="es-ES" sz="1000" kern="1200" dirty="0"/>
+        </a:p>
+        <a:p>
+          <a:pPr marL="57150" lvl="1" indent="-57150" algn="l" defTabSz="355600">
+            <a:lnSpc>
+              <a:spcPct val="90000"/>
+            </a:lnSpc>
+            <a:spcBef>
+              <a:spcPct val="0"/>
+            </a:spcBef>
+            <a:spcAft>
+              <a:spcPct val="15000"/>
+            </a:spcAft>
+            <a:buChar char="•"/>
+          </a:pPr>
+          <a:r>
+            <a:rPr lang="es-ES" sz="800" b="1" kern="1200" dirty="0" err="1"/>
+            <a:t>System.Index</a:t>
+          </a:r>
+          <a:endParaRPr lang="es-ES" sz="800" kern="1200" dirty="0"/>
+        </a:p>
+        <a:p>
+          <a:pPr marL="57150" lvl="1" indent="-57150" algn="l" defTabSz="355600">
+            <a:lnSpc>
+              <a:spcPct val="90000"/>
+            </a:lnSpc>
+            <a:spcBef>
+              <a:spcPct val="0"/>
+            </a:spcBef>
+            <a:spcAft>
+              <a:spcPct val="15000"/>
+            </a:spcAft>
+            <a:buChar char="•"/>
+          </a:pPr>
+          <a:r>
+            <a:rPr lang="es-ES" sz="800" b="1" kern="1200" dirty="0" err="1"/>
+            <a:t>System.Range</a:t>
+          </a:r>
+          <a:endParaRPr lang="es-ES" sz="800" kern="1200" dirty="0"/>
+        </a:p>
+        <a:p>
+          <a:pPr marL="57150" lvl="1" indent="-57150" algn="l" defTabSz="355600">
+            <a:lnSpc>
+              <a:spcPct val="90000"/>
+            </a:lnSpc>
+            <a:spcBef>
+              <a:spcPct val="0"/>
+            </a:spcBef>
+            <a:spcAft>
+              <a:spcPct val="15000"/>
+            </a:spcAft>
+            <a:buChar char="•"/>
+          </a:pPr>
+          <a:r>
+            <a:rPr lang="es-ES" sz="800" b="1" kern="1200" dirty="0"/>
+            <a:t>Operador </a:t>
+          </a:r>
+          <a:r>
+            <a:rPr lang="es-ES" sz="800" b="1" kern="1200" dirty="0" err="1"/>
+            <a:t>Hat</a:t>
+          </a:r>
+          <a:r>
+            <a:rPr lang="es-ES" sz="800" b="1" kern="1200" dirty="0"/>
+            <a:t> (sombrero) “^”</a:t>
+          </a:r>
+          <a:endParaRPr lang="es-ES" sz="800" kern="1200" dirty="0"/>
+        </a:p>
+        <a:p>
+          <a:pPr marL="57150" lvl="1" indent="-57150" algn="l" defTabSz="355600">
+            <a:lnSpc>
+              <a:spcPct val="90000"/>
+            </a:lnSpc>
+            <a:spcBef>
+              <a:spcPct val="0"/>
+            </a:spcBef>
+            <a:spcAft>
+              <a:spcPct val="15000"/>
+            </a:spcAft>
+            <a:buChar char="•"/>
+          </a:pPr>
+          <a:r>
+            <a:rPr lang="es-ES" sz="800" b="1" kern="1200" dirty="0"/>
+            <a:t>Operador rango “..”</a:t>
+          </a:r>
+        </a:p>
+        <a:p>
+          <a:pPr marL="57150" lvl="1" indent="-57150" algn="l" defTabSz="355600">
+            <a:lnSpc>
+              <a:spcPct val="90000"/>
+            </a:lnSpc>
+            <a:spcBef>
+              <a:spcPct val="0"/>
+            </a:spcBef>
+            <a:spcAft>
+              <a:spcPct val="15000"/>
+            </a:spcAft>
+            <a:buChar char="•"/>
+          </a:pPr>
+          <a:endParaRPr lang="es-ES" sz="800" kern="1200" dirty="0"/>
         </a:p>
       </dsp:txBody>
       <dsp:txXfrm>
@@ -6823,7 +7088,7 @@
           <a:p>
             <a:fld id="{27B8802E-0937-47D4-BC87-B51C9102E14A}" type="datetimeFigureOut">
               <a:rPr lang="es-ES" smtClean="0"/>
-              <a:t>12/7/20</a:t>
+              <a:t>13/7/20</a:t>
             </a:fld>
             <a:endParaRPr lang="es-ES"/>
           </a:p>
@@ -7466,7 +7731,7 @@
                 <a:tabLst/>
                 <a:defRPr/>
               </a:pPr>
-              <a:t>7/12/20 6:22 PM</a:t>
+              <a:t>7/13/20 9:59 PM</a:t>
             </a:fld>
             <a:endParaRPr kumimoji="0" lang="en-US" sz="1200" b="0" i="0" u="none" strike="noStrike" kern="1200" cap="none" spc="0" normalizeH="0" baseline="0" noProof="0" dirty="0">
               <a:ln>
@@ -8233,7 +8498,27 @@
             </a:pPr>
             <a:r>
               <a:rPr lang="en-US" strike="noStrike" baseline="0" dirty="0"/>
-              <a:t>Ranges -&gt; from 1 t N</a:t>
+              <a:t>Ranges:</a:t>
+            </a:r>
+          </a:p>
+          <a:p>
+            <a:pPr marL="628650" lvl="1" indent="-171450">
+              <a:buFontTx/>
+              <a:buChar char="-"/>
+            </a:pPr>
+            <a:r>
+              <a:rPr lang="en-US" strike="noStrike" baseline="0" dirty="0"/>
+              <a:t>Start from 0 (from start)</a:t>
+            </a:r>
+          </a:p>
+          <a:p>
+            <a:pPr marL="628650" lvl="1" indent="-171450">
+              <a:buFontTx/>
+              <a:buChar char="-"/>
+            </a:pPr>
+            <a:r>
+              <a:rPr lang="en-US" strike="noStrike" baseline="0" dirty="0"/>
+              <a:t>Start from 1  (from end)</a:t>
             </a:r>
           </a:p>
         </p:txBody>
@@ -8469,7 +8754,7 @@
                 <a:tabLst/>
                 <a:defRPr/>
               </a:pPr>
-              <a:t>7/12/20 6:32 PM</a:t>
+              <a:t>7/13/20 9:59 PM</a:t>
             </a:fld>
             <a:endParaRPr kumimoji="0" lang="en-US" sz="1200" b="0" i="0" u="none" strike="noStrike" kern="1200" cap="none" spc="0" normalizeH="0" baseline="0" noProof="0" dirty="0">
               <a:ln>
@@ -8628,15 +8913,212 @@
           <a:bodyPr/>
           <a:lstStyle/>
           <a:p>
-            <a:endParaRPr lang="es-ES" sz="1200" kern="1200" dirty="0">
-              <a:solidFill>
-                <a:schemeClr val="tx1"/>
-              </a:solidFill>
-              <a:effectLst/>
-              <a:latin typeface="+mn-lt"/>
-              <a:ea typeface="+mn-ea"/>
-              <a:cs typeface="+mn-cs"/>
-            </a:endParaRPr>
+            <a:r>
+              <a:rPr lang="es-ES" sz="1200" kern="1200" dirty="0">
+                <a:solidFill>
+                  <a:schemeClr val="tx1"/>
+                </a:solidFill>
+                <a:effectLst/>
+                <a:latin typeface="+mn-lt"/>
+                <a:ea typeface="+mn-ea"/>
+                <a:cs typeface="+mn-cs"/>
+              </a:rPr>
+              <a:t>Quick </a:t>
+            </a:r>
+            <a:r>
+              <a:rPr lang="es-ES" sz="1200" kern="1200" dirty="0" err="1">
+                <a:solidFill>
+                  <a:schemeClr val="tx1"/>
+                </a:solidFill>
+                <a:effectLst/>
+                <a:latin typeface="+mn-lt"/>
+                <a:ea typeface="+mn-ea"/>
+                <a:cs typeface="+mn-cs"/>
+              </a:rPr>
+              <a:t>questions</a:t>
+            </a:r>
+            <a:r>
+              <a:rPr lang="es-ES" sz="1200" kern="1200" dirty="0">
+                <a:solidFill>
+                  <a:schemeClr val="tx1"/>
+                </a:solidFill>
+                <a:effectLst/>
+                <a:latin typeface="+mn-lt"/>
+                <a:ea typeface="+mn-ea"/>
+                <a:cs typeface="+mn-cs"/>
+              </a:rPr>
+              <a:t>?</a:t>
+            </a:r>
+          </a:p>
+          <a:p>
+            <a:r>
+              <a:rPr lang="es-ES" sz="1200" kern="1200" dirty="0" err="1">
+                <a:solidFill>
+                  <a:schemeClr val="tx1"/>
+                </a:solidFill>
+                <a:effectLst/>
+                <a:latin typeface="+mn-lt"/>
+                <a:ea typeface="+mn-ea"/>
+                <a:cs typeface="+mn-cs"/>
+              </a:rPr>
+              <a:t>Does</a:t>
+            </a:r>
+            <a:r>
+              <a:rPr lang="es-ES" sz="1200" kern="1200" dirty="0">
+                <a:solidFill>
+                  <a:schemeClr val="tx1"/>
+                </a:solidFill>
+                <a:effectLst/>
+                <a:latin typeface="+mn-lt"/>
+                <a:ea typeface="+mn-ea"/>
+                <a:cs typeface="+mn-cs"/>
+              </a:rPr>
+              <a:t> </a:t>
+            </a:r>
+            <a:r>
+              <a:rPr lang="es-ES" sz="1200" kern="1200" dirty="0" err="1">
+                <a:solidFill>
+                  <a:schemeClr val="tx1"/>
+                </a:solidFill>
+                <a:effectLst/>
+                <a:latin typeface="+mn-lt"/>
+                <a:ea typeface="+mn-ea"/>
+                <a:cs typeface="+mn-cs"/>
+              </a:rPr>
+              <a:t>anyone</a:t>
+            </a:r>
+            <a:r>
+              <a:rPr lang="es-ES" sz="1200" kern="1200" dirty="0">
+                <a:solidFill>
+                  <a:schemeClr val="tx1"/>
+                </a:solidFill>
+                <a:effectLst/>
+                <a:latin typeface="+mn-lt"/>
+                <a:ea typeface="+mn-ea"/>
+                <a:cs typeface="+mn-cs"/>
+              </a:rPr>
+              <a:t> </a:t>
+            </a:r>
+            <a:r>
+              <a:rPr lang="es-ES" sz="1200" kern="1200" dirty="0" err="1">
+                <a:solidFill>
+                  <a:schemeClr val="tx1"/>
+                </a:solidFill>
+                <a:effectLst/>
+                <a:latin typeface="+mn-lt"/>
+                <a:ea typeface="+mn-ea"/>
+                <a:cs typeface="+mn-cs"/>
+              </a:rPr>
+              <a:t>remember</a:t>
+            </a:r>
+            <a:r>
+              <a:rPr lang="es-ES" sz="1200" kern="1200" dirty="0">
+                <a:solidFill>
+                  <a:schemeClr val="tx1"/>
+                </a:solidFill>
+                <a:effectLst/>
+                <a:latin typeface="+mn-lt"/>
+                <a:ea typeface="+mn-ea"/>
+                <a:cs typeface="+mn-cs"/>
+              </a:rPr>
+              <a:t> and can </a:t>
+            </a:r>
+            <a:r>
+              <a:rPr lang="es-ES" sz="1200" kern="1200" dirty="0" err="1">
+                <a:solidFill>
+                  <a:schemeClr val="tx1"/>
+                </a:solidFill>
+                <a:effectLst/>
+                <a:latin typeface="+mn-lt"/>
+                <a:ea typeface="+mn-ea"/>
+                <a:cs typeface="+mn-cs"/>
+              </a:rPr>
+              <a:t>tell</a:t>
+            </a:r>
+            <a:r>
+              <a:rPr lang="es-ES" sz="1200" kern="1200" dirty="0">
+                <a:solidFill>
+                  <a:schemeClr val="tx1"/>
+                </a:solidFill>
+                <a:effectLst/>
+                <a:latin typeface="+mn-lt"/>
+                <a:ea typeface="+mn-ea"/>
+                <a:cs typeface="+mn-cs"/>
+              </a:rPr>
+              <a:t> </a:t>
+            </a:r>
+            <a:r>
+              <a:rPr lang="es-ES" sz="1200" kern="1200" dirty="0" err="1">
+                <a:solidFill>
+                  <a:schemeClr val="tx1"/>
+                </a:solidFill>
+                <a:effectLst/>
+                <a:latin typeface="+mn-lt"/>
+                <a:ea typeface="+mn-ea"/>
+                <a:cs typeface="+mn-cs"/>
+              </a:rPr>
+              <a:t>us</a:t>
+            </a:r>
+            <a:r>
+              <a:rPr lang="es-ES" sz="1200" kern="1200" dirty="0">
+                <a:solidFill>
+                  <a:schemeClr val="tx1"/>
+                </a:solidFill>
+                <a:effectLst/>
+                <a:latin typeface="+mn-lt"/>
+                <a:ea typeface="+mn-ea"/>
+                <a:cs typeface="+mn-cs"/>
+              </a:rPr>
+              <a:t> </a:t>
+            </a:r>
+            <a:r>
+              <a:rPr lang="es-ES" sz="1200" kern="1200" dirty="0" err="1">
+                <a:solidFill>
+                  <a:schemeClr val="tx1"/>
+                </a:solidFill>
+                <a:effectLst/>
+                <a:latin typeface="+mn-lt"/>
+                <a:ea typeface="+mn-ea"/>
+                <a:cs typeface="+mn-cs"/>
+              </a:rPr>
+              <a:t>any</a:t>
+            </a:r>
+            <a:r>
+              <a:rPr lang="es-ES" sz="1200" kern="1200" dirty="0">
+                <a:solidFill>
+                  <a:schemeClr val="tx1"/>
+                </a:solidFill>
+                <a:effectLst/>
+                <a:latin typeface="+mn-lt"/>
+                <a:ea typeface="+mn-ea"/>
+                <a:cs typeface="+mn-cs"/>
+              </a:rPr>
+              <a:t> C# 7.0 </a:t>
+            </a:r>
+            <a:r>
+              <a:rPr lang="es-ES" sz="1200" kern="1200" dirty="0" err="1">
+                <a:solidFill>
+                  <a:schemeClr val="tx1"/>
+                </a:solidFill>
+                <a:effectLst/>
+                <a:latin typeface="+mn-lt"/>
+                <a:ea typeface="+mn-ea"/>
+                <a:cs typeface="+mn-cs"/>
+              </a:rPr>
+              <a:t>feature</a:t>
+            </a:r>
+            <a:r>
+              <a:rPr lang="es-ES" sz="1200" kern="1200" dirty="0">
+                <a:solidFill>
+                  <a:schemeClr val="tx1"/>
+                </a:solidFill>
+                <a:effectLst/>
+                <a:latin typeface="+mn-lt"/>
+                <a:ea typeface="+mn-ea"/>
+                <a:cs typeface="+mn-cs"/>
+              </a:rPr>
+              <a:t> ?</a:t>
+            </a:r>
           </a:p>
         </p:txBody>
       </p:sp>
@@ -8871,7 +9353,7 @@
                 <a:tabLst/>
                 <a:defRPr/>
               </a:pPr>
-              <a:t>7/12/20 6:22 PM</a:t>
+              <a:t>7/13/20 10:00 PM</a:t>
             </a:fld>
             <a:endParaRPr kumimoji="0" lang="en-US" sz="1200" b="0" i="0" u="none" strike="noStrike" kern="1200" cap="none" spc="0" normalizeH="0" baseline="0" noProof="0" dirty="0">
               <a:ln>
@@ -8976,7 +9458,7 @@
     </p:spTree>
     <p:extLst>
       <p:ext uri="{BB962C8B-B14F-4D97-AF65-F5344CB8AC3E}">
-        <p14:creationId xmlns:p14="http://schemas.microsoft.com/office/powerpoint/2010/main" val="3537189835"/>
+        <p14:creationId xmlns:p14="http://schemas.microsoft.com/office/powerpoint/2010/main" val="3746700771"/>
       </p:ext>
     </p:extLst>
   </p:cSld>
@@ -9273,7 +9755,7 @@
                 <a:tabLst/>
                 <a:defRPr/>
               </a:pPr>
-              <a:t>7/12/20 6:22 PM</a:t>
+              <a:t>7/13/20 9:59 PM</a:t>
             </a:fld>
             <a:endParaRPr kumimoji="0" lang="en-US" sz="1200" b="0" i="0" u="none" strike="noStrike" kern="1200" cap="none" spc="0" normalizeH="0" baseline="0" noProof="0" dirty="0">
               <a:ln>
@@ -9356,7 +9838,7 @@
                 <a:tabLst/>
                 <a:defRPr/>
               </a:pPr>
-              <a:t>6</a:t>
+              <a:t>5</a:t>
             </a:fld>
             <a:endParaRPr kumimoji="0" lang="en-US" sz="1200" b="0" i="0" u="none" strike="noStrike" kern="1200" cap="none" spc="0" normalizeH="0" baseline="0" noProof="0" dirty="0">
               <a:ln>
@@ -9378,7 +9860,7 @@
     </p:spTree>
     <p:extLst>
       <p:ext uri="{BB962C8B-B14F-4D97-AF65-F5344CB8AC3E}">
-        <p14:creationId xmlns:p14="http://schemas.microsoft.com/office/powerpoint/2010/main" val="2439772390"/>
+        <p14:creationId xmlns:p14="http://schemas.microsoft.com/office/powerpoint/2010/main" val="3537189835"/>
       </p:ext>
     </p:extLst>
   </p:cSld>
@@ -9432,722 +9914,6 @@
           <a:bodyPr/>
           <a:lstStyle/>
           <a:p>
-            <a:r>
-              <a:rPr lang="en-US" sz="1200" b="0" i="0" u="none" strike="noStrike" kern="1200" dirty="0">
-                <a:solidFill>
-                  <a:schemeClr val="tx1"/>
-                </a:solidFill>
-                <a:effectLst/>
-                <a:latin typeface="+mn-lt"/>
-                <a:ea typeface="+mn-ea"/>
-                <a:cs typeface="+mn-cs"/>
-              </a:rPr>
-              <a:t>C# 6.0 </a:t>
-            </a:r>
-            <a:r>
-              <a:rPr lang="en-US" sz="1200" b="0" i="0" u="none" strike="noStrike" kern="1200" dirty="0" err="1">
-                <a:solidFill>
-                  <a:schemeClr val="tx1"/>
-                </a:solidFill>
-                <a:effectLst/>
-                <a:latin typeface="+mn-lt"/>
-                <a:ea typeface="+mn-ea"/>
-                <a:cs typeface="+mn-cs"/>
-              </a:rPr>
-              <a:t>es</a:t>
-            </a:r>
-            <a:r>
-              <a:rPr lang="en-US" sz="1200" b="0" i="0" u="none" strike="noStrike" kern="1200" dirty="0">
-                <a:solidFill>
-                  <a:schemeClr val="tx1"/>
-                </a:solidFill>
-                <a:effectLst/>
-                <a:latin typeface="+mn-lt"/>
-                <a:ea typeface="+mn-ea"/>
-                <a:cs typeface="+mn-cs"/>
-              </a:rPr>
-              <a:t> compatible</a:t>
-            </a:r>
-            <a:r>
-              <a:rPr lang="en-US" sz="1200" b="0" i="0" u="none" strike="noStrike" kern="1200" baseline="0" dirty="0">
-                <a:solidFill>
-                  <a:schemeClr val="tx1"/>
-                </a:solidFill>
-                <a:effectLst/>
-                <a:latin typeface="+mn-lt"/>
-                <a:ea typeface="+mn-ea"/>
-                <a:cs typeface="+mn-cs"/>
-              </a:rPr>
-              <a:t> con </a:t>
-            </a:r>
-            <a:r>
-              <a:rPr lang="en-US" sz="1200" b="0" i="0" u="none" strike="noStrike" kern="1200" baseline="0" dirty="0" err="1">
-                <a:solidFill>
-                  <a:schemeClr val="tx1"/>
-                </a:solidFill>
-                <a:effectLst/>
-                <a:latin typeface="+mn-lt"/>
-                <a:ea typeface="+mn-ea"/>
-                <a:cs typeface="+mn-cs"/>
-              </a:rPr>
-              <a:t>.N</a:t>
-            </a:r>
-            <a:r>
-              <a:rPr lang="en-US" sz="1200" b="0" i="0" u="none" strike="noStrike" kern="1200" dirty="0" err="1">
-                <a:solidFill>
-                  <a:schemeClr val="tx1"/>
-                </a:solidFill>
-                <a:effectLst/>
-                <a:latin typeface="+mn-lt"/>
-                <a:ea typeface="+mn-ea"/>
-                <a:cs typeface="+mn-cs"/>
-              </a:rPr>
-              <a:t>et</a:t>
-            </a:r>
-            <a:r>
-              <a:rPr lang="en-US" sz="1200" b="0" i="0" u="none" strike="noStrike" kern="1200" dirty="0">
-                <a:solidFill>
-                  <a:schemeClr val="tx1"/>
-                </a:solidFill>
-                <a:effectLst/>
-                <a:latin typeface="+mn-lt"/>
-                <a:ea typeface="+mn-ea"/>
-                <a:cs typeface="+mn-cs"/>
-              </a:rPr>
-              <a:t> framework </a:t>
-            </a:r>
-            <a:r>
-              <a:rPr lang="en-US" sz="1200" b="0" i="0" u="none" strike="noStrike" kern="1200" dirty="0" err="1">
-                <a:solidFill>
-                  <a:schemeClr val="tx1"/>
-                </a:solidFill>
-                <a:effectLst/>
-                <a:latin typeface="+mn-lt"/>
-                <a:ea typeface="+mn-ea"/>
-                <a:cs typeface="+mn-cs"/>
-              </a:rPr>
-              <a:t>desde</a:t>
-            </a:r>
-            <a:r>
-              <a:rPr lang="en-US" sz="1200" b="0" i="0" u="none" strike="noStrike" kern="1200" dirty="0">
-                <a:solidFill>
-                  <a:schemeClr val="tx1"/>
-                </a:solidFill>
-                <a:effectLst/>
-                <a:latin typeface="+mn-lt"/>
-                <a:ea typeface="+mn-ea"/>
-                <a:cs typeface="+mn-cs"/>
-              </a:rPr>
-              <a:t> la v2.0 hasta</a:t>
-            </a:r>
-            <a:r>
-              <a:rPr lang="en-US" sz="1200" b="0" i="0" u="none" strike="noStrike" kern="1200" baseline="0" dirty="0">
-                <a:solidFill>
-                  <a:schemeClr val="tx1"/>
-                </a:solidFill>
-                <a:effectLst/>
-                <a:latin typeface="+mn-lt"/>
-                <a:ea typeface="+mn-ea"/>
-                <a:cs typeface="+mn-cs"/>
-              </a:rPr>
-              <a:t> </a:t>
-            </a:r>
-            <a:r>
-              <a:rPr lang="en-US" sz="1200" b="0" i="0" u="none" strike="noStrike" kern="1200" dirty="0">
-                <a:solidFill>
-                  <a:schemeClr val="tx1"/>
-                </a:solidFill>
-                <a:effectLst/>
-                <a:latin typeface="+mn-lt"/>
-                <a:ea typeface="+mn-ea"/>
-                <a:cs typeface="+mn-cs"/>
-              </a:rPr>
-              <a:t> la 4.6. No require de </a:t>
-            </a:r>
-            <a:r>
-              <a:rPr lang="en-US" sz="1200" b="0" i="0" u="none" strike="noStrike" kern="1200" dirty="0" err="1">
-                <a:solidFill>
-                  <a:schemeClr val="tx1"/>
-                </a:solidFill>
-                <a:effectLst/>
-                <a:latin typeface="+mn-lt"/>
-                <a:ea typeface="+mn-ea"/>
-                <a:cs typeface="+mn-cs"/>
-              </a:rPr>
-              <a:t>ninguna</a:t>
-            </a:r>
-            <a:r>
-              <a:rPr lang="en-US" sz="1200" b="0" i="0" u="none" strike="noStrike" kern="1200" dirty="0">
-                <a:solidFill>
-                  <a:schemeClr val="tx1"/>
-                </a:solidFill>
-                <a:effectLst/>
-                <a:latin typeface="+mn-lt"/>
-                <a:ea typeface="+mn-ea"/>
-                <a:cs typeface="+mn-cs"/>
-              </a:rPr>
-              <a:t> version mayor</a:t>
-            </a:r>
-            <a:r>
-              <a:rPr lang="en-US" sz="1200" b="0" i="0" u="none" strike="noStrike" kern="1200" baseline="0" dirty="0">
-                <a:solidFill>
-                  <a:schemeClr val="tx1"/>
-                </a:solidFill>
-                <a:effectLst/>
-                <a:latin typeface="+mn-lt"/>
-                <a:ea typeface="+mn-ea"/>
-                <a:cs typeface="+mn-cs"/>
-              </a:rPr>
-              <a:t> de </a:t>
-            </a:r>
-            <a:r>
-              <a:rPr lang="en-US" sz="1200" b="0" i="0" u="none" strike="noStrike" kern="1200" dirty="0" err="1">
-                <a:solidFill>
-                  <a:schemeClr val="tx1"/>
-                </a:solidFill>
-                <a:effectLst/>
-                <a:latin typeface="+mn-lt"/>
-                <a:ea typeface="+mn-ea"/>
-                <a:cs typeface="+mn-cs"/>
-              </a:rPr>
-              <a:t>.net</a:t>
-            </a:r>
-            <a:r>
-              <a:rPr lang="en-US" sz="1200" b="0" i="0" u="none" strike="noStrike" kern="1200" dirty="0">
-                <a:solidFill>
-                  <a:schemeClr val="tx1"/>
-                </a:solidFill>
-                <a:effectLst/>
-                <a:latin typeface="+mn-lt"/>
-                <a:ea typeface="+mn-ea"/>
-                <a:cs typeface="+mn-cs"/>
-              </a:rPr>
-              <a:t> framework </a:t>
-            </a:r>
-            <a:r>
-              <a:rPr lang="en-US" sz="1200" b="0" i="0" u="none" strike="noStrike" kern="1200" dirty="0" err="1">
-                <a:solidFill>
-                  <a:schemeClr val="tx1"/>
-                </a:solidFill>
-                <a:effectLst/>
-                <a:latin typeface="+mn-lt"/>
-                <a:ea typeface="+mn-ea"/>
-                <a:cs typeface="+mn-cs"/>
-              </a:rPr>
-              <a:t>pero</a:t>
-            </a:r>
-            <a:r>
-              <a:rPr lang="en-US" sz="1200" b="0" i="0" u="none" strike="noStrike" kern="1200" dirty="0">
-                <a:solidFill>
-                  <a:schemeClr val="tx1"/>
-                </a:solidFill>
-                <a:effectLst/>
-                <a:latin typeface="+mn-lt"/>
-                <a:ea typeface="+mn-ea"/>
-                <a:cs typeface="+mn-cs"/>
-              </a:rPr>
-              <a:t> </a:t>
-            </a:r>
-            <a:r>
-              <a:rPr lang="en-US" sz="1200" b="0" i="0" u="none" strike="noStrike" kern="1200" dirty="0" err="1">
-                <a:solidFill>
-                  <a:schemeClr val="tx1"/>
-                </a:solidFill>
-                <a:effectLst/>
-                <a:latin typeface="+mn-lt"/>
-                <a:ea typeface="+mn-ea"/>
-                <a:cs typeface="+mn-cs"/>
-              </a:rPr>
-              <a:t>necesita</a:t>
-            </a:r>
-            <a:r>
-              <a:rPr lang="en-US" sz="1200" b="0" i="0" u="none" strike="noStrike" kern="1200" dirty="0">
-                <a:solidFill>
-                  <a:schemeClr val="tx1"/>
-                </a:solidFill>
-                <a:effectLst/>
-                <a:latin typeface="+mn-lt"/>
-                <a:ea typeface="+mn-ea"/>
-                <a:cs typeface="+mn-cs"/>
-              </a:rPr>
-              <a:t> </a:t>
-            </a:r>
-            <a:r>
-              <a:rPr lang="en-US" sz="1200" b="0" i="0" u="none" strike="noStrike" kern="1200" dirty="0" err="1">
-                <a:solidFill>
-                  <a:schemeClr val="tx1"/>
-                </a:solidFill>
-                <a:effectLst/>
-                <a:latin typeface="+mn-lt"/>
-                <a:ea typeface="+mn-ea"/>
-                <a:cs typeface="+mn-cs"/>
-              </a:rPr>
-              <a:t>una</a:t>
-            </a:r>
-            <a:r>
-              <a:rPr lang="en-US" sz="1200" b="0" i="0" u="none" strike="noStrike" kern="1200" dirty="0">
-                <a:solidFill>
-                  <a:schemeClr val="tx1"/>
-                </a:solidFill>
-                <a:effectLst/>
-                <a:latin typeface="+mn-lt"/>
-                <a:ea typeface="+mn-ea"/>
-                <a:cs typeface="+mn-cs"/>
-              </a:rPr>
-              <a:t> version superior de Visual Studio:</a:t>
-            </a:r>
-            <a:r>
-              <a:rPr lang="en-US" sz="1200" b="0" i="0" u="none" strike="noStrike" kern="1200" baseline="0" dirty="0">
-                <a:solidFill>
-                  <a:schemeClr val="tx1"/>
-                </a:solidFill>
-                <a:effectLst/>
-                <a:latin typeface="+mn-lt"/>
-                <a:ea typeface="+mn-ea"/>
-                <a:cs typeface="+mn-cs"/>
-              </a:rPr>
-              <a:t> 2015 o superior.</a:t>
-            </a:r>
-          </a:p>
-          <a:p>
-            <a:r>
-              <a:rPr lang="en-US" sz="1200" b="0" i="0" u="none" strike="noStrike" kern="1200" baseline="0" dirty="0" err="1">
-                <a:solidFill>
-                  <a:schemeClr val="tx1"/>
-                </a:solidFill>
-                <a:effectLst/>
-                <a:latin typeface="+mn-lt"/>
-                <a:ea typeface="+mn-ea"/>
-                <a:cs typeface="+mn-cs"/>
-              </a:rPr>
-              <a:t>Existen</a:t>
-            </a:r>
-            <a:r>
-              <a:rPr lang="en-US" sz="1200" b="0" i="0" u="none" strike="noStrike" kern="1200" baseline="0" dirty="0">
-                <a:solidFill>
-                  <a:schemeClr val="tx1"/>
-                </a:solidFill>
-                <a:effectLst/>
-                <a:latin typeface="+mn-lt"/>
-                <a:ea typeface="+mn-ea"/>
-                <a:cs typeface="+mn-cs"/>
-              </a:rPr>
-              <a:t> </a:t>
-            </a:r>
-            <a:r>
-              <a:rPr lang="en-US" sz="1200" b="0" i="0" u="none" strike="noStrike" kern="1200" baseline="0" dirty="0" err="1">
-                <a:solidFill>
-                  <a:schemeClr val="tx1"/>
-                </a:solidFill>
-                <a:effectLst/>
-                <a:latin typeface="+mn-lt"/>
-                <a:ea typeface="+mn-ea"/>
-                <a:cs typeface="+mn-cs"/>
-              </a:rPr>
-              <a:t>alguna</a:t>
-            </a:r>
-            <a:r>
-              <a:rPr lang="en-US" sz="1200" b="0" i="0" u="none" strike="noStrike" kern="1200" baseline="0" dirty="0">
-                <a:solidFill>
-                  <a:schemeClr val="tx1"/>
-                </a:solidFill>
-                <a:effectLst/>
-                <a:latin typeface="+mn-lt"/>
-                <a:ea typeface="+mn-ea"/>
-                <a:cs typeface="+mn-cs"/>
-              </a:rPr>
-              <a:t> </a:t>
-            </a:r>
-            <a:r>
-              <a:rPr lang="en-US" sz="1200" b="0" i="0" u="none" strike="noStrike" kern="1200" baseline="0" dirty="0" err="1">
-                <a:solidFill>
-                  <a:schemeClr val="tx1"/>
-                </a:solidFill>
-                <a:effectLst/>
-                <a:latin typeface="+mn-lt"/>
-                <a:ea typeface="+mn-ea"/>
-                <a:cs typeface="+mn-cs"/>
-              </a:rPr>
-              <a:t>excepciones</a:t>
-            </a:r>
-            <a:r>
-              <a:rPr lang="en-US" sz="1200" b="0" i="0" u="none" strike="noStrike" kern="1200" baseline="0" dirty="0">
-                <a:solidFill>
-                  <a:schemeClr val="tx1"/>
-                </a:solidFill>
-                <a:effectLst/>
-                <a:latin typeface="+mn-lt"/>
-                <a:ea typeface="+mn-ea"/>
-                <a:cs typeface="+mn-cs"/>
-              </a:rPr>
-              <a:t>: </a:t>
-            </a:r>
-            <a:r>
-              <a:rPr lang="en-US" sz="1200" b="0" i="0" u="none" strike="noStrike" kern="1200" baseline="0" dirty="0" err="1">
-                <a:solidFill>
-                  <a:schemeClr val="tx1"/>
-                </a:solidFill>
-                <a:effectLst/>
-                <a:latin typeface="+mn-lt"/>
-                <a:ea typeface="+mn-ea"/>
-                <a:cs typeface="+mn-cs"/>
-              </a:rPr>
-              <a:t>Ej</a:t>
-            </a:r>
-            <a:r>
-              <a:rPr lang="en-US" sz="1200" b="0" i="0" u="none" strike="noStrike" kern="1200" baseline="0" dirty="0">
-                <a:solidFill>
-                  <a:schemeClr val="tx1"/>
-                </a:solidFill>
-                <a:effectLst/>
-                <a:latin typeface="+mn-lt"/>
-                <a:ea typeface="+mn-ea"/>
-                <a:cs typeface="+mn-cs"/>
-              </a:rPr>
-              <a:t>: La </a:t>
-            </a:r>
-            <a:r>
-              <a:rPr lang="en-US" sz="1200" b="0" i="0" u="none" strike="noStrike" kern="1200" baseline="0" dirty="0" err="1">
-                <a:solidFill>
-                  <a:schemeClr val="tx1"/>
-                </a:solidFill>
-                <a:effectLst/>
-                <a:latin typeface="+mn-lt"/>
-                <a:ea typeface="+mn-ea"/>
-                <a:cs typeface="+mn-cs"/>
-              </a:rPr>
-              <a:t>interpolación</a:t>
-            </a:r>
-            <a:r>
-              <a:rPr lang="en-US" sz="1200" b="0" i="0" u="none" strike="noStrike" kern="1200" baseline="0" dirty="0">
-                <a:solidFill>
-                  <a:schemeClr val="tx1"/>
-                </a:solidFill>
-                <a:effectLst/>
-                <a:latin typeface="+mn-lt"/>
-                <a:ea typeface="+mn-ea"/>
-                <a:cs typeface="+mn-cs"/>
-              </a:rPr>
-              <a:t> de </a:t>
-            </a:r>
-            <a:r>
-              <a:rPr lang="en-US" sz="1200" b="0" i="0" u="none" strike="noStrike" kern="1200" baseline="0" dirty="0" err="1">
-                <a:solidFill>
-                  <a:schemeClr val="tx1"/>
-                </a:solidFill>
-                <a:effectLst/>
-                <a:latin typeface="+mn-lt"/>
-                <a:ea typeface="+mn-ea"/>
-                <a:cs typeface="+mn-cs"/>
-              </a:rPr>
-              <a:t>cadenas</a:t>
-            </a:r>
-            <a:r>
-              <a:rPr lang="en-US" sz="1200" b="0" i="0" u="none" strike="noStrike" kern="1200" baseline="0" dirty="0">
-                <a:solidFill>
-                  <a:schemeClr val="tx1"/>
-                </a:solidFill>
-                <a:effectLst/>
-                <a:latin typeface="+mn-lt"/>
-                <a:ea typeface="+mn-ea"/>
-                <a:cs typeface="+mn-cs"/>
-              </a:rPr>
-              <a:t> la </a:t>
-            </a:r>
-            <a:r>
-              <a:rPr lang="en-US" sz="1200" b="0" i="0" u="none" strike="noStrike" kern="1200" baseline="0" dirty="0" err="1">
-                <a:solidFill>
-                  <a:schemeClr val="tx1"/>
-                </a:solidFill>
-                <a:effectLst/>
-                <a:latin typeface="+mn-lt"/>
-                <a:ea typeface="+mn-ea"/>
-                <a:cs typeface="+mn-cs"/>
-              </a:rPr>
-              <a:t>soporta</a:t>
-            </a:r>
-            <a:r>
-              <a:rPr lang="en-US" sz="1200" b="0" i="0" u="none" strike="noStrike" kern="1200" baseline="0" dirty="0">
-                <a:solidFill>
-                  <a:schemeClr val="tx1"/>
-                </a:solidFill>
-                <a:effectLst/>
-                <a:latin typeface="+mn-lt"/>
-                <a:ea typeface="+mn-ea"/>
-                <a:cs typeface="+mn-cs"/>
-              </a:rPr>
-              <a:t>, </a:t>
-            </a:r>
-            <a:r>
-              <a:rPr lang="en-US" sz="1200" b="0" i="0" u="none" strike="noStrike" kern="1200" baseline="0" dirty="0" err="1">
-                <a:solidFill>
-                  <a:schemeClr val="tx1"/>
-                </a:solidFill>
-                <a:effectLst/>
-                <a:latin typeface="+mn-lt"/>
-                <a:ea typeface="+mn-ea"/>
-                <a:cs typeface="+mn-cs"/>
-              </a:rPr>
-              <a:t>si</a:t>
-            </a:r>
-            <a:r>
-              <a:rPr lang="en-US" sz="1200" b="0" i="0" u="none" strike="noStrike" kern="1200" baseline="0" dirty="0">
-                <a:solidFill>
-                  <a:schemeClr val="tx1"/>
-                </a:solidFill>
-                <a:effectLst/>
-                <a:latin typeface="+mn-lt"/>
-                <a:ea typeface="+mn-ea"/>
-                <a:cs typeface="+mn-cs"/>
-              </a:rPr>
-              <a:t> </a:t>
-            </a:r>
-            <a:r>
-              <a:rPr lang="en-US" sz="1200" b="0" i="0" u="none" strike="noStrike" kern="1200" baseline="0" dirty="0" err="1">
-                <a:solidFill>
-                  <a:schemeClr val="tx1"/>
-                </a:solidFill>
-                <a:effectLst/>
-                <a:latin typeface="+mn-lt"/>
-                <a:ea typeface="+mn-ea"/>
-                <a:cs typeface="+mn-cs"/>
-              </a:rPr>
-              <a:t>bien</a:t>
-            </a:r>
-            <a:r>
-              <a:rPr lang="en-US" sz="1200" b="0" i="0" u="none" strike="noStrike" kern="1200" baseline="0" dirty="0">
-                <a:solidFill>
-                  <a:schemeClr val="tx1"/>
-                </a:solidFill>
-                <a:effectLst/>
-                <a:latin typeface="+mn-lt"/>
-                <a:ea typeface="+mn-ea"/>
-                <a:cs typeface="+mn-cs"/>
-              </a:rPr>
-              <a:t>, </a:t>
-            </a:r>
-            <a:r>
-              <a:rPr lang="en-US" sz="1200" b="0" i="0" u="none" strike="noStrike" kern="1200" baseline="0" dirty="0" err="1">
-                <a:solidFill>
-                  <a:schemeClr val="tx1"/>
-                </a:solidFill>
-                <a:effectLst/>
-                <a:latin typeface="+mn-lt"/>
-                <a:ea typeface="+mn-ea"/>
-                <a:cs typeface="+mn-cs"/>
-              </a:rPr>
-              <a:t>IFormatable</a:t>
-            </a:r>
-            <a:r>
-              <a:rPr lang="en-US" sz="1200" b="0" i="0" u="none" strike="noStrike" kern="1200" baseline="0" dirty="0">
-                <a:solidFill>
-                  <a:schemeClr val="tx1"/>
-                </a:solidFill>
-                <a:effectLst/>
-                <a:latin typeface="+mn-lt"/>
-                <a:ea typeface="+mn-ea"/>
-                <a:cs typeface="+mn-cs"/>
-              </a:rPr>
-              <a:t> NO!</a:t>
-            </a:r>
-          </a:p>
-          <a:p>
-            <a:r>
-              <a:rPr lang="en-US" sz="1200" b="0" i="0" u="none" strike="noStrike" kern="1200" baseline="0" dirty="0" err="1">
-                <a:solidFill>
-                  <a:schemeClr val="tx1"/>
-                </a:solidFill>
-                <a:effectLst/>
-                <a:latin typeface="+mn-lt"/>
-                <a:ea typeface="+mn-ea"/>
-                <a:cs typeface="+mn-cs"/>
-              </a:rPr>
-              <a:t>Basicamente</a:t>
-            </a:r>
-            <a:r>
-              <a:rPr lang="en-US" sz="1200" b="0" i="0" u="none" strike="noStrike" kern="1200" baseline="0" dirty="0">
-                <a:solidFill>
-                  <a:schemeClr val="tx1"/>
-                </a:solidFill>
-                <a:effectLst/>
-                <a:latin typeface="+mn-lt"/>
-                <a:ea typeface="+mn-ea"/>
-                <a:cs typeface="+mn-cs"/>
-              </a:rPr>
-              <a:t> se </a:t>
-            </a:r>
-            <a:r>
-              <a:rPr lang="en-US" sz="1200" b="0" i="0" u="none" strike="noStrike" kern="1200" baseline="0" dirty="0" err="1">
-                <a:solidFill>
-                  <a:schemeClr val="tx1"/>
-                </a:solidFill>
-                <a:effectLst/>
-                <a:latin typeface="+mn-lt"/>
-                <a:ea typeface="+mn-ea"/>
-                <a:cs typeface="+mn-cs"/>
-              </a:rPr>
-              <a:t>trata</a:t>
-            </a:r>
-            <a:r>
-              <a:rPr lang="en-US" sz="1200" b="0" i="0" u="none" strike="noStrike" kern="1200" baseline="0" dirty="0">
-                <a:solidFill>
-                  <a:schemeClr val="tx1"/>
-                </a:solidFill>
-                <a:effectLst/>
-                <a:latin typeface="+mn-lt"/>
-                <a:ea typeface="+mn-ea"/>
-                <a:cs typeface="+mn-cs"/>
-              </a:rPr>
-              <a:t> del </a:t>
-            </a:r>
-            <a:r>
-              <a:rPr lang="en-US" sz="1200" b="0" i="0" u="none" strike="noStrike" kern="1200" baseline="0" dirty="0" err="1">
-                <a:solidFill>
-                  <a:schemeClr val="tx1"/>
-                </a:solidFill>
-                <a:effectLst/>
-                <a:latin typeface="+mn-lt"/>
-                <a:ea typeface="+mn-ea"/>
-                <a:cs typeface="+mn-cs"/>
-              </a:rPr>
-              <a:t>mismo</a:t>
-            </a:r>
-            <a:r>
-              <a:rPr lang="en-US" sz="1200" b="0" i="0" u="none" strike="noStrike" kern="1200" baseline="0" dirty="0">
-                <a:solidFill>
-                  <a:schemeClr val="tx1"/>
-                </a:solidFill>
-                <a:effectLst/>
-                <a:latin typeface="+mn-lt"/>
-                <a:ea typeface="+mn-ea"/>
-                <a:cs typeface="+mn-cs"/>
-              </a:rPr>
-              <a:t> CLR (</a:t>
-            </a:r>
-            <a:r>
-              <a:rPr lang="en-US" sz="1200" b="0" i="0" u="none" strike="noStrike" kern="1200" baseline="0" dirty="0" err="1">
-                <a:solidFill>
-                  <a:schemeClr val="tx1"/>
-                </a:solidFill>
-                <a:effectLst/>
-                <a:latin typeface="+mn-lt"/>
-                <a:ea typeface="+mn-ea"/>
-                <a:cs typeface="+mn-cs"/>
-              </a:rPr>
-              <a:t>Versión</a:t>
-            </a:r>
-            <a:r>
-              <a:rPr lang="en-US" sz="1200" b="0" i="0" u="none" strike="noStrike" kern="1200" baseline="0" dirty="0">
-                <a:solidFill>
-                  <a:schemeClr val="tx1"/>
-                </a:solidFill>
-                <a:effectLst/>
-                <a:latin typeface="+mn-lt"/>
-                <a:ea typeface="+mn-ea"/>
-                <a:cs typeface="+mn-cs"/>
-              </a:rPr>
-              <a:t> 4).</a:t>
-            </a:r>
-          </a:p>
-          <a:p>
-            <a:r>
-              <a:rPr lang="en-US" sz="1200" b="0" i="0" u="none" strike="noStrike" kern="1200" baseline="0" dirty="0" err="1">
-                <a:solidFill>
-                  <a:schemeClr val="tx1"/>
-                </a:solidFill>
-                <a:effectLst/>
-                <a:latin typeface="+mn-lt"/>
-                <a:ea typeface="+mn-ea"/>
-                <a:cs typeface="+mn-cs"/>
-              </a:rPr>
-              <a:t>También</a:t>
-            </a:r>
-            <a:r>
-              <a:rPr lang="en-US" sz="1200" b="0" i="0" u="none" strike="noStrike" kern="1200" baseline="0" dirty="0">
-                <a:solidFill>
-                  <a:schemeClr val="tx1"/>
-                </a:solidFill>
-                <a:effectLst/>
-                <a:latin typeface="+mn-lt"/>
-                <a:ea typeface="+mn-ea"/>
-                <a:cs typeface="+mn-cs"/>
-              </a:rPr>
-              <a:t>, </a:t>
-            </a:r>
-            <a:r>
-              <a:rPr lang="en-US" sz="1200" b="0" i="0" u="none" strike="noStrike" kern="1200" baseline="0" dirty="0" err="1">
-                <a:solidFill>
-                  <a:schemeClr val="tx1"/>
-                </a:solidFill>
-                <a:effectLst/>
-                <a:latin typeface="+mn-lt"/>
-                <a:ea typeface="+mn-ea"/>
-                <a:cs typeface="+mn-cs"/>
-              </a:rPr>
-              <a:t>podríamos</a:t>
-            </a:r>
-            <a:r>
-              <a:rPr lang="en-US" sz="1200" b="0" i="0" u="none" strike="noStrike" kern="1200" baseline="0" dirty="0">
-                <a:solidFill>
-                  <a:schemeClr val="tx1"/>
-                </a:solidFill>
-                <a:effectLst/>
-                <a:latin typeface="+mn-lt"/>
-                <a:ea typeface="+mn-ea"/>
-                <a:cs typeface="+mn-cs"/>
-              </a:rPr>
-              <a:t> </a:t>
-            </a:r>
-            <a:r>
-              <a:rPr lang="en-US" sz="1200" b="0" i="0" u="none" strike="noStrike" kern="1200" baseline="0" dirty="0" err="1">
-                <a:solidFill>
-                  <a:schemeClr val="tx1"/>
-                </a:solidFill>
-                <a:effectLst/>
-                <a:latin typeface="+mn-lt"/>
-                <a:ea typeface="+mn-ea"/>
-                <a:cs typeface="+mn-cs"/>
-              </a:rPr>
-              <a:t>tener</a:t>
-            </a:r>
-            <a:r>
-              <a:rPr lang="en-US" sz="1200" b="0" i="0" u="none" strike="noStrike" kern="1200" baseline="0" dirty="0">
-                <a:solidFill>
-                  <a:schemeClr val="tx1"/>
-                </a:solidFill>
-                <a:effectLst/>
-                <a:latin typeface="+mn-lt"/>
-                <a:ea typeface="+mn-ea"/>
-                <a:cs typeface="+mn-cs"/>
-              </a:rPr>
-              <a:t> Visual Studio 2013 + el </a:t>
-            </a:r>
-            <a:r>
-              <a:rPr lang="en-US" sz="1200" b="0" i="0" u="none" strike="noStrike" kern="1200" baseline="0" dirty="0" err="1">
-                <a:solidFill>
-                  <a:schemeClr val="tx1"/>
-                </a:solidFill>
-                <a:effectLst/>
-                <a:latin typeface="+mn-lt"/>
-                <a:ea typeface="+mn-ea"/>
-                <a:cs typeface="+mn-cs"/>
-              </a:rPr>
-              <a:t>Compilador</a:t>
-            </a:r>
-            <a:r>
-              <a:rPr lang="en-US" sz="1200" b="0" i="0" u="none" strike="noStrike" kern="1200" baseline="0" dirty="0">
-                <a:solidFill>
-                  <a:schemeClr val="tx1"/>
-                </a:solidFill>
-                <a:effectLst/>
-                <a:latin typeface="+mn-lt"/>
-                <a:ea typeface="+mn-ea"/>
-                <a:cs typeface="+mn-cs"/>
-              </a:rPr>
-              <a:t> de Roslyn (https://github.com/dotnet/Roslyn)</a:t>
-            </a:r>
-          </a:p>
-          <a:p>
             <a:endParaRPr lang="es-ES" sz="1200" kern="1200" dirty="0">
               <a:solidFill>
                 <a:schemeClr val="tx1"/>
@@ -10391,7 +10157,7 @@
                 <a:tabLst/>
                 <a:defRPr/>
               </a:pPr>
-              <a:t>7/12/20 6:22 PM</a:t>
+              <a:t>7/13/20 9:59 PM</a:t>
             </a:fld>
             <a:endParaRPr kumimoji="0" lang="en-US" sz="1200" b="0" i="0" u="none" strike="noStrike" kern="1200" cap="none" spc="0" normalizeH="0" baseline="0" noProof="0" dirty="0">
               <a:ln>
@@ -10496,7 +10262,7 @@
     </p:spTree>
     <p:extLst>
       <p:ext uri="{BB962C8B-B14F-4D97-AF65-F5344CB8AC3E}">
-        <p14:creationId xmlns:p14="http://schemas.microsoft.com/office/powerpoint/2010/main" val="946945998"/>
+        <p14:creationId xmlns:p14="http://schemas.microsoft.com/office/powerpoint/2010/main" val="2439772390"/>
       </p:ext>
     </p:extLst>
   </p:cSld>
@@ -10550,6 +10316,722 @@
           <a:bodyPr/>
           <a:lstStyle/>
           <a:p>
+            <a:r>
+              <a:rPr lang="en-US" sz="1200" b="0" i="0" u="none" strike="noStrike" kern="1200" dirty="0">
+                <a:solidFill>
+                  <a:schemeClr val="tx1"/>
+                </a:solidFill>
+                <a:effectLst/>
+                <a:latin typeface="+mn-lt"/>
+                <a:ea typeface="+mn-ea"/>
+                <a:cs typeface="+mn-cs"/>
+              </a:rPr>
+              <a:t>C# 6.0 </a:t>
+            </a:r>
+            <a:r>
+              <a:rPr lang="en-US" sz="1200" b="0" i="0" u="none" strike="noStrike" kern="1200" dirty="0" err="1">
+                <a:solidFill>
+                  <a:schemeClr val="tx1"/>
+                </a:solidFill>
+                <a:effectLst/>
+                <a:latin typeface="+mn-lt"/>
+                <a:ea typeface="+mn-ea"/>
+                <a:cs typeface="+mn-cs"/>
+              </a:rPr>
+              <a:t>es</a:t>
+            </a:r>
+            <a:r>
+              <a:rPr lang="en-US" sz="1200" b="0" i="0" u="none" strike="noStrike" kern="1200" dirty="0">
+                <a:solidFill>
+                  <a:schemeClr val="tx1"/>
+                </a:solidFill>
+                <a:effectLst/>
+                <a:latin typeface="+mn-lt"/>
+                <a:ea typeface="+mn-ea"/>
+                <a:cs typeface="+mn-cs"/>
+              </a:rPr>
+              <a:t> compatible</a:t>
+            </a:r>
+            <a:r>
+              <a:rPr lang="en-US" sz="1200" b="0" i="0" u="none" strike="noStrike" kern="1200" baseline="0" dirty="0">
+                <a:solidFill>
+                  <a:schemeClr val="tx1"/>
+                </a:solidFill>
+                <a:effectLst/>
+                <a:latin typeface="+mn-lt"/>
+                <a:ea typeface="+mn-ea"/>
+                <a:cs typeface="+mn-cs"/>
+              </a:rPr>
+              <a:t> con </a:t>
+            </a:r>
+            <a:r>
+              <a:rPr lang="en-US" sz="1200" b="0" i="0" u="none" strike="noStrike" kern="1200" baseline="0" dirty="0" err="1">
+                <a:solidFill>
+                  <a:schemeClr val="tx1"/>
+                </a:solidFill>
+                <a:effectLst/>
+                <a:latin typeface="+mn-lt"/>
+                <a:ea typeface="+mn-ea"/>
+                <a:cs typeface="+mn-cs"/>
+              </a:rPr>
+              <a:t>.N</a:t>
+            </a:r>
+            <a:r>
+              <a:rPr lang="en-US" sz="1200" b="0" i="0" u="none" strike="noStrike" kern="1200" dirty="0" err="1">
+                <a:solidFill>
+                  <a:schemeClr val="tx1"/>
+                </a:solidFill>
+                <a:effectLst/>
+                <a:latin typeface="+mn-lt"/>
+                <a:ea typeface="+mn-ea"/>
+                <a:cs typeface="+mn-cs"/>
+              </a:rPr>
+              <a:t>et</a:t>
+            </a:r>
+            <a:r>
+              <a:rPr lang="en-US" sz="1200" b="0" i="0" u="none" strike="noStrike" kern="1200" dirty="0">
+                <a:solidFill>
+                  <a:schemeClr val="tx1"/>
+                </a:solidFill>
+                <a:effectLst/>
+                <a:latin typeface="+mn-lt"/>
+                <a:ea typeface="+mn-ea"/>
+                <a:cs typeface="+mn-cs"/>
+              </a:rPr>
+              <a:t> framework </a:t>
+            </a:r>
+            <a:r>
+              <a:rPr lang="en-US" sz="1200" b="0" i="0" u="none" strike="noStrike" kern="1200" dirty="0" err="1">
+                <a:solidFill>
+                  <a:schemeClr val="tx1"/>
+                </a:solidFill>
+                <a:effectLst/>
+                <a:latin typeface="+mn-lt"/>
+                <a:ea typeface="+mn-ea"/>
+                <a:cs typeface="+mn-cs"/>
+              </a:rPr>
+              <a:t>desde</a:t>
+            </a:r>
+            <a:r>
+              <a:rPr lang="en-US" sz="1200" b="0" i="0" u="none" strike="noStrike" kern="1200" dirty="0">
+                <a:solidFill>
+                  <a:schemeClr val="tx1"/>
+                </a:solidFill>
+                <a:effectLst/>
+                <a:latin typeface="+mn-lt"/>
+                <a:ea typeface="+mn-ea"/>
+                <a:cs typeface="+mn-cs"/>
+              </a:rPr>
+              <a:t> la v2.0 hasta</a:t>
+            </a:r>
+            <a:r>
+              <a:rPr lang="en-US" sz="1200" b="0" i="0" u="none" strike="noStrike" kern="1200" baseline="0" dirty="0">
+                <a:solidFill>
+                  <a:schemeClr val="tx1"/>
+                </a:solidFill>
+                <a:effectLst/>
+                <a:latin typeface="+mn-lt"/>
+                <a:ea typeface="+mn-ea"/>
+                <a:cs typeface="+mn-cs"/>
+              </a:rPr>
+              <a:t> </a:t>
+            </a:r>
+            <a:r>
+              <a:rPr lang="en-US" sz="1200" b="0" i="0" u="none" strike="noStrike" kern="1200" dirty="0">
+                <a:solidFill>
+                  <a:schemeClr val="tx1"/>
+                </a:solidFill>
+                <a:effectLst/>
+                <a:latin typeface="+mn-lt"/>
+                <a:ea typeface="+mn-ea"/>
+                <a:cs typeface="+mn-cs"/>
+              </a:rPr>
+              <a:t> la 4.6. No require de </a:t>
+            </a:r>
+            <a:r>
+              <a:rPr lang="en-US" sz="1200" b="0" i="0" u="none" strike="noStrike" kern="1200" dirty="0" err="1">
+                <a:solidFill>
+                  <a:schemeClr val="tx1"/>
+                </a:solidFill>
+                <a:effectLst/>
+                <a:latin typeface="+mn-lt"/>
+                <a:ea typeface="+mn-ea"/>
+                <a:cs typeface="+mn-cs"/>
+              </a:rPr>
+              <a:t>ninguna</a:t>
+            </a:r>
+            <a:r>
+              <a:rPr lang="en-US" sz="1200" b="0" i="0" u="none" strike="noStrike" kern="1200" dirty="0">
+                <a:solidFill>
+                  <a:schemeClr val="tx1"/>
+                </a:solidFill>
+                <a:effectLst/>
+                <a:latin typeface="+mn-lt"/>
+                <a:ea typeface="+mn-ea"/>
+                <a:cs typeface="+mn-cs"/>
+              </a:rPr>
+              <a:t> version mayor</a:t>
+            </a:r>
+            <a:r>
+              <a:rPr lang="en-US" sz="1200" b="0" i="0" u="none" strike="noStrike" kern="1200" baseline="0" dirty="0">
+                <a:solidFill>
+                  <a:schemeClr val="tx1"/>
+                </a:solidFill>
+                <a:effectLst/>
+                <a:latin typeface="+mn-lt"/>
+                <a:ea typeface="+mn-ea"/>
+                <a:cs typeface="+mn-cs"/>
+              </a:rPr>
+              <a:t> de </a:t>
+            </a:r>
+            <a:r>
+              <a:rPr lang="en-US" sz="1200" b="0" i="0" u="none" strike="noStrike" kern="1200" dirty="0" err="1">
+                <a:solidFill>
+                  <a:schemeClr val="tx1"/>
+                </a:solidFill>
+                <a:effectLst/>
+                <a:latin typeface="+mn-lt"/>
+                <a:ea typeface="+mn-ea"/>
+                <a:cs typeface="+mn-cs"/>
+              </a:rPr>
+              <a:t>.net</a:t>
+            </a:r>
+            <a:r>
+              <a:rPr lang="en-US" sz="1200" b="0" i="0" u="none" strike="noStrike" kern="1200" dirty="0">
+                <a:solidFill>
+                  <a:schemeClr val="tx1"/>
+                </a:solidFill>
+                <a:effectLst/>
+                <a:latin typeface="+mn-lt"/>
+                <a:ea typeface="+mn-ea"/>
+                <a:cs typeface="+mn-cs"/>
+              </a:rPr>
+              <a:t> framework </a:t>
+            </a:r>
+            <a:r>
+              <a:rPr lang="en-US" sz="1200" b="0" i="0" u="none" strike="noStrike" kern="1200" dirty="0" err="1">
+                <a:solidFill>
+                  <a:schemeClr val="tx1"/>
+                </a:solidFill>
+                <a:effectLst/>
+                <a:latin typeface="+mn-lt"/>
+                <a:ea typeface="+mn-ea"/>
+                <a:cs typeface="+mn-cs"/>
+              </a:rPr>
+              <a:t>pero</a:t>
+            </a:r>
+            <a:r>
+              <a:rPr lang="en-US" sz="1200" b="0" i="0" u="none" strike="noStrike" kern="1200" dirty="0">
+                <a:solidFill>
+                  <a:schemeClr val="tx1"/>
+                </a:solidFill>
+                <a:effectLst/>
+                <a:latin typeface="+mn-lt"/>
+                <a:ea typeface="+mn-ea"/>
+                <a:cs typeface="+mn-cs"/>
+              </a:rPr>
+              <a:t> </a:t>
+            </a:r>
+            <a:r>
+              <a:rPr lang="en-US" sz="1200" b="0" i="0" u="none" strike="noStrike" kern="1200" dirty="0" err="1">
+                <a:solidFill>
+                  <a:schemeClr val="tx1"/>
+                </a:solidFill>
+                <a:effectLst/>
+                <a:latin typeface="+mn-lt"/>
+                <a:ea typeface="+mn-ea"/>
+                <a:cs typeface="+mn-cs"/>
+              </a:rPr>
+              <a:t>necesita</a:t>
+            </a:r>
+            <a:r>
+              <a:rPr lang="en-US" sz="1200" b="0" i="0" u="none" strike="noStrike" kern="1200" dirty="0">
+                <a:solidFill>
+                  <a:schemeClr val="tx1"/>
+                </a:solidFill>
+                <a:effectLst/>
+                <a:latin typeface="+mn-lt"/>
+                <a:ea typeface="+mn-ea"/>
+                <a:cs typeface="+mn-cs"/>
+              </a:rPr>
+              <a:t> </a:t>
+            </a:r>
+            <a:r>
+              <a:rPr lang="en-US" sz="1200" b="0" i="0" u="none" strike="noStrike" kern="1200" dirty="0" err="1">
+                <a:solidFill>
+                  <a:schemeClr val="tx1"/>
+                </a:solidFill>
+                <a:effectLst/>
+                <a:latin typeface="+mn-lt"/>
+                <a:ea typeface="+mn-ea"/>
+                <a:cs typeface="+mn-cs"/>
+              </a:rPr>
+              <a:t>una</a:t>
+            </a:r>
+            <a:r>
+              <a:rPr lang="en-US" sz="1200" b="0" i="0" u="none" strike="noStrike" kern="1200" dirty="0">
+                <a:solidFill>
+                  <a:schemeClr val="tx1"/>
+                </a:solidFill>
+                <a:effectLst/>
+                <a:latin typeface="+mn-lt"/>
+                <a:ea typeface="+mn-ea"/>
+                <a:cs typeface="+mn-cs"/>
+              </a:rPr>
+              <a:t> version superior de Visual Studio:</a:t>
+            </a:r>
+            <a:r>
+              <a:rPr lang="en-US" sz="1200" b="0" i="0" u="none" strike="noStrike" kern="1200" baseline="0" dirty="0">
+                <a:solidFill>
+                  <a:schemeClr val="tx1"/>
+                </a:solidFill>
+                <a:effectLst/>
+                <a:latin typeface="+mn-lt"/>
+                <a:ea typeface="+mn-ea"/>
+                <a:cs typeface="+mn-cs"/>
+              </a:rPr>
+              <a:t> 2015 o superior.</a:t>
+            </a:r>
+          </a:p>
+          <a:p>
+            <a:r>
+              <a:rPr lang="en-US" sz="1200" b="0" i="0" u="none" strike="noStrike" kern="1200" baseline="0" dirty="0" err="1">
+                <a:solidFill>
+                  <a:schemeClr val="tx1"/>
+                </a:solidFill>
+                <a:effectLst/>
+                <a:latin typeface="+mn-lt"/>
+                <a:ea typeface="+mn-ea"/>
+                <a:cs typeface="+mn-cs"/>
+              </a:rPr>
+              <a:t>Existen</a:t>
+            </a:r>
+            <a:r>
+              <a:rPr lang="en-US" sz="1200" b="0" i="0" u="none" strike="noStrike" kern="1200" baseline="0" dirty="0">
+                <a:solidFill>
+                  <a:schemeClr val="tx1"/>
+                </a:solidFill>
+                <a:effectLst/>
+                <a:latin typeface="+mn-lt"/>
+                <a:ea typeface="+mn-ea"/>
+                <a:cs typeface="+mn-cs"/>
+              </a:rPr>
+              <a:t> </a:t>
+            </a:r>
+            <a:r>
+              <a:rPr lang="en-US" sz="1200" b="0" i="0" u="none" strike="noStrike" kern="1200" baseline="0" dirty="0" err="1">
+                <a:solidFill>
+                  <a:schemeClr val="tx1"/>
+                </a:solidFill>
+                <a:effectLst/>
+                <a:latin typeface="+mn-lt"/>
+                <a:ea typeface="+mn-ea"/>
+                <a:cs typeface="+mn-cs"/>
+              </a:rPr>
+              <a:t>alguna</a:t>
+            </a:r>
+            <a:r>
+              <a:rPr lang="en-US" sz="1200" b="0" i="0" u="none" strike="noStrike" kern="1200" baseline="0" dirty="0">
+                <a:solidFill>
+                  <a:schemeClr val="tx1"/>
+                </a:solidFill>
+                <a:effectLst/>
+                <a:latin typeface="+mn-lt"/>
+                <a:ea typeface="+mn-ea"/>
+                <a:cs typeface="+mn-cs"/>
+              </a:rPr>
+              <a:t> </a:t>
+            </a:r>
+            <a:r>
+              <a:rPr lang="en-US" sz="1200" b="0" i="0" u="none" strike="noStrike" kern="1200" baseline="0" dirty="0" err="1">
+                <a:solidFill>
+                  <a:schemeClr val="tx1"/>
+                </a:solidFill>
+                <a:effectLst/>
+                <a:latin typeface="+mn-lt"/>
+                <a:ea typeface="+mn-ea"/>
+                <a:cs typeface="+mn-cs"/>
+              </a:rPr>
+              <a:t>excepciones</a:t>
+            </a:r>
+            <a:r>
+              <a:rPr lang="en-US" sz="1200" b="0" i="0" u="none" strike="noStrike" kern="1200" baseline="0" dirty="0">
+                <a:solidFill>
+                  <a:schemeClr val="tx1"/>
+                </a:solidFill>
+                <a:effectLst/>
+                <a:latin typeface="+mn-lt"/>
+                <a:ea typeface="+mn-ea"/>
+                <a:cs typeface="+mn-cs"/>
+              </a:rPr>
+              <a:t>: </a:t>
+            </a:r>
+            <a:r>
+              <a:rPr lang="en-US" sz="1200" b="0" i="0" u="none" strike="noStrike" kern="1200" baseline="0" dirty="0" err="1">
+                <a:solidFill>
+                  <a:schemeClr val="tx1"/>
+                </a:solidFill>
+                <a:effectLst/>
+                <a:latin typeface="+mn-lt"/>
+                <a:ea typeface="+mn-ea"/>
+                <a:cs typeface="+mn-cs"/>
+              </a:rPr>
+              <a:t>Ej</a:t>
+            </a:r>
+            <a:r>
+              <a:rPr lang="en-US" sz="1200" b="0" i="0" u="none" strike="noStrike" kern="1200" baseline="0" dirty="0">
+                <a:solidFill>
+                  <a:schemeClr val="tx1"/>
+                </a:solidFill>
+                <a:effectLst/>
+                <a:latin typeface="+mn-lt"/>
+                <a:ea typeface="+mn-ea"/>
+                <a:cs typeface="+mn-cs"/>
+              </a:rPr>
+              <a:t>: La </a:t>
+            </a:r>
+            <a:r>
+              <a:rPr lang="en-US" sz="1200" b="0" i="0" u="none" strike="noStrike" kern="1200" baseline="0" dirty="0" err="1">
+                <a:solidFill>
+                  <a:schemeClr val="tx1"/>
+                </a:solidFill>
+                <a:effectLst/>
+                <a:latin typeface="+mn-lt"/>
+                <a:ea typeface="+mn-ea"/>
+                <a:cs typeface="+mn-cs"/>
+              </a:rPr>
+              <a:t>interpolación</a:t>
+            </a:r>
+            <a:r>
+              <a:rPr lang="en-US" sz="1200" b="0" i="0" u="none" strike="noStrike" kern="1200" baseline="0" dirty="0">
+                <a:solidFill>
+                  <a:schemeClr val="tx1"/>
+                </a:solidFill>
+                <a:effectLst/>
+                <a:latin typeface="+mn-lt"/>
+                <a:ea typeface="+mn-ea"/>
+                <a:cs typeface="+mn-cs"/>
+              </a:rPr>
+              <a:t> de </a:t>
+            </a:r>
+            <a:r>
+              <a:rPr lang="en-US" sz="1200" b="0" i="0" u="none" strike="noStrike" kern="1200" baseline="0" dirty="0" err="1">
+                <a:solidFill>
+                  <a:schemeClr val="tx1"/>
+                </a:solidFill>
+                <a:effectLst/>
+                <a:latin typeface="+mn-lt"/>
+                <a:ea typeface="+mn-ea"/>
+                <a:cs typeface="+mn-cs"/>
+              </a:rPr>
+              <a:t>cadenas</a:t>
+            </a:r>
+            <a:r>
+              <a:rPr lang="en-US" sz="1200" b="0" i="0" u="none" strike="noStrike" kern="1200" baseline="0" dirty="0">
+                <a:solidFill>
+                  <a:schemeClr val="tx1"/>
+                </a:solidFill>
+                <a:effectLst/>
+                <a:latin typeface="+mn-lt"/>
+                <a:ea typeface="+mn-ea"/>
+                <a:cs typeface="+mn-cs"/>
+              </a:rPr>
+              <a:t> la </a:t>
+            </a:r>
+            <a:r>
+              <a:rPr lang="en-US" sz="1200" b="0" i="0" u="none" strike="noStrike" kern="1200" baseline="0" dirty="0" err="1">
+                <a:solidFill>
+                  <a:schemeClr val="tx1"/>
+                </a:solidFill>
+                <a:effectLst/>
+                <a:latin typeface="+mn-lt"/>
+                <a:ea typeface="+mn-ea"/>
+                <a:cs typeface="+mn-cs"/>
+              </a:rPr>
+              <a:t>soporta</a:t>
+            </a:r>
+            <a:r>
+              <a:rPr lang="en-US" sz="1200" b="0" i="0" u="none" strike="noStrike" kern="1200" baseline="0" dirty="0">
+                <a:solidFill>
+                  <a:schemeClr val="tx1"/>
+                </a:solidFill>
+                <a:effectLst/>
+                <a:latin typeface="+mn-lt"/>
+                <a:ea typeface="+mn-ea"/>
+                <a:cs typeface="+mn-cs"/>
+              </a:rPr>
+              <a:t>, </a:t>
+            </a:r>
+            <a:r>
+              <a:rPr lang="en-US" sz="1200" b="0" i="0" u="none" strike="noStrike" kern="1200" baseline="0" dirty="0" err="1">
+                <a:solidFill>
+                  <a:schemeClr val="tx1"/>
+                </a:solidFill>
+                <a:effectLst/>
+                <a:latin typeface="+mn-lt"/>
+                <a:ea typeface="+mn-ea"/>
+                <a:cs typeface="+mn-cs"/>
+              </a:rPr>
+              <a:t>si</a:t>
+            </a:r>
+            <a:r>
+              <a:rPr lang="en-US" sz="1200" b="0" i="0" u="none" strike="noStrike" kern="1200" baseline="0" dirty="0">
+                <a:solidFill>
+                  <a:schemeClr val="tx1"/>
+                </a:solidFill>
+                <a:effectLst/>
+                <a:latin typeface="+mn-lt"/>
+                <a:ea typeface="+mn-ea"/>
+                <a:cs typeface="+mn-cs"/>
+              </a:rPr>
+              <a:t> </a:t>
+            </a:r>
+            <a:r>
+              <a:rPr lang="en-US" sz="1200" b="0" i="0" u="none" strike="noStrike" kern="1200" baseline="0" dirty="0" err="1">
+                <a:solidFill>
+                  <a:schemeClr val="tx1"/>
+                </a:solidFill>
+                <a:effectLst/>
+                <a:latin typeface="+mn-lt"/>
+                <a:ea typeface="+mn-ea"/>
+                <a:cs typeface="+mn-cs"/>
+              </a:rPr>
+              <a:t>bien</a:t>
+            </a:r>
+            <a:r>
+              <a:rPr lang="en-US" sz="1200" b="0" i="0" u="none" strike="noStrike" kern="1200" baseline="0" dirty="0">
+                <a:solidFill>
+                  <a:schemeClr val="tx1"/>
+                </a:solidFill>
+                <a:effectLst/>
+                <a:latin typeface="+mn-lt"/>
+                <a:ea typeface="+mn-ea"/>
+                <a:cs typeface="+mn-cs"/>
+              </a:rPr>
+              <a:t>, </a:t>
+            </a:r>
+            <a:r>
+              <a:rPr lang="en-US" sz="1200" b="0" i="0" u="none" strike="noStrike" kern="1200" baseline="0" dirty="0" err="1">
+                <a:solidFill>
+                  <a:schemeClr val="tx1"/>
+                </a:solidFill>
+                <a:effectLst/>
+                <a:latin typeface="+mn-lt"/>
+                <a:ea typeface="+mn-ea"/>
+                <a:cs typeface="+mn-cs"/>
+              </a:rPr>
+              <a:t>IFormatable</a:t>
+            </a:r>
+            <a:r>
+              <a:rPr lang="en-US" sz="1200" b="0" i="0" u="none" strike="noStrike" kern="1200" baseline="0" dirty="0">
+                <a:solidFill>
+                  <a:schemeClr val="tx1"/>
+                </a:solidFill>
+                <a:effectLst/>
+                <a:latin typeface="+mn-lt"/>
+                <a:ea typeface="+mn-ea"/>
+                <a:cs typeface="+mn-cs"/>
+              </a:rPr>
+              <a:t> NO!</a:t>
+            </a:r>
+          </a:p>
+          <a:p>
+            <a:r>
+              <a:rPr lang="en-US" sz="1200" b="0" i="0" u="none" strike="noStrike" kern="1200" baseline="0" dirty="0" err="1">
+                <a:solidFill>
+                  <a:schemeClr val="tx1"/>
+                </a:solidFill>
+                <a:effectLst/>
+                <a:latin typeface="+mn-lt"/>
+                <a:ea typeface="+mn-ea"/>
+                <a:cs typeface="+mn-cs"/>
+              </a:rPr>
+              <a:t>Basicamente</a:t>
+            </a:r>
+            <a:r>
+              <a:rPr lang="en-US" sz="1200" b="0" i="0" u="none" strike="noStrike" kern="1200" baseline="0" dirty="0">
+                <a:solidFill>
+                  <a:schemeClr val="tx1"/>
+                </a:solidFill>
+                <a:effectLst/>
+                <a:latin typeface="+mn-lt"/>
+                <a:ea typeface="+mn-ea"/>
+                <a:cs typeface="+mn-cs"/>
+              </a:rPr>
+              <a:t> se </a:t>
+            </a:r>
+            <a:r>
+              <a:rPr lang="en-US" sz="1200" b="0" i="0" u="none" strike="noStrike" kern="1200" baseline="0" dirty="0" err="1">
+                <a:solidFill>
+                  <a:schemeClr val="tx1"/>
+                </a:solidFill>
+                <a:effectLst/>
+                <a:latin typeface="+mn-lt"/>
+                <a:ea typeface="+mn-ea"/>
+                <a:cs typeface="+mn-cs"/>
+              </a:rPr>
+              <a:t>trata</a:t>
+            </a:r>
+            <a:r>
+              <a:rPr lang="en-US" sz="1200" b="0" i="0" u="none" strike="noStrike" kern="1200" baseline="0" dirty="0">
+                <a:solidFill>
+                  <a:schemeClr val="tx1"/>
+                </a:solidFill>
+                <a:effectLst/>
+                <a:latin typeface="+mn-lt"/>
+                <a:ea typeface="+mn-ea"/>
+                <a:cs typeface="+mn-cs"/>
+              </a:rPr>
+              <a:t> del </a:t>
+            </a:r>
+            <a:r>
+              <a:rPr lang="en-US" sz="1200" b="0" i="0" u="none" strike="noStrike" kern="1200" baseline="0" dirty="0" err="1">
+                <a:solidFill>
+                  <a:schemeClr val="tx1"/>
+                </a:solidFill>
+                <a:effectLst/>
+                <a:latin typeface="+mn-lt"/>
+                <a:ea typeface="+mn-ea"/>
+                <a:cs typeface="+mn-cs"/>
+              </a:rPr>
+              <a:t>mismo</a:t>
+            </a:r>
+            <a:r>
+              <a:rPr lang="en-US" sz="1200" b="0" i="0" u="none" strike="noStrike" kern="1200" baseline="0" dirty="0">
+                <a:solidFill>
+                  <a:schemeClr val="tx1"/>
+                </a:solidFill>
+                <a:effectLst/>
+                <a:latin typeface="+mn-lt"/>
+                <a:ea typeface="+mn-ea"/>
+                <a:cs typeface="+mn-cs"/>
+              </a:rPr>
+              <a:t> CLR (</a:t>
+            </a:r>
+            <a:r>
+              <a:rPr lang="en-US" sz="1200" b="0" i="0" u="none" strike="noStrike" kern="1200" baseline="0" dirty="0" err="1">
+                <a:solidFill>
+                  <a:schemeClr val="tx1"/>
+                </a:solidFill>
+                <a:effectLst/>
+                <a:latin typeface="+mn-lt"/>
+                <a:ea typeface="+mn-ea"/>
+                <a:cs typeface="+mn-cs"/>
+              </a:rPr>
+              <a:t>Versión</a:t>
+            </a:r>
+            <a:r>
+              <a:rPr lang="en-US" sz="1200" b="0" i="0" u="none" strike="noStrike" kern="1200" baseline="0" dirty="0">
+                <a:solidFill>
+                  <a:schemeClr val="tx1"/>
+                </a:solidFill>
+                <a:effectLst/>
+                <a:latin typeface="+mn-lt"/>
+                <a:ea typeface="+mn-ea"/>
+                <a:cs typeface="+mn-cs"/>
+              </a:rPr>
+              <a:t> 4).</a:t>
+            </a:r>
+          </a:p>
+          <a:p>
+            <a:r>
+              <a:rPr lang="en-US" sz="1200" b="0" i="0" u="none" strike="noStrike" kern="1200" baseline="0" dirty="0" err="1">
+                <a:solidFill>
+                  <a:schemeClr val="tx1"/>
+                </a:solidFill>
+                <a:effectLst/>
+                <a:latin typeface="+mn-lt"/>
+                <a:ea typeface="+mn-ea"/>
+                <a:cs typeface="+mn-cs"/>
+              </a:rPr>
+              <a:t>También</a:t>
+            </a:r>
+            <a:r>
+              <a:rPr lang="en-US" sz="1200" b="0" i="0" u="none" strike="noStrike" kern="1200" baseline="0" dirty="0">
+                <a:solidFill>
+                  <a:schemeClr val="tx1"/>
+                </a:solidFill>
+                <a:effectLst/>
+                <a:latin typeface="+mn-lt"/>
+                <a:ea typeface="+mn-ea"/>
+                <a:cs typeface="+mn-cs"/>
+              </a:rPr>
+              <a:t>, </a:t>
+            </a:r>
+            <a:r>
+              <a:rPr lang="en-US" sz="1200" b="0" i="0" u="none" strike="noStrike" kern="1200" baseline="0" dirty="0" err="1">
+                <a:solidFill>
+                  <a:schemeClr val="tx1"/>
+                </a:solidFill>
+                <a:effectLst/>
+                <a:latin typeface="+mn-lt"/>
+                <a:ea typeface="+mn-ea"/>
+                <a:cs typeface="+mn-cs"/>
+              </a:rPr>
+              <a:t>podríamos</a:t>
+            </a:r>
+            <a:r>
+              <a:rPr lang="en-US" sz="1200" b="0" i="0" u="none" strike="noStrike" kern="1200" baseline="0" dirty="0">
+                <a:solidFill>
+                  <a:schemeClr val="tx1"/>
+                </a:solidFill>
+                <a:effectLst/>
+                <a:latin typeface="+mn-lt"/>
+                <a:ea typeface="+mn-ea"/>
+                <a:cs typeface="+mn-cs"/>
+              </a:rPr>
+              <a:t> </a:t>
+            </a:r>
+            <a:r>
+              <a:rPr lang="en-US" sz="1200" b="0" i="0" u="none" strike="noStrike" kern="1200" baseline="0" dirty="0" err="1">
+                <a:solidFill>
+                  <a:schemeClr val="tx1"/>
+                </a:solidFill>
+                <a:effectLst/>
+                <a:latin typeface="+mn-lt"/>
+                <a:ea typeface="+mn-ea"/>
+                <a:cs typeface="+mn-cs"/>
+              </a:rPr>
+              <a:t>tener</a:t>
+            </a:r>
+            <a:r>
+              <a:rPr lang="en-US" sz="1200" b="0" i="0" u="none" strike="noStrike" kern="1200" baseline="0" dirty="0">
+                <a:solidFill>
+                  <a:schemeClr val="tx1"/>
+                </a:solidFill>
+                <a:effectLst/>
+                <a:latin typeface="+mn-lt"/>
+                <a:ea typeface="+mn-ea"/>
+                <a:cs typeface="+mn-cs"/>
+              </a:rPr>
+              <a:t> Visual Studio 2013 + el </a:t>
+            </a:r>
+            <a:r>
+              <a:rPr lang="en-US" sz="1200" b="0" i="0" u="none" strike="noStrike" kern="1200" baseline="0" dirty="0" err="1">
+                <a:solidFill>
+                  <a:schemeClr val="tx1"/>
+                </a:solidFill>
+                <a:effectLst/>
+                <a:latin typeface="+mn-lt"/>
+                <a:ea typeface="+mn-ea"/>
+                <a:cs typeface="+mn-cs"/>
+              </a:rPr>
+              <a:t>Compilador</a:t>
+            </a:r>
+            <a:r>
+              <a:rPr lang="en-US" sz="1200" b="0" i="0" u="none" strike="noStrike" kern="1200" baseline="0" dirty="0">
+                <a:solidFill>
+                  <a:schemeClr val="tx1"/>
+                </a:solidFill>
+                <a:effectLst/>
+                <a:latin typeface="+mn-lt"/>
+                <a:ea typeface="+mn-ea"/>
+                <a:cs typeface="+mn-cs"/>
+              </a:rPr>
+              <a:t> de Roslyn (https://github.com/dotnet/Roslyn)</a:t>
+            </a:r>
+          </a:p>
+          <a:p>
             <a:endParaRPr lang="es-ES" sz="1200" kern="1200" dirty="0">
               <a:solidFill>
                 <a:schemeClr val="tx1"/>
@@ -10793,7 +11275,7 @@
                 <a:tabLst/>
                 <a:defRPr/>
               </a:pPr>
-              <a:t>7/12/20 6:22 PM</a:t>
+              <a:t>7/13/20 9:59 PM</a:t>
             </a:fld>
             <a:endParaRPr kumimoji="0" lang="en-US" sz="1200" b="0" i="0" u="none" strike="noStrike" kern="1200" cap="none" spc="0" normalizeH="0" baseline="0" noProof="0" dirty="0">
               <a:ln>
@@ -10898,6 +11380,408 @@
     </p:spTree>
     <p:extLst>
       <p:ext uri="{BB962C8B-B14F-4D97-AF65-F5344CB8AC3E}">
+        <p14:creationId xmlns:p14="http://schemas.microsoft.com/office/powerpoint/2010/main" val="946945998"/>
+      </p:ext>
+    </p:extLst>
+  </p:cSld>
+  <p:clrMapOvr>
+    <a:masterClrMapping/>
+  </p:clrMapOvr>
+</p:notes>
+</file>
+
+<file path=ppt/notesSlides/notesSlide8.xml><?xml version="1.0" encoding="utf-8"?>
+<p:notes xmlns:a="http://schemas.openxmlformats.org/drawingml/2006/main" xmlns:r="http://schemas.openxmlformats.org/officeDocument/2006/relationships" xmlns:p="http://schemas.openxmlformats.org/presentationml/2006/main">
+  <p:cSld>
+    <p:spTree>
+      <p:nvGrpSpPr>
+        <p:cNvPr id="1" name=""/>
+        <p:cNvGrpSpPr/>
+        <p:nvPr/>
+      </p:nvGrpSpPr>
+      <p:grpSpPr>
+        <a:xfrm>
+          <a:off x="0" y="0"/>
+          <a:ext cx="0" cy="0"/>
+          <a:chOff x="0" y="0"/>
+          <a:chExt cx="0" cy="0"/>
+        </a:xfrm>
+      </p:grpSpPr>
+      <p:sp>
+        <p:nvSpPr>
+          <p:cNvPr id="2" name="Slide Image Placeholder 1"/>
+          <p:cNvSpPr>
+            <a:spLocks noGrp="1" noRot="1" noChangeAspect="1"/>
+          </p:cNvSpPr>
+          <p:nvPr>
+            <p:ph type="sldImg"/>
+          </p:nvPr>
+        </p:nvSpPr>
+        <p:spPr/>
+      </p:sp>
+      <p:sp>
+        <p:nvSpPr>
+          <p:cNvPr id="3" name="Notes Placeholder 2"/>
+          <p:cNvSpPr>
+            <a:spLocks noGrp="1"/>
+          </p:cNvSpPr>
+          <p:nvPr>
+            <p:ph type="body" idx="1"/>
+          </p:nvPr>
+        </p:nvSpPr>
+        <p:spPr/>
+        <p:txBody>
+          <a:bodyPr/>
+          <a:lstStyle/>
+          <a:p>
+            <a:endParaRPr lang="es-ES" sz="1200" kern="1200" dirty="0">
+              <a:solidFill>
+                <a:schemeClr val="tx1"/>
+              </a:solidFill>
+              <a:effectLst/>
+              <a:latin typeface="+mn-lt"/>
+              <a:ea typeface="+mn-ea"/>
+              <a:cs typeface="+mn-cs"/>
+            </a:endParaRPr>
+          </a:p>
+        </p:txBody>
+      </p:sp>
+      <p:sp>
+        <p:nvSpPr>
+          <p:cNvPr id="4" name="Header Placeholder 3"/>
+          <p:cNvSpPr>
+            <a:spLocks noGrp="1"/>
+          </p:cNvSpPr>
+          <p:nvPr>
+            <p:ph type="hdr" sz="quarter" idx="10"/>
+          </p:nvPr>
+        </p:nvSpPr>
+        <p:spPr/>
+        <p:txBody>
+          <a:bodyPr/>
+          <a:lstStyle/>
+          <a:p>
+            <a:pPr marL="0" marR="0" lvl="0" indent="0" algn="l" defTabSz="950464" rtl="0" eaLnBrk="1" fontAlgn="auto" latinLnBrk="0" hangingPunct="1">
+              <a:lnSpc>
+                <a:spcPct val="100000"/>
+              </a:lnSpc>
+              <a:spcBef>
+                <a:spcPts val="0"/>
+              </a:spcBef>
+              <a:spcAft>
+                <a:spcPts val="0"/>
+              </a:spcAft>
+              <a:buClrTx/>
+              <a:buSzTx/>
+              <a:buFontTx/>
+              <a:buNone/>
+              <a:tabLst/>
+              <a:defRPr/>
+            </a:pPr>
+            <a:r>
+              <a:rPr kumimoji="0" lang="en-US" sz="1200" b="0" i="0" u="none" strike="noStrike" kern="1200" cap="none" spc="0" normalizeH="0" baseline="0" noProof="0">
+                <a:ln>
+                  <a:noFill/>
+                </a:ln>
+                <a:solidFill>
+                  <a:prstClr val="black"/>
+                </a:solidFill>
+                <a:effectLst/>
+                <a:uLnTx/>
+                <a:uFillTx/>
+                <a:latin typeface="Segoe UI" pitchFamily="34" charset="0"/>
+                <a:ea typeface="+mn-ea"/>
+                <a:cs typeface="+mn-cs"/>
+              </a:rPr>
+              <a:t>WPC 2015</a:t>
+            </a:r>
+          </a:p>
+          <a:p>
+            <a:pPr marL="0" marR="0" lvl="0" indent="0" algn="l" defTabSz="950464" rtl="0" eaLnBrk="1" fontAlgn="auto" latinLnBrk="0" hangingPunct="1">
+              <a:lnSpc>
+                <a:spcPct val="100000"/>
+              </a:lnSpc>
+              <a:spcBef>
+                <a:spcPts val="0"/>
+              </a:spcBef>
+              <a:spcAft>
+                <a:spcPts val="0"/>
+              </a:spcAft>
+              <a:buClrTx/>
+              <a:buSzTx/>
+              <a:buFontTx/>
+              <a:buNone/>
+              <a:tabLst/>
+              <a:defRPr/>
+            </a:pPr>
+            <a:endParaRPr kumimoji="0" lang="en-US" sz="1200" b="0" i="0" u="none" strike="noStrike" kern="1200" cap="none" spc="0" normalizeH="0" baseline="0" noProof="0" dirty="0">
+              <a:ln>
+                <a:noFill/>
+              </a:ln>
+              <a:solidFill>
+                <a:prstClr val="black"/>
+              </a:solidFill>
+              <a:effectLst/>
+              <a:uLnTx/>
+              <a:uFillTx/>
+              <a:latin typeface="Segoe UI" pitchFamily="34" charset="0"/>
+              <a:ea typeface="+mn-ea"/>
+              <a:cs typeface="+mn-cs"/>
+            </a:endParaRPr>
+          </a:p>
+        </p:txBody>
+      </p:sp>
+      <p:sp>
+        <p:nvSpPr>
+          <p:cNvPr id="5" name="Footer Placeholder 4"/>
+          <p:cNvSpPr>
+            <a:spLocks noGrp="1"/>
+          </p:cNvSpPr>
+          <p:nvPr>
+            <p:ph type="ftr" sz="quarter" idx="11"/>
+          </p:nvPr>
+        </p:nvSpPr>
+        <p:spPr/>
+        <p:txBody>
+          <a:bodyPr/>
+          <a:lstStyle/>
+          <a:p>
+            <a:pPr marL="582359" marR="0" lvl="0" indent="0" algn="l" defTabSz="914099" rtl="0" eaLnBrk="0" fontAlgn="base" latinLnBrk="0" hangingPunct="0">
+              <a:lnSpc>
+                <a:spcPct val="100000"/>
+              </a:lnSpc>
+              <a:spcBef>
+                <a:spcPct val="0"/>
+              </a:spcBef>
+              <a:spcAft>
+                <a:spcPct val="0"/>
+              </a:spcAft>
+              <a:buClrTx/>
+              <a:buSzTx/>
+              <a:buFontTx/>
+              <a:buNone/>
+              <a:tabLst/>
+              <a:defRPr/>
+            </a:pPr>
+            <a:r>
+              <a:rPr kumimoji="0" lang="en-US" sz="400" b="0" i="0" u="none" strike="noStrike" kern="1200" cap="none" spc="0" normalizeH="0" baseline="0" noProof="0">
+                <a:ln>
+                  <a:noFill/>
+                </a:ln>
+                <a:gradFill>
+                  <a:gsLst>
+                    <a:gs pos="0">
+                      <a:prstClr val="black"/>
+                    </a:gs>
+                    <a:gs pos="100000">
+                      <a:prstClr val="black"/>
+                    </a:gs>
+                  </a:gsLst>
+                  <a:lin ang="5400000" scaled="0"/>
+                </a:gradFill>
+                <a:effectLst/>
+                <a:uLnTx/>
+                <a:uFillTx/>
+                <a:latin typeface="Segoe UI" pitchFamily="34" charset="0"/>
+                <a:ea typeface="Segoe UI" pitchFamily="34" charset="0"/>
+                <a:cs typeface="Segoe UI" pitchFamily="34" charset="0"/>
+              </a:rPr>
+              <a:t>© 2015 Microsoft Corporation. All rights reserved. MICROSOFT MAKES NO WARRANTIES, EXPRESS, IMPLIED OR STATUTORY, AS TO THE INFORMATION IN THIS PRESENTATION.</a:t>
+            </a:r>
+            <a:endParaRPr kumimoji="0" lang="en-US" sz="400" b="0" i="0" u="none" strike="noStrike" kern="1200" cap="none" spc="0" normalizeH="0" baseline="0" noProof="0" dirty="0">
+              <a:ln>
+                <a:noFill/>
+              </a:ln>
+              <a:gradFill>
+                <a:gsLst>
+                  <a:gs pos="0">
+                    <a:prstClr val="black"/>
+                  </a:gs>
+                  <a:gs pos="100000">
+                    <a:prstClr val="black"/>
+                  </a:gs>
+                </a:gsLst>
+                <a:lin ang="5400000" scaled="0"/>
+              </a:gradFill>
+              <a:effectLst/>
+              <a:uLnTx/>
+              <a:uFillTx/>
+              <a:latin typeface="Segoe UI" pitchFamily="34" charset="0"/>
+              <a:ea typeface="Segoe UI" pitchFamily="34" charset="0"/>
+              <a:cs typeface="Segoe UI" pitchFamily="34" charset="0"/>
+            </a:endParaRPr>
+          </a:p>
+        </p:txBody>
+      </p:sp>
+      <p:sp>
+        <p:nvSpPr>
+          <p:cNvPr id="6" name="Date Placeholder 5"/>
+          <p:cNvSpPr>
+            <a:spLocks noGrp="1"/>
+          </p:cNvSpPr>
+          <p:nvPr>
+            <p:ph type="dt" idx="12"/>
+          </p:nvPr>
+        </p:nvSpPr>
+        <p:spPr/>
+        <p:txBody>
+          <a:bodyPr/>
+          <a:lstStyle/>
+          <a:p>
+            <a:pPr marL="0" marR="0" lvl="0" indent="0" algn="r" defTabSz="931863" rtl="0" eaLnBrk="1" fontAlgn="base" latinLnBrk="0" hangingPunct="1">
+              <a:lnSpc>
+                <a:spcPct val="100000"/>
+              </a:lnSpc>
+              <a:spcBef>
+                <a:spcPct val="0"/>
+              </a:spcBef>
+              <a:spcAft>
+                <a:spcPct val="0"/>
+              </a:spcAft>
+              <a:buClrTx/>
+              <a:buSzTx/>
+              <a:buFontTx/>
+              <a:buNone/>
+              <a:tabLst/>
+              <a:defRPr/>
+            </a:pPr>
+            <a:fld id="{38EEC551-8CDA-4EB6-89BB-2A86C9F091C8}" type="datetime8">
+              <a:rPr kumimoji="0" lang="en-US" sz="1200" b="0" i="0" u="none" strike="noStrike" kern="1200" cap="none" spc="0" normalizeH="0" baseline="0" noProof="0" smtClean="0">
+                <a:ln>
+                  <a:noFill/>
+                </a:ln>
+                <a:solidFill>
+                  <a:prstClr val="black"/>
+                </a:solidFill>
+                <a:effectLst/>
+                <a:uLnTx/>
+                <a:uFillTx/>
+                <a:latin typeface="Segoe UI" panose="020B0502040204020203" pitchFamily="34" charset="0"/>
+                <a:ea typeface="MS PGothic" panose="020B0600070205080204" pitchFamily="34" charset="-128"/>
+                <a:cs typeface="+mn-cs"/>
+              </a:rPr>
+              <a:pPr marL="0" marR="0" lvl="0" indent="0" algn="r" defTabSz="931863" rtl="0" eaLnBrk="1" fontAlgn="base" latinLnBrk="0" hangingPunct="1">
+                <a:lnSpc>
+                  <a:spcPct val="100000"/>
+                </a:lnSpc>
+                <a:spcBef>
+                  <a:spcPct val="0"/>
+                </a:spcBef>
+                <a:spcAft>
+                  <a:spcPct val="0"/>
+                </a:spcAft>
+                <a:buClrTx/>
+                <a:buSzTx/>
+                <a:buFontTx/>
+                <a:buNone/>
+                <a:tabLst/>
+                <a:defRPr/>
+              </a:pPr>
+              <a:t>7/13/20 9:59 PM</a:t>
+            </a:fld>
+            <a:endParaRPr kumimoji="0" lang="en-US" sz="1200" b="0" i="0" u="none" strike="noStrike" kern="1200" cap="none" spc="0" normalizeH="0" baseline="0" noProof="0" dirty="0">
+              <a:ln>
+                <a:noFill/>
+              </a:ln>
+              <a:solidFill>
+                <a:prstClr val="black"/>
+              </a:solidFill>
+              <a:effectLst/>
+              <a:uLnTx/>
+              <a:uFillTx/>
+              <a:latin typeface="Segoe UI" panose="020B0502040204020203" pitchFamily="34" charset="0"/>
+              <a:ea typeface="MS PGothic" panose="020B0600070205080204" pitchFamily="34" charset="-128"/>
+              <a:cs typeface="+mn-cs"/>
+            </a:endParaRPr>
+          </a:p>
+        </p:txBody>
+      </p:sp>
+      <p:sp>
+        <p:nvSpPr>
+          <p:cNvPr id="7" name="Slide Number Placeholder 6"/>
+          <p:cNvSpPr>
+            <a:spLocks noGrp="1"/>
+          </p:cNvSpPr>
+          <p:nvPr>
+            <p:ph type="sldNum" sz="quarter" idx="13"/>
+          </p:nvPr>
+        </p:nvSpPr>
+        <p:spPr/>
+        <p:txBody>
+          <a:bodyPr/>
+          <a:lstStyle/>
+          <a:p>
+            <a:pPr marL="0" marR="0" lvl="0" indent="0" algn="r" defTabSz="931863" rtl="0" eaLnBrk="1" fontAlgn="base" latinLnBrk="0" hangingPunct="1">
+              <a:lnSpc>
+                <a:spcPct val="100000"/>
+              </a:lnSpc>
+              <a:spcBef>
+                <a:spcPct val="0"/>
+              </a:spcBef>
+              <a:spcAft>
+                <a:spcPct val="0"/>
+              </a:spcAft>
+              <a:buClrTx/>
+              <a:buSzTx/>
+              <a:buFontTx/>
+              <a:buNone/>
+              <a:tabLst/>
+              <a:defRPr/>
+            </a:pPr>
+            <a:fld id="{B4008EB6-D09E-4580-8CD6-DDB14511944F}" type="slidenum">
+              <a:rPr kumimoji="0" lang="en-US" sz="1200" b="0" i="0" u="none" strike="noStrike" kern="1200" cap="none" spc="0" normalizeH="0" baseline="0" noProof="0" smtClean="0">
+                <a:ln>
+                  <a:noFill/>
+                </a:ln>
+                <a:solidFill>
+                  <a:prstClr val="black"/>
+                </a:solidFill>
+                <a:effectLst/>
+                <a:uLnTx/>
+                <a:uFillTx/>
+                <a:latin typeface="Segoe UI" panose="020B0502040204020203" pitchFamily="34" charset="0"/>
+                <a:ea typeface="MS PGothic" panose="020B0600070205080204" pitchFamily="34" charset="-128"/>
+                <a:cs typeface="+mn-cs"/>
+              </a:rPr>
+              <a:pPr marL="0" marR="0" lvl="0" indent="0" algn="r" defTabSz="931863" rtl="0" eaLnBrk="1" fontAlgn="base" latinLnBrk="0" hangingPunct="1">
+                <a:lnSpc>
+                  <a:spcPct val="100000"/>
+                </a:lnSpc>
+                <a:spcBef>
+                  <a:spcPct val="0"/>
+                </a:spcBef>
+                <a:spcAft>
+                  <a:spcPct val="0"/>
+                </a:spcAft>
+                <a:buClrTx/>
+                <a:buSzTx/>
+                <a:buFontTx/>
+                <a:buNone/>
+                <a:tabLst/>
+                <a:defRPr/>
+              </a:pPr>
+              <a:t>9</a:t>
+            </a:fld>
+            <a:endParaRPr kumimoji="0" lang="en-US" sz="1200" b="0" i="0" u="none" strike="noStrike" kern="1200" cap="none" spc="0" normalizeH="0" baseline="0" noProof="0" dirty="0">
+              <a:ln>
+                <a:noFill/>
+              </a:ln>
+              <a:solidFill>
+                <a:prstClr val="black"/>
+              </a:solidFill>
+              <a:effectLst/>
+              <a:uLnTx/>
+              <a:uFillTx/>
+              <a:latin typeface="Segoe UI" panose="020B0502040204020203" pitchFamily="34" charset="0"/>
+              <a:ea typeface="MS PGothic" panose="020B0600070205080204" pitchFamily="34" charset="-128"/>
+              <a:cs typeface="+mn-cs"/>
+            </a:endParaRPr>
+          </a:p>
+        </p:txBody>
+      </p:sp>
+    </p:spTree>
+    <p:extLst>
+      <p:ext uri="{BB962C8B-B14F-4D97-AF65-F5344CB8AC3E}">
         <p14:creationId xmlns:p14="http://schemas.microsoft.com/office/powerpoint/2010/main" val="1359998779"/>
       </p:ext>
     </p:extLst>
@@ -10908,7 +11792,7 @@
 </p:notes>
 </file>
 
-<file path=ppt/notesSlides/notesSlide8.xml><?xml version="1.0" encoding="utf-8"?>
+<file path=ppt/notesSlides/notesSlide9.xml><?xml version="1.0" encoding="utf-8"?>
 <p:notes xmlns:a="http://schemas.openxmlformats.org/drawingml/2006/main" xmlns:r="http://schemas.openxmlformats.org/officeDocument/2006/relationships" xmlns:p="http://schemas.openxmlformats.org/presentationml/2006/main">
   <p:cSld>
     <p:spTree>
@@ -10982,7 +11866,7 @@
             <a:fld id="{6C5EA175-D3BD-433B-AE78-035AF1E8740C}" type="slidenum">
               <a:rPr lang="es-ES" smtClean="0"/>
               <a:pPr/>
-              <a:t>9</a:t>
+              <a:t>10</a:t>
             </a:fld>
             <a:endParaRPr lang="es-ES"/>
           </a:p>
@@ -11182,7 +12066,7 @@
           <a:p>
             <a:fld id="{19846C5A-1DDF-42C4-9FB4-FFCE11C434AC}" type="datetimeFigureOut">
               <a:rPr lang="es-ES" smtClean="0"/>
-              <a:t>12/7/20</a:t>
+              <a:t>13/7/20</a:t>
             </a:fld>
             <a:endParaRPr lang="es-ES"/>
           </a:p>
@@ -11352,7 +12236,7 @@
           <a:p>
             <a:fld id="{19846C5A-1DDF-42C4-9FB4-FFCE11C434AC}" type="datetimeFigureOut">
               <a:rPr lang="es-ES" smtClean="0"/>
-              <a:t>12/7/20</a:t>
+              <a:t>13/7/20</a:t>
             </a:fld>
             <a:endParaRPr lang="es-ES"/>
           </a:p>
@@ -11532,7 +12416,7 @@
           <a:p>
             <a:fld id="{19846C5A-1DDF-42C4-9FB4-FFCE11C434AC}" type="datetimeFigureOut">
               <a:rPr lang="es-ES" smtClean="0"/>
-              <a:t>12/7/20</a:t>
+              <a:t>13/7/20</a:t>
             </a:fld>
             <a:endParaRPr lang="es-ES"/>
           </a:p>
@@ -11829,7 +12713,7 @@
           <a:p>
             <a:fld id="{19846C5A-1DDF-42C4-9FB4-FFCE11C434AC}" type="datetimeFigureOut">
               <a:rPr lang="es-ES" smtClean="0"/>
-              <a:t>12/7/20</a:t>
+              <a:t>13/7/20</a:t>
             </a:fld>
             <a:endParaRPr lang="es-ES"/>
           </a:p>
@@ -12075,7 +12959,7 @@
           <a:p>
             <a:fld id="{19846C5A-1DDF-42C4-9FB4-FFCE11C434AC}" type="datetimeFigureOut">
               <a:rPr lang="es-ES" smtClean="0"/>
-              <a:t>12/7/20</a:t>
+              <a:t>13/7/20</a:t>
             </a:fld>
             <a:endParaRPr lang="es-ES"/>
           </a:p>
@@ -12363,7 +13247,7 @@
           <a:p>
             <a:fld id="{19846C5A-1DDF-42C4-9FB4-FFCE11C434AC}" type="datetimeFigureOut">
               <a:rPr lang="es-ES" smtClean="0"/>
-              <a:t>12/7/20</a:t>
+              <a:t>13/7/20</a:t>
             </a:fld>
             <a:endParaRPr lang="es-ES"/>
           </a:p>
@@ -12785,7 +13669,7 @@
           <a:p>
             <a:fld id="{19846C5A-1DDF-42C4-9FB4-FFCE11C434AC}" type="datetimeFigureOut">
               <a:rPr lang="es-ES" smtClean="0"/>
-              <a:t>12/7/20</a:t>
+              <a:t>13/7/20</a:t>
             </a:fld>
             <a:endParaRPr lang="es-ES"/>
           </a:p>
@@ -12903,7 +13787,7 @@
           <a:p>
             <a:fld id="{19846C5A-1DDF-42C4-9FB4-FFCE11C434AC}" type="datetimeFigureOut">
               <a:rPr lang="es-ES" smtClean="0"/>
-              <a:t>12/7/20</a:t>
+              <a:t>13/7/20</a:t>
             </a:fld>
             <a:endParaRPr lang="es-ES"/>
           </a:p>
@@ -12998,7 +13882,7 @@
           <a:p>
             <a:fld id="{19846C5A-1DDF-42C4-9FB4-FFCE11C434AC}" type="datetimeFigureOut">
               <a:rPr lang="es-ES" smtClean="0"/>
-              <a:t>12/7/20</a:t>
+              <a:t>13/7/20</a:t>
             </a:fld>
             <a:endParaRPr lang="es-ES"/>
           </a:p>
@@ -13275,7 +14159,7 @@
           <a:p>
             <a:fld id="{19846C5A-1DDF-42C4-9FB4-FFCE11C434AC}" type="datetimeFigureOut">
               <a:rPr lang="es-ES" smtClean="0"/>
-              <a:t>12/7/20</a:t>
+              <a:t>13/7/20</a:t>
             </a:fld>
             <a:endParaRPr lang="es-ES"/>
           </a:p>
@@ -13528,7 +14412,7 @@
           <a:p>
             <a:fld id="{19846C5A-1DDF-42C4-9FB4-FFCE11C434AC}" type="datetimeFigureOut">
               <a:rPr lang="es-ES" smtClean="0"/>
-              <a:t>12/7/20</a:t>
+              <a:t>13/7/20</a:t>
             </a:fld>
             <a:endParaRPr lang="es-ES"/>
           </a:p>
@@ -13741,7 +14625,7 @@
           <a:p>
             <a:fld id="{19846C5A-1DDF-42C4-9FB4-FFCE11C434AC}" type="datetimeFigureOut">
               <a:rPr lang="es-ES" smtClean="0"/>
-              <a:t>12/7/20</a:t>
+              <a:t>13/7/20</a:t>
             </a:fld>
             <a:endParaRPr lang="es-ES"/>
           </a:p>
@@ -14457,6 +15341,333 @@
 </p:sld>
 </file>
 
+<file path=ppt/slides/slide10.xml><?xml version="1.0" encoding="utf-8"?>
+<p:sld xmlns:a="http://schemas.openxmlformats.org/drawingml/2006/main" xmlns:r="http://schemas.openxmlformats.org/officeDocument/2006/relationships" xmlns:p="http://schemas.openxmlformats.org/presentationml/2006/main">
+  <p:cSld>
+    <p:spTree>
+      <p:nvGrpSpPr>
+        <p:cNvPr id="1" name=""/>
+        <p:cNvGrpSpPr/>
+        <p:nvPr/>
+      </p:nvGrpSpPr>
+      <p:grpSpPr>
+        <a:xfrm>
+          <a:off x="0" y="0"/>
+          <a:ext cx="0" cy="0"/>
+          <a:chOff x="0" y="0"/>
+          <a:chExt cx="0" cy="0"/>
+        </a:xfrm>
+      </p:grpSpPr>
+      <p:sp>
+        <p:nvSpPr>
+          <p:cNvPr id="6" name="Text Placeholder 3"/>
+          <p:cNvSpPr txBox="1">
+            <a:spLocks/>
+          </p:cNvSpPr>
+          <p:nvPr/>
+        </p:nvSpPr>
+        <p:spPr>
+          <a:xfrm>
+            <a:off x="911424" y="4907107"/>
+            <a:ext cx="7171337" cy="1792326"/>
+          </a:xfrm>
+          <a:prstGeom prst="rect">
+            <a:avLst/>
+          </a:prstGeom>
+        </p:spPr>
+        <p:txBody>
+          <a:bodyPr/>
+          <a:lstStyle>
+            <a:lvl1pPr marL="228600" indent="-228600" algn="l" defTabSz="914400" rtl="0" eaLnBrk="1" latinLnBrk="0" hangingPunct="1">
+              <a:lnSpc>
+                <a:spcPct val="90000"/>
+              </a:lnSpc>
+              <a:spcBef>
+                <a:spcPts val="1000"/>
+              </a:spcBef>
+              <a:buFont typeface="Arial" panose="020B0604020202020204" pitchFamily="34" charset="0"/>
+              <a:buChar char="•"/>
+              <a:defRPr sz="2800" kern="1200">
+                <a:solidFill>
+                  <a:schemeClr val="tx1"/>
+                </a:solidFill>
+                <a:latin typeface="+mn-lt"/>
+                <a:ea typeface="+mn-ea"/>
+                <a:cs typeface="+mn-cs"/>
+              </a:defRPr>
+            </a:lvl1pPr>
+            <a:lvl2pPr marL="685800" indent="-228600" algn="l" defTabSz="914400" rtl="0" eaLnBrk="1" latinLnBrk="0" hangingPunct="1">
+              <a:lnSpc>
+                <a:spcPct val="90000"/>
+              </a:lnSpc>
+              <a:spcBef>
+                <a:spcPts val="500"/>
+              </a:spcBef>
+              <a:buFont typeface="Arial" panose="020B0604020202020204" pitchFamily="34" charset="0"/>
+              <a:buChar char="•"/>
+              <a:defRPr sz="2400" kern="1200">
+                <a:solidFill>
+                  <a:schemeClr val="tx1"/>
+                </a:solidFill>
+                <a:latin typeface="+mn-lt"/>
+                <a:ea typeface="+mn-ea"/>
+                <a:cs typeface="+mn-cs"/>
+              </a:defRPr>
+            </a:lvl2pPr>
+            <a:lvl3pPr marL="1143000" indent="-228600" algn="l" defTabSz="914400" rtl="0" eaLnBrk="1" latinLnBrk="0" hangingPunct="1">
+              <a:lnSpc>
+                <a:spcPct val="90000"/>
+              </a:lnSpc>
+              <a:spcBef>
+                <a:spcPts val="500"/>
+              </a:spcBef>
+              <a:buFont typeface="Arial" panose="020B0604020202020204" pitchFamily="34" charset="0"/>
+              <a:buChar char="•"/>
+              <a:defRPr sz="2000" kern="1200">
+                <a:solidFill>
+                  <a:schemeClr val="tx1"/>
+                </a:solidFill>
+                <a:latin typeface="+mn-lt"/>
+                <a:ea typeface="+mn-ea"/>
+                <a:cs typeface="+mn-cs"/>
+              </a:defRPr>
+            </a:lvl3pPr>
+            <a:lvl4pPr marL="1600200" indent="-228600" algn="l" defTabSz="914400" rtl="0" eaLnBrk="1" latinLnBrk="0" hangingPunct="1">
+              <a:lnSpc>
+                <a:spcPct val="90000"/>
+              </a:lnSpc>
+              <a:spcBef>
+                <a:spcPts val="500"/>
+              </a:spcBef>
+              <a:buFont typeface="Arial" panose="020B0604020202020204" pitchFamily="34" charset="0"/>
+              <a:buChar char="•"/>
+              <a:defRPr sz="1800" kern="1200">
+                <a:solidFill>
+                  <a:schemeClr val="tx1"/>
+                </a:solidFill>
+                <a:latin typeface="+mn-lt"/>
+                <a:ea typeface="+mn-ea"/>
+                <a:cs typeface="+mn-cs"/>
+              </a:defRPr>
+            </a:lvl4pPr>
+            <a:lvl5pPr marL="2057400" indent="-228600" algn="l" defTabSz="914400" rtl="0" eaLnBrk="1" latinLnBrk="0" hangingPunct="1">
+              <a:lnSpc>
+                <a:spcPct val="90000"/>
+              </a:lnSpc>
+              <a:spcBef>
+                <a:spcPts val="500"/>
+              </a:spcBef>
+              <a:buFont typeface="Arial" panose="020B0604020202020204" pitchFamily="34" charset="0"/>
+              <a:buChar char="•"/>
+              <a:defRPr sz="1800" kern="1200">
+                <a:solidFill>
+                  <a:schemeClr val="tx1"/>
+                </a:solidFill>
+                <a:latin typeface="+mn-lt"/>
+                <a:ea typeface="+mn-ea"/>
+                <a:cs typeface="+mn-cs"/>
+              </a:defRPr>
+            </a:lvl5pPr>
+            <a:lvl6pPr marL="2514600" indent="-228600" algn="l" defTabSz="914400" rtl="0" eaLnBrk="1" latinLnBrk="0" hangingPunct="1">
+              <a:lnSpc>
+                <a:spcPct val="90000"/>
+              </a:lnSpc>
+              <a:spcBef>
+                <a:spcPts val="500"/>
+              </a:spcBef>
+              <a:buFont typeface="Arial" panose="020B0604020202020204" pitchFamily="34" charset="0"/>
+              <a:buChar char="•"/>
+              <a:defRPr sz="1800" kern="1200">
+                <a:solidFill>
+                  <a:schemeClr val="tx1"/>
+                </a:solidFill>
+                <a:latin typeface="+mn-lt"/>
+                <a:ea typeface="+mn-ea"/>
+                <a:cs typeface="+mn-cs"/>
+              </a:defRPr>
+            </a:lvl6pPr>
+            <a:lvl7pPr marL="2971800" indent="-228600" algn="l" defTabSz="914400" rtl="0" eaLnBrk="1" latinLnBrk="0" hangingPunct="1">
+              <a:lnSpc>
+                <a:spcPct val="90000"/>
+              </a:lnSpc>
+              <a:spcBef>
+                <a:spcPts val="500"/>
+              </a:spcBef>
+              <a:buFont typeface="Arial" panose="020B0604020202020204" pitchFamily="34" charset="0"/>
+              <a:buChar char="•"/>
+              <a:defRPr sz="1800" kern="1200">
+                <a:solidFill>
+                  <a:schemeClr val="tx1"/>
+                </a:solidFill>
+                <a:latin typeface="+mn-lt"/>
+                <a:ea typeface="+mn-ea"/>
+                <a:cs typeface="+mn-cs"/>
+              </a:defRPr>
+            </a:lvl7pPr>
+            <a:lvl8pPr marL="3429000" indent="-228600" algn="l" defTabSz="914400" rtl="0" eaLnBrk="1" latinLnBrk="0" hangingPunct="1">
+              <a:lnSpc>
+                <a:spcPct val="90000"/>
+              </a:lnSpc>
+              <a:spcBef>
+                <a:spcPts val="500"/>
+              </a:spcBef>
+              <a:buFont typeface="Arial" panose="020B0604020202020204" pitchFamily="34" charset="0"/>
+              <a:buChar char="•"/>
+              <a:defRPr sz="1800" kern="1200">
+                <a:solidFill>
+                  <a:schemeClr val="tx1"/>
+                </a:solidFill>
+                <a:latin typeface="+mn-lt"/>
+                <a:ea typeface="+mn-ea"/>
+                <a:cs typeface="+mn-cs"/>
+              </a:defRPr>
+            </a:lvl8pPr>
+            <a:lvl9pPr marL="3886200" indent="-228600" algn="l" defTabSz="914400" rtl="0" eaLnBrk="1" latinLnBrk="0" hangingPunct="1">
+              <a:lnSpc>
+                <a:spcPct val="90000"/>
+              </a:lnSpc>
+              <a:spcBef>
+                <a:spcPts val="500"/>
+              </a:spcBef>
+              <a:buFont typeface="Arial" panose="020B0604020202020204" pitchFamily="34" charset="0"/>
+              <a:buChar char="•"/>
+              <a:defRPr sz="1800" kern="1200">
+                <a:solidFill>
+                  <a:schemeClr val="tx1"/>
+                </a:solidFill>
+                <a:latin typeface="+mn-lt"/>
+                <a:ea typeface="+mn-ea"/>
+                <a:cs typeface="+mn-cs"/>
+              </a:defRPr>
+            </a:lvl9pPr>
+          </a:lstStyle>
+          <a:p>
+            <a:pPr marL="0" indent="0">
+              <a:buNone/>
+            </a:pPr>
+            <a:r>
+              <a:rPr lang="es-ES" sz="2000" dirty="0">
+                <a:latin typeface="Segoe UI Light" panose="020B0502040204020203" pitchFamily="34" charset="0"/>
+                <a:cs typeface="Segoe UI Light" panose="020B0502040204020203" pitchFamily="34" charset="0"/>
+                <a:hlinkClick r:id="rId3"/>
+              </a:rPr>
+              <a:t>jlguerrero@gmail.com</a:t>
+            </a:r>
+            <a:r>
+              <a:rPr lang="es-ES" sz="2000" dirty="0">
+                <a:latin typeface="Segoe UI Light" panose="020B0502040204020203" pitchFamily="34" charset="0"/>
+                <a:cs typeface="Segoe UI Light" panose="020B0502040204020203" pitchFamily="34" charset="0"/>
+              </a:rPr>
+              <a:t> </a:t>
+            </a:r>
+          </a:p>
+          <a:p>
+            <a:pPr marL="0" indent="0">
+              <a:buNone/>
+            </a:pPr>
+            <a:r>
+              <a:rPr lang="es-ES" sz="2000" dirty="0">
+                <a:latin typeface="Segoe UI Light" panose="020B0502040204020203" pitchFamily="34" charset="0"/>
+                <a:cs typeface="Segoe UI Light" panose="020B0502040204020203" pitchFamily="34" charset="0"/>
+              </a:rPr>
+              <a:t>@juanluelguerre</a:t>
+            </a:r>
+          </a:p>
+        </p:txBody>
+      </p:sp>
+      <p:sp>
+        <p:nvSpPr>
+          <p:cNvPr id="2" name="Rectangle 1"/>
+          <p:cNvSpPr/>
+          <p:nvPr/>
+        </p:nvSpPr>
+        <p:spPr>
+          <a:xfrm>
+            <a:off x="4536053" y="2859783"/>
+            <a:ext cx="6805384" cy="369332"/>
+          </a:xfrm>
+          <a:prstGeom prst="rect">
+            <a:avLst/>
+          </a:prstGeom>
+        </p:spPr>
+        <p:txBody>
+          <a:bodyPr wrap="square">
+            <a:spAutoFit/>
+          </a:bodyPr>
+          <a:lstStyle/>
+          <a:p>
+            <a:r>
+              <a:rPr lang="es-ES" dirty="0">
+                <a:hlinkClick r:id="rId4"/>
+              </a:rPr>
+              <a:t>https://github.com/juanluelguerre/Training/tree/master/CSFeatures/</a:t>
+            </a:r>
+            <a:r>
+              <a:rPr lang="es-ES" dirty="0"/>
+              <a:t> </a:t>
+            </a:r>
+          </a:p>
+        </p:txBody>
+      </p:sp>
+      <p:pic>
+        <p:nvPicPr>
+          <p:cNvPr id="7" name="Picture 2" descr="Resultado de imagen de github">
+            <a:hlinkClick r:id="rId4"/>
+          </p:cNvPr>
+          <p:cNvPicPr>
+            <a:picLocks noChangeAspect="1" noChangeArrowheads="1"/>
+          </p:cNvPicPr>
+          <p:nvPr/>
+        </p:nvPicPr>
+        <p:blipFill>
+          <a:blip r:embed="rId5" cstate="print">
+            <a:extLst>
+              <a:ext uri="{28A0092B-C50C-407E-A947-70E740481C1C}">
+                <a14:useLocalDpi xmlns:a14="http://schemas.microsoft.com/office/drawing/2010/main" val="0"/>
+              </a:ext>
+            </a:extLst>
+          </a:blip>
+          <a:srcRect/>
+          <a:stretch>
+            <a:fillRect/>
+          </a:stretch>
+        </p:blipFill>
+        <p:spPr bwMode="auto">
+          <a:xfrm>
+            <a:off x="8760296" y="2132856"/>
+            <a:ext cx="2242330" cy="745575"/>
+          </a:xfrm>
+          <a:prstGeom prst="rect">
+            <a:avLst/>
+          </a:prstGeom>
+          <a:noFill/>
+          <a:extLst>
+            <a:ext uri="{909E8E84-426E-40DD-AFC4-6F175D3DCCD1}">
+              <a14:hiddenFill xmlns:a14="http://schemas.microsoft.com/office/drawing/2010/main">
+                <a:solidFill>
+                  <a:srgbClr val="FFFFFF"/>
+                </a:solidFill>
+              </a14:hiddenFill>
+            </a:ext>
+          </a:extLst>
+        </p:spPr>
+      </p:pic>
+    </p:spTree>
+    <p:extLst>
+      <p:ext uri="{BB962C8B-B14F-4D97-AF65-F5344CB8AC3E}">
+        <p14:creationId xmlns:p14="http://schemas.microsoft.com/office/powerpoint/2010/main" val="3148757024"/>
+      </p:ext>
+    </p:extLst>
+  </p:cSld>
+  <p:clrMapOvr>
+    <a:masterClrMapping/>
+  </p:clrMapOvr>
+  <p:transition spd="slow">
+    <p:push/>
+  </p:transition>
+</p:sld>
+</file>
+
 <file path=ppt/slides/slide2.xml><?xml version="1.0" encoding="utf-8"?>
 <p:sld xmlns:a="http://schemas.openxmlformats.org/drawingml/2006/main" xmlns:r="http://schemas.openxmlformats.org/officeDocument/2006/relationships" xmlns:p="http://schemas.openxmlformats.org/presentationml/2006/main">
   <p:cSld>
@@ -15254,7 +16465,7 @@
           <p:nvPr>
             <p:extLst>
               <p:ext uri="{D42A27DB-BD31-4B8C-83A1-F6EECF244321}">
-                <p14:modId xmlns:p14="http://schemas.microsoft.com/office/powerpoint/2010/main" val="1852532351"/>
+                <p14:modId xmlns:p14="http://schemas.microsoft.com/office/powerpoint/2010/main" val="482597274"/>
               </p:ext>
             </p:extLst>
           </p:nvPr>
@@ -15458,6 +16669,774 @@
 </file>
 
 <file path=ppt/slides/slide4.xml><?xml version="1.0" encoding="utf-8"?>
+<p:sld xmlns:a="http://schemas.openxmlformats.org/drawingml/2006/main" xmlns:r="http://schemas.openxmlformats.org/officeDocument/2006/relationships" xmlns:p="http://schemas.openxmlformats.org/presentationml/2006/main">
+  <p:cSld>
+    <p:spTree>
+      <p:nvGrpSpPr>
+        <p:cNvPr id="1" name=""/>
+        <p:cNvGrpSpPr/>
+        <p:nvPr/>
+      </p:nvGrpSpPr>
+      <p:grpSpPr>
+        <a:xfrm>
+          <a:off x="0" y="0"/>
+          <a:ext cx="0" cy="0"/>
+          <a:chOff x="0" y="0"/>
+          <a:chExt cx="0" cy="0"/>
+        </a:xfrm>
+      </p:grpSpPr>
+      <p:pic>
+        <p:nvPicPr>
+          <p:cNvPr id="87" name="Picture 86"/>
+          <p:cNvPicPr>
+            <a:picLocks noChangeAspect="1"/>
+          </p:cNvPicPr>
+          <p:nvPr/>
+        </p:nvPicPr>
+        <p:blipFill>
+          <a:blip r:embed="rId3"/>
+          <a:stretch>
+            <a:fillRect/>
+          </a:stretch>
+        </p:blipFill>
+        <p:spPr>
+          <a:xfrm>
+            <a:off x="817909" y="5127634"/>
+            <a:ext cx="2116260" cy="1833272"/>
+          </a:xfrm>
+          <a:prstGeom prst="rect">
+            <a:avLst/>
+          </a:prstGeom>
+        </p:spPr>
+      </p:pic>
+      <p:pic>
+        <p:nvPicPr>
+          <p:cNvPr id="88" name="Picture 87"/>
+          <p:cNvPicPr>
+            <a:picLocks noChangeAspect="1"/>
+          </p:cNvPicPr>
+          <p:nvPr/>
+        </p:nvPicPr>
+        <p:blipFill>
+          <a:blip r:embed="rId3"/>
+          <a:stretch>
+            <a:fillRect/>
+          </a:stretch>
+        </p:blipFill>
+        <p:spPr>
+          <a:xfrm>
+            <a:off x="830294" y="-283367"/>
+            <a:ext cx="2101809" cy="1820754"/>
+          </a:xfrm>
+          <a:prstGeom prst="rect">
+            <a:avLst/>
+          </a:prstGeom>
+        </p:spPr>
+      </p:pic>
+      <p:pic>
+        <p:nvPicPr>
+          <p:cNvPr id="89" name="Picture 88"/>
+          <p:cNvPicPr>
+            <a:picLocks noChangeAspect="1"/>
+          </p:cNvPicPr>
+          <p:nvPr/>
+        </p:nvPicPr>
+        <p:blipFill>
+          <a:blip r:embed="rId3"/>
+          <a:stretch>
+            <a:fillRect/>
+          </a:stretch>
+        </p:blipFill>
+        <p:spPr>
+          <a:xfrm>
+            <a:off x="2399276" y="585013"/>
+            <a:ext cx="2140301" cy="1854098"/>
+          </a:xfrm>
+          <a:prstGeom prst="rect">
+            <a:avLst/>
+          </a:prstGeom>
+        </p:spPr>
+      </p:pic>
+      <p:pic>
+        <p:nvPicPr>
+          <p:cNvPr id="90" name="Picture 89"/>
+          <p:cNvPicPr>
+            <a:picLocks noChangeAspect="1"/>
+          </p:cNvPicPr>
+          <p:nvPr/>
+        </p:nvPicPr>
+        <p:blipFill>
+          <a:blip r:embed="rId3"/>
+          <a:stretch>
+            <a:fillRect/>
+          </a:stretch>
+        </p:blipFill>
+        <p:spPr>
+          <a:xfrm>
+            <a:off x="3968018" y="1492110"/>
+            <a:ext cx="2140301" cy="1854098"/>
+          </a:xfrm>
+          <a:prstGeom prst="rect">
+            <a:avLst/>
+          </a:prstGeom>
+        </p:spPr>
+      </p:pic>
+      <p:pic>
+        <p:nvPicPr>
+          <p:cNvPr id="92" name="Picture 91"/>
+          <p:cNvPicPr>
+            <a:picLocks noChangeAspect="1"/>
+          </p:cNvPicPr>
+          <p:nvPr/>
+        </p:nvPicPr>
+        <p:blipFill>
+          <a:blip r:embed="rId3"/>
+          <a:stretch>
+            <a:fillRect/>
+          </a:stretch>
+        </p:blipFill>
+        <p:spPr>
+          <a:xfrm>
+            <a:off x="2399276" y="4224071"/>
+            <a:ext cx="2140301" cy="1854098"/>
+          </a:xfrm>
+          <a:prstGeom prst="rect">
+            <a:avLst/>
+          </a:prstGeom>
+        </p:spPr>
+      </p:pic>
+      <p:sp>
+        <p:nvSpPr>
+          <p:cNvPr id="45" name="Hexagon 44"/>
+          <p:cNvSpPr/>
+          <p:nvPr/>
+        </p:nvSpPr>
+        <p:spPr bwMode="auto">
+          <a:xfrm>
+            <a:off x="6415486" y="917133"/>
+            <a:ext cx="2029679" cy="1749721"/>
+          </a:xfrm>
+          <a:prstGeom prst="hexagon">
+            <a:avLst/>
+          </a:prstGeom>
+          <a:noFill/>
+          <a:ln>
+            <a:noFill/>
+            <a:headEnd type="none" w="med" len="med"/>
+            <a:tailEnd type="none" w="med" len="med"/>
+          </a:ln>
+          <a:effectLst/>
+        </p:spPr>
+        <p:style>
+          <a:lnRef idx="1">
+            <a:schemeClr val="accent2"/>
+          </a:lnRef>
+          <a:fillRef idx="3">
+            <a:schemeClr val="accent2"/>
+          </a:fillRef>
+          <a:effectRef idx="2">
+            <a:schemeClr val="accent2"/>
+          </a:effectRef>
+          <a:fontRef idx="minor">
+            <a:schemeClr val="lt1"/>
+          </a:fontRef>
+        </p:style>
+        <p:txBody>
+          <a:bodyPr rot="0" spcFirstLastPara="0" vertOverflow="overflow" horzOverflow="overflow" vert="horz" wrap="square" lIns="0" tIns="0" rIns="0" bIns="0" numCol="1" spcCol="0" rtlCol="0" fromWordArt="0" anchor="ctr" anchorCtr="0" forceAA="0" compatLnSpc="1">
+            <a:prstTxWarp prst="textNoShape">
+              <a:avLst/>
+            </a:prstTxWarp>
+            <a:noAutofit/>
+          </a:bodyPr>
+          <a:lstStyle/>
+          <a:p>
+            <a:pPr algn="ctr" defTabSz="913741" eaLnBrk="0" fontAlgn="base" hangingPunct="0">
+              <a:lnSpc>
+                <a:spcPct val="90000"/>
+              </a:lnSpc>
+              <a:spcBef>
+                <a:spcPct val="0"/>
+              </a:spcBef>
+              <a:spcAft>
+                <a:spcPct val="0"/>
+              </a:spcAft>
+              <a:defRPr/>
+            </a:pPr>
+            <a:endParaRPr lang="en-US" sz="1469" dirty="0">
+              <a:solidFill>
+                <a:srgbClr val="FFFFFF"/>
+              </a:solidFill>
+              <a:latin typeface="Segoe UI Semibold" panose="020B0702040204020203" pitchFamily="34" charset="0"/>
+              <a:cs typeface="Segoe UI Semibold" panose="020B0702040204020203" pitchFamily="34" charset="0"/>
+            </a:endParaRPr>
+          </a:p>
+        </p:txBody>
+      </p:sp>
+      <p:pic>
+        <p:nvPicPr>
+          <p:cNvPr id="63" name="Picture 62"/>
+          <p:cNvPicPr>
+            <a:picLocks noChangeAspect="1"/>
+          </p:cNvPicPr>
+          <p:nvPr/>
+        </p:nvPicPr>
+        <p:blipFill>
+          <a:blip r:embed="rId3"/>
+          <a:stretch>
+            <a:fillRect/>
+          </a:stretch>
+        </p:blipFill>
+        <p:spPr>
+          <a:xfrm>
+            <a:off x="-738184" y="607087"/>
+            <a:ext cx="2101809" cy="1820754"/>
+          </a:xfrm>
+          <a:prstGeom prst="rect">
+            <a:avLst/>
+          </a:prstGeom>
+        </p:spPr>
+      </p:pic>
+      <p:pic>
+        <p:nvPicPr>
+          <p:cNvPr id="73" name="Picture 72"/>
+          <p:cNvPicPr>
+            <a:picLocks noChangeAspect="1"/>
+          </p:cNvPicPr>
+          <p:nvPr/>
+        </p:nvPicPr>
+        <p:blipFill>
+          <a:blip r:embed="rId3"/>
+          <a:stretch>
+            <a:fillRect/>
+          </a:stretch>
+        </p:blipFill>
+        <p:spPr>
+          <a:xfrm>
+            <a:off x="-738183" y="-1185762"/>
+            <a:ext cx="2101809" cy="1820754"/>
+          </a:xfrm>
+          <a:prstGeom prst="rect">
+            <a:avLst/>
+          </a:prstGeom>
+        </p:spPr>
+      </p:pic>
+      <p:pic>
+        <p:nvPicPr>
+          <p:cNvPr id="74" name="Picture 73"/>
+          <p:cNvPicPr>
+            <a:picLocks noChangeAspect="1"/>
+          </p:cNvPicPr>
+          <p:nvPr/>
+        </p:nvPicPr>
+        <p:blipFill>
+          <a:blip r:embed="rId3"/>
+          <a:stretch>
+            <a:fillRect/>
+          </a:stretch>
+        </p:blipFill>
+        <p:spPr>
+          <a:xfrm>
+            <a:off x="-732125" y="4236143"/>
+            <a:ext cx="2101809" cy="1820754"/>
+          </a:xfrm>
+          <a:prstGeom prst="rect">
+            <a:avLst/>
+          </a:prstGeom>
+        </p:spPr>
+      </p:pic>
+      <p:pic>
+        <p:nvPicPr>
+          <p:cNvPr id="75" name="Picture 74"/>
+          <p:cNvPicPr>
+            <a:picLocks noChangeAspect="1"/>
+          </p:cNvPicPr>
+          <p:nvPr/>
+        </p:nvPicPr>
+        <p:blipFill>
+          <a:blip r:embed="rId3"/>
+          <a:stretch>
+            <a:fillRect/>
+          </a:stretch>
+        </p:blipFill>
+        <p:spPr>
+          <a:xfrm>
+            <a:off x="-732125" y="2414061"/>
+            <a:ext cx="2101809" cy="1830166"/>
+          </a:xfrm>
+          <a:prstGeom prst="rect">
+            <a:avLst/>
+          </a:prstGeom>
+        </p:spPr>
+      </p:pic>
+      <p:grpSp>
+        <p:nvGrpSpPr>
+          <p:cNvPr id="77" name="Group 76"/>
+          <p:cNvGrpSpPr/>
+          <p:nvPr/>
+        </p:nvGrpSpPr>
+        <p:grpSpPr>
+          <a:xfrm>
+            <a:off x="2421034" y="2396540"/>
+            <a:ext cx="2114661" cy="1828662"/>
+            <a:chOff x="2450758" y="2455881"/>
+            <a:chExt cx="2157064" cy="1865330"/>
+          </a:xfrm>
+        </p:grpSpPr>
+        <p:pic>
+          <p:nvPicPr>
+            <p:cNvPr id="78" name="Picture 77"/>
+            <p:cNvPicPr>
+              <a:picLocks noChangeAspect="1"/>
+            </p:cNvPicPr>
+            <p:nvPr/>
+          </p:nvPicPr>
+          <p:blipFill>
+            <a:blip r:embed="rId4"/>
+            <a:stretch>
+              <a:fillRect/>
+            </a:stretch>
+          </p:blipFill>
+          <p:spPr>
+            <a:xfrm>
+              <a:off x="2450758" y="2455881"/>
+              <a:ext cx="2157064" cy="1865330"/>
+            </a:xfrm>
+            <a:prstGeom prst="rect">
+              <a:avLst/>
+            </a:prstGeom>
+          </p:spPr>
+        </p:pic>
+        <p:sp>
+          <p:nvSpPr>
+            <p:cNvPr id="79" name="Rectangle 78"/>
+            <p:cNvSpPr/>
+            <p:nvPr/>
+          </p:nvSpPr>
+          <p:spPr>
+            <a:xfrm>
+              <a:off x="2806867" y="3045748"/>
+              <a:ext cx="1428168" cy="371244"/>
+            </a:xfrm>
+            <a:prstGeom prst="rect">
+              <a:avLst/>
+            </a:prstGeom>
+          </p:spPr>
+          <p:txBody>
+            <a:bodyPr wrap="square">
+              <a:spAutoFit/>
+            </a:bodyPr>
+            <a:lstStyle/>
+            <a:p>
+              <a:pPr algn="ctr" defTabSz="914004">
+                <a:spcAft>
+                  <a:spcPts val="1175"/>
+                </a:spcAft>
+                <a:defRPr/>
+              </a:pPr>
+              <a:endParaRPr lang="en-US" sz="1765" dirty="0">
+                <a:solidFill>
+                  <a:srgbClr val="002050"/>
+                </a:solidFill>
+                <a:latin typeface="Segoe UI Semibold" panose="020B0702040204020203" pitchFamily="34" charset="0"/>
+                <a:cs typeface="Segoe UI Semibold" panose="020B0702040204020203" pitchFamily="34" charset="0"/>
+              </a:endParaRPr>
+            </a:p>
+          </p:txBody>
+        </p:sp>
+      </p:grpSp>
+      <p:grpSp>
+        <p:nvGrpSpPr>
+          <p:cNvPr id="83" name="Group 82"/>
+          <p:cNvGrpSpPr/>
+          <p:nvPr/>
+        </p:nvGrpSpPr>
+        <p:grpSpPr>
+          <a:xfrm>
+            <a:off x="823663" y="1517292"/>
+            <a:ext cx="2114661" cy="1828662"/>
+            <a:chOff x="840179" y="1547221"/>
+            <a:chExt cx="2157064" cy="1865330"/>
+          </a:xfrm>
+        </p:grpSpPr>
+        <p:pic>
+          <p:nvPicPr>
+            <p:cNvPr id="84" name="Picture 83"/>
+            <p:cNvPicPr>
+              <a:picLocks noChangeAspect="1"/>
+            </p:cNvPicPr>
+            <p:nvPr/>
+          </p:nvPicPr>
+          <p:blipFill>
+            <a:blip r:embed="rId4"/>
+            <a:stretch>
+              <a:fillRect/>
+            </a:stretch>
+          </p:blipFill>
+          <p:spPr>
+            <a:xfrm>
+              <a:off x="840179" y="1547221"/>
+              <a:ext cx="2157064" cy="1865330"/>
+            </a:xfrm>
+            <a:prstGeom prst="rect">
+              <a:avLst/>
+            </a:prstGeom>
+          </p:spPr>
+        </p:pic>
+        <p:sp>
+          <p:nvSpPr>
+            <p:cNvPr id="85" name="Rectangle 84"/>
+            <p:cNvSpPr/>
+            <p:nvPr/>
+          </p:nvSpPr>
+          <p:spPr>
+            <a:xfrm>
+              <a:off x="1821099" y="2309070"/>
+              <a:ext cx="188435" cy="343512"/>
+            </a:xfrm>
+            <a:prstGeom prst="rect">
+              <a:avLst/>
+            </a:prstGeom>
+          </p:spPr>
+          <p:txBody>
+            <a:bodyPr wrap="none">
+              <a:spAutoFit/>
+            </a:bodyPr>
+            <a:lstStyle/>
+            <a:p>
+              <a:pPr algn="ctr" defTabSz="913741">
+                <a:lnSpc>
+                  <a:spcPct val="90000"/>
+                </a:lnSpc>
+                <a:defRPr/>
+              </a:pPr>
+              <a:endParaRPr lang="en-US" sz="1765" dirty="0">
+                <a:solidFill>
+                  <a:srgbClr val="002050"/>
+                </a:solidFill>
+                <a:latin typeface="Segoe UI Semibold" panose="020B0702040204020203" pitchFamily="34" charset="0"/>
+                <a:cs typeface="Segoe UI Semibold" panose="020B0702040204020203" pitchFamily="34" charset="0"/>
+              </a:endParaRPr>
+            </a:p>
+          </p:txBody>
+        </p:sp>
+      </p:grpSp>
+      <p:pic>
+        <p:nvPicPr>
+          <p:cNvPr id="86" name="Picture 85"/>
+          <p:cNvPicPr>
+            <a:picLocks noChangeAspect="1"/>
+          </p:cNvPicPr>
+          <p:nvPr/>
+        </p:nvPicPr>
+        <p:blipFill>
+          <a:blip r:embed="rId3"/>
+          <a:stretch>
+            <a:fillRect/>
+          </a:stretch>
+        </p:blipFill>
+        <p:spPr>
+          <a:xfrm>
+            <a:off x="-734123" y="6034259"/>
+            <a:ext cx="2101809" cy="1820754"/>
+          </a:xfrm>
+          <a:prstGeom prst="rect">
+            <a:avLst/>
+          </a:prstGeom>
+        </p:spPr>
+      </p:pic>
+      <p:pic>
+        <p:nvPicPr>
+          <p:cNvPr id="25" name="Picture 24"/>
+          <p:cNvPicPr>
+            <a:picLocks noChangeAspect="1"/>
+          </p:cNvPicPr>
+          <p:nvPr/>
+        </p:nvPicPr>
+        <p:blipFill>
+          <a:blip r:embed="rId3"/>
+          <a:stretch>
+            <a:fillRect/>
+          </a:stretch>
+        </p:blipFill>
+        <p:spPr>
+          <a:xfrm>
+            <a:off x="839416" y="3336638"/>
+            <a:ext cx="2101809" cy="1820754"/>
+          </a:xfrm>
+          <a:prstGeom prst="rect">
+            <a:avLst/>
+          </a:prstGeom>
+        </p:spPr>
+      </p:pic>
+      <p:grpSp>
+        <p:nvGrpSpPr>
+          <p:cNvPr id="24" name="Group 23"/>
+          <p:cNvGrpSpPr/>
+          <p:nvPr/>
+        </p:nvGrpSpPr>
+        <p:grpSpPr>
+          <a:xfrm>
+            <a:off x="839206" y="3297098"/>
+            <a:ext cx="2114661" cy="1828662"/>
+            <a:chOff x="840179" y="1547221"/>
+            <a:chExt cx="2157064" cy="1865330"/>
+          </a:xfrm>
+        </p:grpSpPr>
+        <p:pic>
+          <p:nvPicPr>
+            <p:cNvPr id="26" name="Picture 25"/>
+            <p:cNvPicPr>
+              <a:picLocks noChangeAspect="1"/>
+            </p:cNvPicPr>
+            <p:nvPr/>
+          </p:nvPicPr>
+          <p:blipFill>
+            <a:blip r:embed="rId4"/>
+            <a:stretch>
+              <a:fillRect/>
+            </a:stretch>
+          </p:blipFill>
+          <p:spPr>
+            <a:xfrm>
+              <a:off x="840179" y="1547221"/>
+              <a:ext cx="2157064" cy="1865330"/>
+            </a:xfrm>
+            <a:prstGeom prst="rect">
+              <a:avLst/>
+            </a:prstGeom>
+          </p:spPr>
+        </p:pic>
+        <p:sp>
+          <p:nvSpPr>
+            <p:cNvPr id="27" name="Rectangle 26"/>
+            <p:cNvSpPr/>
+            <p:nvPr/>
+          </p:nvSpPr>
+          <p:spPr>
+            <a:xfrm>
+              <a:off x="1821099" y="2309070"/>
+              <a:ext cx="188435" cy="343512"/>
+            </a:xfrm>
+            <a:prstGeom prst="rect">
+              <a:avLst/>
+            </a:prstGeom>
+          </p:spPr>
+          <p:txBody>
+            <a:bodyPr wrap="none">
+              <a:spAutoFit/>
+            </a:bodyPr>
+            <a:lstStyle/>
+            <a:p>
+              <a:pPr algn="ctr" defTabSz="913741">
+                <a:lnSpc>
+                  <a:spcPct val="90000"/>
+                </a:lnSpc>
+                <a:defRPr/>
+              </a:pPr>
+              <a:endParaRPr lang="en-US" sz="1765" dirty="0">
+                <a:solidFill>
+                  <a:srgbClr val="002050"/>
+                </a:solidFill>
+                <a:latin typeface="Segoe UI Semibold" panose="020B0702040204020203" pitchFamily="34" charset="0"/>
+                <a:cs typeface="Segoe UI Semibold" panose="020B0702040204020203" pitchFamily="34" charset="0"/>
+              </a:endParaRPr>
+            </a:p>
+          </p:txBody>
+        </p:sp>
+      </p:grpSp>
+      <p:pic>
+        <p:nvPicPr>
+          <p:cNvPr id="31" name="Picture 89"/>
+          <p:cNvPicPr>
+            <a:picLocks noChangeAspect="1"/>
+          </p:cNvPicPr>
+          <p:nvPr/>
+        </p:nvPicPr>
+        <p:blipFill>
+          <a:blip r:embed="rId3"/>
+          <a:stretch>
+            <a:fillRect/>
+          </a:stretch>
+        </p:blipFill>
+        <p:spPr>
+          <a:xfrm>
+            <a:off x="3968018" y="3292422"/>
+            <a:ext cx="2140301" cy="1854098"/>
+          </a:xfrm>
+          <a:prstGeom prst="rect">
+            <a:avLst/>
+          </a:prstGeom>
+        </p:spPr>
+      </p:pic>
+      <p:sp>
+        <p:nvSpPr>
+          <p:cNvPr id="30" name="8 CuadroTexto"/>
+          <p:cNvSpPr txBox="1"/>
+          <p:nvPr/>
+        </p:nvSpPr>
+        <p:spPr>
+          <a:xfrm>
+            <a:off x="2567608" y="608301"/>
+            <a:ext cx="8950101" cy="707886"/>
+          </a:xfrm>
+          <a:prstGeom prst="rect">
+            <a:avLst/>
+          </a:prstGeom>
+          <a:noFill/>
+        </p:spPr>
+        <p:txBody>
+          <a:bodyPr wrap="square" rtlCol="0">
+            <a:spAutoFit/>
+          </a:bodyPr>
+          <a:lstStyle/>
+          <a:p>
+            <a:pPr algn="r"/>
+            <a:r>
+              <a:rPr lang="es-ES" sz="4000" dirty="0">
+                <a:solidFill>
+                  <a:schemeClr val="tx2"/>
+                </a:solidFill>
+                <a:effectLst>
+                  <a:outerShdw blurRad="38100" dist="38100" dir="2700000" algn="tl">
+                    <a:srgbClr val="000000">
+                      <a:alpha val="43137"/>
+                    </a:srgbClr>
+                  </a:outerShdw>
+                </a:effectLst>
+                <a:latin typeface="Segoe UI" panose="020B0502040204020203" pitchFamily="34" charset="0"/>
+                <a:cs typeface="Segoe UI" panose="020B0502040204020203" pitchFamily="34" charset="0"/>
+              </a:rPr>
+              <a:t>Recordemos …</a:t>
+            </a:r>
+          </a:p>
+        </p:txBody>
+      </p:sp>
+      <p:sp>
+        <p:nvSpPr>
+          <p:cNvPr id="29" name="8 CuadroTexto"/>
+          <p:cNvSpPr txBox="1"/>
+          <p:nvPr/>
+        </p:nvSpPr>
+        <p:spPr>
+          <a:xfrm>
+            <a:off x="1385227" y="2984941"/>
+            <a:ext cx="2892648" cy="584775"/>
+          </a:xfrm>
+          <a:prstGeom prst="rect">
+            <a:avLst/>
+          </a:prstGeom>
+          <a:noFill/>
+        </p:spPr>
+        <p:txBody>
+          <a:bodyPr wrap="square" rtlCol="0">
+            <a:spAutoFit/>
+          </a:bodyPr>
+          <a:lstStyle/>
+          <a:p>
+            <a:r>
+              <a:rPr lang="es-ES" sz="3200" dirty="0">
+                <a:solidFill>
+                  <a:schemeClr val="bg1">
+                    <a:lumMod val="50000"/>
+                  </a:schemeClr>
+                </a:solidFill>
+                <a:latin typeface="Segoe UI" panose="020B0502040204020203" pitchFamily="34" charset="0"/>
+                <a:cs typeface="Segoe UI" panose="020B0502040204020203" pitchFamily="34" charset="0"/>
+              </a:rPr>
+              <a:t>C# 7.0</a:t>
+            </a:r>
+          </a:p>
+        </p:txBody>
+      </p:sp>
+      <p:sp>
+        <p:nvSpPr>
+          <p:cNvPr id="5" name="TextBox 4">
+            <a:extLst>
+              <a:ext uri="{FF2B5EF4-FFF2-40B4-BE49-F238E27FC236}">
+                <a16:creationId xmlns:a16="http://schemas.microsoft.com/office/drawing/2014/main" id="{2AD2F940-D8AF-D14D-8BD0-99B1B536D34E}"/>
+              </a:ext>
+            </a:extLst>
+          </p:cNvPr>
+          <p:cNvSpPr txBox="1"/>
+          <p:nvPr/>
+        </p:nvSpPr>
+        <p:spPr>
+          <a:xfrm>
+            <a:off x="6215505" y="3180460"/>
+            <a:ext cx="3524555" cy="369332"/>
+          </a:xfrm>
+          <a:prstGeom prst="rect">
+            <a:avLst/>
+          </a:prstGeom>
+          <a:noFill/>
+        </p:spPr>
+        <p:txBody>
+          <a:bodyPr wrap="none" rtlCol="0">
+            <a:spAutoFit/>
+          </a:bodyPr>
+          <a:lstStyle/>
+          <a:p>
+            <a:r>
+              <a:rPr lang="en-ES" dirty="0"/>
+              <a:t>Un vistazo rápido a las DEMOS … !!!</a:t>
+            </a:r>
+          </a:p>
+        </p:txBody>
+      </p:sp>
+      <p:sp>
+        <p:nvSpPr>
+          <p:cNvPr id="6" name="Rectangle 5">
+            <a:extLst>
+              <a:ext uri="{FF2B5EF4-FFF2-40B4-BE49-F238E27FC236}">
+                <a16:creationId xmlns:a16="http://schemas.microsoft.com/office/drawing/2014/main" id="{A60C1348-B48E-E04D-9B81-8C38C05C40F7}"/>
+              </a:ext>
+            </a:extLst>
+          </p:cNvPr>
+          <p:cNvSpPr/>
+          <p:nvPr/>
+        </p:nvSpPr>
+        <p:spPr>
+          <a:xfrm>
+            <a:off x="4460045" y="6228830"/>
+            <a:ext cx="6991311" cy="369332"/>
+          </a:xfrm>
+          <a:prstGeom prst="rect">
+            <a:avLst/>
+          </a:prstGeom>
+        </p:spPr>
+        <p:txBody>
+          <a:bodyPr wrap="square">
+            <a:spAutoFit/>
+          </a:bodyPr>
+          <a:lstStyle/>
+          <a:p>
+            <a:r>
+              <a:rPr lang="en-GB" dirty="0">
+                <a:hlinkClick r:id="rId5"/>
+              </a:rPr>
+              <a:t>https://github.com/juanluelguerre/Training/tree/master/CSFeatures/CS7</a:t>
+            </a:r>
+            <a:endParaRPr lang="en-ES" dirty="0"/>
+          </a:p>
+        </p:txBody>
+      </p:sp>
+    </p:spTree>
+    <p:extLst>
+      <p:ext uri="{BB962C8B-B14F-4D97-AF65-F5344CB8AC3E}">
+        <p14:creationId xmlns:p14="http://schemas.microsoft.com/office/powerpoint/2010/main" val="3648027504"/>
+      </p:ext>
+    </p:extLst>
+  </p:cSld>
+  <p:clrMapOvr>
+    <a:masterClrMapping/>
+  </p:clrMapOvr>
+  <p:transition spd="slow">
+    <p:push/>
+  </p:transition>
+</p:sld>
+</file>
+
+<file path=ppt/slides/slide5.xml><?xml version="1.0" encoding="utf-8"?>
 <p:sld xmlns:a="http://schemas.openxmlformats.org/drawingml/2006/main" xmlns:r="http://schemas.openxmlformats.org/officeDocument/2006/relationships" xmlns:p="http://schemas.openxmlformats.org/presentationml/2006/main">
   <p:cSld>
     <p:spTree>
@@ -16232,7 +18211,7 @@
 </p:sld>
 </file>
 
-<file path=ppt/slides/slide5.xml><?xml version="1.0" encoding="utf-8"?>
+<file path=ppt/slides/slide6.xml><?xml version="1.0" encoding="utf-8"?>
 <p:sld xmlns:a="http://schemas.openxmlformats.org/drawingml/2006/main" xmlns:r="http://schemas.openxmlformats.org/officeDocument/2006/relationships" xmlns:p="http://schemas.openxmlformats.org/presentationml/2006/main">
   <p:cSld>
     <p:spTree>
@@ -16304,7 +18283,7 @@
 </p:sld>
 </file>
 
-<file path=ppt/slides/slide6.xml><?xml version="1.0" encoding="utf-8"?>
+<file path=ppt/slides/slide7.xml><?xml version="1.0" encoding="utf-8"?>
 <p:sld xmlns:a="http://schemas.openxmlformats.org/drawingml/2006/main" xmlns:r="http://schemas.openxmlformats.org/officeDocument/2006/relationships" xmlns:p="http://schemas.openxmlformats.org/presentationml/2006/main">
   <p:cSld>
     <p:spTree>
@@ -17134,7 +19113,7 @@
 </p:sld>
 </file>
 
-<file path=ppt/slides/slide7.xml><?xml version="1.0" encoding="utf-8"?>
+<file path=ppt/slides/slide8.xml><?xml version="1.0" encoding="utf-8"?>
 <p:sld xmlns:a="http://schemas.openxmlformats.org/drawingml/2006/main" xmlns:r="http://schemas.openxmlformats.org/officeDocument/2006/relationships" xmlns:p="http://schemas.openxmlformats.org/presentationml/2006/main">
   <p:cSld>
     <p:spTree>
@@ -17850,7 +19829,7 @@
             <a:avLst/>
           </a:prstGeom>
           <a:noFill/>
-          <a:ln>
+          <a:ln w="38100">
             <a:solidFill>
               <a:srgbClr val="FF0000"/>
             </a:solidFill>
@@ -18056,6 +20035,56 @@
                 <a:schemeClr val="accent3"/>
               </a:solidFill>
             </a:endParaRPr>
+          </a:p>
+        </p:txBody>
+      </p:sp>
+      <p:sp>
+        <p:nvSpPr>
+          <p:cNvPr id="32" name="Rectángulo 1">
+            <a:extLst>
+              <a:ext uri="{FF2B5EF4-FFF2-40B4-BE49-F238E27FC236}">
+                <a16:creationId xmlns:a16="http://schemas.microsoft.com/office/drawing/2014/main" id="{4B53F6FD-3946-254E-8A26-C24F6E7614EC}"/>
+              </a:ext>
+            </a:extLst>
+          </p:cNvPr>
+          <p:cNvSpPr/>
+          <p:nvPr/>
+        </p:nvSpPr>
+        <p:spPr>
+          <a:xfrm>
+            <a:off x="581342" y="4401917"/>
+            <a:ext cx="819800" cy="2448774"/>
+          </a:xfrm>
+          <a:prstGeom prst="rect">
+            <a:avLst/>
+          </a:prstGeom>
+          <a:noFill/>
+          <a:ln w="57150">
+            <a:solidFill>
+              <a:srgbClr val="FF0000"/>
+            </a:solidFill>
+          </a:ln>
+        </p:spPr>
+        <p:style>
+          <a:lnRef idx="2">
+            <a:schemeClr val="accent2"/>
+          </a:lnRef>
+          <a:fillRef idx="1">
+            <a:schemeClr val="lt1"/>
+          </a:fillRef>
+          <a:effectRef idx="0">
+            <a:schemeClr val="accent2"/>
+          </a:effectRef>
+          <a:fontRef idx="minor">
+            <a:schemeClr val="dk1"/>
+          </a:fontRef>
+        </p:style>
+        <p:txBody>
+          <a:bodyPr rtlCol="0" anchor="ctr"/>
+          <a:lstStyle/>
+          <a:p>
+            <a:pPr algn="ctr"/>
+            <a:endParaRPr lang="es-ES"/>
           </a:p>
         </p:txBody>
       </p:sp>
@@ -18493,6 +20522,79 @@
                                   </p:childTnLst>
                                 </p:cTn>
                               </p:par>
+                              <p:par>
+                                <p:cTn id="29" presetID="2" presetClass="entr" presetSubtype="2" fill="hold" grpId="0" nodeType="withEffect">
+                                  <p:stCondLst>
+                                    <p:cond delay="0"/>
+                                  </p:stCondLst>
+                                  <p:childTnLst>
+                                    <p:set>
+                                      <p:cBhvr>
+                                        <p:cTn id="30" dur="1" fill="hold">
+                                          <p:stCondLst>
+                                            <p:cond delay="0"/>
+                                          </p:stCondLst>
+                                        </p:cTn>
+                                        <p:tgtEl>
+                                          <p:spTgt spid="32"/>
+                                        </p:tgtEl>
+                                        <p:attrNameLst>
+                                          <p:attrName>style.visibility</p:attrName>
+                                        </p:attrNameLst>
+                                      </p:cBhvr>
+                                      <p:to>
+                                        <p:strVal val="visible"/>
+                                      </p:to>
+                                    </p:set>
+                                    <p:anim calcmode="lin" valueType="num">
+                                      <p:cBhvr additive="base">
+                                        <p:cTn id="31" dur="500" fill="hold"/>
+                                        <p:tgtEl>
+                                          <p:spTgt spid="32"/>
+                                        </p:tgtEl>
+                                        <p:attrNameLst>
+                                          <p:attrName>ppt_x</p:attrName>
+                                        </p:attrNameLst>
+                                      </p:cBhvr>
+                                      <p:tavLst>
+                                        <p:tav tm="0">
+                                          <p:val>
+                                            <p:strVal val="1+#ppt_w/2"/>
+                                          </p:val>
+                                        </p:tav>
+                                        <p:tav tm="100000">
+                                          <p:val>
+                                            <p:strVal val="#ppt_x"/>
+                                          </p:val>
+                                        </p:tav>
+                                      </p:tavLst>
+                                    </p:anim>
+                                    <p:anim calcmode="lin" valueType="num">
+                                      <p:cBhvr additive="base">
+                                        <p:cTn id="32" dur="500" fill="hold"/>
+                                        <p:tgtEl>
+                                          <p:spTgt spid="32"/>
+                                        </p:tgtEl>
+                                        <p:attrNameLst>
+                                          <p:attrName>ppt_y</p:attrName>
+                                        </p:attrNameLst>
+                                      </p:cBhvr>
+                                      <p:tavLst>
+                                        <p:tav tm="0">
+                                          <p:val>
+                                            <p:strVal val="#ppt_y"/>
+                                          </p:val>
+                                        </p:tav>
+                                        <p:tav tm="100000">
+                                          <p:val>
+                                            <p:strVal val="#ppt_y"/>
+                                          </p:val>
+                                        </p:tav>
+                                      </p:tavLst>
+                                    </p:anim>
+                                  </p:childTnLst>
+                                </p:cTn>
+                              </p:par>
                             </p:childTnLst>
                           </p:cTn>
                         </p:par>
@@ -18526,12 +20628,13 @@
       <p:bldP spid="3" grpId="0"/>
       <p:bldP spid="4" grpId="0" animBg="1"/>
       <p:bldP spid="35" grpId="0" animBg="1"/>
+      <p:bldP spid="32" grpId="0" animBg="1"/>
     </p:bldLst>
   </p:timing>
 </p:sld>
 </file>
 
-<file path=ppt/slides/slide8.xml><?xml version="1.0" encoding="utf-8"?>
+<file path=ppt/slides/slide9.xml><?xml version="1.0" encoding="utf-8"?>
 <p:sld xmlns:a="http://schemas.openxmlformats.org/drawingml/2006/main" xmlns:r="http://schemas.openxmlformats.org/officeDocument/2006/relationships" xmlns:p="http://schemas.openxmlformats.org/presentationml/2006/main">
   <p:cSld>
     <p:spTree>
@@ -19207,333 +21310,6 @@
     <p:extLst>
       <p:ext uri="{BB962C8B-B14F-4D97-AF65-F5344CB8AC3E}">
         <p14:creationId xmlns:p14="http://schemas.microsoft.com/office/powerpoint/2010/main" val="1425935121"/>
-      </p:ext>
-    </p:extLst>
-  </p:cSld>
-  <p:clrMapOvr>
-    <a:masterClrMapping/>
-  </p:clrMapOvr>
-  <p:transition spd="slow">
-    <p:push/>
-  </p:transition>
-</p:sld>
-</file>
-
-<file path=ppt/slides/slide9.xml><?xml version="1.0" encoding="utf-8"?>
-<p:sld xmlns:a="http://schemas.openxmlformats.org/drawingml/2006/main" xmlns:r="http://schemas.openxmlformats.org/officeDocument/2006/relationships" xmlns:p="http://schemas.openxmlformats.org/presentationml/2006/main">
-  <p:cSld>
-    <p:spTree>
-      <p:nvGrpSpPr>
-        <p:cNvPr id="1" name=""/>
-        <p:cNvGrpSpPr/>
-        <p:nvPr/>
-      </p:nvGrpSpPr>
-      <p:grpSpPr>
-        <a:xfrm>
-          <a:off x="0" y="0"/>
-          <a:ext cx="0" cy="0"/>
-          <a:chOff x="0" y="0"/>
-          <a:chExt cx="0" cy="0"/>
-        </a:xfrm>
-      </p:grpSpPr>
-      <p:sp>
-        <p:nvSpPr>
-          <p:cNvPr id="6" name="Text Placeholder 3"/>
-          <p:cNvSpPr txBox="1">
-            <a:spLocks/>
-          </p:cNvSpPr>
-          <p:nvPr/>
-        </p:nvSpPr>
-        <p:spPr>
-          <a:xfrm>
-            <a:off x="911424" y="4907107"/>
-            <a:ext cx="7171337" cy="1792326"/>
-          </a:xfrm>
-          <a:prstGeom prst="rect">
-            <a:avLst/>
-          </a:prstGeom>
-        </p:spPr>
-        <p:txBody>
-          <a:bodyPr/>
-          <a:lstStyle>
-            <a:lvl1pPr marL="228600" indent="-228600" algn="l" defTabSz="914400" rtl="0" eaLnBrk="1" latinLnBrk="0" hangingPunct="1">
-              <a:lnSpc>
-                <a:spcPct val="90000"/>
-              </a:lnSpc>
-              <a:spcBef>
-                <a:spcPts val="1000"/>
-              </a:spcBef>
-              <a:buFont typeface="Arial" panose="020B0604020202020204" pitchFamily="34" charset="0"/>
-              <a:buChar char="•"/>
-              <a:defRPr sz="2800" kern="1200">
-                <a:solidFill>
-                  <a:schemeClr val="tx1"/>
-                </a:solidFill>
-                <a:latin typeface="+mn-lt"/>
-                <a:ea typeface="+mn-ea"/>
-                <a:cs typeface="+mn-cs"/>
-              </a:defRPr>
-            </a:lvl1pPr>
-            <a:lvl2pPr marL="685800" indent="-228600" algn="l" defTabSz="914400" rtl="0" eaLnBrk="1" latinLnBrk="0" hangingPunct="1">
-              <a:lnSpc>
-                <a:spcPct val="90000"/>
-              </a:lnSpc>
-              <a:spcBef>
-                <a:spcPts val="500"/>
-              </a:spcBef>
-              <a:buFont typeface="Arial" panose="020B0604020202020204" pitchFamily="34" charset="0"/>
-              <a:buChar char="•"/>
-              <a:defRPr sz="2400" kern="1200">
-                <a:solidFill>
-                  <a:schemeClr val="tx1"/>
-                </a:solidFill>
-                <a:latin typeface="+mn-lt"/>
-                <a:ea typeface="+mn-ea"/>
-                <a:cs typeface="+mn-cs"/>
-              </a:defRPr>
-            </a:lvl2pPr>
-            <a:lvl3pPr marL="1143000" indent="-228600" algn="l" defTabSz="914400" rtl="0" eaLnBrk="1" latinLnBrk="0" hangingPunct="1">
-              <a:lnSpc>
-                <a:spcPct val="90000"/>
-              </a:lnSpc>
-              <a:spcBef>
-                <a:spcPts val="500"/>
-              </a:spcBef>
-              <a:buFont typeface="Arial" panose="020B0604020202020204" pitchFamily="34" charset="0"/>
-              <a:buChar char="•"/>
-              <a:defRPr sz="2000" kern="1200">
-                <a:solidFill>
-                  <a:schemeClr val="tx1"/>
-                </a:solidFill>
-                <a:latin typeface="+mn-lt"/>
-                <a:ea typeface="+mn-ea"/>
-                <a:cs typeface="+mn-cs"/>
-              </a:defRPr>
-            </a:lvl3pPr>
-            <a:lvl4pPr marL="1600200" indent="-228600" algn="l" defTabSz="914400" rtl="0" eaLnBrk="1" latinLnBrk="0" hangingPunct="1">
-              <a:lnSpc>
-                <a:spcPct val="90000"/>
-              </a:lnSpc>
-              <a:spcBef>
-                <a:spcPts val="500"/>
-              </a:spcBef>
-              <a:buFont typeface="Arial" panose="020B0604020202020204" pitchFamily="34" charset="0"/>
-              <a:buChar char="•"/>
-              <a:defRPr sz="1800" kern="1200">
-                <a:solidFill>
-                  <a:schemeClr val="tx1"/>
-                </a:solidFill>
-                <a:latin typeface="+mn-lt"/>
-                <a:ea typeface="+mn-ea"/>
-                <a:cs typeface="+mn-cs"/>
-              </a:defRPr>
-            </a:lvl4pPr>
-            <a:lvl5pPr marL="2057400" indent="-228600" algn="l" defTabSz="914400" rtl="0" eaLnBrk="1" latinLnBrk="0" hangingPunct="1">
-              <a:lnSpc>
-                <a:spcPct val="90000"/>
-              </a:lnSpc>
-              <a:spcBef>
-                <a:spcPts val="500"/>
-              </a:spcBef>
-              <a:buFont typeface="Arial" panose="020B0604020202020204" pitchFamily="34" charset="0"/>
-              <a:buChar char="•"/>
-              <a:defRPr sz="1800" kern="1200">
-                <a:solidFill>
-                  <a:schemeClr val="tx1"/>
-                </a:solidFill>
-                <a:latin typeface="+mn-lt"/>
-                <a:ea typeface="+mn-ea"/>
-                <a:cs typeface="+mn-cs"/>
-              </a:defRPr>
-            </a:lvl5pPr>
-            <a:lvl6pPr marL="2514600" indent="-228600" algn="l" defTabSz="914400" rtl="0" eaLnBrk="1" latinLnBrk="0" hangingPunct="1">
-              <a:lnSpc>
-                <a:spcPct val="90000"/>
-              </a:lnSpc>
-              <a:spcBef>
-                <a:spcPts val="500"/>
-              </a:spcBef>
-              <a:buFont typeface="Arial" panose="020B0604020202020204" pitchFamily="34" charset="0"/>
-              <a:buChar char="•"/>
-              <a:defRPr sz="1800" kern="1200">
-                <a:solidFill>
-                  <a:schemeClr val="tx1"/>
-                </a:solidFill>
-                <a:latin typeface="+mn-lt"/>
-                <a:ea typeface="+mn-ea"/>
-                <a:cs typeface="+mn-cs"/>
-              </a:defRPr>
-            </a:lvl6pPr>
-            <a:lvl7pPr marL="2971800" indent="-228600" algn="l" defTabSz="914400" rtl="0" eaLnBrk="1" latinLnBrk="0" hangingPunct="1">
-              <a:lnSpc>
-                <a:spcPct val="90000"/>
-              </a:lnSpc>
-              <a:spcBef>
-                <a:spcPts val="500"/>
-              </a:spcBef>
-              <a:buFont typeface="Arial" panose="020B0604020202020204" pitchFamily="34" charset="0"/>
-              <a:buChar char="•"/>
-              <a:defRPr sz="1800" kern="1200">
-                <a:solidFill>
-                  <a:schemeClr val="tx1"/>
-                </a:solidFill>
-                <a:latin typeface="+mn-lt"/>
-                <a:ea typeface="+mn-ea"/>
-                <a:cs typeface="+mn-cs"/>
-              </a:defRPr>
-            </a:lvl7pPr>
-            <a:lvl8pPr marL="3429000" indent="-228600" algn="l" defTabSz="914400" rtl="0" eaLnBrk="1" latinLnBrk="0" hangingPunct="1">
-              <a:lnSpc>
-                <a:spcPct val="90000"/>
-              </a:lnSpc>
-              <a:spcBef>
-                <a:spcPts val="500"/>
-              </a:spcBef>
-              <a:buFont typeface="Arial" panose="020B0604020202020204" pitchFamily="34" charset="0"/>
-              <a:buChar char="•"/>
-              <a:defRPr sz="1800" kern="1200">
-                <a:solidFill>
-                  <a:schemeClr val="tx1"/>
-                </a:solidFill>
-                <a:latin typeface="+mn-lt"/>
-                <a:ea typeface="+mn-ea"/>
-                <a:cs typeface="+mn-cs"/>
-              </a:defRPr>
-            </a:lvl8pPr>
-            <a:lvl9pPr marL="3886200" indent="-228600" algn="l" defTabSz="914400" rtl="0" eaLnBrk="1" latinLnBrk="0" hangingPunct="1">
-              <a:lnSpc>
-                <a:spcPct val="90000"/>
-              </a:lnSpc>
-              <a:spcBef>
-                <a:spcPts val="500"/>
-              </a:spcBef>
-              <a:buFont typeface="Arial" panose="020B0604020202020204" pitchFamily="34" charset="0"/>
-              <a:buChar char="•"/>
-              <a:defRPr sz="1800" kern="1200">
-                <a:solidFill>
-                  <a:schemeClr val="tx1"/>
-                </a:solidFill>
-                <a:latin typeface="+mn-lt"/>
-                <a:ea typeface="+mn-ea"/>
-                <a:cs typeface="+mn-cs"/>
-              </a:defRPr>
-            </a:lvl9pPr>
-          </a:lstStyle>
-          <a:p>
-            <a:pPr marL="0" indent="0">
-              <a:buNone/>
-            </a:pPr>
-            <a:r>
-              <a:rPr lang="es-ES" sz="2000" dirty="0">
-                <a:latin typeface="Segoe UI Light" panose="020B0502040204020203" pitchFamily="34" charset="0"/>
-                <a:cs typeface="Segoe UI Light" panose="020B0502040204020203" pitchFamily="34" charset="0"/>
-                <a:hlinkClick r:id="rId3"/>
-              </a:rPr>
-              <a:t>jlguerrero@gmail.com</a:t>
-            </a:r>
-            <a:r>
-              <a:rPr lang="es-ES" sz="2000" dirty="0">
-                <a:latin typeface="Segoe UI Light" panose="020B0502040204020203" pitchFamily="34" charset="0"/>
-                <a:cs typeface="Segoe UI Light" panose="020B0502040204020203" pitchFamily="34" charset="0"/>
-              </a:rPr>
-              <a:t> </a:t>
-            </a:r>
-          </a:p>
-          <a:p>
-            <a:pPr marL="0" indent="0">
-              <a:buNone/>
-            </a:pPr>
-            <a:r>
-              <a:rPr lang="es-ES" sz="2000" dirty="0">
-                <a:latin typeface="Segoe UI Light" panose="020B0502040204020203" pitchFamily="34" charset="0"/>
-                <a:cs typeface="Segoe UI Light" panose="020B0502040204020203" pitchFamily="34" charset="0"/>
-              </a:rPr>
-              <a:t>@juanluelguerre</a:t>
-            </a:r>
-          </a:p>
-        </p:txBody>
-      </p:sp>
-      <p:sp>
-        <p:nvSpPr>
-          <p:cNvPr id="2" name="Rectangle 1"/>
-          <p:cNvSpPr/>
-          <p:nvPr/>
-        </p:nvSpPr>
-        <p:spPr>
-          <a:xfrm>
-            <a:off x="4536053" y="2859783"/>
-            <a:ext cx="6805384" cy="369332"/>
-          </a:xfrm>
-          <a:prstGeom prst="rect">
-            <a:avLst/>
-          </a:prstGeom>
-        </p:spPr>
-        <p:txBody>
-          <a:bodyPr wrap="square">
-            <a:spAutoFit/>
-          </a:bodyPr>
-          <a:lstStyle/>
-          <a:p>
-            <a:r>
-              <a:rPr lang="es-ES" dirty="0">
-                <a:hlinkClick r:id="rId4"/>
-              </a:rPr>
-              <a:t>https://github.com/juanluelguerre/Training/tree/master/CSFeatures/</a:t>
-            </a:r>
-            <a:r>
-              <a:rPr lang="es-ES" dirty="0"/>
-              <a:t> </a:t>
-            </a:r>
-          </a:p>
-        </p:txBody>
-      </p:sp>
-      <p:pic>
-        <p:nvPicPr>
-          <p:cNvPr id="7" name="Picture 2" descr="Resultado de imagen de github">
-            <a:hlinkClick r:id="rId4"/>
-          </p:cNvPr>
-          <p:cNvPicPr>
-            <a:picLocks noChangeAspect="1" noChangeArrowheads="1"/>
-          </p:cNvPicPr>
-          <p:nvPr/>
-        </p:nvPicPr>
-        <p:blipFill>
-          <a:blip r:embed="rId5" cstate="print">
-            <a:extLst>
-              <a:ext uri="{28A0092B-C50C-407E-A947-70E740481C1C}">
-                <a14:useLocalDpi xmlns:a14="http://schemas.microsoft.com/office/drawing/2010/main" val="0"/>
-              </a:ext>
-            </a:extLst>
-          </a:blip>
-          <a:srcRect/>
-          <a:stretch>
-            <a:fillRect/>
-          </a:stretch>
-        </p:blipFill>
-        <p:spPr bwMode="auto">
-          <a:xfrm>
-            <a:off x="8760296" y="2132856"/>
-            <a:ext cx="2242330" cy="745575"/>
-          </a:xfrm>
-          <a:prstGeom prst="rect">
-            <a:avLst/>
-          </a:prstGeom>
-          <a:noFill/>
-          <a:extLst>
-            <a:ext uri="{909E8E84-426E-40DD-AFC4-6F175D3DCCD1}">
-              <a14:hiddenFill xmlns:a14="http://schemas.microsoft.com/office/drawing/2010/main">
-                <a:solidFill>
-                  <a:srgbClr val="FFFFFF"/>
-                </a:solidFill>
-              </a14:hiddenFill>
-            </a:ext>
-          </a:extLst>
-        </p:spPr>
-      </p:pic>
-    </p:spTree>
-    <p:extLst>
-      <p:ext uri="{BB962C8B-B14F-4D97-AF65-F5344CB8AC3E}">
-        <p14:creationId xmlns:p14="http://schemas.microsoft.com/office/powerpoint/2010/main" val="3148757024"/>
       </p:ext>
     </p:extLst>
   </p:cSld>

</xml_diff>

<commit_message>
* CS7 fixed and CS8 samples added/fixed
</commit_message>
<xml_diff>
--- a/CSFeatures/CS80.pptx
+++ b/CSFeatures/CS80.pptx
@@ -2435,10 +2435,10 @@
         <a:lstStyle/>
         <a:p>
           <a:r>
-            <a:rPr lang="es-ES" dirty="0" err="1"/>
+            <a:rPr lang="es-ES" b="1" dirty="0" err="1"/>
             <a:t>Patterns</a:t>
           </a:r>
-          <a:endParaRPr lang="es-ES" dirty="0"/>
+          <a:endParaRPr lang="es-ES" b="1" dirty="0"/>
         </a:p>
       </dgm:t>
     </dgm:pt>
@@ -2832,10 +2832,24 @@
     <dgm:pt modelId="{4DE0BEA4-10FB-6241-8C0C-D9BD713FF5A4}" type="parTrans" cxnId="{B6F2EB39-D878-3E4E-A80C-BBE0427A825B}">
       <dgm:prSet/>
       <dgm:spPr/>
+      <dgm:t>
+        <a:bodyPr/>
+        <a:lstStyle/>
+        <a:p>
+          <a:endParaRPr lang="en-GB"/>
+        </a:p>
+      </dgm:t>
     </dgm:pt>
     <dgm:pt modelId="{0F029D95-61F1-3B44-AF22-7E7DFF49512F}" type="sibTrans" cxnId="{B6F2EB39-D878-3E4E-A80C-BBE0427A825B}">
       <dgm:prSet/>
       <dgm:spPr/>
+      <dgm:t>
+        <a:bodyPr/>
+        <a:lstStyle/>
+        <a:p>
+          <a:endParaRPr lang="en-GB"/>
+        </a:p>
+      </dgm:t>
     </dgm:pt>
     <dgm:pt modelId="{E56F1900-67AB-414C-B993-20E46BE57774}" type="pres">
       <dgm:prSet presAssocID="{352FE7B3-671C-4073-B16B-7DCE4922259F}" presName="Name0" presStyleCnt="0">
@@ -3653,10 +3667,10 @@
             <a:buNone/>
           </a:pPr>
           <a:r>
-            <a:rPr lang="es-ES" sz="1000" kern="1200" dirty="0" err="1"/>
+            <a:rPr lang="es-ES" sz="1000" b="1" kern="1200" dirty="0" err="1"/>
             <a:t>Patterns</a:t>
           </a:r>
-          <a:endParaRPr lang="es-ES" sz="1000" kern="1200" dirty="0"/>
+          <a:endParaRPr lang="es-ES" sz="1000" b="1" kern="1200" dirty="0"/>
         </a:p>
       </dsp:txBody>
       <dsp:txXfrm>
@@ -7088,7 +7102,7 @@
           <a:p>
             <a:fld id="{27B8802E-0937-47D4-BC87-B51C9102E14A}" type="datetimeFigureOut">
               <a:rPr lang="es-ES" smtClean="0"/>
-              <a:t>13/7/20</a:t>
+              <a:t>14/7/20</a:t>
             </a:fld>
             <a:endParaRPr lang="es-ES"/>
           </a:p>
@@ -7731,7 +7745,7 @@
                 <a:tabLst/>
                 <a:defRPr/>
               </a:pPr>
-              <a:t>7/13/20 9:59 PM</a:t>
+              <a:t>7/14/20 12:00 PM</a:t>
             </a:fld>
             <a:endParaRPr kumimoji="0" lang="en-US" sz="1200" b="0" i="0" u="none" strike="noStrike" kern="1200" cap="none" spc="0" normalizeH="0" baseline="0" noProof="0" dirty="0">
               <a:ln>
@@ -8754,7 +8768,7 @@
                 <a:tabLst/>
                 <a:defRPr/>
               </a:pPr>
-              <a:t>7/13/20 9:59 PM</a:t>
+              <a:t>7/14/20 12:00 PM</a:t>
             </a:fld>
             <a:endParaRPr kumimoji="0" lang="en-US" sz="1200" b="0" i="0" u="none" strike="noStrike" kern="1200" cap="none" spc="0" normalizeH="0" baseline="0" noProof="0" dirty="0">
               <a:ln>
@@ -9353,7 +9367,7 @@
                 <a:tabLst/>
                 <a:defRPr/>
               </a:pPr>
-              <a:t>7/13/20 10:00 PM</a:t>
+              <a:t>7/14/20 12:00 PM</a:t>
             </a:fld>
             <a:endParaRPr kumimoji="0" lang="en-US" sz="1200" b="0" i="0" u="none" strike="noStrike" kern="1200" cap="none" spc="0" normalizeH="0" baseline="0" noProof="0" dirty="0">
               <a:ln>
@@ -9755,7 +9769,7 @@
                 <a:tabLst/>
                 <a:defRPr/>
               </a:pPr>
-              <a:t>7/13/20 9:59 PM</a:t>
+              <a:t>7/14/20 12:00 PM</a:t>
             </a:fld>
             <a:endParaRPr kumimoji="0" lang="en-US" sz="1200" b="0" i="0" u="none" strike="noStrike" kern="1200" cap="none" spc="0" normalizeH="0" baseline="0" noProof="0" dirty="0">
               <a:ln>
@@ -10157,7 +10171,7 @@
                 <a:tabLst/>
                 <a:defRPr/>
               </a:pPr>
-              <a:t>7/13/20 9:59 PM</a:t>
+              <a:t>7/14/20 12:00 PM</a:t>
             </a:fld>
             <a:endParaRPr kumimoji="0" lang="en-US" sz="1200" b="0" i="0" u="none" strike="noStrike" kern="1200" cap="none" spc="0" normalizeH="0" baseline="0" noProof="0" dirty="0">
               <a:ln>
@@ -11275,7 +11289,7 @@
                 <a:tabLst/>
                 <a:defRPr/>
               </a:pPr>
-              <a:t>7/13/20 9:59 PM</a:t>
+              <a:t>7/14/20 12:00 PM</a:t>
             </a:fld>
             <a:endParaRPr kumimoji="0" lang="en-US" sz="1200" b="0" i="0" u="none" strike="noStrike" kern="1200" cap="none" spc="0" normalizeH="0" baseline="0" noProof="0" dirty="0">
               <a:ln>
@@ -11677,7 +11691,7 @@
                 <a:tabLst/>
                 <a:defRPr/>
               </a:pPr>
-              <a:t>7/13/20 9:59 PM</a:t>
+              <a:t>7/14/20 12:00 PM</a:t>
             </a:fld>
             <a:endParaRPr kumimoji="0" lang="en-US" sz="1200" b="0" i="0" u="none" strike="noStrike" kern="1200" cap="none" spc="0" normalizeH="0" baseline="0" noProof="0" dirty="0">
               <a:ln>
@@ -12066,7 +12080,7 @@
           <a:p>
             <a:fld id="{19846C5A-1DDF-42C4-9FB4-FFCE11C434AC}" type="datetimeFigureOut">
               <a:rPr lang="es-ES" smtClean="0"/>
-              <a:t>13/7/20</a:t>
+              <a:t>14/7/20</a:t>
             </a:fld>
             <a:endParaRPr lang="es-ES"/>
           </a:p>
@@ -12236,7 +12250,7 @@
           <a:p>
             <a:fld id="{19846C5A-1DDF-42C4-9FB4-FFCE11C434AC}" type="datetimeFigureOut">
               <a:rPr lang="es-ES" smtClean="0"/>
-              <a:t>13/7/20</a:t>
+              <a:t>14/7/20</a:t>
             </a:fld>
             <a:endParaRPr lang="es-ES"/>
           </a:p>
@@ -12416,7 +12430,7 @@
           <a:p>
             <a:fld id="{19846C5A-1DDF-42C4-9FB4-FFCE11C434AC}" type="datetimeFigureOut">
               <a:rPr lang="es-ES" smtClean="0"/>
-              <a:t>13/7/20</a:t>
+              <a:t>14/7/20</a:t>
             </a:fld>
             <a:endParaRPr lang="es-ES"/>
           </a:p>
@@ -12713,7 +12727,7 @@
           <a:p>
             <a:fld id="{19846C5A-1DDF-42C4-9FB4-FFCE11C434AC}" type="datetimeFigureOut">
               <a:rPr lang="es-ES" smtClean="0"/>
-              <a:t>13/7/20</a:t>
+              <a:t>14/7/20</a:t>
             </a:fld>
             <a:endParaRPr lang="es-ES"/>
           </a:p>
@@ -12959,7 +12973,7 @@
           <a:p>
             <a:fld id="{19846C5A-1DDF-42C4-9FB4-FFCE11C434AC}" type="datetimeFigureOut">
               <a:rPr lang="es-ES" smtClean="0"/>
-              <a:t>13/7/20</a:t>
+              <a:t>14/7/20</a:t>
             </a:fld>
             <a:endParaRPr lang="es-ES"/>
           </a:p>
@@ -13247,7 +13261,7 @@
           <a:p>
             <a:fld id="{19846C5A-1DDF-42C4-9FB4-FFCE11C434AC}" type="datetimeFigureOut">
               <a:rPr lang="es-ES" smtClean="0"/>
-              <a:t>13/7/20</a:t>
+              <a:t>14/7/20</a:t>
             </a:fld>
             <a:endParaRPr lang="es-ES"/>
           </a:p>
@@ -13669,7 +13683,7 @@
           <a:p>
             <a:fld id="{19846C5A-1DDF-42C4-9FB4-FFCE11C434AC}" type="datetimeFigureOut">
               <a:rPr lang="es-ES" smtClean="0"/>
-              <a:t>13/7/20</a:t>
+              <a:t>14/7/20</a:t>
             </a:fld>
             <a:endParaRPr lang="es-ES"/>
           </a:p>
@@ -13787,7 +13801,7 @@
           <a:p>
             <a:fld id="{19846C5A-1DDF-42C4-9FB4-FFCE11C434AC}" type="datetimeFigureOut">
               <a:rPr lang="es-ES" smtClean="0"/>
-              <a:t>13/7/20</a:t>
+              <a:t>14/7/20</a:t>
             </a:fld>
             <a:endParaRPr lang="es-ES"/>
           </a:p>
@@ -13882,7 +13896,7 @@
           <a:p>
             <a:fld id="{19846C5A-1DDF-42C4-9FB4-FFCE11C434AC}" type="datetimeFigureOut">
               <a:rPr lang="es-ES" smtClean="0"/>
-              <a:t>13/7/20</a:t>
+              <a:t>14/7/20</a:t>
             </a:fld>
             <a:endParaRPr lang="es-ES"/>
           </a:p>
@@ -14159,7 +14173,7 @@
           <a:p>
             <a:fld id="{19846C5A-1DDF-42C4-9FB4-FFCE11C434AC}" type="datetimeFigureOut">
               <a:rPr lang="es-ES" smtClean="0"/>
-              <a:t>13/7/20</a:t>
+              <a:t>14/7/20</a:t>
             </a:fld>
             <a:endParaRPr lang="es-ES"/>
           </a:p>
@@ -14412,7 +14426,7 @@
           <a:p>
             <a:fld id="{19846C5A-1DDF-42C4-9FB4-FFCE11C434AC}" type="datetimeFigureOut">
               <a:rPr lang="es-ES" smtClean="0"/>
-              <a:t>13/7/20</a:t>
+              <a:t>14/7/20</a:t>
             </a:fld>
             <a:endParaRPr lang="es-ES"/>
           </a:p>
@@ -14625,7 +14639,7 @@
           <a:p>
             <a:fld id="{19846C5A-1DDF-42C4-9FB4-FFCE11C434AC}" type="datetimeFigureOut">
               <a:rPr lang="es-ES" smtClean="0"/>
-              <a:t>13/7/20</a:t>
+              <a:t>14/7/20</a:t>
             </a:fld>
             <a:endParaRPr lang="es-ES"/>
           </a:p>
@@ -16465,7 +16479,7 @@
           <p:nvPr>
             <p:extLst>
               <p:ext uri="{D42A27DB-BD31-4B8C-83A1-F6EECF244321}">
-                <p14:modId xmlns:p14="http://schemas.microsoft.com/office/powerpoint/2010/main" val="482597274"/>
+                <p14:modId xmlns:p14="http://schemas.microsoft.com/office/powerpoint/2010/main" val="1076211568"/>
               </p:ext>
             </p:extLst>
           </p:nvPr>
@@ -19990,7 +20004,7 @@
         </p:nvSpPr>
         <p:spPr>
           <a:xfrm rot="19730977">
-            <a:off x="5193493" y="3310318"/>
+            <a:off x="4915619" y="3537346"/>
             <a:ext cx="5780493" cy="523220"/>
           </a:xfrm>
           <a:prstGeom prst="rect">

</xml_diff>